<commit_message>
add the Toward a traffic light paper contents to pptx
</commit_message>
<xml_diff>
--- a/1st_Seminar(강민수).pptx
+++ b/1st_Seminar(강민수).pptx
@@ -3,10 +3,10 @@
 <p:presentation xmlns:a="http://schemas.openxmlformats.org/drawingml/2006/main" xmlns:r="http://schemas.openxmlformats.org/officeDocument/2006/relationships" xmlns:p="http://schemas.openxmlformats.org/presentationml/2006/main" autoCompressPictures="0">
   <p:sldMasterIdLst>
     <p:sldMasterId id="2147483708" r:id="rId1"/>
-    <p:sldMasterId id="2147483720" r:id="rId2"/>
+    <p:sldMasterId id="2147483744" r:id="rId2"/>
   </p:sldMasterIdLst>
   <p:notesMasterIdLst>
-    <p:notesMasterId r:id="rId14"/>
+    <p:notesMasterId r:id="rId27"/>
   </p:notesMasterIdLst>
   <p:sldIdLst>
     <p:sldId id="256" r:id="rId3"/>
@@ -20,6 +20,19 @@
     <p:sldId id="264" r:id="rId11"/>
     <p:sldId id="265" r:id="rId12"/>
     <p:sldId id="266" r:id="rId13"/>
+    <p:sldId id="273" r:id="rId14"/>
+    <p:sldId id="268" r:id="rId15"/>
+    <p:sldId id="274" r:id="rId16"/>
+    <p:sldId id="275" r:id="rId17"/>
+    <p:sldId id="276" r:id="rId18"/>
+    <p:sldId id="269" r:id="rId19"/>
+    <p:sldId id="277" r:id="rId20"/>
+    <p:sldId id="278" r:id="rId21"/>
+    <p:sldId id="279" r:id="rId22"/>
+    <p:sldId id="280" r:id="rId23"/>
+    <p:sldId id="270" r:id="rId24"/>
+    <p:sldId id="271" r:id="rId25"/>
+    <p:sldId id="272" r:id="rId26"/>
   </p:sldIdLst>
   <p:sldSz cx="12192000" cy="6858000"/>
   <p:notesSz cx="6858000" cy="9144000"/>
@@ -211,7 +224,7 @@
           <a:p>
             <a:fld id="{B401493B-0A52-4E9A-A475-D6276A64515A}" type="datetimeFigureOut">
               <a:rPr lang="ko-KR" altLang="en-US" smtClean="0"/>
-              <a:t>2021-01-08</a:t>
+              <a:t>2021-01-11</a:t>
             </a:fld>
             <a:endParaRPr lang="ko-KR" altLang="en-US"/>
           </a:p>
@@ -621,7 +634,7 @@
             <a:fld id="{B61BEF0D-F0BB-DE4B-95CE-6DB70DBA9567}" type="datetimeFigureOut">
               <a:rPr lang="en-US" smtClean="0"/>
               <a:pPr/>
-              <a:t>1/8/2021</a:t>
+              <a:t>1/11/2021</a:t>
             </a:fld>
             <a:endParaRPr lang="en-US" dirty="0"/>
           </a:p>
@@ -793,7 +806,7 @@
             <a:fld id="{B61BEF0D-F0BB-DE4B-95CE-6DB70DBA9567}" type="datetimeFigureOut">
               <a:rPr lang="en-US" smtClean="0"/>
               <a:pPr/>
-              <a:t>1/8/2021</a:t>
+              <a:t>1/11/2021</a:t>
             </a:fld>
             <a:endParaRPr lang="en-US" dirty="0"/>
           </a:p>
@@ -975,7 +988,7 @@
             <a:fld id="{B61BEF0D-F0BB-DE4B-95CE-6DB70DBA9567}" type="datetimeFigureOut">
               <a:rPr lang="en-US" smtClean="0"/>
               <a:pPr/>
-              <a:t>1/8/2021</a:t>
+              <a:t>1/11/2021</a:t>
             </a:fld>
             <a:endParaRPr lang="en-US" dirty="0"/>
           </a:p>
@@ -1155,7 +1168,7 @@
               <a:lnSpc>
                 <a:spcPct val="85000"/>
               </a:lnSpc>
-              <a:defRPr sz="5400" spc="-50" baseline="0">
+              <a:defRPr sz="8000" spc="-50" baseline="0">
                 <a:solidFill>
                   <a:schemeClr val="tx1">
                     <a:lumMod val="85000"/>
@@ -1167,7 +1180,7 @@
           </a:lstStyle>
           <a:p>
             <a:r>
-              <a:rPr lang="ko-KR" altLang="en-US" dirty="0"/>
+              <a:rPr lang="ko-KR" altLang="en-US" smtClean="0"/>
               <a:t>마스터 제목 스타일 편집</a:t>
             </a:r>
             <a:endParaRPr lang="en-US" dirty="0"/>
@@ -1239,7 +1252,7 @@
           </a:lstStyle>
           <a:p>
             <a:r>
-              <a:rPr lang="ko-KR" altLang="en-US"/>
+              <a:rPr lang="ko-KR" altLang="en-US" smtClean="0"/>
               <a:t>클릭하여 마스터 부제목 스타일 편집</a:t>
             </a:r>
             <a:endParaRPr lang="en-US" dirty="0"/>
@@ -1264,7 +1277,7 @@
             <a:fld id="{B61BEF0D-F0BB-DE4B-95CE-6DB70DBA9567}" type="datetimeFigureOut">
               <a:rPr lang="en-US" smtClean="0"/>
               <a:pPr/>
-              <a:t>1/8/2021</a:t>
+              <a:t>1/11/2021</a:t>
             </a:fld>
             <a:endParaRPr lang="en-US" dirty="0"/>
           </a:p>
@@ -1354,7 +1367,7 @@
     </p:spTree>
     <p:extLst>
       <p:ext uri="{BB962C8B-B14F-4D97-AF65-F5344CB8AC3E}">
-        <p14:creationId xmlns:p14="http://schemas.microsoft.com/office/powerpoint/2010/main" val="436167587"/>
+        <p14:creationId xmlns:p14="http://schemas.microsoft.com/office/powerpoint/2010/main" val="70776072"/>
       </p:ext>
     </p:extLst>
   </p:cSld>
@@ -1396,12 +1409,12 @@
           <a:bodyPr/>
           <a:lstStyle>
             <a:lvl1pPr marL="0">
-              <a:defRPr sz="4000"/>
+              <a:defRPr/>
             </a:lvl1pPr>
           </a:lstStyle>
           <a:p>
             <a:r>
-              <a:rPr lang="ko-KR" altLang="en-US" dirty="0"/>
+              <a:rPr lang="ko-KR" altLang="en-US" smtClean="0"/>
               <a:t>마스터 제목 스타일 편집</a:t>
             </a:r>
             <a:endParaRPr lang="en-US" dirty="0"/>
@@ -1415,71 +1428,71 @@
             <a:spLocks noGrp="1"/>
           </p:cNvSpPr>
           <p:nvPr>
-            <p:ph idx="1"/>
+            <p:ph idx="1" hasCustomPrompt="1"/>
           </p:nvPr>
         </p:nvSpPr>
         <p:spPr/>
         <p:txBody>
           <a:bodyPr/>
           <a:lstStyle>
-            <a:lvl1pPr marL="457200" indent="-457200">
-              <a:buFont typeface="+mj-lt"/>
-              <a:buAutoNum type="arabicPeriod"/>
+            <a:lvl1pPr marL="91440" indent="-91440">
+              <a:buFont typeface="Wingdings" panose="05000000000000000000" pitchFamily="2" charset="2"/>
+              <a:buChar char="§"/>
               <a:defRPr/>
             </a:lvl1pPr>
             <a:lvl2pPr marL="544068" indent="-342900">
               <a:buFont typeface="+mj-lt"/>
-              <a:buAutoNum type="arabicParenR"/>
+              <a:buAutoNum type="arabicPeriod"/>
               <a:defRPr/>
             </a:lvl2pPr>
             <a:lvl3pPr marL="726948" indent="-342900">
-              <a:buFont typeface="+mj-ea"/>
-              <a:buAutoNum type="circleNumDbPlain"/>
+              <a:buFont typeface="+mj-lt"/>
+              <a:buAutoNum type="arabicParenR"/>
               <a:defRPr/>
             </a:lvl3pPr>
-            <a:lvl4pPr marL="909828" indent="-342900">
+            <a:lvl4pPr marL="749808" indent="-182880">
               <a:buFont typeface="Arial" panose="020B0604020202020204" pitchFamily="34" charset="0"/>
               <a:buChar char="•"/>
               <a:defRPr/>
             </a:lvl4pPr>
             <a:lvl5pPr marL="932688" indent="-182880">
               <a:buFont typeface="Wingdings" panose="05000000000000000000" pitchFamily="2" charset="2"/>
-              <a:buChar char="ü"/>
+              <a:buChar char="Ø"/>
               <a:defRPr/>
             </a:lvl5pPr>
           </a:lstStyle>
           <a:p>
             <a:pPr lvl="0"/>
             <a:r>
-              <a:rPr lang="ko-KR" altLang="en-US" dirty="0"/>
-              <a:t>마스터 텍스트 스타일 편집</a:t>
+              <a:rPr lang="ko-KR" altLang="en-US" dirty="0" smtClean="0"/>
+              <a:t> 마스터 텍스트 스타일 편집</a:t>
             </a:r>
           </a:p>
           <a:p>
             <a:pPr lvl="1"/>
             <a:r>
-              <a:rPr lang="ko-KR" altLang="en-US" dirty="0"/>
+              <a:rPr lang="ko-KR" altLang="en-US" dirty="0" smtClean="0"/>
               <a:t>둘째 수준</a:t>
             </a:r>
           </a:p>
           <a:p>
             <a:pPr lvl="2"/>
             <a:r>
-              <a:rPr lang="ko-KR" altLang="en-US" dirty="0"/>
+              <a:rPr lang="ko-KR" altLang="en-US" dirty="0" smtClean="0"/>
               <a:t>셋째 수준</a:t>
             </a:r>
           </a:p>
           <a:p>
             <a:pPr lvl="3"/>
             <a:r>
-              <a:rPr lang="ko-KR" altLang="en-US" dirty="0"/>
+              <a:rPr lang="ko-KR" altLang="en-US" dirty="0" smtClean="0"/>
               <a:t>넷째 수준</a:t>
             </a:r>
           </a:p>
           <a:p>
             <a:pPr lvl="4"/>
             <a:r>
-              <a:rPr lang="ko-KR" altLang="en-US" dirty="0"/>
+              <a:rPr lang="ko-KR" altLang="en-US" dirty="0" smtClean="0"/>
               <a:t>다섯째 수준</a:t>
             </a:r>
             <a:endParaRPr lang="en-US" dirty="0"/>
@@ -1504,7 +1517,7 @@
             <a:fld id="{B61BEF0D-F0BB-DE4B-95CE-6DB70DBA9567}" type="datetimeFigureOut">
               <a:rPr lang="en-US" smtClean="0"/>
               <a:pPr/>
-              <a:t>1/8/2021</a:t>
+              <a:t>1/11/2021</a:t>
             </a:fld>
             <a:endParaRPr lang="en-US" dirty="0"/>
           </a:p>
@@ -1556,13 +1569,20 @@
     </p:spTree>
     <p:extLst>
       <p:ext uri="{BB962C8B-B14F-4D97-AF65-F5344CB8AC3E}">
-        <p14:creationId xmlns:p14="http://schemas.microsoft.com/office/powerpoint/2010/main" val="1451452566"/>
+        <p14:creationId xmlns:p14="http://schemas.microsoft.com/office/powerpoint/2010/main" val="568497389"/>
       </p:ext>
     </p:extLst>
   </p:cSld>
   <p:clrMapOvr>
     <a:masterClrMapping/>
   </p:clrMapOvr>
+  <p:timing>
+    <p:tnLst>
+      <p:par>
+        <p:cTn id="1" dur="indefinite" restart="never" nodeType="tmRoot"/>
+      </p:par>
+    </p:tnLst>
+  </p:timing>
 </p:sldLayout>
 </file>
 
@@ -1704,7 +1724,7 @@
           </a:lstStyle>
           <a:p>
             <a:r>
-              <a:rPr lang="ko-KR" altLang="en-US"/>
+              <a:rPr lang="ko-KR" altLang="en-US" smtClean="0"/>
               <a:t>마스터 제목 스타일 편집</a:t>
             </a:r>
             <a:endParaRPr lang="en-US" dirty="0"/>
@@ -1825,7 +1845,7 @@
           <a:p>
             <a:pPr lvl="0"/>
             <a:r>
-              <a:rPr lang="ko-KR" altLang="en-US"/>
+              <a:rPr lang="ko-KR" altLang="en-US" smtClean="0"/>
               <a:t>마스터 텍스트 스타일 편집</a:t>
             </a:r>
           </a:p>
@@ -1849,7 +1869,7 @@
             <a:fld id="{B61BEF0D-F0BB-DE4B-95CE-6DB70DBA9567}" type="datetimeFigureOut">
               <a:rPr lang="en-US" smtClean="0"/>
               <a:pPr/>
-              <a:t>1/8/2021</a:t>
+              <a:t>1/11/2021</a:t>
             </a:fld>
             <a:endParaRPr lang="en-US" dirty="0"/>
           </a:p>
@@ -1939,7 +1959,7 @@
     </p:spTree>
     <p:extLst>
       <p:ext uri="{BB962C8B-B14F-4D97-AF65-F5344CB8AC3E}">
-        <p14:creationId xmlns:p14="http://schemas.microsoft.com/office/powerpoint/2010/main" val="1772112480"/>
+        <p14:creationId xmlns:p14="http://schemas.microsoft.com/office/powerpoint/2010/main" val="765463831"/>
       </p:ext>
     </p:extLst>
   </p:cSld>
@@ -1987,7 +2007,7 @@
           <a:lstStyle/>
           <a:p>
             <a:r>
-              <a:rPr lang="ko-KR" altLang="en-US"/>
+              <a:rPr lang="ko-KR" altLang="en-US" smtClean="0"/>
               <a:t>마스터 제목 스타일 편집</a:t>
             </a:r>
             <a:endParaRPr lang="en-US" dirty="0"/>
@@ -2016,35 +2036,35 @@
           <a:p>
             <a:pPr lvl="0"/>
             <a:r>
-              <a:rPr lang="ko-KR" altLang="en-US"/>
+              <a:rPr lang="ko-KR" altLang="en-US" smtClean="0"/>
               <a:t>마스터 텍스트 스타일 편집</a:t>
             </a:r>
           </a:p>
           <a:p>
             <a:pPr lvl="1"/>
             <a:r>
-              <a:rPr lang="ko-KR" altLang="en-US"/>
+              <a:rPr lang="ko-KR" altLang="en-US" smtClean="0"/>
               <a:t>둘째 수준</a:t>
             </a:r>
           </a:p>
           <a:p>
             <a:pPr lvl="2"/>
             <a:r>
-              <a:rPr lang="ko-KR" altLang="en-US"/>
+              <a:rPr lang="ko-KR" altLang="en-US" smtClean="0"/>
               <a:t>셋째 수준</a:t>
             </a:r>
           </a:p>
           <a:p>
             <a:pPr lvl="3"/>
             <a:r>
-              <a:rPr lang="ko-KR" altLang="en-US"/>
+              <a:rPr lang="ko-KR" altLang="en-US" smtClean="0"/>
               <a:t>넷째 수준</a:t>
             </a:r>
           </a:p>
           <a:p>
             <a:pPr lvl="4"/>
             <a:r>
-              <a:rPr lang="ko-KR" altLang="en-US"/>
+              <a:rPr lang="ko-KR" altLang="en-US" smtClean="0"/>
               <a:t>다섯째 수준</a:t>
             </a:r>
             <a:endParaRPr lang="en-US" dirty="0"/>
@@ -2073,35 +2093,35 @@
           <a:p>
             <a:pPr lvl="0"/>
             <a:r>
-              <a:rPr lang="ko-KR" altLang="en-US"/>
+              <a:rPr lang="ko-KR" altLang="en-US" smtClean="0"/>
               <a:t>마스터 텍스트 스타일 편집</a:t>
             </a:r>
           </a:p>
           <a:p>
             <a:pPr lvl="1"/>
             <a:r>
-              <a:rPr lang="ko-KR" altLang="en-US"/>
+              <a:rPr lang="ko-KR" altLang="en-US" smtClean="0"/>
               <a:t>둘째 수준</a:t>
             </a:r>
           </a:p>
           <a:p>
             <a:pPr lvl="2"/>
             <a:r>
-              <a:rPr lang="ko-KR" altLang="en-US"/>
+              <a:rPr lang="ko-KR" altLang="en-US" smtClean="0"/>
               <a:t>셋째 수준</a:t>
             </a:r>
           </a:p>
           <a:p>
             <a:pPr lvl="3"/>
             <a:r>
-              <a:rPr lang="ko-KR" altLang="en-US"/>
+              <a:rPr lang="ko-KR" altLang="en-US" smtClean="0"/>
               <a:t>넷째 수준</a:t>
             </a:r>
           </a:p>
           <a:p>
             <a:pPr lvl="4"/>
             <a:r>
-              <a:rPr lang="ko-KR" altLang="en-US"/>
+              <a:rPr lang="ko-KR" altLang="en-US" smtClean="0"/>
               <a:t>다섯째 수준</a:t>
             </a:r>
             <a:endParaRPr lang="en-US" dirty="0"/>
@@ -2126,7 +2146,7 @@
             <a:fld id="{B61BEF0D-F0BB-DE4B-95CE-6DB70DBA9567}" type="datetimeFigureOut">
               <a:rPr lang="en-US" smtClean="0"/>
               <a:pPr/>
-              <a:t>1/8/2021</a:t>
+              <a:t>1/11/2021</a:t>
             </a:fld>
             <a:endParaRPr lang="en-US" dirty="0"/>
           </a:p>
@@ -2178,7 +2198,7 @@
     </p:spTree>
     <p:extLst>
       <p:ext uri="{BB962C8B-B14F-4D97-AF65-F5344CB8AC3E}">
-        <p14:creationId xmlns:p14="http://schemas.microsoft.com/office/powerpoint/2010/main" val="1178415595"/>
+        <p14:creationId xmlns:p14="http://schemas.microsoft.com/office/powerpoint/2010/main" val="146217383"/>
       </p:ext>
     </p:extLst>
   </p:cSld>
@@ -2226,7 +2246,7 @@
           <a:lstStyle/>
           <a:p>
             <a:r>
-              <a:rPr lang="ko-KR" altLang="en-US"/>
+              <a:rPr lang="ko-KR" altLang="en-US" smtClean="0"/>
               <a:t>마스터 제목 스타일 편집</a:t>
             </a:r>
             <a:endParaRPr lang="en-US" dirty="0"/>
@@ -2298,7 +2318,7 @@
           <a:p>
             <a:pPr lvl="0"/>
             <a:r>
-              <a:rPr lang="ko-KR" altLang="en-US"/>
+              <a:rPr lang="ko-KR" altLang="en-US" smtClean="0"/>
               <a:t>마스터 텍스트 스타일 편집</a:t>
             </a:r>
           </a:p>
@@ -2326,35 +2346,35 @@
           <a:p>
             <a:pPr lvl="0"/>
             <a:r>
-              <a:rPr lang="ko-KR" altLang="en-US"/>
+              <a:rPr lang="ko-KR" altLang="en-US" smtClean="0"/>
               <a:t>마스터 텍스트 스타일 편집</a:t>
             </a:r>
           </a:p>
           <a:p>
             <a:pPr lvl="1"/>
             <a:r>
-              <a:rPr lang="ko-KR" altLang="en-US"/>
+              <a:rPr lang="ko-KR" altLang="en-US" smtClean="0"/>
               <a:t>둘째 수준</a:t>
             </a:r>
           </a:p>
           <a:p>
             <a:pPr lvl="2"/>
             <a:r>
-              <a:rPr lang="ko-KR" altLang="en-US"/>
+              <a:rPr lang="ko-KR" altLang="en-US" smtClean="0"/>
               <a:t>셋째 수준</a:t>
             </a:r>
           </a:p>
           <a:p>
             <a:pPr lvl="3"/>
             <a:r>
-              <a:rPr lang="ko-KR" altLang="en-US"/>
+              <a:rPr lang="ko-KR" altLang="en-US" smtClean="0"/>
               <a:t>넷째 수준</a:t>
             </a:r>
           </a:p>
           <a:p>
             <a:pPr lvl="4"/>
             <a:r>
-              <a:rPr lang="ko-KR" altLang="en-US"/>
+              <a:rPr lang="ko-KR" altLang="en-US" smtClean="0"/>
               <a:t>다섯째 수준</a:t>
             </a:r>
             <a:endParaRPr lang="en-US" dirty="0"/>
@@ -2426,7 +2446,7 @@
           <a:p>
             <a:pPr lvl="0"/>
             <a:r>
-              <a:rPr lang="ko-KR" altLang="en-US"/>
+              <a:rPr lang="ko-KR" altLang="en-US" smtClean="0"/>
               <a:t>마스터 텍스트 스타일 편집</a:t>
             </a:r>
           </a:p>
@@ -2454,35 +2474,35 @@
           <a:p>
             <a:pPr lvl="0"/>
             <a:r>
-              <a:rPr lang="ko-KR" altLang="en-US"/>
+              <a:rPr lang="ko-KR" altLang="en-US" smtClean="0"/>
               <a:t>마스터 텍스트 스타일 편집</a:t>
             </a:r>
           </a:p>
           <a:p>
             <a:pPr lvl="1"/>
             <a:r>
-              <a:rPr lang="ko-KR" altLang="en-US"/>
+              <a:rPr lang="ko-KR" altLang="en-US" smtClean="0"/>
               <a:t>둘째 수준</a:t>
             </a:r>
           </a:p>
           <a:p>
             <a:pPr lvl="2"/>
             <a:r>
-              <a:rPr lang="ko-KR" altLang="en-US"/>
+              <a:rPr lang="ko-KR" altLang="en-US" smtClean="0"/>
               <a:t>셋째 수준</a:t>
             </a:r>
           </a:p>
           <a:p>
             <a:pPr lvl="3"/>
             <a:r>
-              <a:rPr lang="ko-KR" altLang="en-US"/>
+              <a:rPr lang="ko-KR" altLang="en-US" smtClean="0"/>
               <a:t>넷째 수준</a:t>
             </a:r>
           </a:p>
           <a:p>
             <a:pPr lvl="4"/>
             <a:r>
-              <a:rPr lang="ko-KR" altLang="en-US"/>
+              <a:rPr lang="ko-KR" altLang="en-US" smtClean="0"/>
               <a:t>다섯째 수준</a:t>
             </a:r>
             <a:endParaRPr lang="en-US" dirty="0"/>
@@ -2507,7 +2527,7 @@
             <a:fld id="{B61BEF0D-F0BB-DE4B-95CE-6DB70DBA9567}" type="datetimeFigureOut">
               <a:rPr lang="en-US" smtClean="0"/>
               <a:pPr/>
-              <a:t>1/8/2021</a:t>
+              <a:t>1/11/2021</a:t>
             </a:fld>
             <a:endParaRPr lang="en-US" dirty="0"/>
           </a:p>
@@ -2559,7 +2579,7 @@
     </p:spTree>
     <p:extLst>
       <p:ext uri="{BB962C8B-B14F-4D97-AF65-F5344CB8AC3E}">
-        <p14:creationId xmlns:p14="http://schemas.microsoft.com/office/powerpoint/2010/main" val="1746657718"/>
+        <p14:creationId xmlns:p14="http://schemas.microsoft.com/office/powerpoint/2010/main" val="1217535738"/>
       </p:ext>
     </p:extLst>
   </p:cSld>
@@ -2602,7 +2622,7 @@
           <a:lstStyle/>
           <a:p>
             <a:r>
-              <a:rPr lang="ko-KR" altLang="en-US"/>
+              <a:rPr lang="ko-KR" altLang="en-US" smtClean="0"/>
               <a:t>마스터 제목 스타일 편집</a:t>
             </a:r>
             <a:endParaRPr lang="en-US" dirty="0"/>
@@ -2627,7 +2647,7 @@
             <a:fld id="{B61BEF0D-F0BB-DE4B-95CE-6DB70DBA9567}" type="datetimeFigureOut">
               <a:rPr lang="en-US" smtClean="0"/>
               <a:pPr/>
-              <a:t>1/8/2021</a:t>
+              <a:t>1/11/2021</a:t>
             </a:fld>
             <a:endParaRPr lang="en-US" dirty="0"/>
           </a:p>
@@ -2679,7 +2699,7 @@
     </p:spTree>
     <p:extLst>
       <p:ext uri="{BB962C8B-B14F-4D97-AF65-F5344CB8AC3E}">
-        <p14:creationId xmlns:p14="http://schemas.microsoft.com/office/powerpoint/2010/main" val="4078050240"/>
+        <p14:creationId xmlns:p14="http://schemas.microsoft.com/office/powerpoint/2010/main" val="838852106"/>
       </p:ext>
     </p:extLst>
   </p:cSld>
@@ -2800,7 +2820,7 @@
             <a:fld id="{B61BEF0D-F0BB-DE4B-95CE-6DB70DBA9567}" type="datetimeFigureOut">
               <a:rPr lang="en-US" smtClean="0"/>
               <a:pPr/>
-              <a:t>1/8/2021</a:t>
+              <a:t>1/11/2021</a:t>
             </a:fld>
             <a:endParaRPr lang="en-US" dirty="0"/>
           </a:p>
@@ -2860,7 +2880,7 @@
     </p:spTree>
     <p:extLst>
       <p:ext uri="{BB962C8B-B14F-4D97-AF65-F5344CB8AC3E}">
-        <p14:creationId xmlns:p14="http://schemas.microsoft.com/office/powerpoint/2010/main" val="1463527147"/>
+        <p14:creationId xmlns:p14="http://schemas.microsoft.com/office/powerpoint/2010/main" val="1917519724"/>
       </p:ext>
     </p:extLst>
   </p:cSld>
@@ -2994,7 +3014,7 @@
           </a:lstStyle>
           <a:p>
             <a:r>
-              <a:rPr lang="ko-KR" altLang="en-US"/>
+              <a:rPr lang="ko-KR" altLang="en-US" smtClean="0"/>
               <a:t>마스터 제목 스타일 편집</a:t>
             </a:r>
             <a:endParaRPr lang="en-US" dirty="0"/>
@@ -3023,35 +3043,35 @@
           <a:p>
             <a:pPr lvl="0"/>
             <a:r>
-              <a:rPr lang="ko-KR" altLang="en-US"/>
+              <a:rPr lang="ko-KR" altLang="en-US" smtClean="0"/>
               <a:t>마스터 텍스트 스타일 편집</a:t>
             </a:r>
           </a:p>
           <a:p>
             <a:pPr lvl="1"/>
             <a:r>
-              <a:rPr lang="ko-KR" altLang="en-US"/>
+              <a:rPr lang="ko-KR" altLang="en-US" smtClean="0"/>
               <a:t>둘째 수준</a:t>
             </a:r>
           </a:p>
           <a:p>
             <a:pPr lvl="2"/>
             <a:r>
-              <a:rPr lang="ko-KR" altLang="en-US"/>
+              <a:rPr lang="ko-KR" altLang="en-US" smtClean="0"/>
               <a:t>셋째 수준</a:t>
             </a:r>
           </a:p>
           <a:p>
             <a:pPr lvl="3"/>
             <a:r>
-              <a:rPr lang="ko-KR" altLang="en-US"/>
+              <a:rPr lang="ko-KR" altLang="en-US" smtClean="0"/>
               <a:t>넷째 수준</a:t>
             </a:r>
           </a:p>
           <a:p>
             <a:pPr lvl="4"/>
             <a:r>
-              <a:rPr lang="ko-KR" altLang="en-US"/>
+              <a:rPr lang="ko-KR" altLang="en-US" smtClean="0"/>
               <a:t>다섯째 수준</a:t>
             </a:r>
             <a:endParaRPr lang="en-US" dirty="0"/>
@@ -3123,7 +3143,7 @@
           <a:p>
             <a:pPr lvl="0"/>
             <a:r>
-              <a:rPr lang="ko-KR" altLang="en-US"/>
+              <a:rPr lang="ko-KR" altLang="en-US" smtClean="0"/>
               <a:t>마스터 텍스트 스타일 편집</a:t>
             </a:r>
           </a:p>
@@ -3156,7 +3176,7 @@
             <a:fld id="{B61BEF0D-F0BB-DE4B-95CE-6DB70DBA9567}" type="datetimeFigureOut">
               <a:rPr lang="en-US" smtClean="0"/>
               <a:pPr/>
-              <a:t>1/8/2021</a:t>
+              <a:t>1/11/2021</a:t>
             </a:fld>
             <a:endParaRPr lang="en-US" dirty="0"/>
           </a:p>
@@ -3229,7 +3249,7 @@
     </p:spTree>
     <p:extLst>
       <p:ext uri="{BB962C8B-B14F-4D97-AF65-F5344CB8AC3E}">
-        <p14:creationId xmlns:p14="http://schemas.microsoft.com/office/powerpoint/2010/main" val="1641080297"/>
+        <p14:creationId xmlns:p14="http://schemas.microsoft.com/office/powerpoint/2010/main" val="996279130"/>
       </p:ext>
     </p:extLst>
   </p:cSld>
@@ -3349,7 +3369,7 @@
             <a:fld id="{B61BEF0D-F0BB-DE4B-95CE-6DB70DBA9567}" type="datetimeFigureOut">
               <a:rPr lang="en-US" smtClean="0"/>
               <a:pPr/>
-              <a:t>1/8/2021</a:t>
+              <a:t>1/11/2021</a:t>
             </a:fld>
             <a:endParaRPr lang="en-US" dirty="0"/>
           </a:p>
@@ -3535,7 +3555,7 @@
           </a:lstStyle>
           <a:p>
             <a:r>
-              <a:rPr lang="ko-KR" altLang="en-US"/>
+              <a:rPr lang="ko-KR" altLang="en-US" smtClean="0"/>
               <a:t>마스터 제목 스타일 편집</a:t>
             </a:r>
             <a:endParaRPr lang="en-US" dirty="0"/>
@@ -3610,7 +3630,7 @@
           </a:lstStyle>
           <a:p>
             <a:r>
-              <a:rPr lang="ko-KR" altLang="en-US"/>
+              <a:rPr lang="ko-KR" altLang="en-US" smtClean="0"/>
               <a:t>그림을 추가하려면 아이콘을 클릭하십시오</a:t>
             </a:r>
             <a:endParaRPr lang="en-US" dirty="0"/>
@@ -3688,7 +3708,7 @@
           <a:p>
             <a:pPr lvl="0"/>
             <a:r>
-              <a:rPr lang="ko-KR" altLang="en-US"/>
+              <a:rPr lang="ko-KR" altLang="en-US" smtClean="0"/>
               <a:t>마스터 텍스트 스타일 편집</a:t>
             </a:r>
           </a:p>
@@ -3712,7 +3732,7 @@
             <a:fld id="{B61BEF0D-F0BB-DE4B-95CE-6DB70DBA9567}" type="datetimeFigureOut">
               <a:rPr lang="en-US" smtClean="0"/>
               <a:pPr/>
-              <a:t>1/8/2021</a:t>
+              <a:t>1/11/2021</a:t>
             </a:fld>
             <a:endParaRPr lang="en-US" dirty="0"/>
           </a:p>
@@ -3764,7 +3784,7 @@
     </p:spTree>
     <p:extLst>
       <p:ext uri="{BB962C8B-B14F-4D97-AF65-F5344CB8AC3E}">
-        <p14:creationId xmlns:p14="http://schemas.microsoft.com/office/powerpoint/2010/main" val="4068001741"/>
+        <p14:creationId xmlns:p14="http://schemas.microsoft.com/office/powerpoint/2010/main" val="1469477671"/>
       </p:ext>
     </p:extLst>
   </p:cSld>
@@ -3807,7 +3827,7 @@
           <a:lstStyle/>
           <a:p>
             <a:r>
-              <a:rPr lang="ko-KR" altLang="en-US"/>
+              <a:rPr lang="ko-KR" altLang="en-US" smtClean="0"/>
               <a:t>마스터 제목 스타일 편집</a:t>
             </a:r>
             <a:endParaRPr lang="en-US" dirty="0"/>
@@ -3831,35 +3851,35 @@
           <a:p>
             <a:pPr lvl="0"/>
             <a:r>
-              <a:rPr lang="ko-KR" altLang="en-US"/>
+              <a:rPr lang="ko-KR" altLang="en-US" smtClean="0"/>
               <a:t>마스터 텍스트 스타일 편집</a:t>
             </a:r>
           </a:p>
           <a:p>
             <a:pPr lvl="1"/>
             <a:r>
-              <a:rPr lang="ko-KR" altLang="en-US"/>
+              <a:rPr lang="ko-KR" altLang="en-US" smtClean="0"/>
               <a:t>둘째 수준</a:t>
             </a:r>
           </a:p>
           <a:p>
             <a:pPr lvl="2"/>
             <a:r>
-              <a:rPr lang="ko-KR" altLang="en-US"/>
+              <a:rPr lang="ko-KR" altLang="en-US" smtClean="0"/>
               <a:t>셋째 수준</a:t>
             </a:r>
           </a:p>
           <a:p>
             <a:pPr lvl="3"/>
             <a:r>
-              <a:rPr lang="ko-KR" altLang="en-US"/>
+              <a:rPr lang="ko-KR" altLang="en-US" smtClean="0"/>
               <a:t>넷째 수준</a:t>
             </a:r>
           </a:p>
           <a:p>
             <a:pPr lvl="4"/>
             <a:r>
-              <a:rPr lang="ko-KR" altLang="en-US"/>
+              <a:rPr lang="ko-KR" altLang="en-US" smtClean="0"/>
               <a:t>다섯째 수준</a:t>
             </a:r>
             <a:endParaRPr lang="en-US" dirty="0"/>
@@ -3884,7 +3904,7 @@
             <a:fld id="{B61BEF0D-F0BB-DE4B-95CE-6DB70DBA9567}" type="datetimeFigureOut">
               <a:rPr lang="en-US" smtClean="0"/>
               <a:pPr/>
-              <a:t>1/8/2021</a:t>
+              <a:t>1/11/2021</a:t>
             </a:fld>
             <a:endParaRPr lang="en-US" dirty="0"/>
           </a:p>
@@ -3936,7 +3956,7 @@
     </p:spTree>
     <p:extLst>
       <p:ext uri="{BB962C8B-B14F-4D97-AF65-F5344CB8AC3E}">
-        <p14:creationId xmlns:p14="http://schemas.microsoft.com/office/powerpoint/2010/main" val="2173402148"/>
+        <p14:creationId xmlns:p14="http://schemas.microsoft.com/office/powerpoint/2010/main" val="3626516046"/>
       </p:ext>
     </p:extLst>
   </p:cSld>
@@ -4060,7 +4080,7 @@
           <a:lstStyle/>
           <a:p>
             <a:r>
-              <a:rPr lang="ko-KR" altLang="en-US"/>
+              <a:rPr lang="ko-KR" altLang="en-US" smtClean="0"/>
               <a:t>마스터 제목 스타일 편집</a:t>
             </a:r>
             <a:endParaRPr lang="en-US" dirty="0"/>
@@ -4089,35 +4109,35 @@
           <a:p>
             <a:pPr lvl="0"/>
             <a:r>
-              <a:rPr lang="ko-KR" altLang="en-US"/>
+              <a:rPr lang="ko-KR" altLang="en-US" smtClean="0"/>
               <a:t>마스터 텍스트 스타일 편집</a:t>
             </a:r>
           </a:p>
           <a:p>
             <a:pPr lvl="1"/>
             <a:r>
-              <a:rPr lang="ko-KR" altLang="en-US"/>
+              <a:rPr lang="ko-KR" altLang="en-US" smtClean="0"/>
               <a:t>둘째 수준</a:t>
             </a:r>
           </a:p>
           <a:p>
             <a:pPr lvl="2"/>
             <a:r>
-              <a:rPr lang="ko-KR" altLang="en-US"/>
+              <a:rPr lang="ko-KR" altLang="en-US" smtClean="0"/>
               <a:t>셋째 수준</a:t>
             </a:r>
           </a:p>
           <a:p>
             <a:pPr lvl="3"/>
             <a:r>
-              <a:rPr lang="ko-KR" altLang="en-US"/>
+              <a:rPr lang="ko-KR" altLang="en-US" smtClean="0"/>
               <a:t>넷째 수준</a:t>
             </a:r>
           </a:p>
           <a:p>
             <a:pPr lvl="4"/>
             <a:r>
-              <a:rPr lang="ko-KR" altLang="en-US"/>
+              <a:rPr lang="ko-KR" altLang="en-US" smtClean="0"/>
               <a:t>다섯째 수준</a:t>
             </a:r>
             <a:endParaRPr lang="en-US" dirty="0"/>
@@ -4142,7 +4162,7 @@
             <a:fld id="{B61BEF0D-F0BB-DE4B-95CE-6DB70DBA9567}" type="datetimeFigureOut">
               <a:rPr lang="en-US" smtClean="0"/>
               <a:pPr/>
-              <a:t>1/8/2021</a:t>
+              <a:t>1/11/2021</a:t>
             </a:fld>
             <a:endParaRPr lang="en-US" dirty="0"/>
           </a:p>
@@ -4194,7 +4214,7 @@
     </p:spTree>
     <p:extLst>
       <p:ext uri="{BB962C8B-B14F-4D97-AF65-F5344CB8AC3E}">
-        <p14:creationId xmlns:p14="http://schemas.microsoft.com/office/powerpoint/2010/main" val="3935363637"/>
+        <p14:creationId xmlns:p14="http://schemas.microsoft.com/office/powerpoint/2010/main" val="3281720884"/>
       </p:ext>
     </p:extLst>
   </p:cSld>
@@ -4395,7 +4415,7 @@
             <a:fld id="{B61BEF0D-F0BB-DE4B-95CE-6DB70DBA9567}" type="datetimeFigureOut">
               <a:rPr lang="en-US" smtClean="0"/>
               <a:pPr/>
-              <a:t>1/8/2021</a:t>
+              <a:t>1/11/2021</a:t>
             </a:fld>
             <a:endParaRPr lang="en-US" dirty="0"/>
           </a:p>
@@ -4629,7 +4649,7 @@
             <a:fld id="{B61BEF0D-F0BB-DE4B-95CE-6DB70DBA9567}" type="datetimeFigureOut">
               <a:rPr lang="en-US" smtClean="0"/>
               <a:pPr/>
-              <a:t>1/8/2021</a:t>
+              <a:t>1/11/2021</a:t>
             </a:fld>
             <a:endParaRPr lang="en-US" dirty="0"/>
           </a:p>
@@ -4978,7 +4998,7 @@
             <a:fld id="{B61BEF0D-F0BB-DE4B-95CE-6DB70DBA9567}" type="datetimeFigureOut">
               <a:rPr lang="en-US" smtClean="0"/>
               <a:pPr/>
-              <a:t>1/8/2021</a:t>
+              <a:t>1/11/2021</a:t>
             </a:fld>
             <a:endParaRPr lang="en-US" dirty="0"/>
           </a:p>
@@ -5098,7 +5118,7 @@
             <a:fld id="{B61BEF0D-F0BB-DE4B-95CE-6DB70DBA9567}" type="datetimeFigureOut">
               <a:rPr lang="en-US" smtClean="0"/>
               <a:pPr/>
-              <a:t>1/8/2021</a:t>
+              <a:t>1/11/2021</a:t>
             </a:fld>
             <a:endParaRPr lang="en-US" dirty="0"/>
           </a:p>
@@ -5218,7 +5238,7 @@
             <a:fld id="{B61BEF0D-F0BB-DE4B-95CE-6DB70DBA9567}" type="datetimeFigureOut">
               <a:rPr lang="en-US" smtClean="0"/>
               <a:pPr/>
-              <a:t>1/8/2021</a:t>
+              <a:t>1/11/2021</a:t>
             </a:fld>
             <a:endParaRPr lang="en-US" dirty="0"/>
           </a:p>
@@ -5504,7 +5524,7 @@
             <a:fld id="{B61BEF0D-F0BB-DE4B-95CE-6DB70DBA9567}" type="datetimeFigureOut">
               <a:rPr lang="en-US" smtClean="0"/>
               <a:pPr/>
-              <a:t>1/8/2021</a:t>
+              <a:t>1/11/2021</a:t>
             </a:fld>
             <a:endParaRPr lang="en-US" dirty="0"/>
           </a:p>
@@ -5770,7 +5790,7 @@
             <a:fld id="{B61BEF0D-F0BB-DE4B-95CE-6DB70DBA9567}" type="datetimeFigureOut">
               <a:rPr lang="en-US" smtClean="0"/>
               <a:pPr/>
-              <a:t>1/8/2021</a:t>
+              <a:t>1/11/2021</a:t>
             </a:fld>
             <a:endParaRPr lang="en-US" dirty="0"/>
           </a:p>
@@ -5986,7 +6006,7 @@
             <a:fld id="{B61BEF0D-F0BB-DE4B-95CE-6DB70DBA9567}" type="datetimeFigureOut">
               <a:rPr lang="en-US" smtClean="0"/>
               <a:pPr/>
-              <a:t>1/8/2021</a:t>
+              <a:t>1/11/2021</a:t>
             </a:fld>
             <a:endParaRPr lang="en-US" dirty="0"/>
           </a:p>
@@ -6488,7 +6508,7 @@
           <a:lstStyle/>
           <a:p>
             <a:r>
-              <a:rPr lang="ko-KR" altLang="en-US"/>
+              <a:rPr lang="ko-KR" altLang="en-US" smtClean="0"/>
               <a:t>마스터 제목 스타일 편집</a:t>
             </a:r>
             <a:endParaRPr lang="en-US" dirty="0"/>
@@ -6522,35 +6542,35 @@
           <a:p>
             <a:pPr lvl="0"/>
             <a:r>
-              <a:rPr lang="ko-KR" altLang="en-US"/>
+              <a:rPr lang="ko-KR" altLang="en-US" smtClean="0"/>
               <a:t>마스터 텍스트 스타일 편집</a:t>
             </a:r>
           </a:p>
           <a:p>
             <a:pPr lvl="1"/>
             <a:r>
-              <a:rPr lang="ko-KR" altLang="en-US"/>
+              <a:rPr lang="ko-KR" altLang="en-US" smtClean="0"/>
               <a:t>둘째 수준</a:t>
             </a:r>
           </a:p>
           <a:p>
             <a:pPr lvl="2"/>
             <a:r>
-              <a:rPr lang="ko-KR" altLang="en-US"/>
+              <a:rPr lang="ko-KR" altLang="en-US" smtClean="0"/>
               <a:t>셋째 수준</a:t>
             </a:r>
           </a:p>
           <a:p>
             <a:pPr lvl="3"/>
             <a:r>
-              <a:rPr lang="ko-KR" altLang="en-US"/>
+              <a:rPr lang="ko-KR" altLang="en-US" smtClean="0"/>
               <a:t>넷째 수준</a:t>
             </a:r>
           </a:p>
           <a:p>
             <a:pPr lvl="4"/>
             <a:r>
-              <a:rPr lang="ko-KR" altLang="en-US"/>
+              <a:rPr lang="ko-KR" altLang="en-US" smtClean="0"/>
               <a:t>다섯째 수준</a:t>
             </a:r>
             <a:endParaRPr lang="en-US" dirty="0"/>
@@ -6591,7 +6611,7 @@
             <a:fld id="{B61BEF0D-F0BB-DE4B-95CE-6DB70DBA9567}" type="datetimeFigureOut">
               <a:rPr lang="en-US" smtClean="0"/>
               <a:pPr/>
-              <a:t>1/8/2021</a:t>
+              <a:t>1/11/2021</a:t>
             </a:fld>
             <a:endParaRPr lang="en-US" dirty="0"/>
           </a:p>
@@ -6713,23 +6733,23 @@
     </p:spTree>
     <p:extLst>
       <p:ext uri="{BB962C8B-B14F-4D97-AF65-F5344CB8AC3E}">
-        <p14:creationId xmlns:p14="http://schemas.microsoft.com/office/powerpoint/2010/main" val="1669189398"/>
+        <p14:creationId xmlns:p14="http://schemas.microsoft.com/office/powerpoint/2010/main" val="3002995131"/>
       </p:ext>
     </p:extLst>
   </p:cSld>
   <p:clrMap bg1="lt1" tx1="dk1" bg2="lt2" tx2="dk2" accent1="accent1" accent2="accent2" accent3="accent3" accent4="accent4" accent5="accent5" accent6="accent6" hlink="hlink" folHlink="folHlink"/>
   <p:sldLayoutIdLst>
-    <p:sldLayoutId id="2147483721" r:id="rId1"/>
-    <p:sldLayoutId id="2147483722" r:id="rId2"/>
-    <p:sldLayoutId id="2147483723" r:id="rId3"/>
-    <p:sldLayoutId id="2147483724" r:id="rId4"/>
-    <p:sldLayoutId id="2147483725" r:id="rId5"/>
-    <p:sldLayoutId id="2147483726" r:id="rId6"/>
-    <p:sldLayoutId id="2147483727" r:id="rId7"/>
-    <p:sldLayoutId id="2147483728" r:id="rId8"/>
-    <p:sldLayoutId id="2147483729" r:id="rId9"/>
-    <p:sldLayoutId id="2147483730" r:id="rId10"/>
-    <p:sldLayoutId id="2147483731" r:id="rId11"/>
+    <p:sldLayoutId id="2147483745" r:id="rId1"/>
+    <p:sldLayoutId id="2147483746" r:id="rId2"/>
+    <p:sldLayoutId id="2147483747" r:id="rId3"/>
+    <p:sldLayoutId id="2147483748" r:id="rId4"/>
+    <p:sldLayoutId id="2147483749" r:id="rId5"/>
+    <p:sldLayoutId id="2147483750" r:id="rId6"/>
+    <p:sldLayoutId id="2147483751" r:id="rId7"/>
+    <p:sldLayoutId id="2147483752" r:id="rId8"/>
+    <p:sldLayoutId id="2147483753" r:id="rId9"/>
+    <p:sldLayoutId id="2147483754" r:id="rId10"/>
+    <p:sldLayoutId id="2147483755" r:id="rId11"/>
   </p:sldLayoutIdLst>
   <p:txStyles>
     <p:titleStyle>
@@ -7297,6 +7317,10 @@
               <a:rPr lang="ko-KR" altLang="en-US" dirty="0"/>
               <a:t>차량 수 </a:t>
             </a:r>
+            <a:r>
+              <a:rPr lang="en-US" altLang="ko-KR" dirty="0"/>
+              <a:t/>
+            </a:r>
             <a:br>
               <a:rPr lang="en-US" altLang="ko-KR" dirty="0"/>
             </a:br>
@@ -7570,6 +7594,13 @@
   <p:clrMapOvr>
     <a:masterClrMapping/>
   </p:clrMapOvr>
+  <p:timing>
+    <p:tnLst>
+      <p:par>
+        <p:cTn id="1" dur="indefinite" restart="never" nodeType="tmRoot"/>
+      </p:par>
+    </p:tnLst>
+  </p:timing>
 </p:sld>
 </file>
 
@@ -7919,6 +7950,1567 @@
   <p:clrMapOvr>
     <a:masterClrMapping/>
   </p:clrMapOvr>
+  <p:timing>
+    <p:tnLst>
+      <p:par>
+        <p:cTn id="1" dur="indefinite" restart="never" nodeType="tmRoot"/>
+      </p:par>
+    </p:tnLst>
+  </p:timing>
+</p:sld>
+</file>
+
+<file path=ppt/slides/slide12.xml><?xml version="1.0" encoding="utf-8"?>
+<p:sld xmlns:a="http://schemas.openxmlformats.org/drawingml/2006/main" xmlns:r="http://schemas.openxmlformats.org/officeDocument/2006/relationships" xmlns:p="http://schemas.openxmlformats.org/presentationml/2006/main">
+  <p:cSld>
+    <p:spTree>
+      <p:nvGrpSpPr>
+        <p:cNvPr id="1" name=""/>
+        <p:cNvGrpSpPr/>
+        <p:nvPr/>
+      </p:nvGrpSpPr>
+      <p:grpSpPr>
+        <a:xfrm>
+          <a:off x="0" y="0"/>
+          <a:ext cx="0" cy="0"/>
+          <a:chOff x="0" y="0"/>
+          <a:chExt cx="0" cy="0"/>
+        </a:xfrm>
+      </p:grpSpPr>
+      <p:sp>
+        <p:nvSpPr>
+          <p:cNvPr id="6" name="제목 5"/>
+          <p:cNvSpPr>
+            <a:spLocks noGrp="1"/>
+          </p:cNvSpPr>
+          <p:nvPr>
+            <p:ph type="ctrTitle"/>
+          </p:nvPr>
+        </p:nvSpPr>
+        <p:spPr/>
+        <p:txBody>
+          <a:bodyPr>
+            <a:normAutofit/>
+          </a:bodyPr>
+          <a:lstStyle/>
+          <a:p>
+            <a:r>
+              <a:rPr lang="en-US" altLang="ko-KR" sz="2400" b="1" dirty="0" smtClean="0"/>
+              <a:t>Toward A Thousand Lights:</a:t>
+            </a:r>
+            <a:r>
+              <a:rPr lang="en-US" altLang="ko-KR" sz="2400" dirty="0" smtClean="0"/>
+              <a:t/>
+            </a:r>
+            <a:br>
+              <a:rPr lang="en-US" altLang="ko-KR" sz="2400" dirty="0" smtClean="0"/>
+            </a:br>
+            <a:r>
+              <a:rPr lang="en-US" altLang="ko-KR" sz="2400" dirty="0" smtClean="0"/>
+              <a:t>Decentralized Deep Reinforcement Learning for Large-scale Traffic Signal Control</a:t>
+            </a:r>
+            <a:endParaRPr lang="ko-KR" altLang="en-US" sz="2400" dirty="0"/>
+          </a:p>
+        </p:txBody>
+      </p:sp>
+      <p:sp>
+        <p:nvSpPr>
+          <p:cNvPr id="7" name="부제목 6"/>
+          <p:cNvSpPr>
+            <a:spLocks noGrp="1"/>
+          </p:cNvSpPr>
+          <p:nvPr>
+            <p:ph type="subTitle" idx="1"/>
+          </p:nvPr>
+        </p:nvSpPr>
+        <p:spPr/>
+        <p:txBody>
+          <a:bodyPr/>
+          <a:lstStyle/>
+          <a:p>
+            <a:endParaRPr lang="ko-KR" altLang="en-US" dirty="0"/>
+          </a:p>
+        </p:txBody>
+      </p:sp>
+    </p:spTree>
+    <p:extLst>
+      <p:ext uri="{BB962C8B-B14F-4D97-AF65-F5344CB8AC3E}">
+        <p14:creationId xmlns:p14="http://schemas.microsoft.com/office/powerpoint/2010/main" val="2644164681"/>
+      </p:ext>
+    </p:extLst>
+  </p:cSld>
+  <p:clrMapOvr>
+    <a:masterClrMapping/>
+  </p:clrMapOvr>
+  <p:timing>
+    <p:tnLst>
+      <p:par>
+        <p:cTn id="1" dur="indefinite" restart="never" nodeType="tmRoot"/>
+      </p:par>
+    </p:tnLst>
+  </p:timing>
+</p:sld>
+</file>
+
+<file path=ppt/slides/slide13.xml><?xml version="1.0" encoding="utf-8"?>
+<p:sld xmlns:a="http://schemas.openxmlformats.org/drawingml/2006/main" xmlns:r="http://schemas.openxmlformats.org/officeDocument/2006/relationships" xmlns:p="http://schemas.openxmlformats.org/presentationml/2006/main">
+  <p:cSld>
+    <p:spTree>
+      <p:nvGrpSpPr>
+        <p:cNvPr id="1" name=""/>
+        <p:cNvGrpSpPr/>
+        <p:nvPr/>
+      </p:nvGrpSpPr>
+      <p:grpSpPr>
+        <a:xfrm>
+          <a:off x="0" y="0"/>
+          <a:ext cx="0" cy="0"/>
+          <a:chOff x="0" y="0"/>
+          <a:chExt cx="0" cy="0"/>
+        </a:xfrm>
+      </p:grpSpPr>
+      <p:sp>
+        <p:nvSpPr>
+          <p:cNvPr id="2" name="제목 1"/>
+          <p:cNvSpPr>
+            <a:spLocks noGrp="1"/>
+          </p:cNvSpPr>
+          <p:nvPr>
+            <p:ph type="title"/>
+          </p:nvPr>
+        </p:nvSpPr>
+        <p:spPr/>
+        <p:txBody>
+          <a:bodyPr/>
+          <a:lstStyle/>
+          <a:p>
+            <a:r>
+              <a:rPr lang="en-US" altLang="ko-KR" dirty="0" smtClean="0"/>
+              <a:t>Motivation</a:t>
+            </a:r>
+            <a:endParaRPr lang="ko-KR" altLang="en-US" dirty="0"/>
+          </a:p>
+        </p:txBody>
+      </p:sp>
+      <p:sp>
+        <p:nvSpPr>
+          <p:cNvPr id="3" name="내용 개체 틀 2"/>
+          <p:cNvSpPr>
+            <a:spLocks noGrp="1"/>
+          </p:cNvSpPr>
+          <p:nvPr>
+            <p:ph idx="1"/>
+          </p:nvPr>
+        </p:nvSpPr>
+        <p:spPr/>
+        <p:txBody>
+          <a:bodyPr/>
+          <a:lstStyle/>
+          <a:p>
+            <a:r>
+              <a:rPr lang="en-US" altLang="ko-KR" dirty="0" smtClean="0"/>
+              <a:t> Traffic congestion</a:t>
+            </a:r>
+            <a:endParaRPr lang="en-US" altLang="ko-KR" dirty="0"/>
+          </a:p>
+          <a:p>
+            <a:pPr lvl="1"/>
+            <a:r>
+              <a:rPr lang="en-US" altLang="ko-KR" dirty="0" smtClean="0"/>
+              <a:t>Led by rapid urbanization</a:t>
+            </a:r>
+          </a:p>
+          <a:p>
+            <a:pPr lvl="1"/>
+            <a:r>
+              <a:rPr lang="en-US" altLang="ko-KR" dirty="0" smtClean="0"/>
+              <a:t>Increase harmful emissions (contributes 23% of total CO2 emission) </a:t>
+            </a:r>
+            <a:r>
+              <a:rPr lang="en-US" altLang="ko-KR" dirty="0" smtClean="0">
+                <a:sym typeface="Wingdings" panose="05000000000000000000" pitchFamily="2" charset="2"/>
+              </a:rPr>
+              <a:t> </a:t>
+            </a:r>
+            <a:r>
+              <a:rPr lang="ko-KR" altLang="en-US" dirty="0" smtClean="0">
+                <a:sym typeface="Wingdings" panose="05000000000000000000" pitchFamily="2" charset="2"/>
+              </a:rPr>
+              <a:t>그 중에서 </a:t>
+            </a:r>
+            <a:r>
+              <a:rPr lang="en-US" altLang="ko-KR" dirty="0" smtClean="0">
+                <a:sym typeface="Wingdings" panose="05000000000000000000" pitchFamily="2" charset="2"/>
+              </a:rPr>
+              <a:t>traffic</a:t>
+            </a:r>
+            <a:r>
+              <a:rPr lang="ko-KR" altLang="en-US" dirty="0" smtClean="0">
+                <a:sym typeface="Wingdings" panose="05000000000000000000" pitchFamily="2" charset="2"/>
+              </a:rPr>
+              <a:t>에 의해 차지하는 양이 </a:t>
+            </a:r>
+            <a:r>
+              <a:rPr lang="en-US" altLang="ko-KR" dirty="0" smtClean="0">
+                <a:sym typeface="Wingdings" panose="05000000000000000000" pitchFamily="2" charset="2"/>
+              </a:rPr>
+              <a:t>40% </a:t>
+            </a:r>
+            <a:br>
+              <a:rPr lang="en-US" altLang="ko-KR" dirty="0" smtClean="0">
+                <a:sym typeface="Wingdings" panose="05000000000000000000" pitchFamily="2" charset="2"/>
+              </a:rPr>
+            </a:br>
+            <a:r>
+              <a:rPr lang="en-US" altLang="ko-KR" dirty="0" smtClean="0">
+                <a:sym typeface="Wingdings" panose="05000000000000000000" pitchFamily="2" charset="2"/>
+              </a:rPr>
+              <a:t> Trend: applying RL method for traffic signal control</a:t>
+            </a:r>
+            <a:r>
+              <a:rPr lang="en-US" altLang="ko-KR" dirty="0" smtClean="0"/>
+              <a:t/>
+            </a:r>
+            <a:br>
+              <a:rPr lang="en-US" altLang="ko-KR" dirty="0" smtClean="0"/>
+            </a:br>
+            <a:endParaRPr lang="en-US" altLang="ko-KR" dirty="0">
+              <a:sym typeface="Wingdings" panose="05000000000000000000" pitchFamily="2" charset="2"/>
+            </a:endParaRPr>
+          </a:p>
+          <a:p>
+            <a:r>
+              <a:rPr lang="en-US" altLang="ko-KR" dirty="0" smtClean="0"/>
+              <a:t> Traditional transportation approaches</a:t>
+            </a:r>
+          </a:p>
+          <a:p>
+            <a:pPr lvl="1"/>
+            <a:r>
+              <a:rPr lang="en-US" altLang="ko-KR" dirty="0" smtClean="0"/>
+              <a:t>Pre-timed control</a:t>
+            </a:r>
+          </a:p>
+          <a:p>
+            <a:pPr lvl="1"/>
+            <a:r>
+              <a:rPr lang="en-US" altLang="ko-KR" dirty="0" smtClean="0"/>
+              <a:t>Actuated control</a:t>
+            </a:r>
+          </a:p>
+          <a:p>
+            <a:pPr lvl="1"/>
+            <a:r>
+              <a:rPr lang="en-US" altLang="ko-KR" dirty="0" smtClean="0"/>
+              <a:t>Adaptive control</a:t>
+            </a:r>
+          </a:p>
+          <a:p>
+            <a:pPr lvl="1"/>
+            <a:r>
+              <a:rPr lang="en-US" altLang="ko-KR" dirty="0" smtClean="0"/>
+              <a:t>Optimization-based control</a:t>
+            </a:r>
+            <a:br>
+              <a:rPr lang="en-US" altLang="ko-KR" dirty="0" smtClean="0"/>
+            </a:br>
+            <a:r>
+              <a:rPr lang="en-US" altLang="ko-KR" dirty="0" smtClean="0">
+                <a:sym typeface="Wingdings" panose="05000000000000000000" pitchFamily="2" charset="2"/>
+              </a:rPr>
+              <a:t> Given</a:t>
+            </a:r>
+            <a:r>
+              <a:rPr lang="ko-KR" altLang="en-US" dirty="0" smtClean="0">
+                <a:sym typeface="Wingdings" panose="05000000000000000000" pitchFamily="2" charset="2"/>
+              </a:rPr>
+              <a:t> </a:t>
+            </a:r>
+            <a:r>
+              <a:rPr lang="en-US" altLang="ko-KR" dirty="0" smtClean="0">
+                <a:sym typeface="Wingdings" panose="05000000000000000000" pitchFamily="2" charset="2"/>
+              </a:rPr>
+              <a:t>traffic model</a:t>
+            </a:r>
+            <a:r>
+              <a:rPr lang="ko-KR" altLang="en-US" dirty="0">
+                <a:sym typeface="Wingdings" panose="05000000000000000000" pitchFamily="2" charset="2"/>
+              </a:rPr>
+              <a:t> </a:t>
+            </a:r>
+            <a:r>
+              <a:rPr lang="en-US" altLang="ko-KR" dirty="0" smtClean="0">
+                <a:sym typeface="Wingdings" panose="05000000000000000000" pitchFamily="2" charset="2"/>
+              </a:rPr>
+              <a:t>and</a:t>
+            </a:r>
+            <a:r>
+              <a:rPr lang="ko-KR" altLang="en-US" dirty="0" smtClean="0">
+                <a:sym typeface="Wingdings" panose="05000000000000000000" pitchFamily="2" charset="2"/>
+              </a:rPr>
+              <a:t> </a:t>
+            </a:r>
+            <a:r>
+              <a:rPr lang="en-US" altLang="ko-KR" dirty="0" smtClean="0">
+                <a:sym typeface="Wingdings" panose="05000000000000000000" pitchFamily="2" charset="2"/>
+              </a:rPr>
+              <a:t>pre-defined rule</a:t>
+            </a:r>
+            <a:br>
+              <a:rPr lang="en-US" altLang="ko-KR" dirty="0" smtClean="0">
+                <a:sym typeface="Wingdings" panose="05000000000000000000" pitchFamily="2" charset="2"/>
+              </a:rPr>
+            </a:br>
+            <a:r>
+              <a:rPr lang="en-US" altLang="ko-KR" dirty="0" smtClean="0">
+                <a:sym typeface="Wingdings" panose="05000000000000000000" pitchFamily="2" charset="2"/>
+              </a:rPr>
+              <a:t> Fail to adjust to dynamic traffic</a:t>
+            </a:r>
+            <a:endParaRPr lang="ko-KR" altLang="en-US" dirty="0"/>
+          </a:p>
+        </p:txBody>
+      </p:sp>
+    </p:spTree>
+    <p:extLst>
+      <p:ext uri="{BB962C8B-B14F-4D97-AF65-F5344CB8AC3E}">
+        <p14:creationId xmlns:p14="http://schemas.microsoft.com/office/powerpoint/2010/main" val="3384391829"/>
+      </p:ext>
+    </p:extLst>
+  </p:cSld>
+  <p:clrMapOvr>
+    <a:masterClrMapping/>
+  </p:clrMapOvr>
+  <p:timing>
+    <p:tnLst>
+      <p:par>
+        <p:cTn id="1" dur="indefinite" restart="never" nodeType="tmRoot"/>
+      </p:par>
+    </p:tnLst>
+  </p:timing>
+</p:sld>
+</file>
+
+<file path=ppt/slides/slide14.xml><?xml version="1.0" encoding="utf-8"?>
+<p:sld xmlns:a="http://schemas.openxmlformats.org/drawingml/2006/main" xmlns:r="http://schemas.openxmlformats.org/officeDocument/2006/relationships" xmlns:p="http://schemas.openxmlformats.org/presentationml/2006/main">
+  <p:cSld>
+    <p:spTree>
+      <p:nvGrpSpPr>
+        <p:cNvPr id="1" name=""/>
+        <p:cNvGrpSpPr/>
+        <p:nvPr/>
+      </p:nvGrpSpPr>
+      <p:grpSpPr>
+        <a:xfrm>
+          <a:off x="0" y="0"/>
+          <a:ext cx="0" cy="0"/>
+          <a:chOff x="0" y="0"/>
+          <a:chExt cx="0" cy="0"/>
+        </a:xfrm>
+      </p:grpSpPr>
+      <p:sp>
+        <p:nvSpPr>
+          <p:cNvPr id="2" name="제목 1"/>
+          <p:cNvSpPr>
+            <a:spLocks noGrp="1"/>
+          </p:cNvSpPr>
+          <p:nvPr>
+            <p:ph type="title"/>
+          </p:nvPr>
+        </p:nvSpPr>
+        <p:spPr/>
+        <p:txBody>
+          <a:bodyPr/>
+          <a:lstStyle/>
+          <a:p>
+            <a:r>
+              <a:rPr lang="en-US" altLang="ko-KR" dirty="0" smtClean="0"/>
+              <a:t>Motivation</a:t>
+            </a:r>
+            <a:endParaRPr lang="ko-KR" altLang="en-US" dirty="0"/>
+          </a:p>
+        </p:txBody>
+      </p:sp>
+      <p:sp>
+        <p:nvSpPr>
+          <p:cNvPr id="3" name="내용 개체 틀 2"/>
+          <p:cNvSpPr>
+            <a:spLocks noGrp="1"/>
+          </p:cNvSpPr>
+          <p:nvPr>
+            <p:ph idx="1"/>
+          </p:nvPr>
+        </p:nvSpPr>
+        <p:spPr/>
+        <p:txBody>
+          <a:bodyPr/>
+          <a:lstStyle/>
+          <a:p>
+            <a:r>
+              <a:rPr lang="en-US" altLang="ko-KR" dirty="0" smtClean="0">
+                <a:sym typeface="Wingdings" panose="05000000000000000000" pitchFamily="2" charset="2"/>
+              </a:rPr>
+              <a:t> Challenge</a:t>
+            </a:r>
+            <a:endParaRPr lang="en-US" altLang="ko-KR" dirty="0">
+              <a:sym typeface="Wingdings" panose="05000000000000000000" pitchFamily="2" charset="2"/>
+            </a:endParaRPr>
+          </a:p>
+          <a:p>
+            <a:pPr lvl="1"/>
+            <a:r>
+              <a:rPr lang="en-US" altLang="ko-KR" dirty="0">
+                <a:sym typeface="Wingdings" panose="05000000000000000000" pitchFamily="2" charset="2"/>
+              </a:rPr>
+              <a:t>To control and coordinate traffic lights in large-scale urban network</a:t>
+            </a:r>
+            <a:br>
+              <a:rPr lang="en-US" altLang="ko-KR" dirty="0">
+                <a:sym typeface="Wingdings" panose="05000000000000000000" pitchFamily="2" charset="2"/>
+              </a:rPr>
+            </a:br>
+            <a:r>
+              <a:rPr lang="en-US" altLang="ko-KR" dirty="0">
+                <a:sym typeface="Wingdings" panose="05000000000000000000" pitchFamily="2" charset="2"/>
+              </a:rPr>
+              <a:t> Highly correlated due to densely </a:t>
+            </a:r>
+            <a:r>
+              <a:rPr lang="en-US" altLang="ko-KR" dirty="0" smtClean="0">
+                <a:sym typeface="Wingdings" panose="05000000000000000000" pitchFamily="2" charset="2"/>
+              </a:rPr>
+              <a:t>connected</a:t>
+            </a:r>
+          </a:p>
+          <a:p>
+            <a:pPr lvl="1"/>
+            <a:r>
+              <a:rPr lang="en-US" altLang="ko-KR" dirty="0" smtClean="0">
+                <a:sym typeface="Wingdings" panose="05000000000000000000" pitchFamily="2" charset="2"/>
+              </a:rPr>
+              <a:t>Traditional Method is not well adjusted when the traffic is dynamic</a:t>
+            </a:r>
+            <a:endParaRPr lang="en-US" altLang="ko-KR" b="1" dirty="0" smtClean="0">
+              <a:sym typeface="Wingdings" panose="05000000000000000000" pitchFamily="2" charset="2"/>
+            </a:endParaRPr>
+          </a:p>
+          <a:p>
+            <a:pPr lvl="1"/>
+            <a:endParaRPr lang="en-US" altLang="ko-KR" dirty="0">
+              <a:sym typeface="Wingdings" panose="05000000000000000000" pitchFamily="2" charset="2"/>
+            </a:endParaRPr>
+          </a:p>
+          <a:p>
+            <a:r>
+              <a:rPr lang="en-US" altLang="ko-KR" dirty="0" smtClean="0">
+                <a:sym typeface="Wingdings" panose="05000000000000000000" pitchFamily="2" charset="2"/>
+              </a:rPr>
+              <a:t> 3 Key Issues to handle the challenge by RL method</a:t>
+            </a:r>
+          </a:p>
+          <a:p>
+            <a:pPr lvl="1"/>
+            <a:r>
+              <a:rPr lang="en-US" altLang="ko-KR" dirty="0" smtClean="0">
+                <a:sym typeface="Wingdings" panose="05000000000000000000" pitchFamily="2" charset="2"/>
+              </a:rPr>
+              <a:t>Scalability: learn effectively on a large scale, and the global optimization goal simultaneously</a:t>
+            </a:r>
+          </a:p>
+          <a:p>
+            <a:pPr lvl="1"/>
+            <a:r>
+              <a:rPr lang="en-US" altLang="ko-KR" dirty="0" smtClean="0">
+                <a:sym typeface="Wingdings" panose="05000000000000000000" pitchFamily="2" charset="2"/>
+              </a:rPr>
+              <a:t>Coordination: Optimizing signal timing for TL jointly when in close proximity</a:t>
+            </a:r>
+          </a:p>
+          <a:p>
+            <a:pPr lvl="1"/>
+            <a:r>
+              <a:rPr lang="en-US" altLang="ko-KR" dirty="0" smtClean="0">
+                <a:sym typeface="Wingdings" panose="05000000000000000000" pitchFamily="2" charset="2"/>
+              </a:rPr>
+              <a:t>Data feasibility: Not use the data that are hard to occur when learning by the RL-based method </a:t>
+            </a:r>
+            <a:endParaRPr lang="en-US" altLang="ko-KR" dirty="0">
+              <a:sym typeface="Wingdings" panose="05000000000000000000" pitchFamily="2" charset="2"/>
+            </a:endParaRPr>
+          </a:p>
+        </p:txBody>
+      </p:sp>
+    </p:spTree>
+    <p:extLst>
+      <p:ext uri="{BB962C8B-B14F-4D97-AF65-F5344CB8AC3E}">
+        <p14:creationId xmlns:p14="http://schemas.microsoft.com/office/powerpoint/2010/main" val="926466884"/>
+      </p:ext>
+    </p:extLst>
+  </p:cSld>
+  <p:clrMapOvr>
+    <a:masterClrMapping/>
+  </p:clrMapOvr>
+  <p:timing>
+    <p:tnLst>
+      <p:par>
+        <p:cTn id="1" dur="indefinite" restart="never" nodeType="tmRoot"/>
+      </p:par>
+    </p:tnLst>
+  </p:timing>
+</p:sld>
+</file>
+
+<file path=ppt/slides/slide15.xml><?xml version="1.0" encoding="utf-8"?>
+<p:sld xmlns:a="http://schemas.openxmlformats.org/drawingml/2006/main" xmlns:r="http://schemas.openxmlformats.org/officeDocument/2006/relationships" xmlns:p="http://schemas.openxmlformats.org/presentationml/2006/main">
+  <p:cSld>
+    <p:spTree>
+      <p:nvGrpSpPr>
+        <p:cNvPr id="1" name=""/>
+        <p:cNvGrpSpPr/>
+        <p:nvPr/>
+      </p:nvGrpSpPr>
+      <p:grpSpPr>
+        <a:xfrm>
+          <a:off x="0" y="0"/>
+          <a:ext cx="0" cy="0"/>
+          <a:chOff x="0" y="0"/>
+          <a:chExt cx="0" cy="0"/>
+        </a:xfrm>
+      </p:grpSpPr>
+      <p:sp>
+        <p:nvSpPr>
+          <p:cNvPr id="2" name="제목 1"/>
+          <p:cNvSpPr>
+            <a:spLocks noGrp="1"/>
+          </p:cNvSpPr>
+          <p:nvPr>
+            <p:ph type="title"/>
+          </p:nvPr>
+        </p:nvSpPr>
+        <p:spPr>
+          <a:xfrm>
+            <a:off x="1097280" y="252170"/>
+            <a:ext cx="10058400" cy="1450757"/>
+          </a:xfrm>
+        </p:spPr>
+        <p:txBody>
+          <a:bodyPr/>
+          <a:lstStyle/>
+          <a:p>
+            <a:r>
+              <a:rPr lang="en-US" altLang="ko-KR" dirty="0" smtClean="0"/>
+              <a:t>Related work</a:t>
+            </a:r>
+            <a:endParaRPr lang="ko-KR" altLang="en-US" dirty="0"/>
+          </a:p>
+        </p:txBody>
+      </p:sp>
+      <p:sp>
+        <p:nvSpPr>
+          <p:cNvPr id="3" name="내용 개체 틀 2"/>
+          <p:cNvSpPr>
+            <a:spLocks noGrp="1"/>
+          </p:cNvSpPr>
+          <p:nvPr>
+            <p:ph idx="1"/>
+          </p:nvPr>
+        </p:nvSpPr>
+        <p:spPr/>
+        <p:txBody>
+          <a:bodyPr/>
+          <a:lstStyle/>
+          <a:p>
+            <a:r>
+              <a:rPr lang="en-US" altLang="ko-KR" dirty="0" smtClean="0"/>
+              <a:t> Conventional Transportation </a:t>
+            </a:r>
+            <a:r>
+              <a:rPr lang="en-US" altLang="ko-KR" dirty="0"/>
+              <a:t>M</a:t>
+            </a:r>
+            <a:r>
+              <a:rPr lang="en-US" altLang="ko-KR" dirty="0" smtClean="0"/>
+              <a:t>ethods for multi-intersection control</a:t>
+            </a:r>
+          </a:p>
+          <a:p>
+            <a:pPr lvl="1"/>
+            <a:r>
+              <a:rPr lang="en-US" altLang="ko-KR" dirty="0" smtClean="0"/>
+              <a:t>Same cycle length</a:t>
+            </a:r>
+          </a:p>
+          <a:p>
+            <a:pPr lvl="1"/>
+            <a:r>
+              <a:rPr lang="en-US" altLang="ko-KR" dirty="0" smtClean="0"/>
+              <a:t>Facilitated traffic of selected movement: modifying the offset between consecutive intersection</a:t>
+            </a:r>
+            <a:r>
+              <a:rPr lang="en-US" altLang="ko-KR" dirty="0"/>
+              <a:t/>
+            </a:r>
+            <a:br>
+              <a:rPr lang="en-US" altLang="ko-KR" dirty="0"/>
+            </a:br>
+            <a:r>
+              <a:rPr lang="en-US" altLang="ko-KR" dirty="0" smtClean="0"/>
+              <a:t/>
+            </a:r>
+            <a:br>
+              <a:rPr lang="en-US" altLang="ko-KR" dirty="0" smtClean="0"/>
+            </a:br>
+            <a:r>
+              <a:rPr lang="en-US" altLang="ko-KR" dirty="0" smtClean="0">
+                <a:sym typeface="Wingdings" panose="05000000000000000000" pitchFamily="2" charset="2"/>
+              </a:rPr>
+              <a:t> Problem of this approach</a:t>
+            </a:r>
+          </a:p>
+          <a:p>
+            <a:pPr lvl="4"/>
+            <a:r>
+              <a:rPr lang="en-US" altLang="ko-KR" dirty="0">
+                <a:sym typeface="Wingdings" panose="05000000000000000000" pitchFamily="2" charset="2"/>
+              </a:rPr>
+              <a:t> </a:t>
+            </a:r>
+            <a:r>
+              <a:rPr lang="en-US" altLang="ko-KR" dirty="0" smtClean="0">
+                <a:sym typeface="Wingdings" panose="05000000000000000000" pitchFamily="2" charset="2"/>
+              </a:rPr>
+              <a:t>Few network are only uniform for simple approach (Small grid network -&gt; fixed offset achieve coordination)</a:t>
+            </a:r>
+          </a:p>
+          <a:p>
+            <a:pPr lvl="4"/>
+            <a:r>
+              <a:rPr lang="en-US" altLang="ko-KR" dirty="0">
+                <a:sym typeface="Wingdings" panose="05000000000000000000" pitchFamily="2" charset="2"/>
+              </a:rPr>
+              <a:t> </a:t>
+            </a:r>
+            <a:r>
+              <a:rPr lang="en-US" altLang="ko-KR" dirty="0" smtClean="0">
+                <a:sym typeface="Wingdings" panose="05000000000000000000" pitchFamily="2" charset="2"/>
+              </a:rPr>
+              <a:t>Difficult to provide a global optimization</a:t>
+            </a:r>
+            <a:endParaRPr lang="en-US" altLang="ko-KR" dirty="0" smtClean="0"/>
+          </a:p>
+        </p:txBody>
+      </p:sp>
+      <p:pic>
+        <p:nvPicPr>
+          <p:cNvPr id="12" name="그림 11"/>
+          <p:cNvPicPr>
+            <a:picLocks noChangeAspect="1"/>
+          </p:cNvPicPr>
+          <p:nvPr/>
+        </p:nvPicPr>
+        <p:blipFill>
+          <a:blip r:embed="rId2"/>
+          <a:stretch>
+            <a:fillRect/>
+          </a:stretch>
+        </p:blipFill>
+        <p:spPr>
+          <a:xfrm>
+            <a:off x="2892560" y="4150982"/>
+            <a:ext cx="6113707" cy="2163167"/>
+          </a:xfrm>
+          <a:prstGeom prst="rect">
+            <a:avLst/>
+          </a:prstGeom>
+        </p:spPr>
+      </p:pic>
+      <p:sp>
+        <p:nvSpPr>
+          <p:cNvPr id="13" name="타원 12"/>
+          <p:cNvSpPr/>
+          <p:nvPr/>
+        </p:nvSpPr>
+        <p:spPr>
+          <a:xfrm>
+            <a:off x="3324744" y="4946940"/>
+            <a:ext cx="627455" cy="589195"/>
+          </a:xfrm>
+          <a:prstGeom prst="ellipse">
+            <a:avLst/>
+          </a:prstGeom>
+          <a:noFill/>
+          <a:ln>
+            <a:solidFill>
+              <a:srgbClr val="FF0000"/>
+            </a:solidFill>
+          </a:ln>
+        </p:spPr>
+        <p:style>
+          <a:lnRef idx="2">
+            <a:schemeClr val="accent1">
+              <a:shade val="50000"/>
+            </a:schemeClr>
+          </a:lnRef>
+          <a:fillRef idx="1">
+            <a:schemeClr val="accent1"/>
+          </a:fillRef>
+          <a:effectRef idx="0">
+            <a:schemeClr val="accent1"/>
+          </a:effectRef>
+          <a:fontRef idx="minor">
+            <a:schemeClr val="lt1"/>
+          </a:fontRef>
+        </p:style>
+        <p:txBody>
+          <a:bodyPr rtlCol="0" anchor="ctr"/>
+          <a:lstStyle/>
+          <a:p>
+            <a:pPr algn="ctr"/>
+            <a:endParaRPr lang="ko-KR" altLang="en-US"/>
+          </a:p>
+        </p:txBody>
+      </p:sp>
+      <p:cxnSp>
+        <p:nvCxnSpPr>
+          <p:cNvPr id="15" name="직선 화살표 연결선 14"/>
+          <p:cNvCxnSpPr>
+            <a:endCxn id="13" idx="1"/>
+          </p:cNvCxnSpPr>
+          <p:nvPr/>
+        </p:nvCxnSpPr>
+        <p:spPr>
+          <a:xfrm>
+            <a:off x="2616944" y="4518437"/>
+            <a:ext cx="799689" cy="514789"/>
+          </a:xfrm>
+          <a:prstGeom prst="straightConnector1">
+            <a:avLst/>
+          </a:prstGeom>
+          <a:ln>
+            <a:solidFill>
+              <a:srgbClr val="FF0000"/>
+            </a:solidFill>
+            <a:tailEnd type="triangle"/>
+          </a:ln>
+        </p:spPr>
+        <p:style>
+          <a:lnRef idx="1">
+            <a:schemeClr val="accent2"/>
+          </a:lnRef>
+          <a:fillRef idx="0">
+            <a:schemeClr val="accent2"/>
+          </a:fillRef>
+          <a:effectRef idx="0">
+            <a:schemeClr val="accent2"/>
+          </a:effectRef>
+          <a:fontRef idx="minor">
+            <a:schemeClr val="tx1"/>
+          </a:fontRef>
+        </p:style>
+      </p:cxnSp>
+      <p:sp>
+        <p:nvSpPr>
+          <p:cNvPr id="16" name="TextBox 15"/>
+          <p:cNvSpPr txBox="1"/>
+          <p:nvPr/>
+        </p:nvSpPr>
+        <p:spPr>
+          <a:xfrm>
+            <a:off x="1199116" y="4165183"/>
+            <a:ext cx="1764524" cy="369332"/>
+          </a:xfrm>
+          <a:prstGeom prst="rect">
+            <a:avLst/>
+          </a:prstGeom>
+          <a:noFill/>
+        </p:spPr>
+        <p:txBody>
+          <a:bodyPr wrap="square" rtlCol="0">
+            <a:spAutoFit/>
+          </a:bodyPr>
+          <a:lstStyle/>
+          <a:p>
+            <a:r>
+              <a:rPr lang="en-US" altLang="ko-KR" b="1" dirty="0" smtClean="0">
+                <a:solidFill>
+                  <a:srgbClr val="FF0000"/>
+                </a:solidFill>
+              </a:rPr>
+              <a:t>Start from here</a:t>
+            </a:r>
+            <a:endParaRPr lang="ko-KR" altLang="en-US" b="1" dirty="0">
+              <a:solidFill>
+                <a:srgbClr val="FF0000"/>
+              </a:solidFill>
+            </a:endParaRPr>
+          </a:p>
+        </p:txBody>
+      </p:sp>
+      <p:sp>
+        <p:nvSpPr>
+          <p:cNvPr id="17" name="타원 16"/>
+          <p:cNvSpPr/>
+          <p:nvPr/>
+        </p:nvSpPr>
+        <p:spPr>
+          <a:xfrm>
+            <a:off x="7203611" y="4946940"/>
+            <a:ext cx="627455" cy="589195"/>
+          </a:xfrm>
+          <a:prstGeom prst="ellipse">
+            <a:avLst/>
+          </a:prstGeom>
+          <a:noFill/>
+          <a:ln>
+            <a:solidFill>
+              <a:srgbClr val="FF0000"/>
+            </a:solidFill>
+          </a:ln>
+        </p:spPr>
+        <p:style>
+          <a:lnRef idx="2">
+            <a:schemeClr val="accent1">
+              <a:shade val="50000"/>
+            </a:schemeClr>
+          </a:lnRef>
+          <a:fillRef idx="1">
+            <a:schemeClr val="accent1"/>
+          </a:fillRef>
+          <a:effectRef idx="0">
+            <a:schemeClr val="accent1"/>
+          </a:effectRef>
+          <a:fontRef idx="minor">
+            <a:schemeClr val="lt1"/>
+          </a:fontRef>
+        </p:style>
+        <p:txBody>
+          <a:bodyPr rtlCol="0" anchor="ctr"/>
+          <a:lstStyle/>
+          <a:p>
+            <a:pPr algn="ctr"/>
+            <a:endParaRPr lang="ko-KR" altLang="en-US"/>
+          </a:p>
+        </p:txBody>
+      </p:sp>
+      <p:cxnSp>
+        <p:nvCxnSpPr>
+          <p:cNvPr id="18" name="직선 화살표 연결선 17"/>
+          <p:cNvCxnSpPr>
+            <a:endCxn id="17" idx="7"/>
+          </p:cNvCxnSpPr>
+          <p:nvPr/>
+        </p:nvCxnSpPr>
+        <p:spPr>
+          <a:xfrm flipH="1">
+            <a:off x="7739177" y="4654506"/>
+            <a:ext cx="1060488" cy="378720"/>
+          </a:xfrm>
+          <a:prstGeom prst="straightConnector1">
+            <a:avLst/>
+          </a:prstGeom>
+          <a:ln>
+            <a:solidFill>
+              <a:srgbClr val="FF0000"/>
+            </a:solidFill>
+            <a:tailEnd type="triangle"/>
+          </a:ln>
+        </p:spPr>
+        <p:style>
+          <a:lnRef idx="1">
+            <a:schemeClr val="accent2"/>
+          </a:lnRef>
+          <a:fillRef idx="0">
+            <a:schemeClr val="accent2"/>
+          </a:fillRef>
+          <a:effectRef idx="0">
+            <a:schemeClr val="accent2"/>
+          </a:effectRef>
+          <a:fontRef idx="minor">
+            <a:schemeClr val="tx1"/>
+          </a:fontRef>
+        </p:style>
+      </p:cxnSp>
+      <p:sp>
+        <p:nvSpPr>
+          <p:cNvPr id="19" name="TextBox 18"/>
+          <p:cNvSpPr txBox="1"/>
+          <p:nvPr/>
+        </p:nvSpPr>
+        <p:spPr>
+          <a:xfrm>
+            <a:off x="8390419" y="4008175"/>
+            <a:ext cx="2578682" cy="646331"/>
+          </a:xfrm>
+          <a:prstGeom prst="rect">
+            <a:avLst/>
+          </a:prstGeom>
+          <a:noFill/>
+        </p:spPr>
+        <p:txBody>
+          <a:bodyPr wrap="square" rtlCol="0">
+            <a:spAutoFit/>
+          </a:bodyPr>
+          <a:lstStyle/>
+          <a:p>
+            <a:r>
+              <a:rPr lang="en-US" altLang="ko-KR" b="1" dirty="0" smtClean="0">
+                <a:solidFill>
+                  <a:srgbClr val="FF0000"/>
+                </a:solidFill>
+              </a:rPr>
+              <a:t>When arrive this point, turn on the green light</a:t>
+            </a:r>
+            <a:endParaRPr lang="ko-KR" altLang="en-US" b="1" dirty="0">
+              <a:solidFill>
+                <a:srgbClr val="FF0000"/>
+              </a:solidFill>
+            </a:endParaRPr>
+          </a:p>
+        </p:txBody>
+      </p:sp>
+    </p:spTree>
+    <p:extLst>
+      <p:ext uri="{BB962C8B-B14F-4D97-AF65-F5344CB8AC3E}">
+        <p14:creationId xmlns:p14="http://schemas.microsoft.com/office/powerpoint/2010/main" val="3659920307"/>
+      </p:ext>
+    </p:extLst>
+  </p:cSld>
+  <p:clrMapOvr>
+    <a:masterClrMapping/>
+  </p:clrMapOvr>
+  <p:timing>
+    <p:tnLst>
+      <p:par>
+        <p:cTn id="1" dur="indefinite" restart="never" nodeType="tmRoot"/>
+      </p:par>
+    </p:tnLst>
+  </p:timing>
+</p:sld>
+</file>
+
+<file path=ppt/slides/slide16.xml><?xml version="1.0" encoding="utf-8"?>
+<p:sld xmlns:a="http://schemas.openxmlformats.org/drawingml/2006/main" xmlns:r="http://schemas.openxmlformats.org/officeDocument/2006/relationships" xmlns:p="http://schemas.openxmlformats.org/presentationml/2006/main">
+  <p:cSld>
+    <p:spTree>
+      <p:nvGrpSpPr>
+        <p:cNvPr id="1" name=""/>
+        <p:cNvGrpSpPr/>
+        <p:nvPr/>
+      </p:nvGrpSpPr>
+      <p:grpSpPr>
+        <a:xfrm>
+          <a:off x="0" y="0"/>
+          <a:ext cx="0" cy="0"/>
+          <a:chOff x="0" y="0"/>
+          <a:chExt cx="0" cy="0"/>
+        </a:xfrm>
+      </p:grpSpPr>
+      <p:sp>
+        <p:nvSpPr>
+          <p:cNvPr id="2" name="제목 1"/>
+          <p:cNvSpPr>
+            <a:spLocks noGrp="1"/>
+          </p:cNvSpPr>
+          <p:nvPr>
+            <p:ph type="title"/>
+          </p:nvPr>
+        </p:nvSpPr>
+        <p:spPr/>
+        <p:txBody>
+          <a:bodyPr/>
+          <a:lstStyle/>
+          <a:p>
+            <a:r>
+              <a:rPr lang="en-US" altLang="ko-KR" dirty="0" smtClean="0"/>
+              <a:t>Related work</a:t>
+            </a:r>
+            <a:endParaRPr lang="ko-KR" altLang="en-US" dirty="0"/>
+          </a:p>
+        </p:txBody>
+      </p:sp>
+      <p:sp>
+        <p:nvSpPr>
+          <p:cNvPr id="3" name="내용 개체 틀 2"/>
+          <p:cNvSpPr>
+            <a:spLocks noGrp="1"/>
+          </p:cNvSpPr>
+          <p:nvPr>
+            <p:ph idx="1"/>
+          </p:nvPr>
+        </p:nvSpPr>
+        <p:spPr/>
+        <p:txBody>
+          <a:bodyPr/>
+          <a:lstStyle/>
+          <a:p>
+            <a:r>
+              <a:rPr lang="en-US" altLang="ko-KR" dirty="0" smtClean="0"/>
+              <a:t> Max Pressure : optimization-based method</a:t>
+            </a:r>
+          </a:p>
+          <a:p>
+            <a:pPr lvl="1"/>
+            <a:r>
+              <a:rPr lang="en-US" altLang="ko-KR" dirty="0" smtClean="0"/>
+              <a:t>Providing global optimization through coordination</a:t>
+            </a:r>
+          </a:p>
+          <a:p>
+            <a:pPr lvl="1"/>
+            <a:r>
+              <a:rPr lang="en-US" altLang="ko-KR" dirty="0" smtClean="0"/>
+              <a:t>Developed to optimize the global vehicle travel time, throughput and # of stops at intersections</a:t>
+            </a:r>
+            <a:br>
+              <a:rPr lang="en-US" altLang="ko-KR" dirty="0" smtClean="0"/>
+            </a:br>
+            <a:r>
+              <a:rPr lang="en-US" altLang="ko-KR" dirty="0" smtClean="0"/>
+              <a:t/>
+            </a:r>
+            <a:br>
+              <a:rPr lang="en-US" altLang="ko-KR" dirty="0" smtClean="0"/>
+            </a:br>
+            <a:r>
+              <a:rPr lang="en-US" altLang="ko-KR" dirty="0" smtClean="0">
+                <a:sym typeface="Wingdings" panose="05000000000000000000" pitchFamily="2" charset="2"/>
+              </a:rPr>
+              <a:t> Challenges</a:t>
+            </a:r>
+          </a:p>
+          <a:p>
+            <a:pPr lvl="4"/>
+            <a:r>
+              <a:rPr lang="en-US" altLang="ko-KR" dirty="0">
+                <a:sym typeface="Wingdings" panose="05000000000000000000" pitchFamily="2" charset="2"/>
+              </a:rPr>
+              <a:t> </a:t>
+            </a:r>
+            <a:r>
+              <a:rPr lang="en-US" altLang="ko-KR" dirty="0" smtClean="0">
+                <a:sym typeface="Wingdings" panose="05000000000000000000" pitchFamily="2" charset="2"/>
+              </a:rPr>
+              <a:t>Still rely on assumptions of simple traffic condition, HARD to apply to real world</a:t>
+            </a:r>
+          </a:p>
+          <a:p>
+            <a:r>
+              <a:rPr lang="en-US" altLang="ko-KR" dirty="0">
+                <a:sym typeface="Wingdings" panose="05000000000000000000" pitchFamily="2" charset="2"/>
+              </a:rPr>
+              <a:t> </a:t>
+            </a:r>
+            <a:r>
+              <a:rPr lang="en-US" altLang="ko-KR" dirty="0" smtClean="0">
+                <a:sym typeface="Wingdings" panose="05000000000000000000" pitchFamily="2" charset="2"/>
+              </a:rPr>
+              <a:t>RL-based single-intersection methods</a:t>
+            </a:r>
+          </a:p>
+          <a:p>
+            <a:pPr lvl="1"/>
+            <a:r>
+              <a:rPr lang="en-US" altLang="ko-KR" dirty="0" smtClean="0">
+                <a:sym typeface="Wingdings" panose="05000000000000000000" pitchFamily="2" charset="2"/>
+              </a:rPr>
+              <a:t>Outstanding performance over conventional transportation methods</a:t>
+            </a:r>
+          </a:p>
+          <a:p>
+            <a:pPr lvl="1"/>
+            <a:r>
+              <a:rPr lang="en-US" altLang="ko-KR" dirty="0" smtClean="0">
+                <a:sym typeface="Wingdings" panose="05000000000000000000" pitchFamily="2" charset="2"/>
+              </a:rPr>
+              <a:t>For satisfying scalability,  Advance to ‘RL-based multi-intersection methods’</a:t>
+            </a:r>
+            <a:endParaRPr lang="en-US" altLang="ko-KR" dirty="0" smtClean="0"/>
+          </a:p>
+        </p:txBody>
+      </p:sp>
+    </p:spTree>
+    <p:extLst>
+      <p:ext uri="{BB962C8B-B14F-4D97-AF65-F5344CB8AC3E}">
+        <p14:creationId xmlns:p14="http://schemas.microsoft.com/office/powerpoint/2010/main" val="3516416667"/>
+      </p:ext>
+    </p:extLst>
+  </p:cSld>
+  <p:clrMapOvr>
+    <a:masterClrMapping/>
+  </p:clrMapOvr>
+  <p:timing>
+    <p:tnLst>
+      <p:par>
+        <p:cTn id="1" dur="indefinite" restart="never" nodeType="tmRoot"/>
+      </p:par>
+    </p:tnLst>
+  </p:timing>
+</p:sld>
+</file>
+
+<file path=ppt/slides/slide17.xml><?xml version="1.0" encoding="utf-8"?>
+<p:sld xmlns:a="http://schemas.openxmlformats.org/drawingml/2006/main" xmlns:r="http://schemas.openxmlformats.org/officeDocument/2006/relationships" xmlns:p="http://schemas.openxmlformats.org/presentationml/2006/main">
+  <p:cSld>
+    <p:spTree>
+      <p:nvGrpSpPr>
+        <p:cNvPr id="1" name=""/>
+        <p:cNvGrpSpPr/>
+        <p:nvPr/>
+      </p:nvGrpSpPr>
+      <p:grpSpPr>
+        <a:xfrm>
+          <a:off x="0" y="0"/>
+          <a:ext cx="0" cy="0"/>
+          <a:chOff x="0" y="0"/>
+          <a:chExt cx="0" cy="0"/>
+        </a:xfrm>
+      </p:grpSpPr>
+      <p:sp>
+        <p:nvSpPr>
+          <p:cNvPr id="2" name="제목 1"/>
+          <p:cNvSpPr>
+            <a:spLocks noGrp="1"/>
+          </p:cNvSpPr>
+          <p:nvPr>
+            <p:ph type="title"/>
+          </p:nvPr>
+        </p:nvSpPr>
+        <p:spPr/>
+        <p:txBody>
+          <a:bodyPr/>
+          <a:lstStyle/>
+          <a:p>
+            <a:r>
+              <a:rPr lang="en-US" altLang="ko-KR" dirty="0" smtClean="0"/>
+              <a:t>Related work</a:t>
+            </a:r>
+            <a:endParaRPr lang="ko-KR" altLang="en-US" dirty="0"/>
+          </a:p>
+        </p:txBody>
+      </p:sp>
+      <p:sp>
+        <p:nvSpPr>
+          <p:cNvPr id="3" name="내용 개체 틀 2"/>
+          <p:cNvSpPr>
+            <a:spLocks noGrp="1"/>
+          </p:cNvSpPr>
+          <p:nvPr>
+            <p:ph idx="1"/>
+          </p:nvPr>
+        </p:nvSpPr>
+        <p:spPr/>
+        <p:txBody>
+          <a:bodyPr/>
+          <a:lstStyle/>
+          <a:p>
+            <a:r>
+              <a:rPr lang="en-US" altLang="ko-KR" dirty="0" smtClean="0"/>
+              <a:t> Reinforcement Learning(RL) based multi-intersection methods</a:t>
+            </a:r>
+          </a:p>
+          <a:p>
+            <a:pPr lvl="1"/>
+            <a:r>
+              <a:rPr lang="en-US" altLang="ko-KR" dirty="0" smtClean="0"/>
+              <a:t>Treat all the intersection </a:t>
+            </a:r>
+            <a:r>
+              <a:rPr lang="en-US" altLang="ko-KR" dirty="0" err="1" smtClean="0"/>
+              <a:t>isolately</a:t>
+            </a:r>
+            <a:r>
+              <a:rPr lang="en-US" altLang="ko-KR" dirty="0" smtClean="0"/>
+              <a:t> and apply individual traffic signal control</a:t>
+            </a:r>
+          </a:p>
+          <a:p>
+            <a:pPr lvl="2"/>
+            <a:r>
+              <a:rPr lang="en-US" altLang="ko-KR" dirty="0" smtClean="0"/>
+              <a:t>Scale-up easily</a:t>
+            </a:r>
+          </a:p>
+          <a:p>
+            <a:pPr lvl="2"/>
+            <a:r>
+              <a:rPr lang="en-US" altLang="ko-KR" dirty="0" smtClean="0"/>
+              <a:t>Cannot coordinate with neighbors, achieve their own goals</a:t>
+            </a:r>
+          </a:p>
+          <a:p>
+            <a:pPr lvl="1"/>
+            <a:r>
+              <a:rPr lang="en-US" altLang="ko-KR" dirty="0" smtClean="0"/>
+              <a:t>Centralized optimization over multiple coordinated agents</a:t>
+            </a:r>
+          </a:p>
+          <a:p>
+            <a:pPr lvl="2"/>
+            <a:r>
+              <a:rPr lang="en-US" altLang="ko-KR" dirty="0" smtClean="0"/>
+              <a:t>Achieve coordination with neighbor intersections</a:t>
+            </a:r>
+          </a:p>
+          <a:p>
+            <a:pPr lvl="2"/>
+            <a:r>
+              <a:rPr lang="en-US" altLang="ko-KR" dirty="0" smtClean="0"/>
+              <a:t>Network scale expands, optimization is infeasible due to large joint action space</a:t>
+            </a:r>
+          </a:p>
+          <a:p>
+            <a:pPr lvl="2"/>
+            <a:endParaRPr lang="en-US" altLang="ko-KR" dirty="0"/>
+          </a:p>
+          <a:p>
+            <a:pPr marL="0" indent="0">
+              <a:buNone/>
+            </a:pPr>
+            <a:r>
+              <a:rPr lang="en-US" altLang="ko-KR" dirty="0" smtClean="0">
+                <a:sym typeface="Wingdings" panose="05000000000000000000" pitchFamily="2" charset="2"/>
+              </a:rPr>
+              <a:t> Trade-off between scalability and coordination</a:t>
+            </a:r>
+            <a:endParaRPr lang="en-US" altLang="ko-KR" dirty="0" smtClean="0"/>
+          </a:p>
+        </p:txBody>
+      </p:sp>
+    </p:spTree>
+    <p:extLst>
+      <p:ext uri="{BB962C8B-B14F-4D97-AF65-F5344CB8AC3E}">
+        <p14:creationId xmlns:p14="http://schemas.microsoft.com/office/powerpoint/2010/main" val="3965086745"/>
+      </p:ext>
+    </p:extLst>
+  </p:cSld>
+  <p:clrMapOvr>
+    <a:masterClrMapping/>
+  </p:clrMapOvr>
+  <p:timing>
+    <p:tnLst>
+      <p:par>
+        <p:cTn id="1" dur="indefinite" restart="never" nodeType="tmRoot"/>
+      </p:par>
+    </p:tnLst>
+  </p:timing>
+</p:sld>
+</file>
+
+<file path=ppt/slides/slide18.xml><?xml version="1.0" encoding="utf-8"?>
+<p:sld xmlns:a="http://schemas.openxmlformats.org/drawingml/2006/main" xmlns:r="http://schemas.openxmlformats.org/officeDocument/2006/relationships" xmlns:p="http://schemas.openxmlformats.org/presentationml/2006/main">
+  <p:cSld>
+    <p:spTree>
+      <p:nvGrpSpPr>
+        <p:cNvPr id="1" name=""/>
+        <p:cNvGrpSpPr/>
+        <p:nvPr/>
+      </p:nvGrpSpPr>
+      <p:grpSpPr>
+        <a:xfrm>
+          <a:off x="0" y="0"/>
+          <a:ext cx="0" cy="0"/>
+          <a:chOff x="0" y="0"/>
+          <a:chExt cx="0" cy="0"/>
+        </a:xfrm>
+      </p:grpSpPr>
+      <p:sp>
+        <p:nvSpPr>
+          <p:cNvPr id="2" name="제목 1"/>
+          <p:cNvSpPr>
+            <a:spLocks noGrp="1"/>
+          </p:cNvSpPr>
+          <p:nvPr>
+            <p:ph type="title"/>
+          </p:nvPr>
+        </p:nvSpPr>
+        <p:spPr/>
+        <p:txBody>
+          <a:bodyPr/>
+          <a:lstStyle/>
+          <a:p>
+            <a:r>
+              <a:rPr lang="en-US" altLang="ko-KR" dirty="0" smtClean="0"/>
+              <a:t>Related work</a:t>
+            </a:r>
+            <a:endParaRPr lang="ko-KR" altLang="en-US" dirty="0"/>
+          </a:p>
+        </p:txBody>
+      </p:sp>
+      <p:sp>
+        <p:nvSpPr>
+          <p:cNvPr id="3" name="내용 개체 틀 2"/>
+          <p:cNvSpPr>
+            <a:spLocks noGrp="1"/>
+          </p:cNvSpPr>
+          <p:nvPr>
+            <p:ph idx="1"/>
+          </p:nvPr>
+        </p:nvSpPr>
+        <p:spPr/>
+        <p:txBody>
+          <a:bodyPr/>
+          <a:lstStyle/>
+          <a:p>
+            <a:r>
+              <a:rPr lang="en-US" altLang="ko-KR" dirty="0" smtClean="0"/>
+              <a:t> Decentralized Approach based on RL</a:t>
+            </a:r>
+          </a:p>
+          <a:p>
+            <a:pPr lvl="1"/>
+            <a:r>
+              <a:rPr lang="en-US" altLang="ko-KR" dirty="0" smtClean="0"/>
+              <a:t>Considering both scalability and coordination</a:t>
+            </a:r>
+          </a:p>
+          <a:p>
+            <a:pPr lvl="1"/>
+            <a:endParaRPr lang="en-US" altLang="ko-KR" dirty="0"/>
+          </a:p>
+          <a:p>
+            <a:r>
+              <a:rPr lang="en-US" altLang="ko-KR" dirty="0" smtClean="0"/>
+              <a:t> Issues that are hard to apply RL in large-scale network</a:t>
+            </a:r>
+          </a:p>
+          <a:p>
+            <a:pPr lvl="1"/>
+            <a:r>
+              <a:rPr lang="en-US" altLang="ko-KR" dirty="0" err="1" smtClean="0"/>
+              <a:t>Uni</a:t>
+            </a:r>
+            <a:r>
+              <a:rPr lang="en-US" altLang="ko-KR" dirty="0" smtClean="0"/>
+              <a:t>-intersection related reward system</a:t>
+            </a:r>
+          </a:p>
+          <a:p>
+            <a:pPr lvl="1"/>
+            <a:r>
+              <a:rPr lang="en-US" altLang="ko-KR" dirty="0" smtClean="0"/>
+              <a:t>Few reward design for direct coordination</a:t>
+            </a:r>
+          </a:p>
+          <a:p>
+            <a:pPr lvl="1"/>
+            <a:r>
+              <a:rPr lang="en-US" altLang="ko-KR" dirty="0" smtClean="0"/>
+              <a:t>Current RL method includes infeasible features in the states</a:t>
+            </a:r>
+          </a:p>
+          <a:p>
+            <a:pPr lvl="2"/>
+            <a:endParaRPr lang="ko-KR" altLang="en-US" dirty="0"/>
+          </a:p>
+        </p:txBody>
+      </p:sp>
+    </p:spTree>
+    <p:extLst>
+      <p:ext uri="{BB962C8B-B14F-4D97-AF65-F5344CB8AC3E}">
+        <p14:creationId xmlns:p14="http://schemas.microsoft.com/office/powerpoint/2010/main" val="981731544"/>
+      </p:ext>
+    </p:extLst>
+  </p:cSld>
+  <p:clrMapOvr>
+    <a:masterClrMapping/>
+  </p:clrMapOvr>
+  <p:timing>
+    <p:tnLst>
+      <p:par>
+        <p:cTn id="1" dur="indefinite" restart="never" nodeType="tmRoot"/>
+      </p:par>
+    </p:tnLst>
+  </p:timing>
+</p:sld>
+</file>
+
+<file path=ppt/slides/slide19.xml><?xml version="1.0" encoding="utf-8"?>
+<p:sld xmlns:a="http://schemas.openxmlformats.org/drawingml/2006/main" xmlns:r="http://schemas.openxmlformats.org/officeDocument/2006/relationships" xmlns:p="http://schemas.openxmlformats.org/presentationml/2006/main">
+  <p:cSld>
+    <p:spTree>
+      <p:nvGrpSpPr>
+        <p:cNvPr id="1" name=""/>
+        <p:cNvGrpSpPr/>
+        <p:nvPr/>
+      </p:nvGrpSpPr>
+      <p:grpSpPr>
+        <a:xfrm>
+          <a:off x="0" y="0"/>
+          <a:ext cx="0" cy="0"/>
+          <a:chOff x="0" y="0"/>
+          <a:chExt cx="0" cy="0"/>
+        </a:xfrm>
+      </p:grpSpPr>
+      <p:sp>
+        <p:nvSpPr>
+          <p:cNvPr id="2" name="제목 1"/>
+          <p:cNvSpPr>
+            <a:spLocks noGrp="1"/>
+          </p:cNvSpPr>
+          <p:nvPr>
+            <p:ph type="title"/>
+          </p:nvPr>
+        </p:nvSpPr>
+        <p:spPr/>
+        <p:txBody>
+          <a:bodyPr/>
+          <a:lstStyle/>
+          <a:p>
+            <a:r>
+              <a:rPr lang="en-US" altLang="ko-KR" dirty="0" smtClean="0"/>
+              <a:t>Approach</a:t>
+            </a:r>
+            <a:endParaRPr lang="ko-KR" altLang="en-US" dirty="0"/>
+          </a:p>
+        </p:txBody>
+      </p:sp>
+      <p:sp>
+        <p:nvSpPr>
+          <p:cNvPr id="3" name="내용 개체 틀 2"/>
+          <p:cNvSpPr>
+            <a:spLocks noGrp="1"/>
+          </p:cNvSpPr>
+          <p:nvPr>
+            <p:ph idx="1"/>
+          </p:nvPr>
+        </p:nvSpPr>
+        <p:spPr/>
+        <p:txBody>
+          <a:bodyPr/>
+          <a:lstStyle/>
+          <a:p>
+            <a:r>
+              <a:rPr lang="en-US" altLang="ko-KR" dirty="0" smtClean="0"/>
+              <a:t> </a:t>
+            </a:r>
+            <a:r>
+              <a:rPr lang="en-US" altLang="ko-KR" dirty="0" err="1" smtClean="0"/>
+              <a:t>MPLight</a:t>
+            </a:r>
+            <a:endParaRPr lang="en-US" altLang="ko-KR" dirty="0" smtClean="0"/>
+          </a:p>
+          <a:p>
+            <a:pPr lvl="1"/>
+            <a:r>
+              <a:rPr lang="en-US" altLang="ko-KR" dirty="0" smtClean="0"/>
+              <a:t>Utilizing simple features that are feasible in the real world &lt;- overcome infeasibility</a:t>
+            </a:r>
+          </a:p>
+          <a:p>
+            <a:pPr lvl="1"/>
+            <a:r>
+              <a:rPr lang="en-US" altLang="ko-KR" dirty="0" smtClean="0">
+                <a:sym typeface="Wingdings" panose="05000000000000000000" pitchFamily="2" charset="2"/>
+              </a:rPr>
+              <a:t>Sharing parameters of intersections &lt;- overcome scalability</a:t>
+            </a:r>
+          </a:p>
+          <a:p>
+            <a:pPr lvl="2"/>
+            <a:r>
+              <a:rPr lang="en-US" altLang="ko-KR" dirty="0" smtClean="0">
+                <a:sym typeface="Wingdings" panose="05000000000000000000" pitchFamily="2" charset="2"/>
+              </a:rPr>
+              <a:t>Not sharing all the parameters naively  inferior performance because of having different structures each</a:t>
+            </a:r>
+          </a:p>
+          <a:p>
+            <a:pPr lvl="2"/>
+            <a:r>
+              <a:rPr lang="en-US" altLang="ko-KR" dirty="0" smtClean="0">
+                <a:sym typeface="Wingdings" panose="05000000000000000000" pitchFamily="2" charset="2"/>
+              </a:rPr>
+              <a:t>Not applying the control of large flow to the system with little traffic</a:t>
+            </a:r>
+            <a:br>
+              <a:rPr lang="en-US" altLang="ko-KR" dirty="0" smtClean="0">
+                <a:sym typeface="Wingdings" panose="05000000000000000000" pitchFamily="2" charset="2"/>
+              </a:rPr>
+            </a:br>
+            <a:r>
+              <a:rPr lang="en-US" altLang="ko-KR" dirty="0" smtClean="0">
+                <a:sym typeface="Wingdings" panose="05000000000000000000" pitchFamily="2" charset="2"/>
+              </a:rPr>
+              <a:t>- Following similar control logic and enhancing the speed of learning by sharing their learned knowledge </a:t>
+            </a:r>
+            <a:br>
+              <a:rPr lang="en-US" altLang="ko-KR" dirty="0" smtClean="0">
+                <a:sym typeface="Wingdings" panose="05000000000000000000" pitchFamily="2" charset="2"/>
+              </a:rPr>
+            </a:br>
+            <a:r>
+              <a:rPr lang="en-US" altLang="ko-KR" dirty="0" smtClean="0">
+                <a:sym typeface="Wingdings" panose="05000000000000000000" pitchFamily="2" charset="2"/>
+              </a:rPr>
+              <a:t>- base model, ‘FRAP’</a:t>
+            </a:r>
+          </a:p>
+          <a:p>
+            <a:pPr lvl="1"/>
+            <a:r>
+              <a:rPr lang="en-US" altLang="ko-KR" dirty="0"/>
+              <a:t>Integrating the concept of “pressure” into reward design for </a:t>
+            </a:r>
+            <a:r>
+              <a:rPr lang="en-US" altLang="ko-KR" dirty="0" smtClean="0"/>
+              <a:t>coordination</a:t>
+            </a:r>
+          </a:p>
+          <a:p>
+            <a:pPr lvl="2"/>
+            <a:r>
+              <a:rPr lang="en-US" altLang="ko-KR" dirty="0" smtClean="0"/>
+              <a:t>Derived from ‘max pressure theory’, aimed at the global throughput in the area</a:t>
+            </a:r>
+          </a:p>
+          <a:p>
+            <a:pPr lvl="2"/>
+            <a:r>
+              <a:rPr lang="en-US" altLang="ko-KR" dirty="0" smtClean="0"/>
+              <a:t>Balancing the distribution of vehicle by minimizing the pressure and maximizing the throughput </a:t>
+            </a:r>
+            <a:br>
+              <a:rPr lang="en-US" altLang="ko-KR" dirty="0" smtClean="0"/>
+            </a:br>
+            <a:r>
+              <a:rPr lang="en-US" altLang="ko-KR" dirty="0" smtClean="0"/>
+              <a:t/>
+            </a:r>
+            <a:br>
+              <a:rPr lang="en-US" altLang="ko-KR" dirty="0" smtClean="0"/>
+            </a:br>
+            <a:r>
+              <a:rPr lang="en-US" altLang="ko-KR" dirty="0" smtClean="0"/>
+              <a:t>- pressure: discrepancy of the number of vehicles inflow and outflow</a:t>
+            </a:r>
+            <a:r>
+              <a:rPr lang="en-US" altLang="ko-KR" dirty="0"/>
+              <a:t/>
+            </a:r>
+            <a:br>
+              <a:rPr lang="en-US" altLang="ko-KR" dirty="0"/>
+            </a:br>
+            <a:endParaRPr lang="ko-KR" altLang="en-US" dirty="0"/>
+          </a:p>
+        </p:txBody>
+      </p:sp>
+    </p:spTree>
+    <p:extLst>
+      <p:ext uri="{BB962C8B-B14F-4D97-AF65-F5344CB8AC3E}">
+        <p14:creationId xmlns:p14="http://schemas.microsoft.com/office/powerpoint/2010/main" val="3727605026"/>
+      </p:ext>
+    </p:extLst>
+  </p:cSld>
+  <p:clrMapOvr>
+    <a:masterClrMapping/>
+  </p:clrMapOvr>
+  <p:timing>
+    <p:tnLst>
+      <p:par>
+        <p:cTn id="1" dur="indefinite" restart="never" nodeType="tmRoot"/>
+      </p:par>
+    </p:tnLst>
+  </p:timing>
 </p:sld>
 </file>
 
@@ -7993,6 +9585,10 @@
               <a:rPr lang="ko-KR" altLang="en-US" dirty="0"/>
               <a:t>제작</a:t>
             </a:r>
+            <a:r>
+              <a:rPr lang="en-US" altLang="ko-KR" dirty="0"/>
+              <a:t/>
+            </a:r>
             <a:br>
               <a:rPr lang="en-US" altLang="ko-KR" dirty="0"/>
             </a:br>
@@ -8062,6 +9658,957 @@
     <p:extLst>
       <p:ext uri="{BB962C8B-B14F-4D97-AF65-F5344CB8AC3E}">
         <p14:creationId xmlns:p14="http://schemas.microsoft.com/office/powerpoint/2010/main" val="3740832334"/>
+      </p:ext>
+    </p:extLst>
+  </p:cSld>
+  <p:clrMapOvr>
+    <a:masterClrMapping/>
+  </p:clrMapOvr>
+</p:sld>
+</file>
+
+<file path=ppt/slides/slide20.xml><?xml version="1.0" encoding="utf-8"?>
+<p:sld xmlns:a="http://schemas.openxmlformats.org/drawingml/2006/main" xmlns:r="http://schemas.openxmlformats.org/officeDocument/2006/relationships" xmlns:p="http://schemas.openxmlformats.org/presentationml/2006/main">
+  <p:cSld>
+    <p:spTree>
+      <p:nvGrpSpPr>
+        <p:cNvPr id="1" name=""/>
+        <p:cNvGrpSpPr/>
+        <p:nvPr/>
+      </p:nvGrpSpPr>
+      <p:grpSpPr>
+        <a:xfrm>
+          <a:off x="0" y="0"/>
+          <a:ext cx="0" cy="0"/>
+          <a:chOff x="0" y="0"/>
+          <a:chExt cx="0" cy="0"/>
+        </a:xfrm>
+      </p:grpSpPr>
+      <p:sp>
+        <p:nvSpPr>
+          <p:cNvPr id="2" name="제목 1"/>
+          <p:cNvSpPr>
+            <a:spLocks noGrp="1"/>
+          </p:cNvSpPr>
+          <p:nvPr>
+            <p:ph type="title"/>
+          </p:nvPr>
+        </p:nvSpPr>
+        <p:spPr/>
+        <p:txBody>
+          <a:bodyPr/>
+          <a:lstStyle/>
+          <a:p>
+            <a:r>
+              <a:rPr lang="en-US" altLang="ko-KR" dirty="0" smtClean="0"/>
+              <a:t>Approach: DQN Agent</a:t>
+            </a:r>
+            <a:endParaRPr lang="ko-KR" altLang="en-US" dirty="0"/>
+          </a:p>
+        </p:txBody>
+      </p:sp>
+      <mc:AlternateContent xmlns:mc="http://schemas.openxmlformats.org/markup-compatibility/2006">
+        <mc:Choice xmlns:a14="http://schemas.microsoft.com/office/drawing/2010/main" Requires="a14">
+          <p:sp>
+            <p:nvSpPr>
+              <p:cNvPr id="3" name="내용 개체 틀 2"/>
+              <p:cNvSpPr>
+                <a:spLocks noGrp="1"/>
+              </p:cNvSpPr>
+              <p:nvPr>
+                <p:ph idx="1"/>
+              </p:nvPr>
+            </p:nvSpPr>
+            <p:spPr>
+              <a:xfrm>
+                <a:off x="1097280" y="1845734"/>
+                <a:ext cx="5827674" cy="4023360"/>
+              </a:xfrm>
+            </p:spPr>
+            <p:txBody>
+              <a:bodyPr/>
+              <a:lstStyle/>
+              <a:p>
+                <a:r>
+                  <a:rPr lang="en-US" altLang="ko-KR" dirty="0" smtClean="0"/>
+                  <a:t>  Reinforcement Learning Structure(Deep Q-Network)</a:t>
+                </a:r>
+              </a:p>
+              <a:p>
+                <a:pPr lvl="1"/>
+                <a:r>
+                  <a:rPr lang="en-US" altLang="ko-KR" dirty="0" smtClean="0"/>
+                  <a:t>Observation</a:t>
+                </a:r>
+              </a:p>
+              <a:p>
+                <a:pPr lvl="2"/>
+                <a:r>
+                  <a:rPr lang="en-US" altLang="ko-KR" dirty="0" smtClean="0"/>
+                  <a:t>Current phase </a:t>
+                </a:r>
+                <a14:m>
+                  <m:oMath xmlns:m="http://schemas.openxmlformats.org/officeDocument/2006/math">
+                    <m:r>
+                      <a:rPr lang="en-US" altLang="ko-KR" b="0" i="1" smtClean="0">
+                        <a:latin typeface="Cambria Math" panose="02040503050406030204" pitchFamily="18" charset="0"/>
+                      </a:rPr>
+                      <m:t>𝑝</m:t>
+                    </m:r>
+                  </m:oMath>
+                </a14:m>
+                <a:r>
+                  <a:rPr lang="ko-KR" altLang="en-US" dirty="0" smtClean="0"/>
+                  <a:t> </a:t>
+                </a:r>
+                <a:endParaRPr lang="en-US" altLang="ko-KR" dirty="0" smtClean="0"/>
+              </a:p>
+              <a:p>
+                <a:pPr lvl="2"/>
+                <a:r>
+                  <a:rPr lang="en-US" altLang="ko-KR" dirty="0" smtClean="0"/>
+                  <a:t>Pressure of the 12 traffic movements</a:t>
+                </a:r>
+                <a:br>
+                  <a:rPr lang="en-US" altLang="ko-KR" dirty="0" smtClean="0"/>
+                </a:br>
+                <a:r>
+                  <a:rPr lang="en-US" altLang="ko-KR" dirty="0" smtClean="0"/>
+                  <a:t>- fewer movements </a:t>
+                </a:r>
+                <a:r>
+                  <a:rPr lang="en-US" altLang="ko-KR" dirty="0" smtClean="0">
+                    <a:sym typeface="Wingdings" panose="05000000000000000000" pitchFamily="2" charset="2"/>
+                  </a:rPr>
+                  <a:t>-&gt; zero-padded</a:t>
+                </a:r>
+              </a:p>
+              <a:p>
+                <a:pPr lvl="1"/>
+                <a:r>
+                  <a:rPr lang="en-US" altLang="ko-KR" dirty="0" smtClean="0">
+                    <a:sym typeface="Wingdings" panose="05000000000000000000" pitchFamily="2" charset="2"/>
+                  </a:rPr>
+                  <a:t>Action</a:t>
+                </a:r>
+              </a:p>
+              <a:p>
+                <a:pPr lvl="2"/>
+                <a:r>
+                  <a:rPr lang="en-US" altLang="ko-KR" dirty="0" smtClean="0">
+                    <a:sym typeface="Wingdings" panose="05000000000000000000" pitchFamily="2" charset="2"/>
+                  </a:rPr>
+                  <a:t>Choose phase </a:t>
+                </a:r>
+                <a14:m>
+                  <m:oMath xmlns:m="http://schemas.openxmlformats.org/officeDocument/2006/math">
+                    <m:r>
+                      <a:rPr lang="en-US" altLang="ko-KR" b="0" i="1" smtClean="0">
+                        <a:latin typeface="Cambria Math" panose="02040503050406030204" pitchFamily="18" charset="0"/>
+                        <a:sym typeface="Wingdings" panose="05000000000000000000" pitchFamily="2" charset="2"/>
+                      </a:rPr>
+                      <m:t>𝑝</m:t>
+                    </m:r>
+                  </m:oMath>
+                </a14:m>
+                <a:r>
+                  <a:rPr lang="ko-KR" altLang="en-US" dirty="0" smtClean="0"/>
+                  <a:t> </a:t>
+                </a:r>
+                <a:r>
+                  <a:rPr lang="en-US" altLang="ko-KR" dirty="0" smtClean="0"/>
+                  <a:t>among the 8 candidate phases</a:t>
+                </a:r>
+                <a:r>
+                  <a:rPr lang="en-US" altLang="ko-KR" dirty="0"/>
+                  <a:t/>
+                </a:r>
+                <a:br>
+                  <a:rPr lang="en-US" altLang="ko-KR" dirty="0"/>
+                </a:br>
+                <a:r>
+                  <a:rPr lang="en-US" altLang="ko-KR" dirty="0" smtClean="0">
+                    <a:sym typeface="Wingdings" panose="05000000000000000000" pitchFamily="2" charset="2"/>
+                  </a:rPr>
+                  <a:t> Not choosing all the phase</a:t>
+                </a:r>
+              </a:p>
+              <a:p>
+                <a:pPr lvl="1"/>
+                <a:r>
+                  <a:rPr lang="en-US" altLang="ko-KR" dirty="0" smtClean="0">
+                    <a:sym typeface="Wingdings" panose="05000000000000000000" pitchFamily="2" charset="2"/>
+                  </a:rPr>
+                  <a:t>Reward</a:t>
+                </a:r>
+              </a:p>
+              <a:p>
+                <a:pPr lvl="2"/>
+                <a:r>
+                  <a:rPr lang="en-US" altLang="ko-KR" dirty="0" smtClean="0">
+                    <a:sym typeface="Wingdings" panose="05000000000000000000" pitchFamily="2" charset="2"/>
+                  </a:rPr>
+                  <a:t>Difference between the sum of queueing vehicles inflows and</a:t>
+                </a:r>
+                <a:br>
+                  <a:rPr lang="en-US" altLang="ko-KR" dirty="0" smtClean="0">
+                    <a:sym typeface="Wingdings" panose="05000000000000000000" pitchFamily="2" charset="2"/>
+                  </a:rPr>
+                </a:br>
+                <a:r>
+                  <a:rPr lang="en-US" altLang="ko-KR" dirty="0" smtClean="0">
+                    <a:sym typeface="Wingdings" panose="05000000000000000000" pitchFamily="2" charset="2"/>
+                  </a:rPr>
+                  <a:t>the sum of queueing vehicles outflow</a:t>
+                </a:r>
+                <a:br>
+                  <a:rPr lang="en-US" altLang="ko-KR" dirty="0" smtClean="0">
+                    <a:sym typeface="Wingdings" panose="05000000000000000000" pitchFamily="2" charset="2"/>
+                  </a:rPr>
+                </a:br>
+                <a:r>
+                  <a:rPr lang="en-US" altLang="ko-KR" dirty="0" smtClean="0">
+                    <a:sym typeface="Wingdings" panose="05000000000000000000" pitchFamily="2" charset="2"/>
+                  </a:rPr>
+                  <a:t> by maximizing the reward, agent will try to stabilizing </a:t>
+                </a:r>
+                <a:endParaRPr lang="en-US" altLang="ko-KR" dirty="0" smtClean="0"/>
+              </a:p>
+            </p:txBody>
+          </p:sp>
+        </mc:Choice>
+        <mc:Fallback>
+          <p:sp>
+            <p:nvSpPr>
+              <p:cNvPr id="3" name="내용 개체 틀 2"/>
+              <p:cNvSpPr>
+                <a:spLocks noGrp="1" noRot="1" noChangeAspect="1" noMove="1" noResize="1" noEditPoints="1" noAdjustHandles="1" noChangeArrowheads="1" noChangeShapeType="1" noTextEdit="1"/>
+              </p:cNvSpPr>
+              <p:nvPr>
+                <p:ph idx="1"/>
+              </p:nvPr>
+            </p:nvSpPr>
+            <p:spPr>
+              <a:xfrm>
+                <a:off x="1097280" y="1845734"/>
+                <a:ext cx="5827674" cy="4023360"/>
+              </a:xfrm>
+              <a:blipFill>
+                <a:blip r:embed="rId2"/>
+                <a:stretch>
+                  <a:fillRect l="-2510" t="-1667"/>
+                </a:stretch>
+              </a:blipFill>
+            </p:spPr>
+            <p:txBody>
+              <a:bodyPr/>
+              <a:lstStyle/>
+              <a:p>
+                <a:r>
+                  <a:rPr lang="ko-KR" altLang="en-US">
+                    <a:noFill/>
+                  </a:rPr>
+                  <a:t> </a:t>
+                </a:r>
+              </a:p>
+            </p:txBody>
+          </p:sp>
+        </mc:Fallback>
+      </mc:AlternateContent>
+      <p:pic>
+        <p:nvPicPr>
+          <p:cNvPr id="4" name="그림 3"/>
+          <p:cNvPicPr>
+            <a:picLocks noChangeAspect="1"/>
+          </p:cNvPicPr>
+          <p:nvPr/>
+        </p:nvPicPr>
+        <p:blipFill>
+          <a:blip r:embed="rId3"/>
+          <a:stretch>
+            <a:fillRect/>
+          </a:stretch>
+        </p:blipFill>
+        <p:spPr>
+          <a:xfrm>
+            <a:off x="6254411" y="2497001"/>
+            <a:ext cx="5134176" cy="2669105"/>
+          </a:xfrm>
+          <a:prstGeom prst="rect">
+            <a:avLst/>
+          </a:prstGeom>
+        </p:spPr>
+      </p:pic>
+      <p:cxnSp>
+        <p:nvCxnSpPr>
+          <p:cNvPr id="6" name="직선 화살표 연결선 5"/>
+          <p:cNvCxnSpPr>
+            <a:endCxn id="13" idx="2"/>
+          </p:cNvCxnSpPr>
+          <p:nvPr/>
+        </p:nvCxnSpPr>
+        <p:spPr>
+          <a:xfrm flipH="1" flipV="1">
+            <a:off x="7602145" y="4445744"/>
+            <a:ext cx="887619" cy="820099"/>
+          </a:xfrm>
+          <a:prstGeom prst="straightConnector1">
+            <a:avLst/>
+          </a:prstGeom>
+          <a:ln>
+            <a:solidFill>
+              <a:srgbClr val="FF0000"/>
+            </a:solidFill>
+            <a:tailEnd type="triangle"/>
+          </a:ln>
+        </p:spPr>
+        <p:style>
+          <a:lnRef idx="1">
+            <a:schemeClr val="accent2"/>
+          </a:lnRef>
+          <a:fillRef idx="0">
+            <a:schemeClr val="accent2"/>
+          </a:fillRef>
+          <a:effectRef idx="0">
+            <a:schemeClr val="accent2"/>
+          </a:effectRef>
+          <a:fontRef idx="minor">
+            <a:schemeClr val="tx1"/>
+          </a:fontRef>
+        </p:style>
+      </p:cxnSp>
+      <p:sp>
+        <p:nvSpPr>
+          <p:cNvPr id="7" name="TextBox 6"/>
+          <p:cNvSpPr txBox="1"/>
+          <p:nvPr/>
+        </p:nvSpPr>
+        <p:spPr>
+          <a:xfrm>
+            <a:off x="8414841" y="5220293"/>
+            <a:ext cx="813316" cy="369332"/>
+          </a:xfrm>
+          <a:prstGeom prst="rect">
+            <a:avLst/>
+          </a:prstGeom>
+          <a:noFill/>
+        </p:spPr>
+        <p:txBody>
+          <a:bodyPr wrap="square" rtlCol="0">
+            <a:spAutoFit/>
+          </a:bodyPr>
+          <a:lstStyle/>
+          <a:p>
+            <a:r>
+              <a:rPr lang="en-US" altLang="ko-KR" b="1" dirty="0" smtClean="0">
+                <a:solidFill>
+                  <a:srgbClr val="FF0000"/>
+                </a:solidFill>
+              </a:rPr>
+              <a:t>Agent</a:t>
+            </a:r>
+            <a:endParaRPr lang="ko-KR" altLang="en-US" b="1" dirty="0">
+              <a:solidFill>
+                <a:srgbClr val="FF0000"/>
+              </a:solidFill>
+            </a:endParaRPr>
+          </a:p>
+        </p:txBody>
+      </p:sp>
+      <p:sp>
+        <p:nvSpPr>
+          <p:cNvPr id="13" name="직사각형 12"/>
+          <p:cNvSpPr/>
+          <p:nvPr/>
+        </p:nvSpPr>
+        <p:spPr>
+          <a:xfrm>
+            <a:off x="6836956" y="2777633"/>
+            <a:ext cx="1530377" cy="1668111"/>
+          </a:xfrm>
+          <a:prstGeom prst="rect">
+            <a:avLst/>
+          </a:prstGeom>
+          <a:noFill/>
+          <a:ln>
+            <a:solidFill>
+              <a:srgbClr val="FF0000"/>
+            </a:solidFill>
+          </a:ln>
+        </p:spPr>
+        <p:style>
+          <a:lnRef idx="2">
+            <a:schemeClr val="accent1">
+              <a:shade val="50000"/>
+            </a:schemeClr>
+          </a:lnRef>
+          <a:fillRef idx="1">
+            <a:schemeClr val="accent1"/>
+          </a:fillRef>
+          <a:effectRef idx="0">
+            <a:schemeClr val="accent1"/>
+          </a:effectRef>
+          <a:fontRef idx="minor">
+            <a:schemeClr val="lt1"/>
+          </a:fontRef>
+        </p:style>
+        <p:txBody>
+          <a:bodyPr rtlCol="0" anchor="ctr"/>
+          <a:lstStyle/>
+          <a:p>
+            <a:pPr algn="ctr"/>
+            <a:endParaRPr lang="ko-KR" altLang="en-US"/>
+          </a:p>
+        </p:txBody>
+      </p:sp>
+      <mc:AlternateContent xmlns:mc="http://schemas.openxmlformats.org/markup-compatibility/2006">
+        <mc:Choice xmlns:a14="http://schemas.microsoft.com/office/drawing/2010/main" Requires="a14">
+          <p:sp>
+            <p:nvSpPr>
+              <p:cNvPr id="16" name="TextBox 15"/>
+              <p:cNvSpPr txBox="1"/>
+              <p:nvPr/>
+            </p:nvSpPr>
+            <p:spPr>
+              <a:xfrm>
+                <a:off x="1823766" y="5220293"/>
+                <a:ext cx="4399218" cy="246221"/>
+              </a:xfrm>
+              <a:prstGeom prst="rect">
+                <a:avLst/>
+              </a:prstGeom>
+              <a:noFill/>
+            </p:spPr>
+            <p:txBody>
+              <a:bodyPr wrap="none" lIns="0" tIns="0" rIns="0" bIns="0" rtlCol="0">
+                <a:spAutoFit/>
+              </a:bodyPr>
+              <a:lstStyle/>
+              <a:p>
+                <a14:m>
+                  <m:oMathPara xmlns:m="http://schemas.openxmlformats.org/officeDocument/2006/math">
+                    <m:oMathParaPr>
+                      <m:jc m:val="centerGroup"/>
+                    </m:oMathParaPr>
+                    <m:oMath xmlns:m="http://schemas.openxmlformats.org/officeDocument/2006/math">
+                      <m:sSub>
+                        <m:sSubPr>
+                          <m:ctrlPr>
+                            <a:rPr lang="en-US" altLang="ko-KR" sz="1600" b="0" i="1" smtClean="0">
+                              <a:latin typeface="Cambria Math" panose="02040503050406030204" pitchFamily="18" charset="0"/>
+                            </a:rPr>
+                          </m:ctrlPr>
+                        </m:sSubPr>
+                        <m:e>
+                          <m:r>
+                            <a:rPr lang="en-US" altLang="ko-KR" sz="1600" b="0" i="1" smtClean="0">
+                              <a:latin typeface="Cambria Math" panose="02040503050406030204" pitchFamily="18" charset="0"/>
+                            </a:rPr>
+                            <m:t>𝑟</m:t>
+                          </m:r>
+                        </m:e>
+                        <m:sub>
+                          <m:r>
+                            <a:rPr lang="en-US" altLang="ko-KR" sz="1600" b="0" i="1" smtClean="0">
+                              <a:latin typeface="Cambria Math" panose="02040503050406030204" pitchFamily="18" charset="0"/>
+                            </a:rPr>
+                            <m:t>𝑖</m:t>
+                          </m:r>
+                        </m:sub>
+                      </m:sSub>
+                      <m:r>
+                        <a:rPr lang="en-US" altLang="ko-KR" sz="1600" b="0" i="1" smtClean="0">
+                          <a:latin typeface="Cambria Math" panose="02040503050406030204" pitchFamily="18" charset="0"/>
+                        </a:rPr>
+                        <m:t>=−</m:t>
+                      </m:r>
+                      <m:sSub>
+                        <m:sSubPr>
+                          <m:ctrlPr>
+                            <a:rPr lang="en-US" altLang="ko-KR" sz="1600" b="0" i="1" smtClean="0">
+                              <a:latin typeface="Cambria Math" panose="02040503050406030204" pitchFamily="18" charset="0"/>
+                            </a:rPr>
+                          </m:ctrlPr>
+                        </m:sSubPr>
+                        <m:e>
+                          <m:r>
+                            <a:rPr lang="en-US" altLang="ko-KR" sz="1600" b="0" i="1" smtClean="0">
+                              <a:latin typeface="Cambria Math" panose="02040503050406030204" pitchFamily="18" charset="0"/>
+                            </a:rPr>
+                            <m:t>𝑃</m:t>
+                          </m:r>
+                        </m:e>
+                        <m:sub>
+                          <m:r>
+                            <a:rPr lang="en-US" altLang="ko-KR" sz="1600" b="0" i="1" smtClean="0">
+                              <a:latin typeface="Cambria Math" panose="02040503050406030204" pitchFamily="18" charset="0"/>
+                            </a:rPr>
+                            <m:t>𝑖</m:t>
+                          </m:r>
+                        </m:sub>
+                      </m:sSub>
+                      <m:r>
+                        <a:rPr lang="en-US" altLang="ko-KR" sz="1600" b="0" i="1" smtClean="0">
+                          <a:latin typeface="Cambria Math" panose="02040503050406030204" pitchFamily="18" charset="0"/>
+                        </a:rPr>
+                        <m:t>,  </m:t>
+                      </m:r>
+                      <m:sSub>
+                        <m:sSubPr>
+                          <m:ctrlPr>
+                            <a:rPr lang="en-US" altLang="ko-KR" sz="1600" b="0" i="1" smtClean="0">
+                              <a:latin typeface="Cambria Math" panose="02040503050406030204" pitchFamily="18" charset="0"/>
+                            </a:rPr>
+                          </m:ctrlPr>
+                        </m:sSubPr>
+                        <m:e>
+                          <m:r>
+                            <a:rPr lang="en-US" altLang="ko-KR" sz="1600" b="0" i="1" smtClean="0">
+                              <a:latin typeface="Cambria Math" panose="02040503050406030204" pitchFamily="18" charset="0"/>
+                            </a:rPr>
+                            <m:t>𝑃</m:t>
+                          </m:r>
+                        </m:e>
+                        <m:sub>
+                          <m:r>
+                            <a:rPr lang="en-US" altLang="ko-KR" sz="1600" b="0" i="1" smtClean="0">
+                              <a:latin typeface="Cambria Math" panose="02040503050406030204" pitchFamily="18" charset="0"/>
+                            </a:rPr>
+                            <m:t>𝑖</m:t>
+                          </m:r>
+                        </m:sub>
+                      </m:sSub>
+                      <m:r>
+                        <a:rPr lang="en-US" altLang="ko-KR" sz="1600" b="0" i="1" smtClean="0">
+                          <a:latin typeface="Cambria Math" panose="02040503050406030204" pitchFamily="18" charset="0"/>
+                        </a:rPr>
+                        <m:t> </m:t>
+                      </m:r>
+                      <m:r>
+                        <a:rPr lang="en-US" altLang="ko-KR" sz="1600" b="0" i="1" smtClean="0">
+                          <a:latin typeface="Cambria Math" panose="02040503050406030204" pitchFamily="18" charset="0"/>
+                        </a:rPr>
+                        <m:t>𝑖𝑠</m:t>
+                      </m:r>
+                      <m:r>
+                        <a:rPr lang="en-US" altLang="ko-KR" sz="1600" b="0" i="1" smtClean="0">
+                          <a:latin typeface="Cambria Math" panose="02040503050406030204" pitchFamily="18" charset="0"/>
+                        </a:rPr>
+                        <m:t> </m:t>
+                      </m:r>
+                      <m:r>
+                        <a:rPr lang="en-US" altLang="ko-KR" sz="1600" b="0" i="1" smtClean="0">
+                          <a:latin typeface="Cambria Math" panose="02040503050406030204" pitchFamily="18" charset="0"/>
+                        </a:rPr>
+                        <m:t>𝑡h𝑒</m:t>
+                      </m:r>
+                      <m:r>
+                        <a:rPr lang="en-US" altLang="ko-KR" sz="1600" b="0" i="1" smtClean="0">
+                          <a:latin typeface="Cambria Math" panose="02040503050406030204" pitchFamily="18" charset="0"/>
+                        </a:rPr>
+                        <m:t> </m:t>
+                      </m:r>
+                      <m:r>
+                        <a:rPr lang="en-US" altLang="ko-KR" sz="1600" b="0" i="1" smtClean="0">
+                          <a:latin typeface="Cambria Math" panose="02040503050406030204" pitchFamily="18" charset="0"/>
+                        </a:rPr>
+                        <m:t>𝑝𝑟𝑒𝑠𝑠𝑢𝑟𝑒</m:t>
+                      </m:r>
+                      <m:r>
+                        <a:rPr lang="en-US" altLang="ko-KR" sz="1600" b="0" i="1" smtClean="0">
+                          <a:latin typeface="Cambria Math" panose="02040503050406030204" pitchFamily="18" charset="0"/>
+                        </a:rPr>
+                        <m:t> </m:t>
+                      </m:r>
+                      <m:r>
+                        <a:rPr lang="en-US" altLang="ko-KR" sz="1600" b="0" i="1" smtClean="0">
+                          <a:latin typeface="Cambria Math" panose="02040503050406030204" pitchFamily="18" charset="0"/>
+                        </a:rPr>
+                        <m:t>𝑜𝑓</m:t>
+                      </m:r>
+                      <m:r>
+                        <a:rPr lang="en-US" altLang="ko-KR" sz="1600" b="0" i="1" smtClean="0">
+                          <a:latin typeface="Cambria Math" panose="02040503050406030204" pitchFamily="18" charset="0"/>
+                        </a:rPr>
+                        <m:t> </m:t>
+                      </m:r>
+                      <m:r>
+                        <a:rPr lang="en-US" altLang="ko-KR" sz="1600" b="0" i="1" smtClean="0">
+                          <a:latin typeface="Cambria Math" panose="02040503050406030204" pitchFamily="18" charset="0"/>
+                        </a:rPr>
+                        <m:t>𝑖𝑛𝑡𝑒𝑟𝑠𝑒𝑐𝑡𝑖𝑜𝑛</m:t>
+                      </m:r>
+                      <m:r>
+                        <a:rPr lang="en-US" altLang="ko-KR" sz="1600" b="0" i="1" smtClean="0">
+                          <a:latin typeface="Cambria Math" panose="02040503050406030204" pitchFamily="18" charset="0"/>
+                        </a:rPr>
+                        <m:t> </m:t>
+                      </m:r>
+                      <m:r>
+                        <a:rPr lang="en-US" altLang="ko-KR" sz="1600" b="0" i="1" smtClean="0">
+                          <a:latin typeface="Cambria Math" panose="02040503050406030204" pitchFamily="18" charset="0"/>
+                        </a:rPr>
+                        <m:t>𝑖</m:t>
+                      </m:r>
+                    </m:oMath>
+                  </m:oMathPara>
+                </a14:m>
+                <a:endParaRPr lang="ko-KR" altLang="en-US" sz="1600" dirty="0"/>
+              </a:p>
+            </p:txBody>
+          </p:sp>
+        </mc:Choice>
+        <mc:Fallback>
+          <p:sp>
+            <p:nvSpPr>
+              <p:cNvPr id="16" name="TextBox 15"/>
+              <p:cNvSpPr txBox="1">
+                <a:spLocks noRot="1" noChangeAspect="1" noMove="1" noResize="1" noEditPoints="1" noAdjustHandles="1" noChangeArrowheads="1" noChangeShapeType="1" noTextEdit="1"/>
+              </p:cNvSpPr>
+              <p:nvPr/>
+            </p:nvSpPr>
+            <p:spPr>
+              <a:xfrm>
+                <a:off x="1823766" y="5220293"/>
+                <a:ext cx="4399218" cy="246221"/>
+              </a:xfrm>
+              <a:prstGeom prst="rect">
+                <a:avLst/>
+              </a:prstGeom>
+              <a:blipFill>
+                <a:blip r:embed="rId4"/>
+                <a:stretch>
+                  <a:fillRect l="-139" r="-416" b="-31707"/>
+                </a:stretch>
+              </a:blipFill>
+            </p:spPr>
+            <p:txBody>
+              <a:bodyPr/>
+              <a:lstStyle/>
+              <a:p>
+                <a:r>
+                  <a:rPr lang="ko-KR" altLang="en-US">
+                    <a:noFill/>
+                  </a:rPr>
+                  <a:t> </a:t>
+                </a:r>
+              </a:p>
+            </p:txBody>
+          </p:sp>
+        </mc:Fallback>
+      </mc:AlternateContent>
+    </p:spTree>
+    <p:extLst>
+      <p:ext uri="{BB962C8B-B14F-4D97-AF65-F5344CB8AC3E}">
+        <p14:creationId xmlns:p14="http://schemas.microsoft.com/office/powerpoint/2010/main" val="1306872571"/>
+      </p:ext>
+    </p:extLst>
+  </p:cSld>
+  <p:clrMapOvr>
+    <a:masterClrMapping/>
+  </p:clrMapOvr>
+  <p:timing>
+    <p:tnLst>
+      <p:par>
+        <p:cTn id="1" dur="indefinite" restart="never" nodeType="tmRoot"/>
+      </p:par>
+    </p:tnLst>
+  </p:timing>
+</p:sld>
+</file>
+
+<file path=ppt/slides/slide21.xml><?xml version="1.0" encoding="utf-8"?>
+<p:sld xmlns:a="http://schemas.openxmlformats.org/drawingml/2006/main" xmlns:r="http://schemas.openxmlformats.org/officeDocument/2006/relationships" xmlns:p="http://schemas.openxmlformats.org/presentationml/2006/main">
+  <p:cSld>
+    <p:spTree>
+      <p:nvGrpSpPr>
+        <p:cNvPr id="1" name=""/>
+        <p:cNvGrpSpPr/>
+        <p:nvPr/>
+      </p:nvGrpSpPr>
+      <p:grpSpPr>
+        <a:xfrm>
+          <a:off x="0" y="0"/>
+          <a:ext cx="0" cy="0"/>
+          <a:chOff x="0" y="0"/>
+          <a:chExt cx="0" cy="0"/>
+        </a:xfrm>
+      </p:grpSpPr>
+      <p:sp>
+        <p:nvSpPr>
+          <p:cNvPr id="2" name="제목 1"/>
+          <p:cNvSpPr>
+            <a:spLocks noGrp="1"/>
+          </p:cNvSpPr>
+          <p:nvPr>
+            <p:ph type="title"/>
+          </p:nvPr>
+        </p:nvSpPr>
+        <p:spPr/>
+        <p:txBody>
+          <a:bodyPr/>
+          <a:lstStyle/>
+          <a:p>
+            <a:endParaRPr lang="ko-KR" altLang="en-US" dirty="0"/>
+          </a:p>
+        </p:txBody>
+      </p:sp>
+      <p:sp>
+        <p:nvSpPr>
+          <p:cNvPr id="3" name="내용 개체 틀 2"/>
+          <p:cNvSpPr>
+            <a:spLocks noGrp="1"/>
+          </p:cNvSpPr>
+          <p:nvPr>
+            <p:ph idx="1"/>
+          </p:nvPr>
+        </p:nvSpPr>
+        <p:spPr/>
+        <p:txBody>
+          <a:bodyPr/>
+          <a:lstStyle/>
+          <a:p>
+            <a:endParaRPr lang="ko-KR" altLang="en-US"/>
+          </a:p>
+        </p:txBody>
+      </p:sp>
+    </p:spTree>
+    <p:extLst>
+      <p:ext uri="{BB962C8B-B14F-4D97-AF65-F5344CB8AC3E}">
+        <p14:creationId xmlns:p14="http://schemas.microsoft.com/office/powerpoint/2010/main" val="197467838"/>
+      </p:ext>
+    </p:extLst>
+  </p:cSld>
+  <p:clrMapOvr>
+    <a:masterClrMapping/>
+  </p:clrMapOvr>
+  <p:timing>
+    <p:tnLst>
+      <p:par>
+        <p:cTn id="1" dur="indefinite" restart="never" nodeType="tmRoot"/>
+      </p:par>
+    </p:tnLst>
+  </p:timing>
+</p:sld>
+</file>
+
+<file path=ppt/slides/slide22.xml><?xml version="1.0" encoding="utf-8"?>
+<p:sld xmlns:a="http://schemas.openxmlformats.org/drawingml/2006/main" xmlns:r="http://schemas.openxmlformats.org/officeDocument/2006/relationships" xmlns:p="http://schemas.openxmlformats.org/presentationml/2006/main">
+  <p:cSld>
+    <p:spTree>
+      <p:nvGrpSpPr>
+        <p:cNvPr id="1" name=""/>
+        <p:cNvGrpSpPr/>
+        <p:nvPr/>
+      </p:nvGrpSpPr>
+      <p:grpSpPr>
+        <a:xfrm>
+          <a:off x="0" y="0"/>
+          <a:ext cx="0" cy="0"/>
+          <a:chOff x="0" y="0"/>
+          <a:chExt cx="0" cy="0"/>
+        </a:xfrm>
+      </p:grpSpPr>
+      <p:sp>
+        <p:nvSpPr>
+          <p:cNvPr id="2" name="제목 1"/>
+          <p:cNvSpPr>
+            <a:spLocks noGrp="1"/>
+          </p:cNvSpPr>
+          <p:nvPr>
+            <p:ph type="title"/>
+          </p:nvPr>
+        </p:nvSpPr>
+        <p:spPr/>
+        <p:txBody>
+          <a:bodyPr/>
+          <a:lstStyle/>
+          <a:p>
+            <a:r>
+              <a:rPr lang="en-US" altLang="ko-KR" dirty="0" smtClean="0"/>
+              <a:t>Result</a:t>
+            </a:r>
+            <a:endParaRPr lang="ko-KR" altLang="en-US" dirty="0"/>
+          </a:p>
+        </p:txBody>
+      </p:sp>
+      <p:sp>
+        <p:nvSpPr>
+          <p:cNvPr id="3" name="내용 개체 틀 2"/>
+          <p:cNvSpPr>
+            <a:spLocks noGrp="1"/>
+          </p:cNvSpPr>
+          <p:nvPr>
+            <p:ph idx="1"/>
+          </p:nvPr>
+        </p:nvSpPr>
+        <p:spPr/>
+        <p:txBody>
+          <a:bodyPr/>
+          <a:lstStyle/>
+          <a:p>
+            <a:endParaRPr lang="ko-KR" altLang="en-US" dirty="0"/>
+          </a:p>
+        </p:txBody>
+      </p:sp>
+    </p:spTree>
+    <p:extLst>
+      <p:ext uri="{BB962C8B-B14F-4D97-AF65-F5344CB8AC3E}">
+        <p14:creationId xmlns:p14="http://schemas.microsoft.com/office/powerpoint/2010/main" val="2293835521"/>
+      </p:ext>
+    </p:extLst>
+  </p:cSld>
+  <p:clrMapOvr>
+    <a:masterClrMapping/>
+  </p:clrMapOvr>
+  <p:timing>
+    <p:tnLst>
+      <p:par>
+        <p:cTn id="1" dur="indefinite" restart="never" nodeType="tmRoot"/>
+      </p:par>
+    </p:tnLst>
+  </p:timing>
+</p:sld>
+</file>
+
+<file path=ppt/slides/slide23.xml><?xml version="1.0" encoding="utf-8"?>
+<p:sld xmlns:a="http://schemas.openxmlformats.org/drawingml/2006/main" xmlns:r="http://schemas.openxmlformats.org/officeDocument/2006/relationships" xmlns:p="http://schemas.openxmlformats.org/presentationml/2006/main">
+  <p:cSld>
+    <p:spTree>
+      <p:nvGrpSpPr>
+        <p:cNvPr id="1" name=""/>
+        <p:cNvGrpSpPr/>
+        <p:nvPr/>
+      </p:nvGrpSpPr>
+      <p:grpSpPr>
+        <a:xfrm>
+          <a:off x="0" y="0"/>
+          <a:ext cx="0" cy="0"/>
+          <a:chOff x="0" y="0"/>
+          <a:chExt cx="0" cy="0"/>
+        </a:xfrm>
+      </p:grpSpPr>
+      <p:sp>
+        <p:nvSpPr>
+          <p:cNvPr id="2" name="제목 1"/>
+          <p:cNvSpPr>
+            <a:spLocks noGrp="1"/>
+          </p:cNvSpPr>
+          <p:nvPr>
+            <p:ph type="title"/>
+          </p:nvPr>
+        </p:nvSpPr>
+        <p:spPr/>
+        <p:txBody>
+          <a:bodyPr/>
+          <a:lstStyle/>
+          <a:p>
+            <a:r>
+              <a:rPr lang="en-US" altLang="ko-KR" dirty="0" smtClean="0"/>
+              <a:t>Comment</a:t>
+            </a:r>
+            <a:endParaRPr lang="ko-KR" altLang="en-US" dirty="0"/>
+          </a:p>
+        </p:txBody>
+      </p:sp>
+      <p:sp>
+        <p:nvSpPr>
+          <p:cNvPr id="3" name="내용 개체 틀 2"/>
+          <p:cNvSpPr>
+            <a:spLocks noGrp="1"/>
+          </p:cNvSpPr>
+          <p:nvPr>
+            <p:ph idx="1"/>
+          </p:nvPr>
+        </p:nvSpPr>
+        <p:spPr/>
+        <p:txBody>
+          <a:bodyPr/>
+          <a:lstStyle/>
+          <a:p>
+            <a:endParaRPr lang="ko-KR" altLang="en-US"/>
+          </a:p>
+        </p:txBody>
+      </p:sp>
+    </p:spTree>
+    <p:extLst>
+      <p:ext uri="{BB962C8B-B14F-4D97-AF65-F5344CB8AC3E}">
+        <p14:creationId xmlns:p14="http://schemas.microsoft.com/office/powerpoint/2010/main" val="2088717915"/>
+      </p:ext>
+    </p:extLst>
+  </p:cSld>
+  <p:clrMapOvr>
+    <a:masterClrMapping/>
+  </p:clrMapOvr>
+  <p:timing>
+    <p:tnLst>
+      <p:par>
+        <p:cTn id="1" dur="indefinite" restart="never" nodeType="tmRoot"/>
+      </p:par>
+    </p:tnLst>
+  </p:timing>
+</p:sld>
+</file>
+
+<file path=ppt/slides/slide24.xml><?xml version="1.0" encoding="utf-8"?>
+<p:sld xmlns:a="http://schemas.openxmlformats.org/drawingml/2006/main" xmlns:r="http://schemas.openxmlformats.org/officeDocument/2006/relationships" xmlns:p="http://schemas.openxmlformats.org/presentationml/2006/main">
+  <p:cSld>
+    <p:spTree>
+      <p:nvGrpSpPr>
+        <p:cNvPr id="1" name=""/>
+        <p:cNvGrpSpPr/>
+        <p:nvPr/>
+      </p:nvGrpSpPr>
+      <p:grpSpPr>
+        <a:xfrm>
+          <a:off x="0" y="0"/>
+          <a:ext cx="0" cy="0"/>
+          <a:chOff x="0" y="0"/>
+          <a:chExt cx="0" cy="0"/>
+        </a:xfrm>
+      </p:grpSpPr>
+      <p:sp>
+        <p:nvSpPr>
+          <p:cNvPr id="2" name="제목 1"/>
+          <p:cNvSpPr>
+            <a:spLocks noGrp="1"/>
+          </p:cNvSpPr>
+          <p:nvPr>
+            <p:ph type="title"/>
+          </p:nvPr>
+        </p:nvSpPr>
+        <p:spPr/>
+        <p:txBody>
+          <a:bodyPr/>
+          <a:lstStyle/>
+          <a:p>
+            <a:endParaRPr lang="ko-KR" altLang="en-US"/>
+          </a:p>
+        </p:txBody>
+      </p:sp>
+      <p:sp>
+        <p:nvSpPr>
+          <p:cNvPr id="3" name="내용 개체 틀 2"/>
+          <p:cNvSpPr>
+            <a:spLocks noGrp="1"/>
+          </p:cNvSpPr>
+          <p:nvPr>
+            <p:ph idx="1"/>
+          </p:nvPr>
+        </p:nvSpPr>
+        <p:spPr/>
+        <p:txBody>
+          <a:bodyPr/>
+          <a:lstStyle/>
+          <a:p>
+            <a:endParaRPr lang="ko-KR" altLang="en-US"/>
+          </a:p>
+        </p:txBody>
+      </p:sp>
+    </p:spTree>
+    <p:extLst>
+      <p:ext uri="{BB962C8B-B14F-4D97-AF65-F5344CB8AC3E}">
+        <p14:creationId xmlns:p14="http://schemas.microsoft.com/office/powerpoint/2010/main" val="2316143761"/>
       </p:ext>
     </p:extLst>
   </p:cSld>
@@ -8204,7 +10751,7 @@
         </p:blipFill>
         <p:spPr>
           <a:xfrm>
-            <a:off x="6227293" y="1876264"/>
+            <a:off x="3409953" y="1846263"/>
             <a:ext cx="5432420" cy="4022725"/>
           </a:xfrm>
           <a:prstGeom prst="rect">
@@ -8320,6 +10867,10 @@
               <a:rPr lang="ko-KR" altLang="en-US" dirty="0"/>
               <a:t>를 조절</a:t>
             </a:r>
+            <a:r>
+              <a:rPr lang="en-US" altLang="ko-KR" dirty="0"/>
+              <a:t/>
+            </a:r>
             <a:br>
               <a:rPr lang="en-US" altLang="ko-KR" dirty="0"/>
             </a:br>
@@ -8467,6 +11018,10 @@
             <a:r>
               <a:rPr lang="ko-KR" altLang="en-US" dirty="0"/>
               <a:t>을 사용</a:t>
+            </a:r>
+            <a:r>
+              <a:rPr lang="en-US" altLang="ko-KR" dirty="0"/>
+              <a:t/>
             </a:r>
             <a:br>
               <a:rPr lang="en-US" altLang="ko-KR" dirty="0"/>
@@ -9273,6 +11828,10 @@
               <a:rPr lang="ko-KR" altLang="en-US" dirty="0"/>
               <a:t>부여 방식</a:t>
             </a:r>
+            <a:r>
+              <a:rPr lang="en-US" altLang="ko-KR" dirty="0"/>
+              <a:t/>
+            </a:r>
             <a:br>
               <a:rPr lang="en-US" altLang="ko-KR" dirty="0"/>
             </a:br>
@@ -9292,6 +11851,10 @@
               <a:rPr lang="ko-KR" altLang="en-US" dirty="0"/>
               <a:t>의 방향 별로 부여</a:t>
             </a:r>
+            <a:r>
+              <a:rPr lang="en-US" altLang="ko-KR" dirty="0"/>
+              <a:t/>
+            </a:r>
             <a:br>
               <a:rPr lang="en-US" altLang="ko-KR" dirty="0"/>
             </a:br>
@@ -9340,6 +11903,10 @@
             <a:r>
               <a:rPr lang="ko-KR" altLang="en-US" dirty="0"/>
               <a:t> 개수 조절 가능</a:t>
+            </a:r>
+            <a:r>
+              <a:rPr lang="en-US" altLang="ko-KR" dirty="0"/>
+              <a:t/>
             </a:r>
             <a:br>
               <a:rPr lang="en-US" altLang="ko-KR" dirty="0"/>
@@ -9644,6 +12211,10 @@
               <a:rPr lang="en-US" altLang="ko-KR" dirty="0" err="1"/>
               <a:t>getIDList</a:t>
             </a:r>
+            <a:r>
+              <a:rPr lang="en-US" altLang="ko-KR" dirty="0"/>
+              <a:t/>
+            </a:r>
             <a:br>
               <a:rPr lang="en-US" altLang="ko-KR" dirty="0"/>
             </a:br>
@@ -9655,6 +12226,10 @@
               <a:rPr lang="en-US" altLang="ko-KR" dirty="0" err="1"/>
               <a:t>getRedYellowGreenState</a:t>
             </a:r>
+            <a:r>
+              <a:rPr lang="en-US" altLang="ko-KR" dirty="0"/>
+              <a:t/>
+            </a:r>
             <a:br>
               <a:rPr lang="en-US" altLang="ko-KR" dirty="0"/>
             </a:br>
@@ -9746,6 +12321,10 @@
               <a:rPr lang="en-US" altLang="ko-KR" dirty="0" err="1"/>
               <a:t>setRedYellowGreenState</a:t>
             </a:r>
+            <a:r>
+              <a:rPr lang="en-US" altLang="ko-KR" dirty="0"/>
+              <a:t/>
+            </a:r>
             <a:br>
               <a:rPr lang="en-US" altLang="ko-KR" dirty="0"/>
             </a:br>
@@ -9757,6 +12336,10 @@
               <a:rPr lang="en-US" altLang="ko-KR" dirty="0" err="1"/>
               <a:t>setPhaseDuration</a:t>
             </a:r>
+            <a:r>
+              <a:rPr lang="en-US" altLang="ko-KR" dirty="0"/>
+              <a:t/>
+            </a:r>
             <a:br>
               <a:rPr lang="en-US" altLang="ko-KR" dirty="0"/>
             </a:br>
@@ -9783,6 +12366,10 @@
             <a:r>
               <a:rPr lang="ko-KR" altLang="en-US" dirty="0"/>
               <a:t> 프로그램 삽입</a:t>
+            </a:r>
+            <a:r>
+              <a:rPr lang="en-US" altLang="ko-KR" dirty="0"/>
+              <a:t/>
             </a:r>
             <a:br>
               <a:rPr lang="en-US" altLang="ko-KR" dirty="0"/>

</xml_diff>

<commit_message>
change the presentation file
</commit_message>
<xml_diff>
--- a/1st_Seminar(강민수).pptx
+++ b/1st_Seminar(강민수).pptx
@@ -38,12 +38,12 @@
     <p:sldId id="285" r:id="rId29"/>
     <p:sldId id="270" r:id="rId30"/>
     <p:sldId id="286" r:id="rId31"/>
-    <p:sldId id="264" r:id="rId32"/>
-    <p:sldId id="265" r:id="rId33"/>
-    <p:sldId id="266" r:id="rId34"/>
-    <p:sldId id="282" r:id="rId35"/>
-    <p:sldId id="271" r:id="rId36"/>
-    <p:sldId id="272" r:id="rId37"/>
+    <p:sldId id="292" r:id="rId32"/>
+    <p:sldId id="264" r:id="rId33"/>
+    <p:sldId id="265" r:id="rId34"/>
+    <p:sldId id="266" r:id="rId35"/>
+    <p:sldId id="282" r:id="rId36"/>
+    <p:sldId id="271" r:id="rId37"/>
   </p:sldIdLst>
   <p:sldSz cx="12192000" cy="6858000"/>
   <p:notesSz cx="6858000" cy="9144000"/>
@@ -7156,10 +7156,9 @@
           <a:lstStyle/>
           <a:p>
             <a:r>
-              <a:rPr lang="ko-KR" altLang="en-US" dirty="0" smtClean="0"/>
+              <a:rPr lang="ko-KR" altLang="en-US" dirty="0"/>
               <a:t>사전 발표</a:t>
             </a:r>
-            <a:endParaRPr lang="ko-KR" altLang="en-US" dirty="0"/>
           </a:p>
         </p:txBody>
       </p:sp>
@@ -7179,10 +7178,9 @@
           <a:lstStyle/>
           <a:p>
             <a:r>
-              <a:rPr lang="ko-KR" altLang="en-US" dirty="0" smtClean="0"/>
+              <a:rPr lang="ko-KR" altLang="en-US" dirty="0"/>
               <a:t>강민수</a:t>
             </a:r>
-            <a:endParaRPr lang="ko-KR" altLang="en-US" dirty="0"/>
           </a:p>
         </p:txBody>
       </p:sp>
@@ -7274,10 +7272,6 @@
               <a:rPr lang="en-US" altLang="ko-KR" dirty="0" err="1"/>
               <a:t>getIDList</a:t>
             </a:r>
-            <a:r>
-              <a:rPr lang="en-US" altLang="ko-KR" dirty="0"/>
-              <a:t/>
-            </a:r>
             <a:br>
               <a:rPr lang="en-US" altLang="ko-KR" dirty="0"/>
             </a:br>
@@ -7289,10 +7283,6 @@
               <a:rPr lang="en-US" altLang="ko-KR" dirty="0" err="1"/>
               <a:t>getRedYellowGreenState</a:t>
             </a:r>
-            <a:r>
-              <a:rPr lang="en-US" altLang="ko-KR" dirty="0"/>
-              <a:t/>
-            </a:r>
             <a:br>
               <a:rPr lang="en-US" altLang="ko-KR" dirty="0"/>
             </a:br>
@@ -7384,10 +7374,6 @@
               <a:rPr lang="en-US" altLang="ko-KR" dirty="0" err="1"/>
               <a:t>setRedYellowGreenState</a:t>
             </a:r>
-            <a:r>
-              <a:rPr lang="en-US" altLang="ko-KR" dirty="0"/>
-              <a:t/>
-            </a:r>
             <a:br>
               <a:rPr lang="en-US" altLang="ko-KR" dirty="0"/>
             </a:br>
@@ -7399,10 +7385,6 @@
               <a:rPr lang="en-US" altLang="ko-KR" dirty="0" err="1"/>
               <a:t>setPhaseDuration</a:t>
             </a:r>
-            <a:r>
-              <a:rPr lang="en-US" altLang="ko-KR" dirty="0"/>
-              <a:t/>
-            </a:r>
             <a:br>
               <a:rPr lang="en-US" altLang="ko-KR" dirty="0"/>
             </a:br>
@@ -7429,10 +7411,6 @@
             <a:r>
               <a:rPr lang="ko-KR" altLang="en-US" dirty="0"/>
               <a:t> 프로그램 삽입</a:t>
-            </a:r>
-            <a:r>
-              <a:rPr lang="en-US" altLang="ko-KR" dirty="0"/>
-              <a:t/>
             </a:r>
             <a:br>
               <a:rPr lang="en-US" altLang="ko-KR" dirty="0"/>
@@ -7503,7 +7481,7 @@
           <a:lstStyle/>
           <a:p>
             <a:r>
-              <a:rPr lang="en-US" altLang="ko-KR" dirty="0" smtClean="0"/>
+              <a:rPr lang="en-US" altLang="ko-KR" dirty="0"/>
               <a:t>Traffic Observation Data</a:t>
             </a:r>
             <a:endParaRPr lang="ko-KR" altLang="en-US" dirty="0"/>
@@ -7526,121 +7504,93 @@
           <a:lstStyle/>
           <a:p>
             <a:r>
-              <a:rPr lang="en-US" altLang="ko-KR" dirty="0" smtClean="0"/>
+              <a:rPr lang="en-US" altLang="ko-KR" dirty="0"/>
               <a:t> Induction Loops detector (</a:t>
             </a:r>
             <a:r>
-              <a:rPr lang="en-US" altLang="ko-KR" dirty="0" err="1" smtClean="0"/>
+              <a:rPr lang="en-US" altLang="ko-KR" dirty="0" err="1"/>
               <a:t>TraCI</a:t>
             </a:r>
             <a:r>
-              <a:rPr lang="en-US" altLang="ko-KR" dirty="0" smtClean="0"/>
+              <a:rPr lang="en-US" altLang="ko-KR" dirty="0"/>
               <a:t>)</a:t>
             </a:r>
           </a:p>
           <a:p>
             <a:pPr lvl="1"/>
             <a:r>
-              <a:rPr lang="en-US" altLang="ko-KR" dirty="0" smtClean="0"/>
-              <a:t>Induction Loop value </a:t>
-            </a:r>
-            <a:r>
-              <a:rPr lang="en-US" altLang="ko-KR" dirty="0"/>
-              <a:t>r</a:t>
-            </a:r>
-            <a:r>
-              <a:rPr lang="en-US" altLang="ko-KR" dirty="0" smtClean="0"/>
-              <a:t>etrieval</a:t>
+              <a:rPr lang="en-US" altLang="ko-KR" dirty="0"/>
+              <a:t>Induction Loop value retrieval</a:t>
             </a:r>
           </a:p>
           <a:p>
             <a:pPr lvl="2"/>
             <a:r>
-              <a:rPr lang="en-US" altLang="ko-KR" dirty="0" smtClean="0"/>
+              <a:rPr lang="en-US" altLang="ko-KR" dirty="0"/>
               <a:t>ID List: </a:t>
             </a:r>
             <a:r>
-              <a:rPr lang="en-US" altLang="ko-KR" dirty="0" err="1" smtClean="0"/>
+              <a:rPr lang="en-US" altLang="ko-KR" dirty="0" err="1"/>
               <a:t>getIDList</a:t>
             </a:r>
-            <a:endParaRPr lang="en-US" altLang="ko-KR" dirty="0" smtClean="0"/>
+            <a:endParaRPr lang="en-US" altLang="ko-KR" dirty="0"/>
           </a:p>
           <a:p>
             <a:pPr lvl="2"/>
             <a:r>
-              <a:rPr lang="en-US" altLang="ko-KR" dirty="0" smtClean="0"/>
+              <a:rPr lang="en-US" altLang="ko-KR" dirty="0"/>
               <a:t># Visiting Vehicle: </a:t>
             </a:r>
             <a:r>
-              <a:rPr lang="en-US" altLang="ko-KR" dirty="0" err="1" smtClean="0"/>
+              <a:rPr lang="en-US" altLang="ko-KR" dirty="0" err="1"/>
               <a:t>getLastStepVehicleNumber</a:t>
             </a:r>
-            <a:endParaRPr lang="en-US" altLang="ko-KR" dirty="0" smtClean="0"/>
+            <a:endParaRPr lang="en-US" altLang="ko-KR" dirty="0"/>
           </a:p>
           <a:p>
             <a:pPr lvl="2"/>
             <a:r>
-              <a:rPr lang="en-US" altLang="ko-KR" dirty="0" smtClean="0"/>
+              <a:rPr lang="en-US" altLang="ko-KR" dirty="0"/>
               <a:t>Percentage of time that was occupied: </a:t>
             </a:r>
             <a:r>
-              <a:rPr lang="en-US" altLang="ko-KR" dirty="0" err="1" smtClean="0"/>
+              <a:rPr lang="en-US" altLang="ko-KR" dirty="0" err="1"/>
               <a:t>getLastStepOccupancy</a:t>
             </a:r>
-            <a:endParaRPr lang="en-US" altLang="ko-KR" dirty="0" smtClean="0"/>
-          </a:p>
-          <a:p>
-            <a:r>
-              <a:rPr lang="en-US" altLang="ko-KR" dirty="0"/>
-              <a:t> </a:t>
-            </a:r>
-            <a:r>
-              <a:rPr lang="en-US" altLang="ko-KR" dirty="0" smtClean="0"/>
-              <a:t>Lane Area detector (</a:t>
-            </a:r>
-            <a:r>
-              <a:rPr lang="en-US" altLang="ko-KR" dirty="0" err="1" smtClean="0"/>
+            <a:endParaRPr lang="en-US" altLang="ko-KR" dirty="0"/>
+          </a:p>
+          <a:p>
+            <a:r>
+              <a:rPr lang="en-US" altLang="ko-KR" dirty="0"/>
+              <a:t> Lane Area detector (</a:t>
+            </a:r>
+            <a:r>
+              <a:rPr lang="en-US" altLang="ko-KR" dirty="0" err="1"/>
               <a:t>TraCI</a:t>
             </a:r>
             <a:r>
-              <a:rPr lang="en-US" altLang="ko-KR" dirty="0" smtClean="0"/>
+              <a:rPr lang="en-US" altLang="ko-KR" dirty="0"/>
               <a:t>)</a:t>
             </a:r>
           </a:p>
           <a:p>
             <a:pPr lvl="1"/>
             <a:r>
-              <a:rPr lang="en-US" altLang="ko-KR" dirty="0" smtClean="0"/>
-              <a:t>Lane Area </a:t>
-            </a:r>
-            <a:r>
-              <a:rPr lang="en-US" altLang="ko-KR" dirty="0"/>
-              <a:t>d</a:t>
-            </a:r>
-            <a:r>
-              <a:rPr lang="en-US" altLang="ko-KR" dirty="0" smtClean="0"/>
-              <a:t>etector </a:t>
-            </a:r>
-            <a:r>
-              <a:rPr lang="en-US" altLang="ko-KR" dirty="0"/>
-              <a:t>v</a:t>
-            </a:r>
-            <a:r>
-              <a:rPr lang="en-US" altLang="ko-KR" dirty="0" smtClean="0"/>
-              <a:t>alue retrieval</a:t>
+              <a:rPr lang="en-US" altLang="ko-KR" dirty="0"/>
+              <a:t>Lane Area detector value retrieval</a:t>
             </a:r>
           </a:p>
           <a:p>
             <a:pPr lvl="2"/>
             <a:r>
-              <a:rPr lang="en-US" altLang="ko-KR" dirty="0" smtClean="0"/>
+              <a:rPr lang="en-US" altLang="ko-KR" dirty="0"/>
               <a:t>ID List: </a:t>
             </a:r>
             <a:r>
-              <a:rPr lang="en-US" altLang="ko-KR" dirty="0" err="1" smtClean="0"/>
+              <a:rPr lang="en-US" altLang="ko-KR" dirty="0" err="1"/>
               <a:t>getIDList</a:t>
             </a:r>
-            <a:endParaRPr lang="en-US" altLang="ko-KR" dirty="0" smtClean="0"/>
+            <a:endParaRPr lang="en-US" altLang="ko-KR" dirty="0"/>
           </a:p>
           <a:p>
             <a:pPr lvl="2"/>
@@ -7771,10 +7721,6 @@
               <a:rPr lang="en-US" altLang="ko-KR" sz="2400" b="1" dirty="0"/>
               <a:t>Toward A Thousand Lights:</a:t>
             </a:r>
-            <a:r>
-              <a:rPr lang="en-US" altLang="ko-KR" sz="2400" dirty="0"/>
-              <a:t/>
-            </a:r>
             <a:br>
               <a:rPr lang="en-US" altLang="ko-KR" sz="2400" dirty="0"/>
             </a:br>
@@ -7805,23 +7751,19 @@
           <a:p>
             <a:pPr algn="r"/>
             <a:r>
-              <a:rPr lang="en-US" altLang="ko-KR" sz="1600" spc="0" dirty="0" smtClean="0">
+              <a:rPr lang="en-US" altLang="ko-KR" sz="1600" spc="0" dirty="0">
                 <a:latin typeface="+mj-ea"/>
                 <a:ea typeface="+mj-ea"/>
               </a:rPr>
               <a:t>ETRI </a:t>
             </a:r>
             <a:r>
-              <a:rPr lang="ko-KR" altLang="en-US" sz="1600" spc="0" dirty="0" smtClean="0">
+              <a:rPr lang="ko-KR" altLang="en-US" sz="1600" spc="0" dirty="0">
                 <a:latin typeface="+mj-ea"/>
                 <a:ea typeface="+mj-ea"/>
               </a:rPr>
               <a:t>연수생 강민수</a:t>
             </a:r>
-            <a:endParaRPr lang="ko-KR" altLang="en-US" sz="1600" spc="0" dirty="0">
-              <a:latin typeface="+mj-ea"/>
-              <a:ea typeface="+mj-ea"/>
-            </a:endParaRPr>
           </a:p>
         </p:txBody>
       </p:sp>
@@ -7871,7 +7813,7 @@
           <a:lstStyle/>
           <a:p>
             <a:r>
-              <a:rPr lang="en-US" altLang="ko-KR" dirty="0" smtClean="0"/>
+              <a:rPr lang="en-US" altLang="ko-KR" dirty="0"/>
               <a:t>Contents</a:t>
             </a:r>
             <a:endParaRPr lang="ko-KR" altLang="en-US" dirty="0"/>
@@ -7896,114 +7838,90 @@
           <a:lstStyle/>
           <a:p>
             <a:r>
-              <a:rPr lang="en-US" altLang="ko-KR" dirty="0" smtClean="0"/>
+              <a:rPr lang="en-US" altLang="ko-KR" dirty="0"/>
               <a:t>Motivation</a:t>
             </a:r>
-            <a:r>
-              <a:rPr lang="en-US" altLang="ko-KR" dirty="0" smtClean="0"/>
-              <a:t/>
-            </a:r>
             <a:br>
-              <a:rPr lang="en-US" altLang="ko-KR" dirty="0" smtClean="0"/>
+              <a:rPr lang="en-US" altLang="ko-KR" dirty="0"/>
             </a:br>
             <a:r>
-              <a:rPr lang="en-US" altLang="ko-KR" sz="1800" dirty="0" smtClean="0"/>
+              <a:rPr lang="en-US" altLang="ko-KR" sz="1800" dirty="0"/>
               <a:t>- Reinforcement Learning</a:t>
             </a:r>
             <a:r>
-              <a:rPr lang="ko-KR" altLang="en-US" sz="1800" dirty="0" smtClean="0"/>
+              <a:rPr lang="ko-KR" altLang="en-US" sz="1800" dirty="0"/>
               <a:t>을 </a:t>
             </a:r>
             <a:r>
-              <a:rPr lang="en-US" altLang="ko-KR" sz="1800" dirty="0" smtClean="0"/>
+              <a:rPr lang="en-US" altLang="ko-KR" sz="1800" dirty="0"/>
               <a:t>Traffic System</a:t>
             </a:r>
             <a:r>
-              <a:rPr lang="ko-KR" altLang="en-US" sz="1800" dirty="0" smtClean="0"/>
+              <a:rPr lang="ko-KR" altLang="en-US" sz="1800" dirty="0"/>
               <a:t>에 적용하기 위해 필요한 조건</a:t>
             </a:r>
-            <a:r>
-              <a:rPr lang="en-US" altLang="ko-KR" sz="1800" dirty="0" smtClean="0"/>
-              <a:t/>
-            </a:r>
             <a:br>
-              <a:rPr lang="en-US" altLang="ko-KR" sz="1800" dirty="0" smtClean="0"/>
+              <a:rPr lang="en-US" altLang="ko-KR" sz="1800" dirty="0"/>
             </a:br>
             <a:r>
-              <a:rPr lang="en-US" altLang="ko-KR" sz="1800" dirty="0" smtClean="0"/>
+              <a:rPr lang="en-US" altLang="ko-KR" sz="1800" dirty="0"/>
               <a:t>- </a:t>
             </a:r>
             <a:r>
-              <a:rPr lang="ko-KR" altLang="en-US" sz="1800" dirty="0" smtClean="0"/>
+              <a:rPr lang="ko-KR" altLang="en-US" sz="1800" dirty="0"/>
               <a:t>지금까지 적용이 어려웠던 이유</a:t>
             </a:r>
-            <a:endParaRPr lang="en-US" altLang="ko-KR" dirty="0" smtClean="0"/>
-          </a:p>
-          <a:p>
-            <a:r>
-              <a:rPr lang="en-US" altLang="ko-KR" dirty="0"/>
-              <a:t> </a:t>
-            </a:r>
-            <a:r>
-              <a:rPr lang="en-US" altLang="ko-KR" dirty="0" smtClean="0"/>
-              <a:t>Related Work</a:t>
+            <a:endParaRPr lang="en-US" altLang="ko-KR" dirty="0"/>
+          </a:p>
+          <a:p>
+            <a:r>
+              <a:rPr lang="en-US" altLang="ko-KR" dirty="0"/>
+              <a:t> Related Work</a:t>
             </a:r>
             <a:br>
-              <a:rPr lang="en-US" altLang="ko-KR" dirty="0" smtClean="0"/>
+              <a:rPr lang="en-US" altLang="ko-KR" dirty="0"/>
             </a:br>
             <a:r>
-              <a:rPr lang="en-US" altLang="ko-KR" sz="1800" dirty="0" smtClean="0"/>
+              <a:rPr lang="en-US" altLang="ko-KR" sz="1800" dirty="0"/>
               <a:t>- Conventional Transportation Method and Max pressure control</a:t>
             </a:r>
             <a:br>
-              <a:rPr lang="en-US" altLang="ko-KR" sz="1800" dirty="0" smtClean="0"/>
+              <a:rPr lang="en-US" altLang="ko-KR" sz="1800" dirty="0"/>
             </a:br>
             <a:r>
-              <a:rPr lang="en-US" altLang="ko-KR" sz="1800" dirty="0" smtClean="0"/>
+              <a:rPr lang="en-US" altLang="ko-KR" sz="1800" dirty="0"/>
               <a:t>- RL- based approach and their challenge</a:t>
             </a:r>
           </a:p>
           <a:p>
             <a:r>
               <a:rPr lang="en-US" altLang="ko-KR" dirty="0"/>
-              <a:t> </a:t>
-            </a:r>
-            <a:r>
-              <a:rPr lang="en-US" altLang="ko-KR" dirty="0" smtClean="0"/>
-              <a:t>Approach</a:t>
+              <a:t> Approach</a:t>
             </a:r>
             <a:br>
-              <a:rPr lang="en-US" altLang="ko-KR" dirty="0" smtClean="0"/>
+              <a:rPr lang="en-US" altLang="ko-KR" dirty="0"/>
             </a:br>
             <a:r>
-              <a:rPr lang="en-US" altLang="ko-KR" sz="1800" dirty="0" smtClean="0"/>
+              <a:rPr lang="en-US" altLang="ko-KR" sz="1800" dirty="0"/>
               <a:t>- Super agent based multi-intersection method with FRAP model</a:t>
             </a:r>
           </a:p>
           <a:p>
             <a:r>
               <a:rPr lang="en-US" altLang="ko-KR" dirty="0"/>
-              <a:t> </a:t>
-            </a:r>
-            <a:r>
-              <a:rPr lang="en-US" altLang="ko-KR" dirty="0" smtClean="0"/>
-              <a:t>Result</a:t>
-            </a:r>
-          </a:p>
-          <a:p>
-            <a:r>
-              <a:rPr lang="en-US" altLang="ko-KR" dirty="0"/>
-              <a:t> </a:t>
-            </a:r>
-            <a:r>
-              <a:rPr lang="en-US" altLang="ko-KR" dirty="0" smtClean="0"/>
-              <a:t>Comment</a:t>
+              <a:t> Result</a:t>
+            </a:r>
+          </a:p>
+          <a:p>
+            <a:r>
+              <a:rPr lang="en-US" altLang="ko-KR" dirty="0"/>
+              <a:t> Comment</a:t>
             </a:r>
             <a:br>
-              <a:rPr lang="en-US" altLang="ko-KR" dirty="0" smtClean="0"/>
+              <a:rPr lang="en-US" altLang="ko-KR" dirty="0"/>
             </a:br>
             <a:r>
-              <a:rPr lang="en-US" altLang="ko-KR" dirty="0" smtClean="0"/>
+              <a:rPr lang="en-US" altLang="ko-KR" dirty="0"/>
               <a:t>- Improvement proposal</a:t>
             </a:r>
           </a:p>
@@ -8099,18 +8017,8 @@
           <a:p>
             <a:pPr lvl="1"/>
             <a:r>
-              <a:rPr lang="en-US" altLang="ko-KR" dirty="0" smtClean="0"/>
-              <a:t>Increase emission gas </a:t>
-            </a:r>
-            <a:r>
-              <a:rPr lang="en-US" altLang="ko-KR" dirty="0"/>
-              <a:t>(contributes 23% of total CO2 emission) </a:t>
-            </a:r>
-            <a:r>
-              <a:rPr lang="en-US" altLang="ko-KR" dirty="0">
-                <a:sym typeface="Wingdings" panose="05000000000000000000" pitchFamily="2" charset="2"/>
-              </a:rPr>
-              <a:t/>
+              <a:rPr lang="en-US" altLang="ko-KR" dirty="0"/>
+              <a:t>Increase emission gas (contributes 23% of total CO2 emission) </a:t>
             </a:r>
             <a:br>
               <a:rPr lang="en-US" altLang="ko-KR" dirty="0">
@@ -8118,16 +8026,10 @@
               </a:rPr>
             </a:br>
             <a:r>
-              <a:rPr lang="en-US" altLang="ko-KR" dirty="0" smtClean="0">
+              <a:rPr lang="en-US" altLang="ko-KR" dirty="0">
                 <a:sym typeface="Wingdings" panose="05000000000000000000" pitchFamily="2" charset="2"/>
               </a:rPr>
               <a:t>40% of total vehicle emissions generated by traffic system</a:t>
-            </a:r>
-            <a:r>
-              <a:rPr lang="en-US" altLang="ko-KR" dirty="0">
-                <a:sym typeface="Wingdings" panose="05000000000000000000" pitchFamily="2" charset="2"/>
-              </a:rPr>
-              <a:t/>
             </a:r>
             <a:br>
               <a:rPr lang="en-US" altLang="ko-KR" dirty="0">
@@ -8140,10 +8042,6 @@
               </a:rPr>
               <a:t> Trend: applying RL method for traffic signal control</a:t>
             </a:r>
-            <a:r>
-              <a:rPr lang="en-US" altLang="ko-KR" dirty="0"/>
-              <a:t/>
-            </a:r>
             <a:br>
               <a:rPr lang="en-US" altLang="ko-KR" dirty="0"/>
             </a:br>
@@ -8163,20 +8061,12 @@
               <a:rPr lang="en-US" altLang="ko-KR" dirty="0"/>
               <a:t>Pre-timed control: Deciding traffic signal plan that change </a:t>
             </a:r>
-            <a:r>
-              <a:rPr lang="en-US" altLang="ko-KR" dirty="0" smtClean="0"/>
-              <a:t/>
-            </a:r>
             <a:br>
-              <a:rPr lang="en-US" altLang="ko-KR" dirty="0" smtClean="0"/>
+              <a:rPr lang="en-US" altLang="ko-KR" dirty="0"/>
             </a:br>
             <a:r>
-              <a:rPr lang="en-US" altLang="ko-KR" dirty="0" smtClean="0"/>
-              <a:t>according </a:t>
-            </a:r>
-            <a:r>
-              <a:rPr lang="en-US" altLang="ko-KR" dirty="0"/>
-              <a:t>to the real-time data</a:t>
+              <a:rPr lang="en-US" altLang="ko-KR" dirty="0"/>
+              <a:t>according to the real-time data</a:t>
             </a:r>
           </a:p>
           <a:p>
@@ -8425,7 +8315,7 @@
               <a:rPr lang="en-US" altLang="ko-KR" dirty="0">
                 <a:sym typeface="Wingdings" panose="05000000000000000000" pitchFamily="2" charset="2"/>
               </a:rPr>
-              <a:t>Coordination: Optimizing signal timing for TL jointly when in close proximity</a:t>
+              <a:t>Coordination: Optimizing signal timing for TL jointly when in proximity</a:t>
             </a:r>
           </a:p>
           <a:p>
@@ -8533,10 +8423,6 @@
             <a:br>
               <a:rPr lang="en-US" altLang="ko-KR" dirty="0"/>
             </a:br>
-            <a:r>
-              <a:rPr lang="en-US" altLang="ko-KR" dirty="0"/>
-              <a:t/>
-            </a:r>
             <a:br>
               <a:rPr lang="en-US" altLang="ko-KR" dirty="0"/>
             </a:br>
@@ -8930,10 +8816,6 @@
             <a:br>
               <a:rPr lang="en-US" altLang="ko-KR" dirty="0"/>
             </a:br>
-            <a:r>
-              <a:rPr lang="en-US" altLang="ko-KR" dirty="0"/>
-              <a:t/>
-            </a:r>
             <a:br>
               <a:rPr lang="en-US" altLang="ko-KR" dirty="0"/>
             </a:br>
@@ -8976,13 +8858,7 @@
               <a:rPr lang="en-US" altLang="ko-KR" dirty="0">
                 <a:sym typeface="Wingdings" panose="05000000000000000000" pitchFamily="2" charset="2"/>
               </a:rPr>
-              <a:t>For satisfying scalability,  Advance to ‘RL-based multi-intersection </a:t>
-            </a:r>
-            <a:r>
-              <a:rPr lang="en-US" altLang="ko-KR" dirty="0" smtClean="0">
-                <a:sym typeface="Wingdings" panose="05000000000000000000" pitchFamily="2" charset="2"/>
-              </a:rPr>
-              <a:t>methods’</a:t>
+              <a:t>For satisfying scalability,  Advance to ‘RL-based multi-intersection methods’</a:t>
             </a:r>
             <a:endParaRPr lang="en-US" altLang="ko-KR" dirty="0"/>
           </a:p>
@@ -9092,7 +8968,7 @@
           <a:p>
             <a:pPr algn="ctr"/>
             <a:r>
-              <a:rPr lang="en-US" altLang="ko-KR" b="1" dirty="0" smtClean="0">
+              <a:rPr lang="en-US" altLang="ko-KR" b="1" dirty="0">
                 <a:solidFill>
                   <a:srgbClr val="FF0000"/>
                 </a:solidFill>
@@ -9100,7 +8976,7 @@
               <a:t>Change from N</a:t>
             </a:r>
             <a:r>
-              <a:rPr lang="en-US" altLang="ko-KR" b="1" dirty="0" smtClean="0">
+              <a:rPr lang="en-US" altLang="ko-KR" b="1" dirty="0">
                 <a:solidFill>
                   <a:srgbClr val="FF0000"/>
                 </a:solidFill>
@@ -9331,16 +9207,12 @@
             <a:pPr lvl="2"/>
             <a:r>
               <a:rPr lang="en-US" altLang="ko-KR" dirty="0"/>
-              <a:t>Cannot coordinate with neighbors, achieve their own </a:t>
-            </a:r>
-            <a:r>
-              <a:rPr lang="en-US" altLang="ko-KR" dirty="0" smtClean="0"/>
-              <a:t>goals</a:t>
+              <a:t>Cannot coordinate with neighbors, achieve their own goals</a:t>
             </a:r>
           </a:p>
           <a:p>
             <a:pPr lvl="2"/>
-            <a:endParaRPr lang="en-US" altLang="ko-KR" dirty="0" smtClean="0"/>
+            <a:endParaRPr lang="en-US" altLang="ko-KR" dirty="0"/>
           </a:p>
           <a:p>
             <a:pPr lvl="2"/>
@@ -9617,7 +9489,7 @@
           <a:lstStyle/>
           <a:p>
             <a:r>
-              <a:rPr lang="ko-KR" altLang="en-US" sz="1200" dirty="0" err="1" smtClean="0">
+              <a:rPr lang="ko-KR" altLang="en-US" sz="1200" dirty="0" err="1">
                 <a:solidFill>
                   <a:schemeClr val="bg1">
                     <a:lumMod val="75000"/>
@@ -9627,7 +9499,7 @@
               <a:t>Intellilight</a:t>
             </a:r>
             <a:r>
-              <a:rPr lang="en-US" altLang="ko-KR" sz="1200" dirty="0" smtClean="0">
+              <a:rPr lang="en-US" altLang="ko-KR" sz="1200" dirty="0">
                 <a:solidFill>
                   <a:schemeClr val="bg1">
                     <a:lumMod val="75000"/>
@@ -9637,7 +9509,7 @@
               <a:t>, </a:t>
             </a:r>
             <a:r>
-              <a:rPr lang="ko-KR" altLang="en-US" sz="1200" dirty="0" smtClean="0">
+              <a:rPr lang="ko-KR" altLang="en-US" sz="1200" dirty="0">
                 <a:solidFill>
                   <a:schemeClr val="bg1">
                     <a:lumMod val="75000"/>
@@ -9647,7 +9519,7 @@
               <a:t>Wei,</a:t>
             </a:r>
             <a:r>
-              <a:rPr lang="ko-KR" altLang="en-US" sz="1200" dirty="0" err="1" smtClean="0">
+              <a:rPr lang="ko-KR" altLang="en-US" sz="1200" dirty="0" err="1">
                 <a:solidFill>
                   <a:schemeClr val="bg1">
                     <a:lumMod val="75000"/>
@@ -9751,7 +9623,7 @@
           <a:lstStyle/>
           <a:p>
             <a:r>
-              <a:rPr lang="ko-KR" altLang="en-US" sz="1100" dirty="0" err="1" smtClean="0">
+              <a:rPr lang="ko-KR" altLang="en-US" sz="1100" dirty="0" err="1">
                 <a:solidFill>
                   <a:schemeClr val="bg1">
                     <a:lumMod val="75000"/>
@@ -9761,7 +9633,7 @@
               <a:t>Colight</a:t>
             </a:r>
             <a:r>
-              <a:rPr lang="en-US" altLang="ko-KR" sz="1100" dirty="0" smtClean="0">
+              <a:rPr lang="en-US" altLang="ko-KR" sz="1100" dirty="0">
                 <a:solidFill>
                   <a:schemeClr val="bg1">
                     <a:lumMod val="75000"/>
@@ -9771,7 +9643,7 @@
               <a:t>, </a:t>
             </a:r>
             <a:r>
-              <a:rPr lang="ko-KR" altLang="en-US" sz="1100" dirty="0" err="1" smtClean="0">
+              <a:rPr lang="ko-KR" altLang="en-US" sz="1100" dirty="0" err="1">
                 <a:solidFill>
                   <a:schemeClr val="bg1">
                     <a:lumMod val="75000"/>
@@ -9848,20 +9720,10 @@
                   </a:schemeClr>
                 </a:solidFill>
               </a:rPr>
-              <a:t>.; </a:t>
-            </a:r>
-            <a:r>
-              <a:rPr lang="ko-KR" altLang="en-US" sz="1100" dirty="0" smtClean="0">
-                <a:solidFill>
-                  <a:schemeClr val="bg1">
-                    <a:lumMod val="75000"/>
-                  </a:schemeClr>
-                </a:solidFill>
-              </a:rPr>
-              <a:t>and </a:t>
-            </a:r>
-            <a:r>
-              <a:rPr lang="ko-KR" altLang="en-US" sz="1100" dirty="0" err="1" smtClean="0">
+              <a:t>.; and </a:t>
+            </a:r>
+            <a:r>
+              <a:rPr lang="ko-KR" altLang="en-US" sz="1100" dirty="0" err="1">
                 <a:solidFill>
                   <a:schemeClr val="bg1">
                     <a:lumMod val="75000"/>
@@ -9871,7 +9733,7 @@
               <a:t>Li</a:t>
             </a:r>
             <a:r>
-              <a:rPr lang="ko-KR" altLang="en-US" sz="1100" dirty="0" smtClean="0">
+              <a:rPr lang="ko-KR" altLang="en-US" sz="1100" dirty="0">
                 <a:solidFill>
                   <a:schemeClr val="bg1">
                     <a:lumMod val="75000"/>
@@ -9881,7 +9743,7 @@
               <a:t>, </a:t>
             </a:r>
             <a:r>
-              <a:rPr lang="ko-KR" altLang="en-US" sz="1100" dirty="0" err="1" smtClean="0">
+              <a:rPr lang="ko-KR" altLang="en-US" sz="1100" dirty="0" err="1">
                 <a:solidFill>
                   <a:schemeClr val="bg1">
                     <a:lumMod val="75000"/>
@@ -9891,16 +9753,6 @@
               <a:t>Z</a:t>
             </a:r>
             <a:r>
-              <a:rPr lang="ko-KR" altLang="en-US" sz="1100" dirty="0" smtClean="0">
-                <a:solidFill>
-                  <a:schemeClr val="bg1">
-                    <a:lumMod val="75000"/>
-                  </a:schemeClr>
-                </a:solidFill>
-              </a:rPr>
-              <a:t>. 2019b</a:t>
-            </a:r>
-            <a:r>
               <a:rPr lang="ko-KR" altLang="en-US" sz="1100" dirty="0">
                 <a:solidFill>
                   <a:schemeClr val="bg1">
@@ -9908,7 +9760,7 @@
                   </a:schemeClr>
                 </a:solidFill>
               </a:rPr>
-              <a:t>. </a:t>
+              <a:t>. 2019b. </a:t>
             </a:r>
           </a:p>
         </p:txBody>
@@ -9990,22 +9842,14 @@
             <a:pPr lvl="1"/>
             <a:r>
               <a:rPr lang="en-US" altLang="ko-KR" dirty="0"/>
-              <a:t>Considering both scalability and </a:t>
-            </a:r>
-            <a:r>
-              <a:rPr lang="en-US" altLang="ko-KR" dirty="0" smtClean="0"/>
-              <a:t>coordination</a:t>
+              <a:t>Considering both scalability and coordination</a:t>
             </a:r>
           </a:p>
           <a:p>
             <a:pPr lvl="1"/>
             <a:r>
-              <a:rPr lang="en-US" altLang="ko-KR" dirty="0" smtClean="0"/>
-              <a:t>Super agent </a:t>
-            </a:r>
-            <a:r>
-              <a:rPr lang="en-US" altLang="ko-KR" dirty="0" smtClean="0"/>
-              <a:t>network</a:t>
+              <a:rPr lang="en-US" altLang="ko-KR" dirty="0"/>
+              <a:t>Super agent network</a:t>
             </a:r>
           </a:p>
           <a:p>
@@ -10163,38 +10007,18 @@
               <a:rPr lang="ko-KR" altLang="en-US" dirty="0">
                 <a:sym typeface="Wingdings" panose="05000000000000000000" pitchFamily="2" charset="2"/>
               </a:rPr>
-              <a:t>교통 공학 </a:t>
-            </a:r>
-            <a:r>
-              <a:rPr lang="ko-KR" altLang="en-US" dirty="0" smtClean="0">
-                <a:sym typeface="Wingdings" panose="05000000000000000000" pitchFamily="2" charset="2"/>
-              </a:rPr>
-              <a:t>용어 </a:t>
-            </a:r>
-            <a:r>
-              <a:rPr lang="ko-KR" altLang="en-US" dirty="0" smtClean="0">
-                <a:sym typeface="Wingdings" panose="05000000000000000000" pitchFamily="2" charset="2"/>
-              </a:rPr>
-              <a:t>정리 및 학습 </a:t>
+              <a:t>교통 공학 용어 정리 및 학습 </a:t>
             </a:r>
             <a:endParaRPr lang="en-US" altLang="ko-KR" dirty="0"/>
           </a:p>
           <a:p>
             <a:r>
-              <a:rPr lang="en-US" altLang="ko-KR" dirty="0" smtClean="0"/>
-              <a:t> SUMO </a:t>
-            </a:r>
-            <a:r>
-              <a:rPr lang="en-US" altLang="ko-KR" dirty="0"/>
-              <a:t>Network </a:t>
+              <a:rPr lang="en-US" altLang="ko-KR" dirty="0"/>
+              <a:t> SUMO Network </a:t>
             </a:r>
             <a:r>
               <a:rPr lang="ko-KR" altLang="en-US" dirty="0"/>
               <a:t>제작</a:t>
-            </a:r>
-            <a:r>
-              <a:rPr lang="en-US" altLang="ko-KR" dirty="0"/>
-              <a:t/>
             </a:r>
             <a:br>
               <a:rPr lang="en-US" altLang="ko-KR" dirty="0"/>
@@ -10218,7 +10042,7 @@
               <a:t> </a:t>
             </a:r>
             <a:r>
-              <a:rPr lang="ko-KR" altLang="en-US" dirty="0" smtClean="0">
+              <a:rPr lang="ko-KR" altLang="en-US" dirty="0">
                 <a:sym typeface="Wingdings" panose="05000000000000000000" pitchFamily="2" charset="2"/>
               </a:rPr>
               <a:t>함수</a:t>
@@ -10227,47 +10051,39 @@
           </a:p>
           <a:p>
             <a:r>
-              <a:rPr lang="ko-KR" altLang="en-US" dirty="0" smtClean="0"/>
+              <a:rPr lang="ko-KR" altLang="en-US" dirty="0"/>
               <a:t> </a:t>
             </a:r>
             <a:r>
-              <a:rPr lang="ko-KR" altLang="en-US" dirty="0" err="1" smtClean="0"/>
+              <a:rPr lang="ko-KR" altLang="en-US" dirty="0" err="1"/>
               <a:t>강화학습</a:t>
             </a:r>
             <a:r>
-              <a:rPr lang="ko-KR" altLang="en-US" dirty="0" smtClean="0"/>
-              <a:t> </a:t>
-            </a:r>
-            <a:r>
               <a:rPr lang="ko-KR" altLang="en-US" dirty="0"/>
-              <a:t>내용 파악</a:t>
+              <a:t> 내용 파악</a:t>
             </a:r>
             <a:endParaRPr lang="en-US" altLang="ko-KR" dirty="0"/>
           </a:p>
           <a:p>
             <a:r>
-              <a:rPr lang="ko-KR" altLang="en-US" dirty="0" smtClean="0"/>
+              <a:rPr lang="ko-KR" altLang="en-US" dirty="0"/>
               <a:t> 논문 </a:t>
             </a:r>
             <a:r>
-              <a:rPr lang="en-US" altLang="ko-KR" dirty="0" smtClean="0"/>
+              <a:rPr lang="en-US" altLang="ko-KR" dirty="0"/>
               <a:t>Review</a:t>
             </a:r>
           </a:p>
           <a:p>
             <a:r>
-              <a:rPr lang="en-US" altLang="ko-KR" dirty="0" smtClean="0"/>
-              <a:t> State</a:t>
-            </a:r>
-            <a:r>
-              <a:rPr lang="en-US" altLang="ko-KR" dirty="0"/>
-              <a:t>, Reward, Action </a:t>
+              <a:rPr lang="en-US" altLang="ko-KR" dirty="0"/>
+              <a:t> State, Reward, Action </a:t>
             </a:r>
             <a:r>
               <a:rPr lang="ko-KR" altLang="en-US" dirty="0"/>
               <a:t>종류 판별</a:t>
             </a:r>
-            <a:endParaRPr lang="en-US" altLang="ko-KR" dirty="0" smtClean="0"/>
+            <a:endParaRPr lang="en-US" altLang="ko-KR" dirty="0"/>
           </a:p>
           <a:p>
             <a:r>
@@ -10275,7 +10091,7 @@
               <a:t> </a:t>
             </a:r>
             <a:r>
-              <a:rPr lang="ko-KR" altLang="en-US" dirty="0" smtClean="0"/>
+              <a:rPr lang="ko-KR" altLang="en-US" dirty="0"/>
               <a:t>개선점</a:t>
             </a:r>
             <a:endParaRPr lang="en-US" altLang="ko-KR" dirty="0"/>
@@ -10439,10 +10255,6 @@
             <a:br>
               <a:rPr lang="en-US" altLang="ko-KR" dirty="0"/>
             </a:br>
-            <a:r>
-              <a:rPr lang="en-US" altLang="ko-KR" dirty="0"/>
-              <a:t/>
-            </a:r>
             <a:br>
               <a:rPr lang="en-US" altLang="ko-KR" dirty="0"/>
             </a:br>
@@ -10458,16 +10270,8 @@
           <a:p>
             <a:pPr lvl="1"/>
             <a:r>
-              <a:rPr lang="en-US" altLang="ko-KR" dirty="0" smtClean="0"/>
-              <a:t>Decentralized </a:t>
-            </a:r>
-            <a:r>
-              <a:rPr lang="en-US" altLang="ko-KR" dirty="0"/>
-              <a:t>a</a:t>
-            </a:r>
-            <a:r>
-              <a:rPr lang="en-US" altLang="ko-KR" dirty="0" smtClean="0"/>
-              <a:t>gent(Super agent) based on Deep Q-Network &lt;- overcome coordination</a:t>
+              <a:rPr lang="en-US" altLang="ko-KR" dirty="0"/>
+              <a:t>Decentralized agent(Super agent) based on Deep Q-Network &lt;- overcome coordination</a:t>
             </a:r>
             <a:endParaRPr lang="ko-KR" altLang="en-US" dirty="0"/>
           </a:p>
@@ -10932,19 +10736,7 @@
               <a:rPr lang="en-US" altLang="ko-KR" dirty="0">
                 <a:sym typeface="Wingdings" panose="05000000000000000000" pitchFamily="2" charset="2"/>
               </a:rPr>
-              <a:t> By </a:t>
-            </a:r>
-            <a:r>
-              <a:rPr lang="en-US" altLang="ko-KR" dirty="0" smtClean="0">
-                <a:sym typeface="Wingdings" panose="05000000000000000000" pitchFamily="2" charset="2"/>
-              </a:rPr>
-              <a:t>rotating and flipping, </a:t>
-            </a:r>
-            <a:r>
-              <a:rPr lang="en-US" altLang="ko-KR" dirty="0">
-                <a:sym typeface="Wingdings" panose="05000000000000000000" pitchFamily="2" charset="2"/>
-              </a:rPr>
-              <a:t>Reduces needed experience in ¼ scale</a:t>
+              <a:t> By rotating and flipping, Reduces needed experience in ¼ scale</a:t>
             </a:r>
           </a:p>
           <a:p>
@@ -10962,23 +10754,8 @@
               <a:rPr lang="en-US" altLang="ko-KR" dirty="0">
                 <a:sym typeface="Wingdings" panose="05000000000000000000" pitchFamily="2" charset="2"/>
               </a:rPr>
-              <a:t>Principles of </a:t>
-            </a:r>
-            <a:r>
-              <a:rPr lang="en-US" altLang="ko-KR" dirty="0" smtClean="0">
-                <a:sym typeface="Wingdings" panose="05000000000000000000" pitchFamily="2" charset="2"/>
-              </a:rPr>
-              <a:t>competition: Larger traffic indicates higher demand for ‘</a:t>
-            </a:r>
-            <a:r>
-              <a:rPr lang="en-US" altLang="ko-KR" dirty="0" smtClean="0">
-                <a:sym typeface="Wingdings" panose="05000000000000000000" pitchFamily="2" charset="2"/>
-              </a:rPr>
-              <a:t>green’</a:t>
-            </a:r>
-            <a:endParaRPr lang="en-US" altLang="ko-KR" dirty="0">
-              <a:sym typeface="Wingdings" panose="05000000000000000000" pitchFamily="2" charset="2"/>
-            </a:endParaRPr>
+              <a:t>Principles of competition: Larger traffic indicates higher demand for ‘green’</a:t>
+            </a:r>
           </a:p>
           <a:p>
             <a:pPr lvl="2"/>
@@ -10986,40 +10763,13 @@
               <a:rPr lang="en-US" altLang="ko-KR" dirty="0">
                 <a:sym typeface="Wingdings" panose="05000000000000000000" pitchFamily="2" charset="2"/>
               </a:rPr>
-              <a:t>Principles of </a:t>
-            </a:r>
-            <a:r>
-              <a:rPr lang="en-US" altLang="ko-KR" dirty="0" smtClean="0">
-                <a:sym typeface="Wingdings" panose="05000000000000000000" pitchFamily="2" charset="2"/>
-              </a:rPr>
-              <a:t>invariance: signal control should be invariant to symmetries such as </a:t>
-            </a:r>
-            <a:r>
-              <a:rPr lang="en-US" altLang="ko-KR" dirty="0" smtClean="0">
-                <a:sym typeface="Wingdings" panose="05000000000000000000" pitchFamily="2" charset="2"/>
-              </a:rPr>
-              <a:t>rotating </a:t>
-            </a:r>
-            <a:r>
-              <a:rPr lang="en-US" altLang="ko-KR" dirty="0" smtClean="0">
-                <a:sym typeface="Wingdings" panose="05000000000000000000" pitchFamily="2" charset="2"/>
-              </a:rPr>
-              <a:t>and </a:t>
-            </a:r>
-            <a:r>
-              <a:rPr lang="en-US" altLang="ko-KR" dirty="0" smtClean="0">
-                <a:sym typeface="Wingdings" panose="05000000000000000000" pitchFamily="2" charset="2"/>
-              </a:rPr>
-              <a:t>flipping</a:t>
-            </a:r>
-            <a:endParaRPr lang="en-US" altLang="ko-KR" dirty="0">
-              <a:sym typeface="Wingdings" panose="05000000000000000000" pitchFamily="2" charset="2"/>
-            </a:endParaRPr>
+              <a:t>Principles of invariance: signal control should be invariant to symmetries such as rotating and flipping</a:t>
+            </a:r>
           </a:p>
           <a:p>
             <a:pPr lvl="1"/>
             <a:r>
-              <a:rPr lang="en-US" altLang="ko-KR" dirty="0" smtClean="0">
+              <a:rPr lang="en-US" altLang="ko-KR" dirty="0">
                 <a:sym typeface="Wingdings" panose="05000000000000000000" pitchFamily="2" charset="2"/>
               </a:rPr>
               <a:t>Prediction of phase score into tree stages</a:t>
@@ -11028,7 +10778,7 @@
           <a:p>
             <a:pPr lvl="2"/>
             <a:r>
-              <a:rPr lang="en-US" altLang="ko-KR" dirty="0" smtClean="0">
+              <a:rPr lang="en-US" altLang="ko-KR" dirty="0">
                 <a:sym typeface="Wingdings" panose="05000000000000000000" pitchFamily="2" charset="2"/>
               </a:rPr>
               <a:t>Phase demand modeling</a:t>
@@ -11037,7 +10787,7 @@
           <a:p>
             <a:pPr lvl="2"/>
             <a:r>
-              <a:rPr lang="en-US" altLang="ko-KR" dirty="0" smtClean="0">
+              <a:rPr lang="en-US" altLang="ko-KR" dirty="0">
                 <a:sym typeface="Wingdings" panose="05000000000000000000" pitchFamily="2" charset="2"/>
               </a:rPr>
               <a:t>Phase pair representation</a:t>
@@ -11046,7 +10796,7 @@
           <a:p>
             <a:pPr lvl="2"/>
             <a:r>
-              <a:rPr lang="en-US" altLang="ko-KR" dirty="0" smtClean="0">
+              <a:rPr lang="en-US" altLang="ko-KR" dirty="0">
                 <a:sym typeface="Wingdings" panose="05000000000000000000" pitchFamily="2" charset="2"/>
               </a:rPr>
               <a:t>Phase pair competition</a:t>
@@ -11088,6 +10838,36 @@
           <a:chExt cx="0" cy="0"/>
         </a:xfrm>
       </p:grpSpPr>
+      <p:pic>
+        <p:nvPicPr>
+          <p:cNvPr id="16" name="그림 15">
+            <a:extLst>
+              <a:ext uri="{FF2B5EF4-FFF2-40B4-BE49-F238E27FC236}">
+                <a16:creationId xmlns:a16="http://schemas.microsoft.com/office/drawing/2014/main" id="{4ED6D56B-65FB-4389-B07B-243CDE4A9722}"/>
+              </a:ext>
+            </a:extLst>
+          </p:cNvPr>
+          <p:cNvPicPr>
+            <a:picLocks noChangeAspect="1"/>
+          </p:cNvPicPr>
+          <p:nvPr/>
+        </p:nvPicPr>
+        <p:blipFill>
+          <a:blip r:embed="rId2"/>
+          <a:stretch>
+            <a:fillRect/>
+          </a:stretch>
+        </p:blipFill>
+        <p:spPr>
+          <a:xfrm>
+            <a:off x="9362680" y="3050425"/>
+            <a:ext cx="2829320" cy="3181794"/>
+          </a:xfrm>
+          <a:prstGeom prst="rect">
+            <a:avLst/>
+          </a:prstGeom>
+        </p:spPr>
+      </p:pic>
       <p:sp>
         <p:nvSpPr>
           <p:cNvPr id="2" name="제목 1">
@@ -11110,7 +10890,7 @@
           <a:lstStyle/>
           <a:p>
             <a:r>
-              <a:rPr lang="en-US" altLang="ko-KR" dirty="0" smtClean="0"/>
+              <a:rPr lang="en-US" altLang="ko-KR" dirty="0"/>
               <a:t>Approach: FRAP</a:t>
             </a:r>
             <a:endParaRPr lang="ko-KR" altLang="en-US" dirty="0"/>
@@ -11141,28 +10921,28 @@
               <a:lstStyle/>
               <a:p>
                 <a:r>
-                  <a:rPr lang="en-US" altLang="ko-KR" dirty="0" smtClean="0"/>
+                  <a:rPr lang="en-US" altLang="ko-KR" dirty="0"/>
                   <a:t> FRAP Network (Prediction of phase score into three stages)</a:t>
                 </a:r>
               </a:p>
               <a:p>
                 <a:pPr lvl="1"/>
                 <a:r>
-                  <a:rPr lang="en-US" altLang="ko-KR" dirty="0" smtClean="0"/>
+                  <a:rPr lang="en-US" altLang="ko-KR" dirty="0"/>
                   <a:t>Phase demand modeling: features from both current phase and # of vehicles through 2 fc-layers </a:t>
                 </a:r>
               </a:p>
               <a:p>
                 <a:pPr lvl="1"/>
                 <a:r>
-                  <a:rPr lang="en-US" altLang="ko-KR" dirty="0" smtClean="0"/>
+                  <a:rPr lang="en-US" altLang="ko-KR" dirty="0"/>
                   <a:t>Phase pair representation: the score of a phase depends on its competition with the other phase</a:t>
                 </a:r>
               </a:p>
               <a:p>
                 <a:pPr lvl="1"/>
                 <a:r>
-                  <a:rPr lang="en-US" altLang="ko-KR" dirty="0" smtClean="0"/>
+                  <a:rPr lang="en-US" altLang="ko-KR" dirty="0"/>
                   <a:t>Phase pair competition: predicted score of a phase </a:t>
                 </a:r>
                 <a14:m>
@@ -11176,7 +10956,7 @@
                   </m:oMath>
                 </a14:m>
                 <a:r>
-                  <a:rPr lang="en-US" altLang="ko-KR" dirty="0" smtClean="0"/>
+                  <a:rPr lang="en-US" altLang="ko-KR" dirty="0"/>
                   <a:t> over all its opponents</a:t>
                 </a:r>
                 <a:endParaRPr lang="ko-KR" altLang="en-US" dirty="0"/>
@@ -11203,7 +10983,7 @@
             </p:nvSpPr>
             <p:spPr>
               <a:blipFill>
-                <a:blip r:embed="rId2"/>
+                <a:blip r:embed="rId3"/>
                 <a:stretch>
                   <a:fillRect l="-1455" t="-1667"/>
                 </a:stretch>
@@ -11238,16 +11018,15 @@
           </p:cNvPicPr>
           <p:nvPr/>
         </p:nvPicPr>
-        <p:blipFill>
-          <a:blip r:embed="rId3"/>
-          <a:stretch>
-            <a:fillRect/>
-          </a:stretch>
+        <p:blipFill rotWithShape="1">
+          <a:blip r:embed="rId4"/>
+          <a:srcRect r="1423"/>
+          <a:stretch/>
         </p:blipFill>
         <p:spPr>
           <a:xfrm>
-            <a:off x="2528786" y="3606943"/>
-            <a:ext cx="8330268" cy="2526870"/>
+            <a:off x="1226434" y="3606943"/>
+            <a:ext cx="8211747" cy="2526870"/>
           </a:xfrm>
           <a:prstGeom prst="rect">
             <a:avLst/>
@@ -11268,7 +11047,7 @@
         </p:nvSpPr>
         <p:spPr>
           <a:xfrm>
-            <a:off x="2528786" y="3606943"/>
+            <a:off x="1226434" y="3606943"/>
             <a:ext cx="1832714" cy="1099281"/>
           </a:xfrm>
           <a:prstGeom prst="roundRect">
@@ -11320,7 +11099,7 @@
         </p:nvSpPr>
         <p:spPr>
           <a:xfrm>
-            <a:off x="2528786" y="4769813"/>
+            <a:off x="1226434" y="4769813"/>
             <a:ext cx="1832714" cy="1099281"/>
           </a:xfrm>
           <a:prstGeom prst="roundRect">
@@ -11372,8 +11151,8 @@
         </p:nvSpPr>
         <p:spPr>
           <a:xfrm>
-            <a:off x="1341464" y="4444614"/>
-            <a:ext cx="1409350" cy="523220"/>
+            <a:off x="25166" y="4444614"/>
+            <a:ext cx="1372961" cy="523220"/>
           </a:xfrm>
           <a:prstGeom prst="rect">
             <a:avLst/>
@@ -11410,7 +11189,7 @@
         </p:nvSpPr>
         <p:spPr>
           <a:xfrm>
-            <a:off x="3382015" y="3790460"/>
+            <a:off x="2079663" y="3790460"/>
             <a:ext cx="126256" cy="133907"/>
           </a:xfrm>
           <a:prstGeom prst="ellipse">
@@ -11456,7 +11235,7 @@
         </p:nvSpPr>
         <p:spPr>
           <a:xfrm>
-            <a:off x="3382015" y="4048138"/>
+            <a:off x="2079663" y="4048138"/>
             <a:ext cx="126256" cy="133907"/>
           </a:xfrm>
           <a:prstGeom prst="ellipse">
@@ -11502,7 +11281,7 @@
         </p:nvSpPr>
         <p:spPr>
           <a:xfrm>
-            <a:off x="3827852" y="4020858"/>
+            <a:off x="2525500" y="4020858"/>
             <a:ext cx="126256" cy="133907"/>
           </a:xfrm>
           <a:prstGeom prst="ellipse">
@@ -11548,7 +11327,7 @@
         </p:nvSpPr>
         <p:spPr>
           <a:xfrm>
-            <a:off x="1434354" y="3450050"/>
+            <a:off x="132002" y="3450050"/>
             <a:ext cx="956744" cy="276999"/>
           </a:xfrm>
           <a:prstGeom prst="rect">
@@ -11564,7 +11343,7 @@
           <a:p>
             <a:pPr algn="r"/>
             <a:r>
-              <a:rPr lang="en-US" altLang="ko-KR" sz="1200" dirty="0" smtClean="0">
+              <a:rPr lang="en-US" altLang="ko-KR" sz="1200" dirty="0">
                 <a:solidFill>
                   <a:srgbClr val="FF0000"/>
                 </a:solidFill>
@@ -11587,8 +11366,8 @@
         </p:nvSpPr>
         <p:spPr>
           <a:xfrm>
-            <a:off x="1270210" y="3680883"/>
-            <a:ext cx="1120888" cy="276999"/>
+            <a:off x="0" y="3680883"/>
+            <a:ext cx="1088746" cy="276999"/>
           </a:xfrm>
           <a:prstGeom prst="rect">
             <a:avLst/>
@@ -11603,7 +11382,7 @@
           <a:p>
             <a:pPr algn="r"/>
             <a:r>
-              <a:rPr lang="en-US" altLang="ko-KR" sz="1200" dirty="0" smtClean="0">
+              <a:rPr lang="en-US" altLang="ko-KR" sz="1200" dirty="0">
                 <a:solidFill>
                   <a:srgbClr val="FF0000"/>
                 </a:solidFill>
@@ -11622,6 +11401,7 @@
         <p:nvCxnSpPr>
           <p:cNvPr id="14" name="직선 화살표 연결선 13"/>
           <p:cNvCxnSpPr>
+            <a:cxnSpLocks/>
             <a:stCxn id="12" idx="3"/>
             <a:endCxn id="9" idx="2"/>
           </p:cNvCxnSpPr>
@@ -11629,7 +11409,7 @@
         </p:nvCxnSpPr>
         <p:spPr>
           <a:xfrm>
-            <a:off x="2391098" y="3819383"/>
+            <a:off x="1088746" y="3819383"/>
             <a:ext cx="990917" cy="295709"/>
           </a:xfrm>
           <a:prstGeom prst="straightConnector1">
@@ -11668,7 +11448,7 @@
         </p:nvCxnSpPr>
         <p:spPr>
           <a:xfrm>
-            <a:off x="2391098" y="3588550"/>
+            <a:off x="1088746" y="3588550"/>
             <a:ext cx="990917" cy="268864"/>
           </a:xfrm>
           <a:prstGeom prst="straightConnector1">
@@ -11704,7 +11484,7 @@
         </p:nvSpPr>
         <p:spPr>
           <a:xfrm>
-            <a:off x="4487246" y="3716423"/>
+            <a:off x="3184894" y="3716423"/>
             <a:ext cx="1120888" cy="276999"/>
           </a:xfrm>
           <a:prstGeom prst="rect">
@@ -11719,7 +11499,7 @@
           <a:lstStyle/>
           <a:p>
             <a:r>
-              <a:rPr lang="en-US" altLang="ko-KR" sz="1200" dirty="0" smtClean="0">
+              <a:rPr lang="en-US" altLang="ko-KR" sz="1200" dirty="0">
                 <a:solidFill>
                   <a:srgbClr val="FF0000"/>
                 </a:solidFill>
@@ -11745,7 +11525,7 @@
         </p:nvCxnSpPr>
         <p:spPr>
           <a:xfrm flipH="1">
-            <a:off x="3954108" y="3854923"/>
+            <a:off x="2651756" y="3854923"/>
             <a:ext cx="533138" cy="232889"/>
           </a:xfrm>
           <a:prstGeom prst="straightConnector1">
@@ -11819,15 +11599,15 @@
           <a:lstStyle/>
           <a:p>
             <a:r>
-              <a:rPr lang="en-US" altLang="ko-KR" dirty="0" smtClean="0"/>
+              <a:rPr lang="en-US" altLang="ko-KR" dirty="0"/>
               <a:t>Approach: DQN</a:t>
             </a:r>
             <a:endParaRPr lang="ko-KR" altLang="en-US" dirty="0"/>
           </a:p>
         </p:txBody>
       </p:sp>
-      <mc:AlternateContent xmlns:mc="http://schemas.openxmlformats.org/markup-compatibility/2006">
-        <mc:Choice xmlns:a14="http://schemas.microsoft.com/office/drawing/2010/main" Requires="a14">
+      <mc:AlternateContent xmlns:mc="http://schemas.openxmlformats.org/markup-compatibility/2006" xmlns:a14="http://schemas.microsoft.com/office/drawing/2010/main">
+        <mc:Choice Requires="a14">
           <p:sp>
             <p:nvSpPr>
               <p:cNvPr id="3" name="내용 개체 틀 2"/>
@@ -11844,25 +11624,25 @@
               <a:lstStyle/>
               <a:p>
                 <a:r>
-                  <a:rPr lang="en-US" altLang="ko-KR" dirty="0" smtClean="0"/>
+                  <a:rPr lang="en-US" altLang="ko-KR" dirty="0"/>
                   <a:t> Deep Q-Network</a:t>
                 </a:r>
               </a:p>
               <a:p>
                 <a:pPr lvl="1"/>
                 <a:r>
-                  <a:rPr lang="en-US" altLang="ko-KR" dirty="0" smtClean="0"/>
+                  <a:rPr lang="en-US" altLang="ko-KR" dirty="0"/>
                   <a:t>Value-based learning(Q learning), Epsilon-greedy</a:t>
                 </a:r>
               </a:p>
               <a:p>
                 <a:pPr lvl="1"/>
                 <a:r>
-                  <a:rPr lang="en-US" altLang="ko-KR" dirty="0" smtClean="0"/>
+                  <a:rPr lang="en-US" altLang="ko-KR" dirty="0"/>
                   <a:t>Loss function that compare fixed target Q and approximated local Q </a:t>
                 </a:r>
                 <a:br>
-                  <a:rPr lang="en-US" altLang="ko-KR" dirty="0" smtClean="0"/>
+                  <a:rPr lang="en-US" altLang="ko-KR" dirty="0"/>
                 </a:br>
                 <a14:m>
                   <m:oMath xmlns:m="http://schemas.openxmlformats.org/officeDocument/2006/math">
@@ -12173,12 +11953,12 @@
                     </m:sSup>
                   </m:oMath>
                 </a14:m>
-                <a:endParaRPr lang="en-US" altLang="ko-KR" b="0" dirty="0" smtClean="0"/>
+                <a:endParaRPr lang="en-US" altLang="ko-KR" b="0" dirty="0"/>
               </a:p>
               <a:p>
                 <a:pPr lvl="1"/>
                 <a:r>
-                  <a:rPr lang="en-US" altLang="ko-KR" dirty="0" smtClean="0"/>
+                  <a:rPr lang="en-US" altLang="ko-KR" dirty="0"/>
                   <a:t>Soft update the target Q network(</a:t>
                 </a:r>
                 <a14:m>
@@ -12321,38 +12101,38 @@
                   </m:oMath>
                 </a14:m>
                 <a:r>
-                  <a:rPr lang="en-US" altLang="ko-KR" dirty="0" smtClean="0"/>
+                  <a:rPr lang="en-US" altLang="ko-KR" dirty="0"/>
                   <a:t>) periodically</a:t>
                 </a:r>
               </a:p>
               <a:p>
                 <a:pPr lvl="1"/>
                 <a:r>
-                  <a:rPr lang="en-US" altLang="ko-KR" dirty="0" smtClean="0"/>
+                  <a:rPr lang="en-US" altLang="ko-KR" dirty="0"/>
                   <a:t>Use experience replay for updating Q</a:t>
                 </a:r>
                 <a:br>
-                  <a:rPr lang="en-US" altLang="ko-KR" dirty="0" smtClean="0"/>
+                  <a:rPr lang="en-US" altLang="ko-KR" dirty="0"/>
                 </a:br>
                 <a:r>
-                  <a:rPr lang="en-US" altLang="ko-KR" dirty="0" smtClean="0"/>
+                  <a:rPr lang="en-US" altLang="ko-KR" dirty="0"/>
                   <a:t>- Using on-policy make the data highly correlated </a:t>
                 </a:r>
                 <a:r>
-                  <a:rPr lang="en-US" altLang="ko-KR" dirty="0" smtClean="0">
+                  <a:rPr lang="en-US" altLang="ko-KR" dirty="0">
                     <a:sym typeface="Wingdings" panose="05000000000000000000" pitchFamily="2" charset="2"/>
                   </a:rPr>
                   <a:t> by using</a:t>
                 </a:r>
                 <a:r>
-                  <a:rPr lang="en-US" altLang="ko-KR" dirty="0" smtClean="0"/>
+                  <a:rPr lang="en-US" altLang="ko-KR" dirty="0"/>
                   <a:t> replay, uniformly random sample</a:t>
                 </a:r>
                 <a:br>
-                  <a:rPr lang="en-US" altLang="ko-KR" dirty="0" smtClean="0"/>
+                  <a:rPr lang="en-US" altLang="ko-KR" dirty="0"/>
                 </a:br>
                 <a:r>
-                  <a:rPr lang="en-US" altLang="ko-KR" dirty="0" smtClean="0"/>
+                  <a:rPr lang="en-US" altLang="ko-KR" dirty="0"/>
                   <a:t>- Disadvantage: using much memory during the learning</a:t>
                 </a:r>
                 <a:endParaRPr lang="ko-KR" altLang="en-US" dirty="0"/>
@@ -12360,7 +12140,7 @@
             </p:txBody>
           </p:sp>
         </mc:Choice>
-        <mc:Fallback>
+        <mc:Fallback xmlns="">
           <p:sp>
             <p:nvSpPr>
               <p:cNvPr id="3" name="내용 개체 틀 2"/>
@@ -12471,8 +12251,8 @@
           </a:p>
         </p:txBody>
       </p:sp>
-      <mc:AlternateContent xmlns:mc="http://schemas.openxmlformats.org/markup-compatibility/2006">
-        <mc:Choice xmlns:a14="http://schemas.microsoft.com/office/drawing/2010/main" Requires="a14">
+      <mc:AlternateContent xmlns:mc="http://schemas.openxmlformats.org/markup-compatibility/2006" xmlns:a14="http://schemas.microsoft.com/office/drawing/2010/main">
+        <mc:Choice Requires="a14">
           <p:sp>
             <p:nvSpPr>
               <p:cNvPr id="3" name="내용 개체 틀 2"/>
@@ -12599,17 +12379,8 @@
                   <a:rPr lang="en-US" altLang="ko-KR" dirty="0">
                     <a:sym typeface="Wingdings" panose="05000000000000000000" pitchFamily="2" charset="2"/>
                   </a:rPr>
-                  <a:t>Select the phase based on Max Pressure Control </a:t>
+                  <a:t>Select the phase based on Max Pressure Control Law(FRAP)</a:t>
                 </a:r>
-                <a:r>
-                  <a:rPr lang="en-US" altLang="ko-KR" dirty="0" smtClean="0">
-                    <a:sym typeface="Wingdings" panose="05000000000000000000" pitchFamily="2" charset="2"/>
-                  </a:rPr>
-                  <a:t>Law(FRAP)</a:t>
-                </a:r>
-                <a:endParaRPr lang="en-US" altLang="ko-KR" dirty="0">
-                  <a:sym typeface="Wingdings" panose="05000000000000000000" pitchFamily="2" charset="2"/>
-                </a:endParaRPr>
               </a:p>
               <a:p>
                 <a:pPr lvl="1"/>
@@ -12655,7 +12426,7 @@
             </p:txBody>
           </p:sp>
         </mc:Choice>
-        <mc:Fallback>
+        <mc:Fallback xmlns="">
           <p:sp>
             <p:nvSpPr>
               <p:cNvPr id="3" name="내용 개체 틀 2"/>
@@ -13364,15 +13135,7 @@
                 <a:pPr lvl="1"/>
                 <a:r>
                   <a:rPr lang="en-US" altLang="ko-KR" dirty="0"/>
-                  <a:t> All parameters shared among all the agents </a:t>
-                </a:r>
-                <a:r>
-                  <a:rPr lang="en-US" altLang="ko-KR" dirty="0" smtClean="0"/>
-                  <a:t>(Observation data sharing)</a:t>
-                </a:r>
-                <a:r>
-                  <a:rPr lang="en-US" altLang="ko-KR" dirty="0"/>
-                  <a:t/>
+                  <a:t> All parameters shared among all the agents (Observation data sharing)</a:t>
                 </a:r>
                 <a:br>
                   <a:rPr lang="en-US" altLang="ko-KR" dirty="0"/>
@@ -13639,7 +13402,7 @@
             <a:pPr lvl="1"/>
             <a:r>
               <a:rPr lang="en-US" altLang="ko-KR" dirty="0"/>
-              <a:t>Throughput: the number of trips completed</a:t>
+              <a:t>Throughput: the number of completed  trips</a:t>
             </a:r>
             <a:br>
               <a:rPr lang="en-US" altLang="ko-KR" dirty="0"/>
@@ -13685,96 +13448,15 @@
           <a:chExt cx="0" cy="0"/>
         </a:xfrm>
       </p:grpSpPr>
-      <p:sp>
-        <p:nvSpPr>
-          <p:cNvPr id="2" name="제목 1"/>
-          <p:cNvSpPr>
-            <a:spLocks noGrp="1"/>
-          </p:cNvSpPr>
-          <p:nvPr>
-            <p:ph type="title"/>
-          </p:nvPr>
-        </p:nvSpPr>
-        <p:spPr/>
-        <p:txBody>
-          <a:bodyPr/>
-          <a:lstStyle/>
-          <a:p>
-            <a:r>
-              <a:rPr lang="en-US" altLang="ko-KR" dirty="0" smtClean="0"/>
-              <a:t>Result</a:t>
-            </a:r>
-            <a:endParaRPr lang="ko-KR" altLang="en-US" dirty="0"/>
-          </a:p>
-        </p:txBody>
-      </p:sp>
-      <p:sp>
-        <p:nvSpPr>
-          <p:cNvPr id="3" name="내용 개체 틀 2"/>
-          <p:cNvSpPr>
-            <a:spLocks noGrp="1"/>
-          </p:cNvSpPr>
-          <p:nvPr>
-            <p:ph idx="1"/>
-          </p:nvPr>
-        </p:nvSpPr>
-        <p:spPr/>
-        <p:txBody>
-          <a:bodyPr/>
-          <a:lstStyle/>
-          <a:p>
-            <a:r>
-              <a:rPr lang="en-US" altLang="ko-KR" dirty="0" smtClean="0"/>
-              <a:t> Performance Comparison</a:t>
-            </a:r>
-          </a:p>
-          <a:p>
-            <a:pPr lvl="1"/>
-            <a:r>
-              <a:rPr lang="en-US" altLang="ko-KR" dirty="0" smtClean="0"/>
-              <a:t>Travel time is reduced 19.20% in </a:t>
-            </a:r>
-            <a:r>
-              <a:rPr lang="en-US" altLang="ko-KR" dirty="0" err="1" smtClean="0"/>
-              <a:t>MPLight</a:t>
-            </a:r>
-            <a:r>
-              <a:rPr lang="en-US" altLang="ko-KR" dirty="0" smtClean="0"/>
-              <a:t> over all other methods (second best time, config3)</a:t>
-            </a:r>
-          </a:p>
-          <a:p>
-            <a:pPr lvl="1"/>
-            <a:r>
-              <a:rPr lang="en-US" altLang="ko-KR" dirty="0" smtClean="0"/>
-              <a:t>Throughput is increased 3% in </a:t>
-            </a:r>
-            <a:r>
-              <a:rPr lang="en-US" altLang="ko-KR" dirty="0" err="1" smtClean="0"/>
-              <a:t>MPLight</a:t>
-            </a:r>
-            <a:r>
-              <a:rPr lang="en-US" altLang="ko-KR" dirty="0" smtClean="0"/>
-              <a:t> over all other methods (second best time, config3)</a:t>
-            </a:r>
-            <a:endParaRPr lang="en-US" altLang="ko-KR" dirty="0"/>
-          </a:p>
-          <a:p>
-            <a:r>
-              <a:rPr lang="en-US" altLang="ko-KR" dirty="0" smtClean="0"/>
-              <a:t> </a:t>
-            </a:r>
-            <a:r>
-              <a:rPr lang="en-US" altLang="ko-KR" dirty="0" smtClean="0"/>
-              <a:t>Best performance compared to other RL method and Pressure control system</a:t>
-            </a:r>
-            <a:endParaRPr lang="en-US" altLang="ko-KR" dirty="0" smtClean="0"/>
-          </a:p>
-        </p:txBody>
-      </p:sp>
       <p:pic>
         <p:nvPicPr>
-          <p:cNvPr id="4" name="그림 3"/>
+          <p:cNvPr id="10" name="그림 9">
+            <a:extLst>
+              <a:ext uri="{FF2B5EF4-FFF2-40B4-BE49-F238E27FC236}">
+                <a16:creationId xmlns:a16="http://schemas.microsoft.com/office/drawing/2014/main" id="{4ECEA085-F68B-4761-819B-1685364EF7DF}"/>
+              </a:ext>
+            </a:extLst>
+          </p:cNvPr>
           <p:cNvPicPr>
             <a:picLocks noChangeAspect="1"/>
           </p:cNvPicPr>
@@ -13788,7 +13470,112 @@
         </p:blipFill>
         <p:spPr>
           <a:xfrm>
-            <a:off x="1618374" y="3301802"/>
+            <a:off x="51288" y="3735820"/>
+            <a:ext cx="4014952" cy="1924022"/>
+          </a:xfrm>
+          <a:prstGeom prst="rect">
+            <a:avLst/>
+          </a:prstGeom>
+        </p:spPr>
+      </p:pic>
+      <p:sp>
+        <p:nvSpPr>
+          <p:cNvPr id="2" name="제목 1"/>
+          <p:cNvSpPr>
+            <a:spLocks noGrp="1"/>
+          </p:cNvSpPr>
+          <p:nvPr>
+            <p:ph type="title"/>
+          </p:nvPr>
+        </p:nvSpPr>
+        <p:spPr/>
+        <p:txBody>
+          <a:bodyPr/>
+          <a:lstStyle/>
+          <a:p>
+            <a:r>
+              <a:rPr lang="en-US" altLang="ko-KR" dirty="0"/>
+              <a:t>Result</a:t>
+            </a:r>
+            <a:endParaRPr lang="ko-KR" altLang="en-US" dirty="0"/>
+          </a:p>
+        </p:txBody>
+      </p:sp>
+      <p:sp>
+        <p:nvSpPr>
+          <p:cNvPr id="3" name="내용 개체 틀 2"/>
+          <p:cNvSpPr>
+            <a:spLocks noGrp="1"/>
+          </p:cNvSpPr>
+          <p:nvPr>
+            <p:ph idx="1"/>
+          </p:nvPr>
+        </p:nvSpPr>
+        <p:spPr/>
+        <p:txBody>
+          <a:bodyPr/>
+          <a:lstStyle/>
+          <a:p>
+            <a:r>
+              <a:rPr lang="en-US" altLang="ko-KR" dirty="0"/>
+              <a:t> Performance Comparison</a:t>
+            </a:r>
+          </a:p>
+          <a:p>
+            <a:pPr lvl="1"/>
+            <a:r>
+              <a:rPr lang="en-US" altLang="ko-KR" dirty="0"/>
+              <a:t>Travel time is reduced 19.20% in </a:t>
+            </a:r>
+            <a:r>
+              <a:rPr lang="en-US" altLang="ko-KR" dirty="0" err="1"/>
+              <a:t>MPLight</a:t>
+            </a:r>
+            <a:r>
+              <a:rPr lang="en-US" altLang="ko-KR" dirty="0"/>
+              <a:t> over all other methods (second best time, config3)</a:t>
+            </a:r>
+          </a:p>
+          <a:p>
+            <a:pPr lvl="1"/>
+            <a:r>
+              <a:rPr lang="en-US" altLang="ko-KR" dirty="0"/>
+              <a:t>Throughput is increased 3% in </a:t>
+            </a:r>
+            <a:r>
+              <a:rPr lang="en-US" altLang="ko-KR" dirty="0" err="1"/>
+              <a:t>MPLight</a:t>
+            </a:r>
+            <a:r>
+              <a:rPr lang="en-US" altLang="ko-KR" dirty="0"/>
+              <a:t> over all other methods (second best time, config3)</a:t>
+            </a:r>
+          </a:p>
+          <a:p>
+            <a:r>
+              <a:rPr lang="en-US" altLang="ko-KR" dirty="0"/>
+              <a:t> Best performance compared to other RL method and Pressure control system(4x4)</a:t>
+            </a:r>
+          </a:p>
+        </p:txBody>
+      </p:sp>
+      <p:pic>
+        <p:nvPicPr>
+          <p:cNvPr id="4" name="그림 3"/>
+          <p:cNvPicPr>
+            <a:picLocks noChangeAspect="1"/>
+          </p:cNvPicPr>
+          <p:nvPr/>
+        </p:nvPicPr>
+        <p:blipFill>
+          <a:blip r:embed="rId3"/>
+          <a:stretch>
+            <a:fillRect/>
+          </a:stretch>
+        </p:blipFill>
+        <p:spPr>
+          <a:xfrm>
+            <a:off x="3864269" y="3301802"/>
             <a:ext cx="8176036" cy="2567292"/>
           </a:xfrm>
           <a:prstGeom prst="rect">
@@ -13804,7 +13591,7 @@
         </p:nvSpPr>
         <p:spPr>
           <a:xfrm>
-            <a:off x="8283163" y="5298932"/>
+            <a:off x="10545100" y="5298932"/>
             <a:ext cx="413201" cy="172167"/>
           </a:xfrm>
           <a:prstGeom prst="roundRect">
@@ -13850,7 +13637,7 @@
         </p:nvSpPr>
         <p:spPr>
           <a:xfrm>
-            <a:off x="8283163" y="5573759"/>
+            <a:off x="10545100" y="5573759"/>
             <a:ext cx="413201" cy="172167"/>
           </a:xfrm>
           <a:prstGeom prst="roundRect">
@@ -13896,7 +13683,7 @@
         </p:nvSpPr>
         <p:spPr>
           <a:xfrm>
-            <a:off x="4812407" y="5080210"/>
+            <a:off x="7074344" y="5080210"/>
             <a:ext cx="536262" cy="172167"/>
           </a:xfrm>
           <a:prstGeom prst="roundRect">
@@ -13942,7 +13729,7 @@
         </p:nvSpPr>
         <p:spPr>
           <a:xfrm>
-            <a:off x="4812407" y="5565467"/>
+            <a:off x="7074344" y="5565467"/>
             <a:ext cx="536262" cy="207879"/>
           </a:xfrm>
           <a:prstGeom prst="roundRect">
@@ -14049,42 +13836,42 @@
           <a:lstStyle/>
           <a:p>
             <a:r>
-              <a:rPr lang="en-US" altLang="ko-KR" dirty="0" smtClean="0"/>
+              <a:rPr lang="en-US" altLang="ko-KR" dirty="0"/>
               <a:t> Scalability Analysis</a:t>
             </a:r>
           </a:p>
           <a:p>
             <a:pPr lvl="1"/>
             <a:r>
-              <a:rPr lang="en-US" altLang="ko-KR" dirty="0" smtClean="0"/>
+              <a:rPr lang="en-US" altLang="ko-KR" dirty="0"/>
               <a:t>Evaluate the method with other baselines under Manhattan, 2500 signalized intersection</a:t>
             </a:r>
           </a:p>
           <a:p>
             <a:pPr lvl="1"/>
             <a:r>
-              <a:rPr lang="en-US" altLang="ko-KR" dirty="0" smtClean="0"/>
+              <a:rPr lang="en-US" altLang="ko-KR" dirty="0"/>
               <a:t>Compared to other methods, </a:t>
             </a:r>
             <a:r>
-              <a:rPr lang="en-US" altLang="ko-KR" dirty="0" err="1" smtClean="0"/>
+              <a:rPr lang="en-US" altLang="ko-KR" dirty="0" err="1"/>
               <a:t>MPLight</a:t>
             </a:r>
             <a:r>
-              <a:rPr lang="en-US" altLang="ko-KR" dirty="0" smtClean="0"/>
+              <a:rPr lang="en-US" altLang="ko-KR" dirty="0"/>
               <a:t> handle traffic signal more effectively and efficiently</a:t>
             </a:r>
           </a:p>
           <a:p>
             <a:r>
-              <a:rPr lang="en-US" altLang="ko-KR" dirty="0" smtClean="0"/>
-              <a:t> Impact of Pressure-based Design</a:t>
+              <a:rPr lang="en-US" altLang="ko-KR" dirty="0"/>
+              <a:t> Impact of Pressure-based Design(Manhattan)</a:t>
             </a:r>
           </a:p>
           <a:p>
             <a:pPr lvl="1"/>
             <a:r>
-              <a:rPr lang="en-US" altLang="ko-KR" dirty="0" smtClean="0"/>
+              <a:rPr lang="en-US" altLang="ko-KR" dirty="0"/>
               <a:t>Evaluate the performance of RL-based method with and without ‘pressure’.</a:t>
             </a:r>
           </a:p>
@@ -14184,7 +13971,7 @@
           <a:lstStyle/>
           <a:p>
             <a:r>
-              <a:rPr lang="en-US" altLang="ko-KR" dirty="0" smtClean="0"/>
+              <a:rPr lang="en-US" altLang="ko-KR" dirty="0"/>
               <a:t>Result &amp; Conclusion</a:t>
             </a:r>
             <a:endParaRPr lang="ko-KR" altLang="en-US" dirty="0"/>
@@ -14207,21 +13994,21 @@
           <a:lstStyle/>
           <a:p>
             <a:r>
-              <a:rPr lang="en-US" altLang="ko-KR" dirty="0" smtClean="0"/>
+              <a:rPr lang="en-US" altLang="ko-KR" dirty="0"/>
               <a:t> Impact of Parameter Sharing (Super Agent)</a:t>
             </a:r>
           </a:p>
           <a:p>
             <a:pPr lvl="1"/>
             <a:r>
-              <a:rPr lang="en-US" altLang="ko-KR" dirty="0" smtClean="0"/>
+              <a:rPr lang="en-US" altLang="ko-KR" dirty="0"/>
               <a:t>Parameter sharing enables our model to converge faster</a:t>
             </a:r>
             <a:br>
-              <a:rPr lang="en-US" altLang="ko-KR" dirty="0" smtClean="0"/>
+              <a:rPr lang="en-US" altLang="ko-KR" dirty="0"/>
             </a:br>
             <a:r>
-              <a:rPr lang="en-US" altLang="ko-KR" dirty="0" smtClean="0">
+              <a:rPr lang="en-US" altLang="ko-KR" dirty="0">
                 <a:sym typeface="Wingdings" panose="05000000000000000000" pitchFamily="2" charset="2"/>
               </a:rPr>
               <a:t> Effectiveness of parameter sharing </a:t>
@@ -14243,7 +14030,7 @@
           </a:p>
           <a:p>
             <a:r>
-              <a:rPr lang="en-US" altLang="ko-KR" dirty="0" smtClean="0">
+              <a:rPr lang="en-US" altLang="ko-KR" dirty="0">
                 <a:sym typeface="Wingdings" panose="05000000000000000000" pitchFamily="2" charset="2"/>
               </a:rPr>
               <a:t> Conclusion</a:t>
@@ -14252,10 +14039,38 @@
           <a:p>
             <a:pPr lvl="1"/>
             <a:r>
-              <a:rPr lang="en-US" altLang="ko-KR" dirty="0" smtClean="0">
+              <a:rPr lang="en-US" altLang="ko-KR" dirty="0">
                 <a:sym typeface="Wingdings" panose="05000000000000000000" pitchFamily="2" charset="2"/>
               </a:rPr>
               <a:t>Need more elaborate design for coordination and cooperation among neighboring intersection</a:t>
+            </a:r>
+            <a:br>
+              <a:rPr lang="en-US" altLang="ko-KR" dirty="0">
+                <a:sym typeface="Wingdings" panose="05000000000000000000" pitchFamily="2" charset="2"/>
+              </a:rPr>
+            </a:br>
+            <a:r>
+              <a:rPr lang="en-US" altLang="ko-KR" dirty="0">
+                <a:sym typeface="Wingdings" panose="05000000000000000000" pitchFamily="2" charset="2"/>
+              </a:rPr>
+              <a:t> </a:t>
+            </a:r>
+            <a:r>
+              <a:rPr lang="en-US" altLang="ko-KR" dirty="0" err="1">
+                <a:sym typeface="Wingdings" panose="05000000000000000000" pitchFamily="2" charset="2"/>
+              </a:rPr>
+              <a:t>MetaLight</a:t>
+            </a:r>
+            <a:br>
+              <a:rPr lang="en-US" altLang="ko-KR" dirty="0">
+                <a:sym typeface="Wingdings" panose="05000000000000000000" pitchFamily="2" charset="2"/>
+              </a:rPr>
+            </a:br>
+            <a:r>
+              <a:rPr lang="en-US" altLang="ko-KR" dirty="0">
+                <a:sym typeface="Wingdings" panose="05000000000000000000" pitchFamily="2" charset="2"/>
+              </a:rPr>
+              <a:t> Multi-agent learning</a:t>
             </a:r>
             <a:endParaRPr lang="ko-KR" altLang="en-US" dirty="0"/>
           </a:p>
@@ -14331,7 +14146,7 @@
           <a:lstStyle/>
           <a:p>
             <a:r>
-              <a:rPr lang="en-US" altLang="ko-KR" dirty="0" smtClean="0"/>
+              <a:rPr lang="en-US" altLang="ko-KR" dirty="0"/>
               <a:t>Preliminary</a:t>
             </a:r>
             <a:endParaRPr lang="ko-KR" altLang="en-US" dirty="0"/>
@@ -14354,80 +14169,80 @@
           <a:lstStyle/>
           <a:p>
             <a:r>
-              <a:rPr lang="en-US" altLang="ko-KR" dirty="0" smtClean="0"/>
+              <a:rPr lang="en-US" altLang="ko-KR" dirty="0"/>
               <a:t> TOD Control (Time of Day), Pre-time, Fix time</a:t>
             </a:r>
           </a:p>
           <a:p>
             <a:pPr lvl="1"/>
             <a:r>
-              <a:rPr lang="en-US" altLang="ko-KR" dirty="0" smtClean="0"/>
+              <a:rPr lang="en-US" altLang="ko-KR" dirty="0"/>
               <a:t>1</a:t>
             </a:r>
             <a:r>
-              <a:rPr lang="ko-KR" altLang="en-US" dirty="0" smtClean="0"/>
+              <a:rPr lang="ko-KR" altLang="en-US" dirty="0"/>
               <a:t>일 시간대 별로 사용자가 입력한 신호 시간에 따라 매일 반복하여 신호를 제어하는 것</a:t>
             </a:r>
-            <a:endParaRPr lang="en-US" altLang="ko-KR" dirty="0" smtClean="0"/>
+            <a:endParaRPr lang="en-US" altLang="ko-KR" dirty="0"/>
           </a:p>
           <a:p>
             <a:pPr lvl="1"/>
             <a:r>
-              <a:rPr lang="ko-KR" altLang="en-US" dirty="0" smtClean="0"/>
+              <a:rPr lang="ko-KR" altLang="en-US" dirty="0"/>
               <a:t>장점</a:t>
             </a:r>
             <a:r>
-              <a:rPr lang="en-US" altLang="ko-KR" dirty="0" smtClean="0"/>
+              <a:rPr lang="en-US" altLang="ko-KR" dirty="0"/>
               <a:t> </a:t>
             </a:r>
           </a:p>
           <a:p>
             <a:pPr lvl="2"/>
             <a:r>
-              <a:rPr lang="ko-KR" altLang="en-US" dirty="0" smtClean="0"/>
+              <a:rPr lang="ko-KR" altLang="en-US" dirty="0"/>
               <a:t>안정된 도로에서 효율이 높고</a:t>
             </a:r>
             <a:r>
-              <a:rPr lang="en-US" altLang="ko-KR" dirty="0" smtClean="0"/>
+              <a:rPr lang="en-US" altLang="ko-KR" dirty="0"/>
               <a:t>, </a:t>
             </a:r>
             <a:r>
-              <a:rPr lang="ko-KR" altLang="en-US" dirty="0" smtClean="0"/>
+              <a:rPr lang="ko-KR" altLang="en-US" dirty="0"/>
               <a:t>요일 별 혹은 일 별 교통 </a:t>
             </a:r>
             <a:r>
-              <a:rPr lang="ko-KR" altLang="en-US" dirty="0" err="1" smtClean="0"/>
+              <a:rPr lang="ko-KR" altLang="en-US" dirty="0" err="1"/>
               <a:t>변동량이</a:t>
             </a:r>
             <a:r>
-              <a:rPr lang="ko-KR" altLang="en-US" dirty="0" smtClean="0"/>
+              <a:rPr lang="ko-KR" altLang="en-US" dirty="0"/>
               <a:t> 적으면 효율적</a:t>
             </a:r>
-            <a:endParaRPr lang="en-US" altLang="ko-KR" dirty="0" smtClean="0"/>
+            <a:endParaRPr lang="en-US" altLang="ko-KR" dirty="0"/>
           </a:p>
           <a:p>
             <a:pPr lvl="1"/>
             <a:r>
-              <a:rPr lang="ko-KR" altLang="en-US" dirty="0" smtClean="0"/>
+              <a:rPr lang="ko-KR" altLang="en-US" dirty="0"/>
               <a:t>단점</a:t>
             </a:r>
-            <a:endParaRPr lang="en-US" altLang="ko-KR" dirty="0" smtClean="0"/>
+            <a:endParaRPr lang="en-US" altLang="ko-KR" dirty="0"/>
           </a:p>
           <a:p>
             <a:pPr lvl="2"/>
             <a:r>
-              <a:rPr lang="ko-KR" altLang="en-US" dirty="0" smtClean="0"/>
+              <a:rPr lang="ko-KR" altLang="en-US" dirty="0"/>
               <a:t>복잡한 도로에서 효율이 낮음</a:t>
             </a:r>
-            <a:endParaRPr lang="en-US" altLang="ko-KR" dirty="0" smtClean="0"/>
+            <a:endParaRPr lang="en-US" altLang="ko-KR" dirty="0"/>
           </a:p>
           <a:p>
             <a:pPr lvl="2"/>
             <a:r>
-              <a:rPr lang="ko-KR" altLang="en-US" dirty="0" smtClean="0"/>
+              <a:rPr lang="ko-KR" altLang="en-US" dirty="0"/>
               <a:t>사용자의 사전 조사 및 검증이 필요</a:t>
             </a:r>
-            <a:endParaRPr lang="en-US" altLang="ko-KR" dirty="0" smtClean="0"/>
+            <a:endParaRPr lang="en-US" altLang="ko-KR" dirty="0"/>
           </a:p>
           <a:p>
             <a:pPr lvl="1"/>
@@ -14436,58 +14251,58 @@
           <a:p>
             <a:pPr lvl="1"/>
             <a:r>
-              <a:rPr lang="ko-KR" altLang="en-US" dirty="0" smtClean="0"/>
+              <a:rPr lang="ko-KR" altLang="en-US" dirty="0"/>
               <a:t>적합 주기</a:t>
             </a:r>
             <a:r>
-              <a:rPr lang="en-US" altLang="ko-KR" dirty="0" smtClean="0"/>
+              <a:rPr lang="en-US" altLang="ko-KR" dirty="0"/>
               <a:t>, </a:t>
             </a:r>
             <a:r>
-              <a:rPr lang="ko-KR" altLang="en-US" dirty="0" smtClean="0"/>
+              <a:rPr lang="ko-KR" altLang="en-US" dirty="0"/>
               <a:t>녹색 시간</a:t>
             </a:r>
             <a:r>
-              <a:rPr lang="en-US" altLang="ko-KR" dirty="0" smtClean="0"/>
+              <a:rPr lang="en-US" altLang="ko-KR" dirty="0"/>
               <a:t>, Offset</a:t>
             </a:r>
             <a:r>
-              <a:rPr lang="ko-KR" altLang="en-US" dirty="0" smtClean="0"/>
+              <a:rPr lang="ko-KR" altLang="en-US" dirty="0"/>
               <a:t>을 준비한 후 설정된 신호 시간으로 운영</a:t>
             </a:r>
-            <a:endParaRPr lang="en-US" altLang="ko-KR" dirty="0" smtClean="0"/>
+            <a:endParaRPr lang="en-US" altLang="ko-KR" dirty="0"/>
           </a:p>
           <a:p>
             <a:pPr lvl="1"/>
             <a:r>
-              <a:rPr lang="ko-KR" altLang="en-US" dirty="0" smtClean="0"/>
+              <a:rPr lang="ko-KR" altLang="en-US" dirty="0"/>
               <a:t>가로 축</a:t>
             </a:r>
             <a:r>
-              <a:rPr lang="en-US" altLang="ko-KR" dirty="0" smtClean="0"/>
+              <a:rPr lang="en-US" altLang="ko-KR" dirty="0"/>
               <a:t>, </a:t>
             </a:r>
             <a:r>
-              <a:rPr lang="ko-KR" altLang="en-US" dirty="0" smtClean="0"/>
+              <a:rPr lang="ko-KR" altLang="en-US" dirty="0"/>
               <a:t>지역 별로 유사 교통 패턴을 갖는 경우 </a:t>
             </a:r>
             <a:r>
-              <a:rPr lang="en-US" altLang="ko-KR" dirty="0" smtClean="0"/>
+              <a:rPr lang="en-US" altLang="ko-KR" dirty="0"/>
               <a:t>‘</a:t>
             </a:r>
             <a:r>
-              <a:rPr lang="ko-KR" altLang="en-US" dirty="0" smtClean="0"/>
+              <a:rPr lang="ko-KR" altLang="en-US" dirty="0"/>
               <a:t>교차로 </a:t>
             </a:r>
             <a:r>
-              <a:rPr lang="en-US" altLang="ko-KR" dirty="0" smtClean="0"/>
+              <a:rPr lang="en-US" altLang="ko-KR" dirty="0"/>
               <a:t>group’ </a:t>
             </a:r>
             <a:r>
-              <a:rPr lang="ko-KR" altLang="en-US" dirty="0" smtClean="0"/>
+              <a:rPr lang="ko-KR" altLang="en-US" dirty="0"/>
               <a:t>편성</a:t>
             </a:r>
-            <a:endParaRPr lang="en-US" altLang="ko-KR" dirty="0" smtClean="0"/>
+            <a:endParaRPr lang="en-US" altLang="ko-KR" dirty="0"/>
           </a:p>
           <a:p>
             <a:pPr lvl="1"/>
@@ -14714,7 +14529,13 @@
       </p:grpSpPr>
       <p:sp>
         <p:nvSpPr>
-          <p:cNvPr id="2" name="제목 1"/>
+          <p:cNvPr id="2" name="제목 1">
+            <a:extLst>
+              <a:ext uri="{FF2B5EF4-FFF2-40B4-BE49-F238E27FC236}">
+                <a16:creationId xmlns:a16="http://schemas.microsoft.com/office/drawing/2014/main" id="{6AD560DC-09DC-4AA5-BDEE-80C5DB922B59}"/>
+              </a:ext>
+            </a:extLst>
+          </p:cNvPr>
           <p:cNvSpPr>
             <a:spLocks noGrp="1"/>
           </p:cNvSpPr>
@@ -14728,278 +14549,60 @@
           <a:lstStyle/>
           <a:p>
             <a:r>
+              <a:rPr lang="en-US" altLang="ko-KR" dirty="0"/>
+              <a:t>Comment</a:t>
+            </a:r>
+            <a:endParaRPr lang="ko-KR" altLang="en-US" dirty="0"/>
+          </a:p>
+        </p:txBody>
+      </p:sp>
+      <p:sp>
+        <p:nvSpPr>
+          <p:cNvPr id="3" name="내용 개체 틀 2">
+            <a:extLst>
+              <a:ext uri="{FF2B5EF4-FFF2-40B4-BE49-F238E27FC236}">
+                <a16:creationId xmlns:a16="http://schemas.microsoft.com/office/drawing/2014/main" id="{13E599D9-0AD1-4600-A03A-61887E617F21}"/>
+              </a:ext>
+            </a:extLst>
+          </p:cNvPr>
+          <p:cNvSpPr>
+            <a:spLocks noGrp="1"/>
+          </p:cNvSpPr>
+          <p:nvPr>
+            <p:ph idx="1"/>
+          </p:nvPr>
+        </p:nvSpPr>
+        <p:spPr/>
+        <p:txBody>
+          <a:bodyPr/>
+          <a:lstStyle/>
+          <a:p>
+            <a:r>
+              <a:rPr lang="en-US" altLang="ko-KR" dirty="0"/>
+              <a:t> Improvement Proposal</a:t>
+            </a:r>
+          </a:p>
+          <a:p>
+            <a:pPr lvl="1"/>
+            <a:r>
               <a:rPr lang="ko-KR" altLang="en-US" dirty="0"/>
-              <a:t>현재 </a:t>
-            </a:r>
-            <a:r>
-              <a:rPr lang="en-US" altLang="ko-KR" dirty="0"/>
-              <a:t>State</a:t>
-            </a:r>
+              <a:t>기존의 실험 구성</a:t>
+            </a:r>
+            <a:endParaRPr lang="en-US" altLang="ko-KR" dirty="0"/>
+          </a:p>
+          <a:p>
+            <a:pPr lvl="1"/>
             <a:r>
               <a:rPr lang="ko-KR" altLang="en-US" dirty="0"/>
-              <a:t>와 </a:t>
-            </a:r>
-            <a:r>
-              <a:rPr lang="en-US" altLang="ko-KR" dirty="0"/>
-              <a:t>Action, Reward </a:t>
-            </a:r>
-            <a:r>
-              <a:rPr lang="ko-KR" altLang="en-US" dirty="0"/>
-              <a:t>구성 방식</a:t>
-            </a:r>
-          </a:p>
-        </p:txBody>
-      </p:sp>
-      <p:sp>
-        <p:nvSpPr>
-          <p:cNvPr id="3" name="내용 개체 틀 2"/>
-          <p:cNvSpPr>
-            <a:spLocks noGrp="1"/>
-          </p:cNvSpPr>
-          <p:nvPr>
-            <p:ph idx="1"/>
-          </p:nvPr>
-        </p:nvSpPr>
-        <p:spPr>
-          <a:xfrm>
-            <a:off x="1097280" y="1845734"/>
-            <a:ext cx="10756364" cy="4023360"/>
-          </a:xfrm>
-        </p:spPr>
-        <p:txBody>
-          <a:bodyPr/>
-          <a:lstStyle/>
-          <a:p>
-            <a:r>
-              <a:rPr lang="ko-KR" altLang="en-US" dirty="0" smtClean="0"/>
-              <a:t> 공통 </a:t>
-            </a:r>
-            <a:r>
-              <a:rPr lang="ko-KR" altLang="en-US" dirty="0"/>
-              <a:t>주기</a:t>
-            </a:r>
-            <a:r>
-              <a:rPr lang="en-US" altLang="ko-KR" dirty="0"/>
-              <a:t>: 90s (time step: 90</a:t>
-            </a:r>
-            <a:r>
-              <a:rPr lang="ko-KR" altLang="en-US" dirty="0"/>
-              <a:t>초</a:t>
-            </a:r>
-            <a:r>
-              <a:rPr lang="en-US" altLang="ko-KR" dirty="0"/>
-              <a:t>)</a:t>
-            </a:r>
-            <a:br>
-              <a:rPr lang="en-US" altLang="ko-KR" dirty="0"/>
-            </a:br>
-            <a:r>
-              <a:rPr lang="en-US" altLang="ko-KR" dirty="0"/>
-              <a:t>- simulation Step: 1s</a:t>
-            </a:r>
-            <a:br>
-              <a:rPr lang="en-US" altLang="ko-KR" dirty="0"/>
-            </a:br>
-            <a:r>
-              <a:rPr lang="en-US" altLang="ko-KR" dirty="0"/>
-              <a:t>- target update</a:t>
-            </a:r>
-            <a:r>
-              <a:rPr lang="ko-KR" altLang="en-US" dirty="0"/>
-              <a:t>주기</a:t>
-            </a:r>
-            <a:r>
-              <a:rPr lang="en-US" altLang="ko-KR" dirty="0"/>
-              <a:t>: </a:t>
-            </a:r>
-            <a:r>
-              <a:rPr lang="ko-KR" altLang="en-US" dirty="0"/>
-              <a:t>매 </a:t>
-            </a:r>
-            <a:r>
-              <a:rPr lang="en-US" altLang="ko-KR" dirty="0"/>
-              <a:t>10 time step(900s)</a:t>
-            </a:r>
-          </a:p>
-          <a:p>
-            <a:r>
-              <a:rPr lang="en-US" altLang="ko-KR" dirty="0" smtClean="0"/>
-              <a:t> State</a:t>
-            </a:r>
-            <a:endParaRPr lang="en-US" altLang="ko-KR" dirty="0"/>
-          </a:p>
-          <a:p>
-            <a:pPr lvl="1"/>
-            <a:r>
-              <a:rPr lang="en-US" altLang="ko-KR" dirty="0"/>
-              <a:t>Junction B1, B2</a:t>
-            </a:r>
-            <a:r>
-              <a:rPr lang="ko-KR" altLang="en-US" dirty="0"/>
-              <a:t>의 </a:t>
-            </a:r>
-            <a:r>
-              <a:rPr lang="en-US" altLang="ko-KR" dirty="0"/>
-              <a:t>lane</a:t>
-            </a:r>
-            <a:r>
-              <a:rPr lang="ko-KR" altLang="en-US" dirty="0"/>
-              <a:t>별 정지한 차량의 수와 총 차량의 수 </a:t>
-            </a:r>
-            <a:r>
-              <a:rPr lang="en-US" altLang="ko-KR" dirty="0"/>
-              <a:t>(B1: 30lanes, B2:28lanes) </a:t>
-            </a:r>
-            <a:r>
-              <a:rPr lang="en-US" altLang="ko-KR" dirty="0">
-                <a:sym typeface="Wingdings" panose="05000000000000000000" pitchFamily="2" charset="2"/>
-              </a:rPr>
-              <a:t> Pressure Light</a:t>
-            </a:r>
-            <a:endParaRPr lang="en-US" altLang="ko-KR" dirty="0"/>
-          </a:p>
-          <a:p>
-            <a:pPr lvl="1"/>
-            <a:r>
-              <a:rPr lang="en-US" altLang="ko-KR" dirty="0" err="1"/>
-              <a:t>lightMatrix</a:t>
-            </a:r>
-            <a:r>
-              <a:rPr lang="en-US" altLang="ko-KR" dirty="0"/>
-              <a:t>: B1</a:t>
-            </a:r>
-            <a:r>
-              <a:rPr lang="ko-KR" altLang="en-US" dirty="0"/>
-              <a:t>과 </a:t>
-            </a:r>
-            <a:r>
-              <a:rPr lang="en-US" altLang="ko-KR" dirty="0"/>
-              <a:t>B2</a:t>
-            </a:r>
-            <a:r>
-              <a:rPr lang="ko-KR" altLang="en-US" dirty="0"/>
-              <a:t>의 </a:t>
-            </a:r>
-            <a:r>
-              <a:rPr lang="en-US" altLang="ko-KR" dirty="0"/>
-              <a:t>phase (3</a:t>
-            </a:r>
-            <a:r>
-              <a:rPr lang="ko-KR" altLang="en-US" dirty="0"/>
-              <a:t>초 </a:t>
-            </a:r>
-            <a:r>
-              <a:rPr lang="en-US" altLang="ko-KR" dirty="0"/>
-              <a:t>duration</a:t>
-            </a:r>
-            <a:r>
-              <a:rPr lang="ko-KR" altLang="en-US" dirty="0"/>
-              <a:t>을 가진 </a:t>
-            </a:r>
-            <a:r>
-              <a:rPr lang="en-US" altLang="ko-KR" dirty="0"/>
-              <a:t>phase data</a:t>
-            </a:r>
-            <a:r>
-              <a:rPr lang="ko-KR" altLang="en-US" dirty="0"/>
-              <a:t>가 </a:t>
-            </a:r>
-            <a:r>
-              <a:rPr lang="en-US" altLang="ko-KR" dirty="0"/>
-              <a:t>state</a:t>
-            </a:r>
-            <a:r>
-              <a:rPr lang="ko-KR" altLang="en-US" dirty="0"/>
-              <a:t>로 존재하지 않음</a:t>
-            </a:r>
-            <a:r>
-              <a:rPr lang="en-US" altLang="ko-KR" dirty="0"/>
-              <a:t>)</a:t>
-            </a:r>
-          </a:p>
-          <a:p>
-            <a:r>
-              <a:rPr lang="en-US" altLang="ko-KR" dirty="0" smtClean="0"/>
-              <a:t> Action </a:t>
-            </a:r>
-            <a:r>
-              <a:rPr lang="en-US" altLang="ko-KR" dirty="0"/>
-              <a:t/>
-            </a:r>
-            <a:br>
-              <a:rPr lang="en-US" altLang="ko-KR" dirty="0"/>
-            </a:br>
-            <a:r>
-              <a:rPr lang="en-US" altLang="ko-KR" dirty="0"/>
-              <a:t>- Junction B2</a:t>
-            </a:r>
-            <a:r>
-              <a:rPr lang="ko-KR" altLang="en-US" dirty="0"/>
-              <a:t>가 </a:t>
-            </a:r>
-            <a:r>
-              <a:rPr lang="en-US" altLang="ko-KR" dirty="0"/>
-              <a:t>Agent </a:t>
-            </a:r>
-            <a:r>
-              <a:rPr lang="en-US" altLang="ko-KR" dirty="0">
-                <a:sym typeface="Wingdings" panose="05000000000000000000" pitchFamily="2" charset="2"/>
-              </a:rPr>
-              <a:t> B2</a:t>
-            </a:r>
-            <a:r>
-              <a:rPr lang="ko-KR" altLang="en-US" dirty="0">
-                <a:sym typeface="Wingdings" panose="05000000000000000000" pitchFamily="2" charset="2"/>
-              </a:rPr>
-              <a:t>의 </a:t>
-            </a:r>
-            <a:r>
-              <a:rPr lang="en-US" altLang="ko-KR" dirty="0">
-                <a:sym typeface="Wingdings" panose="05000000000000000000" pitchFamily="2" charset="2"/>
-              </a:rPr>
-              <a:t>Phase Duration </a:t>
-            </a:r>
-            <a:r>
-              <a:rPr lang="ko-KR" altLang="en-US" dirty="0">
-                <a:sym typeface="Wingdings" panose="05000000000000000000" pitchFamily="2" charset="2"/>
-              </a:rPr>
-              <a:t>조정</a:t>
-            </a:r>
-            <a:endParaRPr lang="en-US" altLang="ko-KR" dirty="0"/>
-          </a:p>
-          <a:p>
-            <a:pPr lvl="1"/>
-            <a:r>
-              <a:rPr lang="en-US" altLang="ko-KR" dirty="0"/>
-              <a:t>phase1_duration: </a:t>
-            </a:r>
-            <a:r>
-              <a:rPr lang="en-US" altLang="ko-KR" dirty="0" err="1"/>
-              <a:t>GGGGGggrrrrrrrGGGGGggrrrrrrr</a:t>
-            </a:r>
-            <a:r>
-              <a:rPr lang="en-US" altLang="ko-KR" dirty="0"/>
-              <a:t> (Min: 20s, Max: 64s, yellow light:6s)</a:t>
-            </a:r>
-          </a:p>
-          <a:p>
-            <a:pPr lvl="1"/>
-            <a:r>
-              <a:rPr lang="en-US" altLang="ko-KR" dirty="0"/>
-              <a:t>phase2_duration: </a:t>
-            </a:r>
-            <a:r>
-              <a:rPr lang="en-US" altLang="ko-KR" dirty="0" err="1"/>
-              <a:t>GGGGGggrrrrrrrrGGGGGggrrrrrrrr</a:t>
-            </a:r>
-            <a:endParaRPr lang="en-US" altLang="ko-KR" dirty="0"/>
+              <a:t>논문과의 비교와 개선 </a:t>
+            </a:r>
           </a:p>
         </p:txBody>
       </p:sp>
     </p:spTree>
     <p:extLst>
       <p:ext uri="{BB962C8B-B14F-4D97-AF65-F5344CB8AC3E}">
-        <p14:creationId xmlns:p14="http://schemas.microsoft.com/office/powerpoint/2010/main" val="677275479"/>
+        <p14:creationId xmlns:p14="http://schemas.microsoft.com/office/powerpoint/2010/main" val="3180526755"/>
       </p:ext>
     </p:extLst>
   </p:cSld>
@@ -15074,6 +14677,311 @@
             <p:ph idx="1"/>
           </p:nvPr>
         </p:nvSpPr>
+        <p:spPr>
+          <a:xfrm>
+            <a:off x="1097280" y="1845734"/>
+            <a:ext cx="10756364" cy="4023360"/>
+          </a:xfrm>
+        </p:spPr>
+        <p:txBody>
+          <a:bodyPr/>
+          <a:lstStyle/>
+          <a:p>
+            <a:r>
+              <a:rPr lang="ko-KR" altLang="en-US" dirty="0"/>
+              <a:t> 공통 주기</a:t>
+            </a:r>
+            <a:r>
+              <a:rPr lang="en-US" altLang="ko-KR" dirty="0"/>
+              <a:t>: 90s (time step: 90</a:t>
+            </a:r>
+            <a:r>
+              <a:rPr lang="ko-KR" altLang="en-US" dirty="0"/>
+              <a:t>초</a:t>
+            </a:r>
+            <a:r>
+              <a:rPr lang="en-US" altLang="ko-KR" dirty="0"/>
+              <a:t>)</a:t>
+            </a:r>
+            <a:br>
+              <a:rPr lang="en-US" altLang="ko-KR" dirty="0"/>
+            </a:br>
+            <a:r>
+              <a:rPr lang="en-US" altLang="ko-KR" dirty="0"/>
+              <a:t>- simulation Step: 1s</a:t>
+            </a:r>
+            <a:br>
+              <a:rPr lang="en-US" altLang="ko-KR" dirty="0"/>
+            </a:br>
+            <a:r>
+              <a:rPr lang="en-US" altLang="ko-KR" dirty="0"/>
+              <a:t>- target update</a:t>
+            </a:r>
+            <a:r>
+              <a:rPr lang="ko-KR" altLang="en-US" dirty="0"/>
+              <a:t>주기</a:t>
+            </a:r>
+            <a:r>
+              <a:rPr lang="en-US" altLang="ko-KR" dirty="0"/>
+              <a:t>: </a:t>
+            </a:r>
+            <a:r>
+              <a:rPr lang="ko-KR" altLang="en-US" dirty="0"/>
+              <a:t>매 </a:t>
+            </a:r>
+            <a:r>
+              <a:rPr lang="en-US" altLang="ko-KR" dirty="0"/>
+              <a:t>10 time step(900s)</a:t>
+            </a:r>
+          </a:p>
+          <a:p>
+            <a:r>
+              <a:rPr lang="en-US" altLang="ko-KR" dirty="0"/>
+              <a:t> State</a:t>
+            </a:r>
+          </a:p>
+          <a:p>
+            <a:pPr lvl="1"/>
+            <a:r>
+              <a:rPr lang="en-US" altLang="ko-KR" dirty="0"/>
+              <a:t>Junction B1, B2</a:t>
+            </a:r>
+            <a:r>
+              <a:rPr lang="ko-KR" altLang="en-US" dirty="0"/>
+              <a:t>의 </a:t>
+            </a:r>
+            <a:r>
+              <a:rPr lang="en-US" altLang="ko-KR" dirty="0"/>
+              <a:t>lane</a:t>
+            </a:r>
+            <a:r>
+              <a:rPr lang="ko-KR" altLang="en-US" dirty="0"/>
+              <a:t>별 정지한 차량의 수와 총 차량의 수 </a:t>
+            </a:r>
+            <a:r>
+              <a:rPr lang="en-US" altLang="ko-KR" dirty="0"/>
+              <a:t>(B1: 30lanes, B2:28lanes) </a:t>
+            </a:r>
+            <a:r>
+              <a:rPr lang="en-US" altLang="ko-KR" dirty="0">
+                <a:sym typeface="Wingdings" panose="05000000000000000000" pitchFamily="2" charset="2"/>
+              </a:rPr>
+              <a:t> Pressure Light</a:t>
+            </a:r>
+            <a:endParaRPr lang="en-US" altLang="ko-KR" dirty="0"/>
+          </a:p>
+          <a:p>
+            <a:pPr lvl="1"/>
+            <a:r>
+              <a:rPr lang="en-US" altLang="ko-KR" dirty="0" err="1"/>
+              <a:t>lightMatrix</a:t>
+            </a:r>
+            <a:r>
+              <a:rPr lang="en-US" altLang="ko-KR" dirty="0"/>
+              <a:t>: B1</a:t>
+            </a:r>
+            <a:r>
+              <a:rPr lang="ko-KR" altLang="en-US" dirty="0"/>
+              <a:t>과 </a:t>
+            </a:r>
+            <a:r>
+              <a:rPr lang="en-US" altLang="ko-KR" dirty="0"/>
+              <a:t>B2</a:t>
+            </a:r>
+            <a:r>
+              <a:rPr lang="ko-KR" altLang="en-US" dirty="0"/>
+              <a:t>의 </a:t>
+            </a:r>
+            <a:r>
+              <a:rPr lang="en-US" altLang="ko-KR" dirty="0"/>
+              <a:t>phase (3</a:t>
+            </a:r>
+            <a:r>
+              <a:rPr lang="ko-KR" altLang="en-US" dirty="0"/>
+              <a:t>초 </a:t>
+            </a:r>
+            <a:r>
+              <a:rPr lang="en-US" altLang="ko-KR" dirty="0"/>
+              <a:t>duration</a:t>
+            </a:r>
+            <a:r>
+              <a:rPr lang="ko-KR" altLang="en-US" dirty="0"/>
+              <a:t>을 가진 </a:t>
+            </a:r>
+            <a:r>
+              <a:rPr lang="en-US" altLang="ko-KR" dirty="0"/>
+              <a:t>phase data</a:t>
+            </a:r>
+            <a:r>
+              <a:rPr lang="ko-KR" altLang="en-US" dirty="0"/>
+              <a:t>가 </a:t>
+            </a:r>
+            <a:r>
+              <a:rPr lang="en-US" altLang="ko-KR" dirty="0"/>
+              <a:t>state</a:t>
+            </a:r>
+            <a:r>
+              <a:rPr lang="ko-KR" altLang="en-US" dirty="0"/>
+              <a:t>로 존재하지 않음</a:t>
+            </a:r>
+            <a:r>
+              <a:rPr lang="en-US" altLang="ko-KR" dirty="0"/>
+              <a:t>)</a:t>
+            </a:r>
+          </a:p>
+          <a:p>
+            <a:r>
+              <a:rPr lang="en-US" altLang="ko-KR" dirty="0"/>
+              <a:t> Action </a:t>
+            </a:r>
+            <a:br>
+              <a:rPr lang="en-US" altLang="ko-KR" dirty="0"/>
+            </a:br>
+            <a:r>
+              <a:rPr lang="en-US" altLang="ko-KR" dirty="0"/>
+              <a:t>- Junction B2</a:t>
+            </a:r>
+            <a:r>
+              <a:rPr lang="ko-KR" altLang="en-US" dirty="0"/>
+              <a:t>가 </a:t>
+            </a:r>
+            <a:r>
+              <a:rPr lang="en-US" altLang="ko-KR" dirty="0"/>
+              <a:t>Agent </a:t>
+            </a:r>
+            <a:r>
+              <a:rPr lang="en-US" altLang="ko-KR" dirty="0">
+                <a:sym typeface="Wingdings" panose="05000000000000000000" pitchFamily="2" charset="2"/>
+              </a:rPr>
+              <a:t> B2</a:t>
+            </a:r>
+            <a:r>
+              <a:rPr lang="ko-KR" altLang="en-US" dirty="0">
+                <a:sym typeface="Wingdings" panose="05000000000000000000" pitchFamily="2" charset="2"/>
+              </a:rPr>
+              <a:t>의 </a:t>
+            </a:r>
+            <a:r>
+              <a:rPr lang="en-US" altLang="ko-KR" dirty="0">
+                <a:sym typeface="Wingdings" panose="05000000000000000000" pitchFamily="2" charset="2"/>
+              </a:rPr>
+              <a:t>Phase Duration </a:t>
+            </a:r>
+            <a:r>
+              <a:rPr lang="ko-KR" altLang="en-US" dirty="0">
+                <a:sym typeface="Wingdings" panose="05000000000000000000" pitchFamily="2" charset="2"/>
+              </a:rPr>
+              <a:t>조정</a:t>
+            </a:r>
+            <a:endParaRPr lang="en-US" altLang="ko-KR" dirty="0"/>
+          </a:p>
+          <a:p>
+            <a:pPr lvl="1"/>
+            <a:r>
+              <a:rPr lang="en-US" altLang="ko-KR" dirty="0"/>
+              <a:t>phase1_duration: </a:t>
+            </a:r>
+            <a:r>
+              <a:rPr lang="en-US" altLang="ko-KR" dirty="0" err="1"/>
+              <a:t>GGGGGggrrrrrrrGGGGGggrrrrrrr</a:t>
+            </a:r>
+            <a:r>
+              <a:rPr lang="en-US" altLang="ko-KR" dirty="0"/>
+              <a:t> (Min: 20s, Max: 64s, yellow light:6s)</a:t>
+            </a:r>
+          </a:p>
+          <a:p>
+            <a:pPr lvl="1"/>
+            <a:r>
+              <a:rPr lang="en-US" altLang="ko-KR" dirty="0"/>
+              <a:t>phase2_duration: </a:t>
+            </a:r>
+            <a:r>
+              <a:rPr lang="en-US" altLang="ko-KR" dirty="0" err="1"/>
+              <a:t>GGGGGggrrrrrrrrGGGGGggrrrrrrrr</a:t>
+            </a:r>
+            <a:endParaRPr lang="en-US" altLang="ko-KR" dirty="0"/>
+          </a:p>
+        </p:txBody>
+      </p:sp>
+    </p:spTree>
+    <p:extLst>
+      <p:ext uri="{BB962C8B-B14F-4D97-AF65-F5344CB8AC3E}">
+        <p14:creationId xmlns:p14="http://schemas.microsoft.com/office/powerpoint/2010/main" val="677275479"/>
+      </p:ext>
+    </p:extLst>
+  </p:cSld>
+  <p:clrMapOvr>
+    <a:masterClrMapping/>
+  </p:clrMapOvr>
+</p:sld>
+</file>
+
+<file path=ppt/slides/slide32.xml><?xml version="1.0" encoding="utf-8"?>
+<p:sld xmlns:a="http://schemas.openxmlformats.org/drawingml/2006/main" xmlns:r="http://schemas.openxmlformats.org/officeDocument/2006/relationships" xmlns:p="http://schemas.openxmlformats.org/presentationml/2006/main">
+  <p:cSld>
+    <p:spTree>
+      <p:nvGrpSpPr>
+        <p:cNvPr id="1" name=""/>
+        <p:cNvGrpSpPr/>
+        <p:nvPr/>
+      </p:nvGrpSpPr>
+      <p:grpSpPr>
+        <a:xfrm>
+          <a:off x="0" y="0"/>
+          <a:ext cx="0" cy="0"/>
+          <a:chOff x="0" y="0"/>
+          <a:chExt cx="0" cy="0"/>
+        </a:xfrm>
+      </p:grpSpPr>
+      <p:sp>
+        <p:nvSpPr>
+          <p:cNvPr id="2" name="제목 1"/>
+          <p:cNvSpPr>
+            <a:spLocks noGrp="1"/>
+          </p:cNvSpPr>
+          <p:nvPr>
+            <p:ph type="title"/>
+          </p:nvPr>
+        </p:nvSpPr>
+        <p:spPr/>
+        <p:txBody>
+          <a:bodyPr/>
+          <a:lstStyle/>
+          <a:p>
+            <a:r>
+              <a:rPr lang="ko-KR" altLang="en-US" dirty="0"/>
+              <a:t>현재 </a:t>
+            </a:r>
+            <a:r>
+              <a:rPr lang="en-US" altLang="ko-KR" dirty="0"/>
+              <a:t>State</a:t>
+            </a:r>
+            <a:r>
+              <a:rPr lang="ko-KR" altLang="en-US" dirty="0"/>
+              <a:t>와 </a:t>
+            </a:r>
+            <a:r>
+              <a:rPr lang="en-US" altLang="ko-KR" dirty="0"/>
+              <a:t>Action, Reward </a:t>
+            </a:r>
+            <a:r>
+              <a:rPr lang="ko-KR" altLang="en-US" dirty="0"/>
+              <a:t>구성 방식</a:t>
+            </a:r>
+          </a:p>
+        </p:txBody>
+      </p:sp>
+      <p:sp>
+        <p:nvSpPr>
+          <p:cNvPr id="3" name="내용 개체 틀 2"/>
+          <p:cNvSpPr>
+            <a:spLocks noGrp="1"/>
+          </p:cNvSpPr>
+          <p:nvPr>
+            <p:ph idx="1"/>
+          </p:nvPr>
+        </p:nvSpPr>
         <p:spPr/>
         <p:txBody>
           <a:bodyPr/>
@@ -15138,10 +15046,6 @@
             <a:r>
               <a:rPr lang="ko-KR" altLang="en-US" dirty="0"/>
               <a:t>차량 수 </a:t>
-            </a:r>
-            <a:r>
-              <a:rPr lang="en-US" altLang="ko-KR" dirty="0"/>
-              <a:t/>
             </a:r>
             <a:br>
               <a:rPr lang="en-US" altLang="ko-KR" dirty="0"/>
@@ -15419,398 +15323,6 @@
 </p:sld>
 </file>
 
-<file path=ppt/slides/slide32.xml><?xml version="1.0" encoding="utf-8"?>
-<p:sld xmlns:a="http://schemas.openxmlformats.org/drawingml/2006/main" xmlns:r="http://schemas.openxmlformats.org/officeDocument/2006/relationships" xmlns:p="http://schemas.openxmlformats.org/presentationml/2006/main">
-  <p:cSld>
-    <p:spTree>
-      <p:nvGrpSpPr>
-        <p:cNvPr id="1" name=""/>
-        <p:cNvGrpSpPr/>
-        <p:nvPr/>
-      </p:nvGrpSpPr>
-      <p:grpSpPr>
-        <a:xfrm>
-          <a:off x="0" y="0"/>
-          <a:ext cx="0" cy="0"/>
-          <a:chOff x="0" y="0"/>
-          <a:chExt cx="0" cy="0"/>
-        </a:xfrm>
-      </p:grpSpPr>
-      <p:sp>
-        <p:nvSpPr>
-          <p:cNvPr id="2" name="제목 1"/>
-          <p:cNvSpPr>
-            <a:spLocks noGrp="1"/>
-          </p:cNvSpPr>
-          <p:nvPr>
-            <p:ph type="title"/>
-          </p:nvPr>
-        </p:nvSpPr>
-        <p:spPr/>
-        <p:txBody>
-          <a:bodyPr/>
-          <a:lstStyle/>
-          <a:p>
-            <a:r>
-              <a:rPr lang="en-US" altLang="ko-KR" dirty="0"/>
-              <a:t>Training </a:t>
-            </a:r>
-            <a:r>
-              <a:rPr lang="ko-KR" altLang="en-US" dirty="0"/>
-              <a:t>구성 방식 제안</a:t>
-            </a:r>
-          </a:p>
-        </p:txBody>
-      </p:sp>
-      <p:sp>
-        <p:nvSpPr>
-          <p:cNvPr id="3" name="내용 개체 틀 2"/>
-          <p:cNvSpPr>
-            <a:spLocks noGrp="1"/>
-          </p:cNvSpPr>
-          <p:nvPr>
-            <p:ph idx="1"/>
-          </p:nvPr>
-        </p:nvSpPr>
-        <p:spPr/>
-        <p:txBody>
-          <a:bodyPr>
-            <a:normAutofit/>
-          </a:bodyPr>
-          <a:lstStyle/>
-          <a:p>
-            <a:pPr>
-              <a:lnSpc>
-                <a:spcPct val="120000"/>
-              </a:lnSpc>
-            </a:pPr>
-            <a:r>
-              <a:rPr lang="ko-KR" altLang="en-US" dirty="0" smtClean="0"/>
-              <a:t> 매 </a:t>
-            </a:r>
-            <a:r>
-              <a:rPr lang="en-US" altLang="ko-KR" dirty="0"/>
-              <a:t>epoch</a:t>
-            </a:r>
-            <a:r>
-              <a:rPr lang="ko-KR" altLang="en-US" dirty="0"/>
-              <a:t>당 </a:t>
-            </a:r>
-            <a:r>
-              <a:rPr lang="en-US" altLang="ko-KR" dirty="0"/>
-              <a:t>Learning Start Time</a:t>
-            </a:r>
-            <a:br>
-              <a:rPr lang="en-US" altLang="ko-KR" dirty="0"/>
-            </a:br>
-            <a:r>
-              <a:rPr lang="en-US" altLang="ko-KR" dirty="0"/>
-              <a:t>- </a:t>
-            </a:r>
-            <a:r>
-              <a:rPr lang="ko-KR" altLang="en-US" dirty="0"/>
-              <a:t>시작하자 마자 차량이 자리잡기 전의 데이터는 일반적이지 않음</a:t>
-            </a:r>
-            <a:endParaRPr lang="en-US" altLang="ko-KR" dirty="0"/>
-          </a:p>
-          <a:p>
-            <a:pPr>
-              <a:lnSpc>
-                <a:spcPct val="120000"/>
-              </a:lnSpc>
-            </a:pPr>
-            <a:r>
-              <a:rPr lang="en-US" altLang="ko-KR" dirty="0" smtClean="0"/>
-              <a:t> Learning </a:t>
-            </a:r>
-            <a:r>
-              <a:rPr lang="en-US" altLang="ko-KR" dirty="0"/>
-              <a:t>Start Epoch </a:t>
-            </a:r>
-            <a:r>
-              <a:rPr lang="ko-KR" altLang="en-US" dirty="0"/>
-              <a:t>지정 </a:t>
-            </a:r>
-            <a:r>
-              <a:rPr lang="en-US" altLang="ko-KR" dirty="0"/>
-              <a:t>(</a:t>
-            </a:r>
-            <a:r>
-              <a:rPr lang="ko-KR" altLang="en-US" dirty="0"/>
-              <a:t>현재 </a:t>
-            </a:r>
-            <a:r>
-              <a:rPr lang="en-US" altLang="ko-KR" dirty="0"/>
-              <a:t>1epoch</a:t>
-            </a:r>
-            <a:r>
-              <a:rPr lang="ko-KR" altLang="en-US" dirty="0"/>
-              <a:t>당 </a:t>
-            </a:r>
-            <a:r>
-              <a:rPr lang="en-US" altLang="ko-KR" dirty="0"/>
-              <a:t>90</a:t>
-            </a:r>
-            <a:r>
-              <a:rPr lang="ko-KR" altLang="en-US" dirty="0"/>
-              <a:t>개 </a:t>
-            </a:r>
-            <a:r>
-              <a:rPr lang="en-US" altLang="ko-KR" dirty="0"/>
-              <a:t>state</a:t>
-            </a:r>
-            <a:r>
-              <a:rPr lang="ko-KR" altLang="en-US" dirty="0"/>
-              <a:t>가 </a:t>
-            </a:r>
-            <a:r>
-              <a:rPr lang="en-US" altLang="ko-KR" dirty="0"/>
-              <a:t>replay</a:t>
-            </a:r>
-            <a:r>
-              <a:rPr lang="ko-KR" altLang="en-US" dirty="0"/>
-              <a:t>에 저장</a:t>
-            </a:r>
-            <a:r>
-              <a:rPr lang="en-US" altLang="ko-KR" dirty="0"/>
-              <a:t>) </a:t>
-            </a:r>
-            <a:br>
-              <a:rPr lang="en-US" altLang="ko-KR" dirty="0"/>
-            </a:br>
-            <a:r>
-              <a:rPr lang="ko-KR" altLang="en-US" dirty="0"/>
-              <a:t>現 </a:t>
-            </a:r>
-            <a:r>
-              <a:rPr lang="en-US" altLang="ko-KR" dirty="0"/>
-              <a:t>replay: 40 </a:t>
-            </a:r>
-            <a:r>
-              <a:rPr lang="ko-KR" altLang="en-US" dirty="0"/>
-              <a:t>부터 </a:t>
-            </a:r>
-            <a:r>
-              <a:rPr lang="en-US" altLang="ko-KR" dirty="0"/>
-              <a:t>target update </a:t>
-            </a:r>
-            <a:r>
-              <a:rPr lang="en-US" altLang="ko-KR" dirty="0">
-                <a:sym typeface="Wingdings" panose="05000000000000000000" pitchFamily="2" charset="2"/>
-              </a:rPr>
-              <a:t> </a:t>
-            </a:r>
-            <a:r>
-              <a:rPr lang="ko-KR" altLang="en-US" dirty="0">
-                <a:sym typeface="Wingdings" panose="05000000000000000000" pitchFamily="2" charset="2"/>
-              </a:rPr>
-              <a:t>초반 학습의 </a:t>
-            </a:r>
-            <a:r>
-              <a:rPr lang="en-US" altLang="ko-KR" dirty="0">
-                <a:sym typeface="Wingdings" panose="05000000000000000000" pitchFamily="2" charset="2"/>
-              </a:rPr>
-              <a:t>Correlation </a:t>
-            </a:r>
-            <a:r>
-              <a:rPr lang="ko-KR" altLang="en-US" dirty="0">
-                <a:sym typeface="Wingdings" panose="05000000000000000000" pitchFamily="2" charset="2"/>
-              </a:rPr>
-              <a:t>높음</a:t>
-            </a:r>
-            <a:endParaRPr lang="en-US" altLang="ko-KR" dirty="0">
-              <a:sym typeface="Wingdings" panose="05000000000000000000" pitchFamily="2" charset="2"/>
-            </a:endParaRPr>
-          </a:p>
-          <a:p>
-            <a:pPr lvl="1">
-              <a:lnSpc>
-                <a:spcPct val="120000"/>
-              </a:lnSpc>
-            </a:pPr>
-            <a:r>
-              <a:rPr lang="en-US" altLang="ko-KR" dirty="0">
-                <a:sym typeface="Wingdings" panose="05000000000000000000" pitchFamily="2" charset="2"/>
-              </a:rPr>
-              <a:t> Learning Start </a:t>
-            </a:r>
-            <a:r>
-              <a:rPr lang="ko-KR" altLang="en-US" dirty="0">
-                <a:sym typeface="Wingdings" panose="05000000000000000000" pitchFamily="2" charset="2"/>
-              </a:rPr>
-              <a:t>하는</a:t>
-            </a:r>
-            <a:r>
-              <a:rPr lang="en-US" altLang="ko-KR" dirty="0">
-                <a:sym typeface="Wingdings" panose="05000000000000000000" pitchFamily="2" charset="2"/>
-              </a:rPr>
-              <a:t> Epoch</a:t>
-            </a:r>
-            <a:r>
-              <a:rPr lang="ko-KR" altLang="en-US" dirty="0">
-                <a:sym typeface="Wingdings" panose="05000000000000000000" pitchFamily="2" charset="2"/>
-              </a:rPr>
-              <a:t>를</a:t>
-            </a:r>
-            <a:r>
-              <a:rPr lang="en-US" altLang="ko-KR" dirty="0">
-                <a:sym typeface="Wingdings" panose="05000000000000000000" pitchFamily="2" charset="2"/>
-              </a:rPr>
-              <a:t> 4</a:t>
-            </a:r>
-            <a:r>
-              <a:rPr lang="ko-KR" altLang="en-US" dirty="0">
-                <a:sym typeface="Wingdings" panose="05000000000000000000" pitchFamily="2" charset="2"/>
-              </a:rPr>
-              <a:t>이상</a:t>
-            </a:r>
-            <a:endParaRPr lang="en-US" altLang="ko-KR" dirty="0">
-              <a:sym typeface="Wingdings" panose="05000000000000000000" pitchFamily="2" charset="2"/>
-            </a:endParaRPr>
-          </a:p>
-          <a:p>
-            <a:pPr lvl="1">
-              <a:lnSpc>
-                <a:spcPct val="120000"/>
-              </a:lnSpc>
-            </a:pPr>
-            <a:r>
-              <a:rPr lang="en-US" altLang="ko-KR" dirty="0">
-                <a:sym typeface="Wingdings" panose="05000000000000000000" pitchFamily="2" charset="2"/>
-              </a:rPr>
-              <a:t> time step</a:t>
-            </a:r>
-            <a:r>
-              <a:rPr lang="ko-KR" altLang="en-US" dirty="0">
-                <a:sym typeface="Wingdings" panose="05000000000000000000" pitchFamily="2" charset="2"/>
-              </a:rPr>
-              <a:t>을 세분화 </a:t>
-            </a:r>
-            <a:r>
-              <a:rPr lang="en-US" altLang="ko-KR" dirty="0">
-                <a:sym typeface="Wingdings" panose="05000000000000000000" pitchFamily="2" charset="2"/>
-              </a:rPr>
-              <a:t>Action </a:t>
-            </a:r>
-            <a:r>
-              <a:rPr lang="ko-KR" altLang="en-US" dirty="0">
-                <a:sym typeface="Wingdings" panose="05000000000000000000" pitchFamily="2" charset="2"/>
-              </a:rPr>
-              <a:t>형태 변화 필요</a:t>
-            </a:r>
-            <a:endParaRPr lang="en-US" altLang="ko-KR" dirty="0">
-              <a:sym typeface="Wingdings" panose="05000000000000000000" pitchFamily="2" charset="2"/>
-            </a:endParaRPr>
-          </a:p>
-          <a:p>
-            <a:pPr lvl="1">
-              <a:lnSpc>
-                <a:spcPct val="120000"/>
-              </a:lnSpc>
-            </a:pPr>
-            <a:r>
-              <a:rPr lang="en-US" altLang="ko-KR" dirty="0">
-                <a:sym typeface="Wingdings" panose="05000000000000000000" pitchFamily="2" charset="2"/>
-              </a:rPr>
-              <a:t> Epoch </a:t>
-            </a:r>
-            <a:r>
-              <a:rPr lang="ko-KR" altLang="en-US" dirty="0">
-                <a:sym typeface="Wingdings" panose="05000000000000000000" pitchFamily="2" charset="2"/>
-              </a:rPr>
-              <a:t>길이 길게 </a:t>
-            </a:r>
-            <a:r>
-              <a:rPr lang="en-US" altLang="ko-KR" dirty="0">
-                <a:sym typeface="Wingdings" panose="05000000000000000000" pitchFamily="2" charset="2"/>
-              </a:rPr>
-              <a:t>(</a:t>
-            </a:r>
-            <a:r>
-              <a:rPr lang="ko-KR" altLang="en-US" dirty="0">
-                <a:sym typeface="Wingdings" panose="05000000000000000000" pitchFamily="2" charset="2"/>
-              </a:rPr>
-              <a:t>現</a:t>
-            </a:r>
-            <a:r>
-              <a:rPr lang="en-US" altLang="ko-KR" dirty="0">
-                <a:sym typeface="Wingdings" panose="05000000000000000000" pitchFamily="2" charset="2"/>
-              </a:rPr>
-              <a:t>:10000s/epoch -&gt; 27000s/epoch</a:t>
-            </a:r>
-            <a:r>
-              <a:rPr lang="ko-KR" altLang="en-US" dirty="0">
-                <a:sym typeface="Wingdings" panose="05000000000000000000" pitchFamily="2" charset="2"/>
-              </a:rPr>
-              <a:t>이상</a:t>
-            </a:r>
-            <a:r>
-              <a:rPr lang="en-US" altLang="ko-KR" dirty="0">
-                <a:sym typeface="Wingdings" panose="05000000000000000000" pitchFamily="2" charset="2"/>
-              </a:rPr>
-              <a:t>)</a:t>
-            </a:r>
-          </a:p>
-          <a:p>
-            <a:pPr>
-              <a:lnSpc>
-                <a:spcPct val="120000"/>
-              </a:lnSpc>
-            </a:pPr>
-            <a:r>
-              <a:rPr lang="en-US" altLang="ko-KR" dirty="0">
-                <a:sym typeface="Wingdings" panose="05000000000000000000" pitchFamily="2" charset="2"/>
-              </a:rPr>
-              <a:t> Learning </a:t>
-            </a:r>
-            <a:r>
-              <a:rPr lang="ko-KR" altLang="en-US" dirty="0">
-                <a:sym typeface="Wingdings" panose="05000000000000000000" pitchFamily="2" charset="2"/>
-              </a:rPr>
-              <a:t>에서 </a:t>
-            </a:r>
-            <a:r>
-              <a:rPr lang="en-US" altLang="ko-KR" dirty="0">
-                <a:sym typeface="Wingdings" panose="05000000000000000000" pitchFamily="2" charset="2"/>
-              </a:rPr>
-              <a:t>augmentation(</a:t>
-            </a:r>
-            <a:r>
-              <a:rPr lang="ko-KR" altLang="en-US" dirty="0">
-                <a:sym typeface="Wingdings" panose="05000000000000000000" pitchFamily="2" charset="2"/>
-              </a:rPr>
-              <a:t>각 교차로에 대해서</a:t>
-            </a:r>
-            <a:r>
-              <a:rPr lang="en-US" altLang="ko-KR" dirty="0">
-                <a:sym typeface="Wingdings" panose="05000000000000000000" pitchFamily="2" charset="2"/>
-              </a:rPr>
-              <a:t>)</a:t>
-            </a:r>
-          </a:p>
-          <a:p>
-            <a:pPr>
-              <a:lnSpc>
-                <a:spcPct val="120000"/>
-              </a:lnSpc>
-            </a:pPr>
-            <a:endParaRPr lang="ko-KR" altLang="en-US" dirty="0"/>
-          </a:p>
-        </p:txBody>
-      </p:sp>
-    </p:spTree>
-    <p:extLst>
-      <p:ext uri="{BB962C8B-B14F-4D97-AF65-F5344CB8AC3E}">
-        <p14:creationId xmlns:p14="http://schemas.microsoft.com/office/powerpoint/2010/main" val="1873075976"/>
-      </p:ext>
-    </p:extLst>
-  </p:cSld>
-  <p:clrMapOvr>
-    <a:masterClrMapping/>
-  </p:clrMapOvr>
-</p:sld>
-</file>
-
 <file path=ppt/slides/slide33.xml><?xml version="1.0" encoding="utf-8"?>
 <p:sld xmlns:a="http://schemas.openxmlformats.org/drawingml/2006/main" xmlns:r="http://schemas.openxmlformats.org/officeDocument/2006/relationships" xmlns:p="http://schemas.openxmlformats.org/presentationml/2006/main">
   <p:cSld>
@@ -15866,106 +15378,82 @@
         </p:nvSpPr>
         <p:spPr/>
         <p:txBody>
-          <a:bodyPr/>
-          <a:lstStyle/>
-          <a:p>
-            <a:r>
-              <a:rPr lang="en-US" altLang="ko-KR" dirty="0"/>
-              <a:t> </a:t>
-            </a:r>
+          <a:bodyPr>
+            <a:normAutofit/>
+          </a:bodyPr>
+          <a:lstStyle/>
+          <a:p>
+            <a:pPr>
+              <a:lnSpc>
+                <a:spcPct val="120000"/>
+              </a:lnSpc>
+            </a:pPr>
             <a:r>
               <a:rPr lang="ko-KR" altLang="en-US" dirty="0"/>
-              <a:t>차량 진입로를 줄이는 대신에 차량의 </a:t>
-            </a:r>
-            <a:r>
-              <a:rPr lang="en-US" altLang="ko-KR" dirty="0"/>
-              <a:t>Random</a:t>
+              <a:t> 매 </a:t>
+            </a:r>
+            <a:r>
+              <a:rPr lang="en-US" altLang="ko-KR" dirty="0"/>
+              <a:t>epoch</a:t>
             </a:r>
             <a:r>
               <a:rPr lang="ko-KR" altLang="en-US" dirty="0"/>
-              <a:t>성을 주는 </a:t>
-            </a:r>
-            <a:r>
-              <a:rPr lang="en-US" altLang="ko-KR" dirty="0"/>
-              <a:t>IDM controller</a:t>
+              <a:t>당 </a:t>
+            </a:r>
+            <a:r>
+              <a:rPr lang="en-US" altLang="ko-KR" dirty="0"/>
+              <a:t>Learning Start Time </a:t>
             </a:r>
             <a:r>
               <a:rPr lang="ko-KR" altLang="en-US" dirty="0"/>
-              <a:t>와 가속도 분산 갖게 해서 차이를 줌</a:t>
+              <a:t>뒤로</a:t>
+            </a:r>
+            <a:br>
+              <a:rPr lang="en-US" altLang="ko-KR" dirty="0"/>
+            </a:br>
+            <a:r>
+              <a:rPr lang="en-US" altLang="ko-KR" dirty="0"/>
+              <a:t>- </a:t>
+            </a:r>
+            <a:r>
+              <a:rPr lang="ko-KR" altLang="en-US" dirty="0"/>
+              <a:t>시작하자 마자 차량이 자리잡기 전의 데이터는 일반적이지 않음</a:t>
             </a:r>
             <a:endParaRPr lang="en-US" altLang="ko-KR" dirty="0"/>
           </a:p>
           <a:p>
-            <a:r>
-              <a:rPr lang="en-US" altLang="ko-KR" dirty="0"/>
-              <a:t> phase</a:t>
+            <a:pPr>
+              <a:lnSpc>
+                <a:spcPct val="120000"/>
+              </a:lnSpc>
+            </a:pPr>
+            <a:r>
+              <a:rPr lang="en-US" altLang="ko-KR" dirty="0"/>
+              <a:t> Learning Start Epoch </a:t>
             </a:r>
             <a:r>
               <a:rPr lang="ko-KR" altLang="en-US" dirty="0"/>
-              <a:t>를 변화하는 </a:t>
-            </a:r>
-            <a:r>
-              <a:rPr lang="en-US" altLang="ko-KR" dirty="0"/>
-              <a:t>action</a:t>
+              <a:t>지정 </a:t>
+            </a:r>
+            <a:r>
+              <a:rPr lang="en-US" altLang="ko-KR" dirty="0"/>
+              <a:t>(</a:t>
             </a:r>
             <a:r>
               <a:rPr lang="ko-KR" altLang="en-US" dirty="0"/>
-              <a:t>이 아닌 </a:t>
-            </a:r>
-            <a:r>
-              <a:rPr lang="en-US" altLang="ko-KR" dirty="0"/>
-              <a:t>phase</a:t>
+              <a:t>현재 </a:t>
+            </a:r>
+            <a:r>
+              <a:rPr lang="en-US" altLang="ko-KR" dirty="0"/>
+              <a:t>1epoch</a:t>
             </a:r>
             <a:r>
               <a:rPr lang="ko-KR" altLang="en-US" dirty="0"/>
-              <a:t>를 선택하게 하고 최소 시간은 </a:t>
-            </a:r>
-            <a:r>
-              <a:rPr lang="en-US" altLang="ko-KR" dirty="0"/>
-              <a:t>20</a:t>
-            </a:r>
-            <a:r>
-              <a:rPr lang="ko-KR" altLang="en-US" dirty="0"/>
-              <a:t>초로 하되</a:t>
-            </a:r>
-            <a:r>
-              <a:rPr lang="en-US" altLang="ko-KR" dirty="0"/>
-              <a:t>, </a:t>
-            </a:r>
-            <a:r>
-              <a:rPr lang="ko-KR" altLang="en-US" dirty="0"/>
-              <a:t>최대 이상에서는 엄청난 </a:t>
-            </a:r>
-            <a:r>
-              <a:rPr lang="en-US" altLang="ko-KR" dirty="0"/>
-              <a:t>penalty</a:t>
-            </a:r>
-            <a:r>
-              <a:rPr lang="ko-KR" altLang="en-US" dirty="0"/>
-              <a:t>를 </a:t>
-            </a:r>
-            <a:r>
-              <a:rPr lang="ko-KR" altLang="en-US" dirty="0" err="1"/>
-              <a:t>준다던지</a:t>
-            </a:r>
-            <a:r>
-              <a:rPr lang="ko-KR" altLang="en-US" dirty="0"/>
-              <a:t> 하는 식으로 운용</a:t>
-            </a:r>
-            <a:endParaRPr lang="en-US" altLang="ko-KR" dirty="0"/>
-          </a:p>
-          <a:p>
-            <a:r>
-              <a:rPr lang="en-US" altLang="ko-KR" dirty="0"/>
-              <a:t> phase</a:t>
-            </a:r>
-            <a:r>
-              <a:rPr lang="ko-KR" altLang="en-US" dirty="0"/>
-              <a:t> 종류 수를 현재 </a:t>
-            </a:r>
-            <a:r>
-              <a:rPr lang="en-US" altLang="ko-KR" dirty="0"/>
-              <a:t>8</a:t>
+              <a:t>당 </a:t>
+            </a:r>
+            <a:r>
+              <a:rPr lang="en-US" altLang="ko-KR" dirty="0"/>
+              <a:t>90</a:t>
             </a:r>
             <a:r>
               <a:rPr lang="ko-KR" altLang="en-US" dirty="0"/>
@@ -15973,43 +15461,243 @@
             </a:r>
             <a:r>
               <a:rPr lang="en-US" altLang="ko-KR" dirty="0"/>
+              <a:t>state</a:t>
+            </a:r>
+            <a:r>
+              <a:rPr lang="ko-KR" altLang="en-US" dirty="0"/>
+              <a:t>가 </a:t>
+            </a:r>
+            <a:r>
+              <a:rPr lang="en-US" altLang="ko-KR" dirty="0"/>
+              <a:t>replay</a:t>
+            </a:r>
+            <a:r>
+              <a:rPr lang="ko-KR" altLang="en-US" dirty="0"/>
+              <a:t>에 저장</a:t>
+            </a:r>
+            <a:r>
+              <a:rPr lang="en-US" altLang="ko-KR" dirty="0"/>
+              <a:t>) </a:t>
+            </a:r>
+            <a:br>
+              <a:rPr lang="en-US" altLang="ko-KR" dirty="0"/>
+            </a:br>
+            <a:r>
+              <a:rPr lang="ko-KR" altLang="en-US" dirty="0"/>
+              <a:t>現 </a:t>
+            </a:r>
+            <a:r>
+              <a:rPr lang="en-US" altLang="ko-KR" dirty="0"/>
+              <a:t>replay: 40 </a:t>
+            </a:r>
+            <a:r>
+              <a:rPr lang="ko-KR" altLang="en-US" dirty="0"/>
+              <a:t>부터 </a:t>
+            </a:r>
+            <a:r>
+              <a:rPr lang="en-US" altLang="ko-KR" dirty="0"/>
+              <a:t>target update </a:t>
+            </a:r>
+            <a:r>
+              <a:rPr lang="en-US" altLang="ko-KR" dirty="0">
+                <a:sym typeface="Wingdings" panose="05000000000000000000" pitchFamily="2" charset="2"/>
+              </a:rPr>
+              <a:t> </a:t>
+            </a:r>
+            <a:r>
+              <a:rPr lang="ko-KR" altLang="en-US" dirty="0">
+                <a:sym typeface="Wingdings" panose="05000000000000000000" pitchFamily="2" charset="2"/>
+              </a:rPr>
+              <a:t>초반 학습의 </a:t>
+            </a:r>
+            <a:r>
+              <a:rPr lang="en-US" altLang="ko-KR" dirty="0">
+                <a:sym typeface="Wingdings" panose="05000000000000000000" pitchFamily="2" charset="2"/>
+              </a:rPr>
+              <a:t>Correlation </a:t>
+            </a:r>
+            <a:r>
+              <a:rPr lang="ko-KR" altLang="en-US" dirty="0">
+                <a:sym typeface="Wingdings" panose="05000000000000000000" pitchFamily="2" charset="2"/>
+              </a:rPr>
+              <a:t>높음</a:t>
+            </a:r>
+            <a:endParaRPr lang="en-US" altLang="ko-KR" dirty="0">
+              <a:sym typeface="Wingdings" panose="05000000000000000000" pitchFamily="2" charset="2"/>
+            </a:endParaRPr>
+          </a:p>
+          <a:p>
+            <a:pPr lvl="1">
+              <a:lnSpc>
+                <a:spcPct val="120000"/>
+              </a:lnSpc>
+            </a:pPr>
+            <a:r>
+              <a:rPr lang="en-US" altLang="ko-KR" dirty="0">
+                <a:sym typeface="Wingdings" panose="05000000000000000000" pitchFamily="2" charset="2"/>
+              </a:rPr>
+              <a:t> Learning Start </a:t>
+            </a:r>
+            <a:r>
+              <a:rPr lang="ko-KR" altLang="en-US" dirty="0">
+                <a:sym typeface="Wingdings" panose="05000000000000000000" pitchFamily="2" charset="2"/>
+              </a:rPr>
+              <a:t>하는</a:t>
+            </a:r>
+            <a:r>
+              <a:rPr lang="en-US" altLang="ko-KR" dirty="0">
+                <a:sym typeface="Wingdings" panose="05000000000000000000" pitchFamily="2" charset="2"/>
+              </a:rPr>
+              <a:t> Epoch</a:t>
+            </a:r>
+            <a:r>
+              <a:rPr lang="ko-KR" altLang="en-US" dirty="0">
+                <a:sym typeface="Wingdings" panose="05000000000000000000" pitchFamily="2" charset="2"/>
+              </a:rPr>
+              <a:t>를</a:t>
+            </a:r>
+            <a:r>
+              <a:rPr lang="en-US" altLang="ko-KR" dirty="0">
+                <a:sym typeface="Wingdings" panose="05000000000000000000" pitchFamily="2" charset="2"/>
+              </a:rPr>
+              <a:t> 4</a:t>
+            </a:r>
+            <a:r>
+              <a:rPr lang="ko-KR" altLang="en-US" dirty="0">
+                <a:sym typeface="Wingdings" panose="05000000000000000000" pitchFamily="2" charset="2"/>
+              </a:rPr>
+              <a:t>이상</a:t>
+            </a:r>
+            <a:endParaRPr lang="en-US" altLang="ko-KR" dirty="0">
+              <a:sym typeface="Wingdings" panose="05000000000000000000" pitchFamily="2" charset="2"/>
+            </a:endParaRPr>
+          </a:p>
+          <a:p>
+            <a:pPr lvl="1">
+              <a:lnSpc>
+                <a:spcPct val="120000"/>
+              </a:lnSpc>
+            </a:pPr>
+            <a:r>
+              <a:rPr lang="en-US" altLang="ko-KR" dirty="0">
+                <a:sym typeface="Wingdings" panose="05000000000000000000" pitchFamily="2" charset="2"/>
+              </a:rPr>
+              <a:t> time step</a:t>
+            </a:r>
+            <a:r>
+              <a:rPr lang="ko-KR" altLang="en-US" dirty="0">
+                <a:sym typeface="Wingdings" panose="05000000000000000000" pitchFamily="2" charset="2"/>
+              </a:rPr>
+              <a:t>을 세분화 </a:t>
+            </a:r>
+            <a:r>
+              <a:rPr lang="en-US" altLang="ko-KR" dirty="0">
+                <a:sym typeface="Wingdings" panose="05000000000000000000" pitchFamily="2" charset="2"/>
+              </a:rPr>
+              <a:t>Action </a:t>
+            </a:r>
+            <a:r>
+              <a:rPr lang="ko-KR" altLang="en-US" dirty="0">
+                <a:sym typeface="Wingdings" panose="05000000000000000000" pitchFamily="2" charset="2"/>
+              </a:rPr>
+              <a:t>형태 변화 필요</a:t>
+            </a:r>
+            <a:endParaRPr lang="en-US" altLang="ko-KR" dirty="0">
+              <a:sym typeface="Wingdings" panose="05000000000000000000" pitchFamily="2" charset="2"/>
+            </a:endParaRPr>
+          </a:p>
+          <a:p>
+            <a:pPr lvl="1">
+              <a:lnSpc>
+                <a:spcPct val="120000"/>
+              </a:lnSpc>
+            </a:pPr>
+            <a:r>
+              <a:rPr lang="en-US" altLang="ko-KR" dirty="0">
+                <a:sym typeface="Wingdings" panose="05000000000000000000" pitchFamily="2" charset="2"/>
+              </a:rPr>
+              <a:t> Epoch </a:t>
+            </a:r>
+            <a:r>
+              <a:rPr lang="ko-KR" altLang="en-US" dirty="0">
+                <a:sym typeface="Wingdings" panose="05000000000000000000" pitchFamily="2" charset="2"/>
+              </a:rPr>
+              <a:t>길이 길게 </a:t>
+            </a:r>
+            <a:r>
+              <a:rPr lang="en-US" altLang="ko-KR" dirty="0">
+                <a:sym typeface="Wingdings" panose="05000000000000000000" pitchFamily="2" charset="2"/>
+              </a:rPr>
               <a:t>(</a:t>
             </a:r>
             <a:r>
-              <a:rPr lang="ko-KR" altLang="en-US" dirty="0"/>
-              <a:t>논문상</a:t>
-            </a:r>
-            <a:r>
-              <a:rPr lang="en-US" altLang="ko-KR" dirty="0"/>
+              <a:rPr lang="ko-KR" altLang="en-US" dirty="0">
+                <a:sym typeface="Wingdings" panose="05000000000000000000" pitchFamily="2" charset="2"/>
+              </a:rPr>
+              <a:t>現</a:t>
+            </a:r>
+            <a:r>
+              <a:rPr lang="en-US" altLang="ko-KR" dirty="0">
+                <a:sym typeface="Wingdings" panose="05000000000000000000" pitchFamily="2" charset="2"/>
+              </a:rPr>
+              <a:t>:10000s/epoch -&gt; 27000s/epoch</a:t>
+            </a:r>
+            <a:r>
+              <a:rPr lang="ko-KR" altLang="en-US" dirty="0">
+                <a:sym typeface="Wingdings" panose="05000000000000000000" pitchFamily="2" charset="2"/>
+              </a:rPr>
+              <a:t>이상</a:t>
+            </a:r>
+            <a:r>
+              <a:rPr lang="en-US" altLang="ko-KR" dirty="0">
+                <a:sym typeface="Wingdings" panose="05000000000000000000" pitchFamily="2" charset="2"/>
+              </a:rPr>
               <a:t>)</a:t>
             </a:r>
-            <a:r>
-              <a:rPr lang="ko-KR" altLang="en-US" dirty="0"/>
+          </a:p>
+          <a:p>
+            <a:pPr>
+              <a:lnSpc>
+                <a:spcPct val="120000"/>
+              </a:lnSpc>
+            </a:pPr>
+            <a:r>
+              <a:rPr lang="en-US" altLang="ko-KR" dirty="0">
+                <a:sym typeface="Wingdings" panose="05000000000000000000" pitchFamily="2" charset="2"/>
+              </a:rPr>
+              <a:t> Learning </a:t>
+            </a:r>
+            <a:r>
+              <a:rPr lang="ko-KR" altLang="en-US" dirty="0">
+                <a:sym typeface="Wingdings" panose="05000000000000000000" pitchFamily="2" charset="2"/>
+              </a:rPr>
               <a:t>에서 </a:t>
             </a:r>
             <a:r>
-              <a:rPr lang="en-US" altLang="ko-KR" dirty="0"/>
-              <a:t>6</a:t>
-            </a:r>
-            <a:r>
-              <a:rPr lang="ko-KR" altLang="en-US" dirty="0"/>
-              <a:t>개 내지는 </a:t>
-            </a:r>
-            <a:r>
-              <a:rPr lang="en-US" altLang="ko-KR" dirty="0"/>
-              <a:t>4</a:t>
-            </a:r>
-            <a:r>
-              <a:rPr lang="ko-KR" altLang="en-US" dirty="0"/>
-              <a:t>개로 줄임</a:t>
-            </a:r>
-            <a:endParaRPr lang="en-US" altLang="ko-KR" dirty="0"/>
-          </a:p>
-          <a:p>
-            <a:r>
-              <a:rPr lang="en-US" altLang="ko-KR" dirty="0"/>
-              <a:t> </a:t>
-            </a:r>
+              <a:rPr lang="en-US" altLang="ko-KR" dirty="0">
+                <a:sym typeface="Wingdings" panose="05000000000000000000" pitchFamily="2" charset="2"/>
+              </a:rPr>
+              <a:t>augmentation(</a:t>
+            </a:r>
+            <a:r>
+              <a:rPr lang="ko-KR" altLang="en-US" dirty="0">
+                <a:sym typeface="Wingdings" panose="05000000000000000000" pitchFamily="2" charset="2"/>
+              </a:rPr>
+              <a:t>각 교차로에 대해서</a:t>
+            </a:r>
+            <a:r>
+              <a:rPr lang="en-US" altLang="ko-KR" dirty="0">
+                <a:sym typeface="Wingdings" panose="05000000000000000000" pitchFamily="2" charset="2"/>
+              </a:rPr>
+              <a:t>)</a:t>
+            </a:r>
+          </a:p>
+          <a:p>
+            <a:pPr>
+              <a:lnSpc>
+                <a:spcPct val="120000"/>
+              </a:lnSpc>
+            </a:pPr>
             <a:endParaRPr lang="ko-KR" altLang="en-US" dirty="0"/>
           </a:p>
         </p:txBody>
@@ -16017,7 +15705,7 @@
     </p:spTree>
     <p:extLst>
       <p:ext uri="{BB962C8B-B14F-4D97-AF65-F5344CB8AC3E}">
-        <p14:creationId xmlns:p14="http://schemas.microsoft.com/office/powerpoint/2010/main" val="214645791"/>
+        <p14:creationId xmlns:p14="http://schemas.microsoft.com/office/powerpoint/2010/main" val="1873075976"/>
       </p:ext>
     </p:extLst>
   </p:cSld>
@@ -16061,58 +15749,179 @@
           <a:p>
             <a:r>
               <a:rPr lang="en-US" altLang="ko-KR" dirty="0"/>
-              <a:t>Comment</a:t>
+              <a:t>Training </a:t>
+            </a:r>
+            <a:r>
+              <a:rPr lang="ko-KR" altLang="en-US" dirty="0"/>
+              <a:t>구성 방식 제안</a:t>
+            </a:r>
+          </a:p>
+        </p:txBody>
+      </p:sp>
+      <p:sp>
+        <p:nvSpPr>
+          <p:cNvPr id="3" name="내용 개체 틀 2"/>
+          <p:cNvSpPr>
+            <a:spLocks noGrp="1"/>
+          </p:cNvSpPr>
+          <p:nvPr>
+            <p:ph idx="1"/>
+          </p:nvPr>
+        </p:nvSpPr>
+        <p:spPr/>
+        <p:txBody>
+          <a:bodyPr/>
+          <a:lstStyle/>
+          <a:p>
+            <a:r>
+              <a:rPr lang="en-US" altLang="ko-KR" dirty="0"/>
+              <a:t> </a:t>
+            </a:r>
+            <a:r>
+              <a:rPr lang="ko-KR" altLang="en-US" dirty="0"/>
+              <a:t>차량 진입로를 줄이는 대신에 차량의 </a:t>
+            </a:r>
+            <a:r>
+              <a:rPr lang="en-US" altLang="ko-KR" dirty="0"/>
+              <a:t>Random</a:t>
+            </a:r>
+            <a:r>
+              <a:rPr lang="ko-KR" altLang="en-US" dirty="0"/>
+              <a:t>성을 주는 </a:t>
+            </a:r>
+            <a:r>
+              <a:rPr lang="en-US" altLang="ko-KR" dirty="0"/>
+              <a:t>IDM controller</a:t>
+            </a:r>
+            <a:r>
+              <a:rPr lang="ko-KR" altLang="en-US" dirty="0"/>
+              <a:t>와 가속도 분산 갖게 해서 차이를 줌</a:t>
+            </a:r>
+            <a:endParaRPr lang="en-US" altLang="ko-KR" dirty="0"/>
+          </a:p>
+          <a:p>
+            <a:r>
+              <a:rPr lang="en-US" altLang="ko-KR" dirty="0"/>
+              <a:t> phase</a:t>
+            </a:r>
+            <a:r>
+              <a:rPr lang="ko-KR" altLang="en-US" dirty="0"/>
+              <a:t>를 변화하는 </a:t>
+            </a:r>
+            <a:r>
+              <a:rPr lang="en-US" altLang="ko-KR" dirty="0"/>
+              <a:t>action</a:t>
+            </a:r>
+            <a:r>
+              <a:rPr lang="ko-KR" altLang="en-US" dirty="0"/>
+              <a:t>이 아닌 </a:t>
+            </a:r>
+            <a:r>
+              <a:rPr lang="en-US" altLang="ko-KR" dirty="0"/>
+              <a:t>phase</a:t>
+            </a:r>
+            <a:r>
+              <a:rPr lang="ko-KR" altLang="en-US" dirty="0"/>
+              <a:t>를 선택하게 하고 최소 시간은 </a:t>
+            </a:r>
+            <a:r>
+              <a:rPr lang="en-US" altLang="ko-KR" dirty="0"/>
+              <a:t>20</a:t>
+            </a:r>
+            <a:r>
+              <a:rPr lang="ko-KR" altLang="en-US" dirty="0"/>
+              <a:t>초로 하되</a:t>
+            </a:r>
+            <a:r>
+              <a:rPr lang="en-US" altLang="ko-KR" dirty="0"/>
+              <a:t>, </a:t>
+            </a:r>
+            <a:r>
+              <a:rPr lang="ko-KR" altLang="en-US" dirty="0"/>
+              <a:t>최대 이상에서는 엄청난 </a:t>
+            </a:r>
+            <a:r>
+              <a:rPr lang="en-US" altLang="ko-KR" dirty="0"/>
+              <a:t>penalty</a:t>
+            </a:r>
+            <a:r>
+              <a:rPr lang="ko-KR" altLang="en-US" dirty="0"/>
+              <a:t>를 </a:t>
+            </a:r>
+            <a:r>
+              <a:rPr lang="ko-KR" altLang="en-US" dirty="0" err="1"/>
+              <a:t>준다던지</a:t>
+            </a:r>
+            <a:r>
+              <a:rPr lang="ko-KR" altLang="en-US" dirty="0"/>
+              <a:t> 하는 식으로 운용</a:t>
+            </a:r>
+            <a:endParaRPr lang="en-US" altLang="ko-KR" dirty="0"/>
+          </a:p>
+          <a:p>
+            <a:r>
+              <a:rPr lang="en-US" altLang="ko-KR" dirty="0"/>
+              <a:t> phase</a:t>
+            </a:r>
+            <a:r>
+              <a:rPr lang="ko-KR" altLang="en-US" dirty="0"/>
+              <a:t> 종류 수를 현재 </a:t>
+            </a:r>
+            <a:r>
+              <a:rPr lang="en-US" altLang="ko-KR" dirty="0"/>
+              <a:t>8</a:t>
+            </a:r>
+            <a:r>
+              <a:rPr lang="ko-KR" altLang="en-US" dirty="0"/>
+              <a:t>개 </a:t>
+            </a:r>
+            <a:r>
+              <a:rPr lang="en-US" altLang="ko-KR" dirty="0"/>
+              <a:t>(</a:t>
+            </a:r>
+            <a:r>
+              <a:rPr lang="ko-KR" altLang="en-US" dirty="0"/>
+              <a:t>논문상</a:t>
+            </a:r>
+            <a:r>
+              <a:rPr lang="en-US" altLang="ko-KR" dirty="0"/>
+              <a:t>)</a:t>
+            </a:r>
+            <a:r>
+              <a:rPr lang="ko-KR" altLang="en-US" dirty="0"/>
+              <a:t>에서 </a:t>
+            </a:r>
+            <a:r>
+              <a:rPr lang="en-US" altLang="ko-KR" dirty="0"/>
+              <a:t>6</a:t>
+            </a:r>
+            <a:r>
+              <a:rPr lang="ko-KR" altLang="en-US" dirty="0"/>
+              <a:t>개 내지는 </a:t>
+            </a:r>
+            <a:r>
+              <a:rPr lang="en-US" altLang="ko-KR" dirty="0"/>
+              <a:t>4</a:t>
+            </a:r>
+            <a:r>
+              <a:rPr lang="ko-KR" altLang="en-US" dirty="0"/>
+              <a:t>개로 줄임</a:t>
+            </a:r>
+            <a:endParaRPr lang="en-US" altLang="ko-KR" dirty="0"/>
+          </a:p>
+          <a:p>
+            <a:r>
+              <a:rPr lang="en-US" altLang="ko-KR" dirty="0"/>
+              <a:t> </a:t>
             </a:r>
             <a:endParaRPr lang="ko-KR" altLang="en-US" dirty="0"/>
-          </a:p>
-        </p:txBody>
-      </p:sp>
-      <p:sp>
-        <p:nvSpPr>
-          <p:cNvPr id="3" name="내용 개체 틀 2"/>
-          <p:cNvSpPr>
-            <a:spLocks noGrp="1"/>
-          </p:cNvSpPr>
-          <p:nvPr>
-            <p:ph idx="1"/>
-          </p:nvPr>
-        </p:nvSpPr>
-        <p:spPr/>
-        <p:txBody>
-          <a:bodyPr/>
-          <a:lstStyle/>
-          <a:p>
-            <a:r>
-              <a:rPr lang="en-US" altLang="ko-KR" dirty="0"/>
-              <a:t> </a:t>
-            </a:r>
-            <a:r>
-              <a:rPr lang="ko-KR" altLang="en-US" dirty="0"/>
-              <a:t>네비게이션 시스템이 복잡</a:t>
-            </a:r>
-            <a:r>
-              <a:rPr lang="en-US" altLang="ko-KR" dirty="0"/>
-              <a:t>? Why </a:t>
-            </a:r>
-            <a:r>
-              <a:rPr lang="ko-KR" altLang="en-US" dirty="0"/>
-              <a:t>애들이 차량이 많은 쪽위주로 </a:t>
-            </a:r>
-            <a:r>
-              <a:rPr lang="ko-KR" altLang="en-US" dirty="0" err="1"/>
-              <a:t>열어주다보면</a:t>
-            </a:r>
-            <a:r>
-              <a:rPr lang="ko-KR" altLang="en-US" dirty="0"/>
-              <a:t> 분명 개인 입장에서 기다리는 시간이 길 것으로 판단</a:t>
-            </a:r>
           </a:p>
         </p:txBody>
       </p:sp>
     </p:spTree>
     <p:extLst>
       <p:ext uri="{BB962C8B-B14F-4D97-AF65-F5344CB8AC3E}">
-        <p14:creationId xmlns:p14="http://schemas.microsoft.com/office/powerpoint/2010/main" val="2088717915"/>
+        <p14:creationId xmlns:p14="http://schemas.microsoft.com/office/powerpoint/2010/main" val="214645791"/>
       </p:ext>
     </p:extLst>
   </p:cSld>
@@ -16154,7 +15963,11 @@
           <a:bodyPr/>
           <a:lstStyle/>
           <a:p>
-            <a:endParaRPr lang="ko-KR" altLang="en-US"/>
+            <a:r>
+              <a:rPr lang="en-US" altLang="ko-KR" dirty="0"/>
+              <a:t>Comment</a:t>
+            </a:r>
+            <a:endParaRPr lang="ko-KR" altLang="en-US" dirty="0"/>
           </a:p>
         </p:txBody>
       </p:sp>
@@ -16173,14 +15986,37 @@
           <a:bodyPr/>
           <a:lstStyle/>
           <a:p>
-            <a:endParaRPr lang="ko-KR" altLang="en-US"/>
+            <a:r>
+              <a:rPr lang="en-US" altLang="ko-KR" dirty="0"/>
+              <a:t> </a:t>
+            </a:r>
+            <a:r>
+              <a:rPr lang="ko-KR" altLang="en-US" dirty="0"/>
+              <a:t>네비게이션 시스템이 복잡</a:t>
+            </a:r>
+            <a:r>
+              <a:rPr lang="en-US" altLang="ko-KR" dirty="0"/>
+              <a:t>? Why </a:t>
+            </a:r>
+            <a:r>
+              <a:rPr lang="ko-KR" altLang="en-US" dirty="0"/>
+              <a:t>애들이 차량이 많은 쪽위주로 </a:t>
+            </a:r>
+            <a:r>
+              <a:rPr lang="ko-KR" altLang="en-US" dirty="0" err="1"/>
+              <a:t>열어주다보면</a:t>
+            </a:r>
+            <a:r>
+              <a:rPr lang="ko-KR" altLang="en-US" dirty="0"/>
+              <a:t> 분명 개인 입장에서 기다리는 시간이 길 것으로 판단</a:t>
+            </a:r>
           </a:p>
         </p:txBody>
       </p:sp>
     </p:spTree>
     <p:extLst>
       <p:ext uri="{BB962C8B-B14F-4D97-AF65-F5344CB8AC3E}">
-        <p14:creationId xmlns:p14="http://schemas.microsoft.com/office/powerpoint/2010/main" val="2316143761"/>
+        <p14:creationId xmlns:p14="http://schemas.microsoft.com/office/powerpoint/2010/main" val="2088717915"/>
       </p:ext>
     </p:extLst>
   </p:cSld>
@@ -16258,7 +16094,7 @@
               </a:lnSpc>
             </a:pPr>
             <a:r>
-              <a:rPr lang="en-US" altLang="ko-KR" dirty="0" smtClean="0"/>
+              <a:rPr lang="en-US" altLang="ko-KR" dirty="0"/>
               <a:t> Considering factors when constructing traffic system</a:t>
             </a:r>
           </a:p>
@@ -16269,18 +16105,18 @@
               </a:lnSpc>
             </a:pPr>
             <a:r>
-              <a:rPr lang="ko-KR" altLang="en-US" dirty="0" smtClean="0"/>
+              <a:rPr lang="ko-KR" altLang="en-US" dirty="0"/>
               <a:t>신호 </a:t>
             </a:r>
             <a:r>
-              <a:rPr lang="ko-KR" altLang="en-US" dirty="0" err="1" smtClean="0"/>
+              <a:rPr lang="ko-KR" altLang="en-US" dirty="0" err="1"/>
               <a:t>교차로간</a:t>
             </a:r>
             <a:r>
-              <a:rPr lang="ko-KR" altLang="en-US" dirty="0" smtClean="0"/>
+              <a:rPr lang="ko-KR" altLang="en-US" dirty="0"/>
               <a:t> 거리</a:t>
             </a:r>
-            <a:endParaRPr lang="en-US" altLang="ko-KR" dirty="0" smtClean="0"/>
+            <a:endParaRPr lang="en-US" altLang="ko-KR" dirty="0"/>
           </a:p>
           <a:p>
             <a:pPr lvl="2">
@@ -16289,7 +16125,7 @@
               </a:lnSpc>
             </a:pPr>
             <a:r>
-              <a:rPr lang="ko-KR" altLang="en-US" dirty="0" smtClean="0"/>
+              <a:rPr lang="ko-KR" altLang="en-US" dirty="0"/>
               <a:t>짧을 수록 연동 시스템의 구축 필요성</a:t>
             </a:r>
             <a:r>
@@ -16297,10 +16133,10 @@
               <a:t> </a:t>
             </a:r>
             <a:r>
-              <a:rPr lang="ko-KR" altLang="en-US" dirty="0" smtClean="0"/>
+              <a:rPr lang="ko-KR" altLang="en-US" dirty="0"/>
               <a:t>높음</a:t>
             </a:r>
-            <a:endParaRPr lang="en-US" altLang="ko-KR" dirty="0" smtClean="0"/>
+            <a:endParaRPr lang="en-US" altLang="ko-KR" dirty="0"/>
           </a:p>
           <a:p>
             <a:pPr lvl="2">
@@ -16309,17 +16145,13 @@
               </a:lnSpc>
             </a:pPr>
             <a:r>
-              <a:rPr lang="ko-KR" altLang="en-US" dirty="0" smtClean="0"/>
+              <a:rPr lang="ko-KR" altLang="en-US" dirty="0"/>
               <a:t>멀면 분산효과가 커서 필요성이 낮음</a:t>
             </a:r>
-            <a:r>
-              <a:rPr lang="en-US" altLang="ko-KR" dirty="0" smtClean="0"/>
-              <a:t/>
-            </a:r>
             <a:br>
-              <a:rPr lang="en-US" altLang="ko-KR" dirty="0" smtClean="0"/>
+              <a:rPr lang="en-US" altLang="ko-KR" dirty="0"/>
             </a:br>
-            <a:endParaRPr lang="en-US" altLang="ko-KR" dirty="0" smtClean="0"/>
+            <a:endParaRPr lang="en-US" altLang="ko-KR" dirty="0"/>
           </a:p>
           <a:p>
             <a:pPr lvl="1">
@@ -16328,7 +16160,7 @@
               </a:lnSpc>
             </a:pPr>
             <a:r>
-              <a:rPr lang="ko-KR" altLang="en-US" dirty="0" smtClean="0"/>
+              <a:rPr lang="ko-KR" altLang="en-US" dirty="0"/>
               <a:t>도로 운영</a:t>
             </a:r>
             <a:endParaRPr lang="en-US" altLang="ko-KR" dirty="0"/>
@@ -16340,65 +16172,65 @@
               </a:lnSpc>
             </a:pPr>
             <a:r>
-              <a:rPr lang="ko-KR" altLang="en-US" dirty="0" smtClean="0"/>
+              <a:rPr lang="ko-KR" altLang="en-US" dirty="0"/>
               <a:t>일방 통행</a:t>
             </a:r>
             <a:r>
-              <a:rPr lang="en-US" altLang="ko-KR" dirty="0" smtClean="0"/>
+              <a:rPr lang="en-US" altLang="ko-KR" dirty="0"/>
               <a:t>, </a:t>
             </a:r>
             <a:r>
-              <a:rPr lang="ko-KR" altLang="en-US" dirty="0" smtClean="0"/>
+              <a:rPr lang="ko-KR" altLang="en-US" dirty="0"/>
               <a:t>양방 통행 </a:t>
             </a:r>
             <a:r>
-              <a:rPr lang="en-US" altLang="ko-KR" dirty="0" smtClean="0">
+              <a:rPr lang="en-US" altLang="ko-KR" dirty="0">
                 <a:sym typeface="Wingdings" panose="05000000000000000000" pitchFamily="2" charset="2"/>
               </a:rPr>
               <a:t> </a:t>
             </a:r>
             <a:r>
-              <a:rPr lang="ko-KR" altLang="en-US" dirty="0" smtClean="0">
+              <a:rPr lang="ko-KR" altLang="en-US" dirty="0">
                 <a:sym typeface="Wingdings" panose="05000000000000000000" pitchFamily="2" charset="2"/>
               </a:rPr>
               <a:t>양방이 운영하기 어려움</a:t>
             </a:r>
             <a:r>
-              <a:rPr lang="en-US" altLang="ko-KR" dirty="0" smtClean="0">
+              <a:rPr lang="en-US" altLang="ko-KR" dirty="0">
                 <a:sym typeface="Wingdings" panose="05000000000000000000" pitchFamily="2" charset="2"/>
               </a:rPr>
               <a:t>, </a:t>
             </a:r>
             <a:r>
-              <a:rPr lang="ko-KR" altLang="en-US" dirty="0" smtClean="0">
+              <a:rPr lang="ko-KR" altLang="en-US" dirty="0">
                 <a:sym typeface="Wingdings" panose="05000000000000000000" pitchFamily="2" charset="2"/>
               </a:rPr>
               <a:t>공통적으로 신호등이 없는 횡단보도는 문제임</a:t>
             </a:r>
             <a:r>
-              <a:rPr lang="en-US" altLang="ko-KR" dirty="0" smtClean="0">
+              <a:rPr lang="en-US" altLang="ko-KR" dirty="0">
                 <a:sym typeface="Wingdings" panose="05000000000000000000" pitchFamily="2" charset="2"/>
               </a:rPr>
               <a:t>(offset </a:t>
             </a:r>
             <a:r>
-              <a:rPr lang="ko-KR" altLang="en-US" dirty="0" smtClean="0">
+              <a:rPr lang="ko-KR" altLang="en-US" dirty="0">
                 <a:sym typeface="Wingdings" panose="05000000000000000000" pitchFamily="2" charset="2"/>
               </a:rPr>
               <a:t>설정 문제</a:t>
             </a:r>
             <a:r>
-              <a:rPr lang="en-US" altLang="ko-KR" dirty="0" smtClean="0">
+              <a:rPr lang="en-US" altLang="ko-KR" dirty="0">
                 <a:sym typeface="Wingdings" panose="05000000000000000000" pitchFamily="2" charset="2"/>
               </a:rPr>
               <a:t>)</a:t>
             </a:r>
             <a:br>
-              <a:rPr lang="en-US" altLang="ko-KR" dirty="0" smtClean="0">
+              <a:rPr lang="en-US" altLang="ko-KR" dirty="0">
                 <a:sym typeface="Wingdings" panose="05000000000000000000" pitchFamily="2" charset="2"/>
               </a:rPr>
             </a:br>
-            <a:endParaRPr lang="en-US" altLang="ko-KR" dirty="0" smtClean="0">
+            <a:endParaRPr lang="en-US" altLang="ko-KR" dirty="0">
               <a:sym typeface="Wingdings" panose="05000000000000000000" pitchFamily="2" charset="2"/>
             </a:endParaRPr>
           </a:p>
@@ -16409,18 +16241,18 @@
               </a:lnSpc>
             </a:pPr>
             <a:r>
-              <a:rPr lang="ko-KR" altLang="en-US" dirty="0" err="1" smtClean="0">
+              <a:rPr lang="ko-KR" altLang="en-US" dirty="0" err="1">
                 <a:sym typeface="Wingdings" panose="05000000000000000000" pitchFamily="2" charset="2"/>
               </a:rPr>
               <a:t>접근로의</a:t>
             </a:r>
             <a:r>
-              <a:rPr lang="ko-KR" altLang="en-US" dirty="0" smtClean="0">
+              <a:rPr lang="ko-KR" altLang="en-US" dirty="0">
                 <a:sym typeface="Wingdings" panose="05000000000000000000" pitchFamily="2" charset="2"/>
               </a:rPr>
               <a:t> 상태</a:t>
             </a:r>
-            <a:endParaRPr lang="en-US" altLang="ko-KR" dirty="0" smtClean="0">
+            <a:endParaRPr lang="en-US" altLang="ko-KR" dirty="0">
               <a:sym typeface="Wingdings" panose="05000000000000000000" pitchFamily="2" charset="2"/>
             </a:endParaRPr>
           </a:p>
@@ -16431,42 +16263,42 @@
               </a:lnSpc>
             </a:pPr>
             <a:r>
-              <a:rPr lang="ko-KR" altLang="en-US" dirty="0" smtClean="0">
+              <a:rPr lang="ko-KR" altLang="en-US" dirty="0">
                 <a:sym typeface="Wingdings" panose="05000000000000000000" pitchFamily="2" charset="2"/>
               </a:rPr>
               <a:t>이상적인 경우</a:t>
             </a:r>
             <a:r>
-              <a:rPr lang="en-US" altLang="ko-KR" dirty="0" smtClean="0">
+              <a:rPr lang="en-US" altLang="ko-KR" dirty="0">
                 <a:sym typeface="Wingdings" panose="05000000000000000000" pitchFamily="2" charset="2"/>
               </a:rPr>
               <a:t>: </a:t>
             </a:r>
             <a:r>
-              <a:rPr lang="ko-KR" altLang="en-US" dirty="0" err="1" smtClean="0">
+              <a:rPr lang="ko-KR" altLang="en-US" dirty="0" err="1">
                 <a:sym typeface="Wingdings" panose="05000000000000000000" pitchFamily="2" charset="2"/>
               </a:rPr>
               <a:t>교차로간</a:t>
             </a:r>
             <a:r>
-              <a:rPr lang="ko-KR" altLang="en-US" dirty="0" smtClean="0">
+              <a:rPr lang="ko-KR" altLang="en-US" dirty="0">
                 <a:sym typeface="Wingdings" panose="05000000000000000000" pitchFamily="2" charset="2"/>
               </a:rPr>
               <a:t> 거리와 주행속도만으로 </a:t>
             </a:r>
             <a:r>
-              <a:rPr lang="en-US" altLang="ko-KR" dirty="0" smtClean="0">
+              <a:rPr lang="en-US" altLang="ko-KR" dirty="0">
                 <a:sym typeface="Wingdings" panose="05000000000000000000" pitchFamily="2" charset="2"/>
               </a:rPr>
               <a:t>offset decision </a:t>
             </a:r>
             <a:r>
-              <a:rPr lang="ko-KR" altLang="en-US" dirty="0" smtClean="0">
+              <a:rPr lang="ko-KR" altLang="en-US" dirty="0">
                 <a:sym typeface="Wingdings" panose="05000000000000000000" pitchFamily="2" charset="2"/>
               </a:rPr>
               <a:t>가능</a:t>
             </a:r>
-            <a:endParaRPr lang="en-US" altLang="ko-KR" dirty="0" smtClean="0">
+            <a:endParaRPr lang="en-US" altLang="ko-KR" dirty="0">
               <a:sym typeface="Wingdings" panose="05000000000000000000" pitchFamily="2" charset="2"/>
             </a:endParaRPr>
           </a:p>
@@ -16477,65 +16309,59 @@
               </a:lnSpc>
             </a:pPr>
             <a:r>
-              <a:rPr lang="ko-KR" altLang="en-US" dirty="0" smtClean="0">
+              <a:rPr lang="ko-KR" altLang="en-US" dirty="0">
                 <a:sym typeface="Wingdings" panose="05000000000000000000" pitchFamily="2" charset="2"/>
               </a:rPr>
               <a:t>현실적인 경우</a:t>
             </a:r>
             <a:r>
-              <a:rPr lang="en-US" altLang="ko-KR" dirty="0" smtClean="0">
+              <a:rPr lang="en-US" altLang="ko-KR" dirty="0">
                 <a:sym typeface="Wingdings" panose="05000000000000000000" pitchFamily="2" charset="2"/>
               </a:rPr>
               <a:t>: </a:t>
             </a:r>
             <a:r>
-              <a:rPr lang="ko-KR" altLang="en-US" dirty="0" smtClean="0">
+              <a:rPr lang="ko-KR" altLang="en-US" dirty="0">
                 <a:sym typeface="Wingdings" panose="05000000000000000000" pitchFamily="2" charset="2"/>
               </a:rPr>
               <a:t>불법 </a:t>
             </a:r>
             <a:r>
-              <a:rPr lang="ko-KR" altLang="en-US" dirty="0" err="1" smtClean="0">
+              <a:rPr lang="ko-KR" altLang="en-US" dirty="0" err="1">
                 <a:sym typeface="Wingdings" panose="05000000000000000000" pitchFamily="2" charset="2"/>
               </a:rPr>
               <a:t>주정차</a:t>
             </a:r>
             <a:r>
-              <a:rPr lang="en-US" altLang="ko-KR" dirty="0" smtClean="0">
+              <a:rPr lang="en-US" altLang="ko-KR" dirty="0">
                 <a:sym typeface="Wingdings" panose="05000000000000000000" pitchFamily="2" charset="2"/>
               </a:rPr>
               <a:t>, </a:t>
             </a:r>
             <a:r>
-              <a:rPr lang="ko-KR" altLang="en-US" dirty="0" smtClean="0">
+              <a:rPr lang="ko-KR" altLang="en-US" dirty="0">
                 <a:sym typeface="Wingdings" panose="05000000000000000000" pitchFamily="2" charset="2"/>
               </a:rPr>
               <a:t>중간 유입 차량</a:t>
             </a:r>
             <a:r>
-              <a:rPr lang="en-US" altLang="ko-KR" dirty="0" smtClean="0">
+              <a:rPr lang="en-US" altLang="ko-KR" dirty="0">
                 <a:sym typeface="Wingdings" panose="05000000000000000000" pitchFamily="2" charset="2"/>
               </a:rPr>
               <a:t>, outflow </a:t>
             </a:r>
             <a:r>
-              <a:rPr lang="ko-KR" altLang="en-US" dirty="0" smtClean="0">
+              <a:rPr lang="ko-KR" altLang="en-US" dirty="0">
                 <a:sym typeface="Wingdings" panose="05000000000000000000" pitchFamily="2" charset="2"/>
               </a:rPr>
               <a:t>차량 모두 고려해야 함</a:t>
             </a:r>
-            <a:r>
-              <a:rPr lang="en-US" altLang="ko-KR" dirty="0" smtClean="0">
-                <a:sym typeface="Wingdings" panose="05000000000000000000" pitchFamily="2" charset="2"/>
-              </a:rPr>
-              <a:t/>
-            </a:r>
             <a:br>
-              <a:rPr lang="en-US" altLang="ko-KR" dirty="0" smtClean="0">
+              <a:rPr lang="en-US" altLang="ko-KR" dirty="0">
                 <a:sym typeface="Wingdings" panose="05000000000000000000" pitchFamily="2" charset="2"/>
               </a:rPr>
             </a:br>
-            <a:endParaRPr lang="en-US" altLang="ko-KR" dirty="0" smtClean="0">
+            <a:endParaRPr lang="en-US" altLang="ko-KR" dirty="0">
               <a:sym typeface="Wingdings" panose="05000000000000000000" pitchFamily="2" charset="2"/>
             </a:endParaRPr>
           </a:p>
@@ -16546,12 +16372,12 @@
               </a:lnSpc>
             </a:pPr>
             <a:r>
-              <a:rPr lang="ko-KR" altLang="en-US" dirty="0" smtClean="0">
+              <a:rPr lang="ko-KR" altLang="en-US" dirty="0">
                 <a:sym typeface="Wingdings" panose="05000000000000000000" pitchFamily="2" charset="2"/>
               </a:rPr>
               <a:t>차량의 도착 특성</a:t>
             </a:r>
-            <a:endParaRPr lang="en-US" altLang="ko-KR" dirty="0" smtClean="0">
+            <a:endParaRPr lang="en-US" altLang="ko-KR" dirty="0">
               <a:sym typeface="Wingdings" panose="05000000000000000000" pitchFamily="2" charset="2"/>
             </a:endParaRPr>
           </a:p>
@@ -16562,41 +16388,35 @@
               </a:lnSpc>
             </a:pPr>
             <a:r>
-              <a:rPr lang="ko-KR" altLang="en-US" dirty="0" err="1" smtClean="0">
+              <a:rPr lang="ko-KR" altLang="en-US" dirty="0" err="1">
                 <a:sym typeface="Wingdings" panose="05000000000000000000" pitchFamily="2" charset="2"/>
               </a:rPr>
               <a:t>도착율이</a:t>
             </a:r>
             <a:r>
-              <a:rPr lang="ko-KR" altLang="en-US" dirty="0" smtClean="0">
+              <a:rPr lang="ko-KR" altLang="en-US" dirty="0">
                 <a:sym typeface="Wingdings" panose="05000000000000000000" pitchFamily="2" charset="2"/>
               </a:rPr>
               <a:t> 일정한 경우</a:t>
             </a:r>
             <a:r>
-              <a:rPr lang="en-US" altLang="ko-KR" dirty="0" smtClean="0">
+              <a:rPr lang="en-US" altLang="ko-KR" dirty="0">
                 <a:sym typeface="Wingdings" panose="05000000000000000000" pitchFamily="2" charset="2"/>
               </a:rPr>
               <a:t>, </a:t>
             </a:r>
             <a:r>
-              <a:rPr lang="ko-KR" altLang="en-US" dirty="0" smtClean="0">
+              <a:rPr lang="ko-KR" altLang="en-US" dirty="0">
                 <a:sym typeface="Wingdings" panose="05000000000000000000" pitchFamily="2" charset="2"/>
               </a:rPr>
               <a:t>연동 필요가 없음</a:t>
             </a:r>
-            <a:r>
-              <a:rPr lang="en-US" altLang="ko-KR" dirty="0" smtClean="0">
-                <a:sym typeface="Wingdings" panose="05000000000000000000" pitchFamily="2" charset="2"/>
-              </a:rPr>
-              <a:t/>
-            </a:r>
             <a:br>
-              <a:rPr lang="en-US" altLang="ko-KR" dirty="0" smtClean="0">
+              <a:rPr lang="en-US" altLang="ko-KR" dirty="0">
                 <a:sym typeface="Wingdings" panose="05000000000000000000" pitchFamily="2" charset="2"/>
               </a:rPr>
             </a:br>
-            <a:endParaRPr lang="en-US" altLang="ko-KR" dirty="0" smtClean="0">
+            <a:endParaRPr lang="en-US" altLang="ko-KR" dirty="0">
               <a:sym typeface="Wingdings" panose="05000000000000000000" pitchFamily="2" charset="2"/>
             </a:endParaRPr>
           </a:p>
@@ -16607,12 +16427,12 @@
               </a:lnSpc>
             </a:pPr>
             <a:r>
-              <a:rPr lang="ko-KR" altLang="en-US" dirty="0" smtClean="0">
+              <a:rPr lang="ko-KR" altLang="en-US" dirty="0">
                 <a:sym typeface="Wingdings" panose="05000000000000000000" pitchFamily="2" charset="2"/>
               </a:rPr>
               <a:t>시간에 따른 교통량 변화</a:t>
             </a:r>
-            <a:endParaRPr lang="en-US" altLang="ko-KR" dirty="0" smtClean="0">
+            <a:endParaRPr lang="en-US" altLang="ko-KR" dirty="0">
               <a:sym typeface="Wingdings" panose="05000000000000000000" pitchFamily="2" charset="2"/>
             </a:endParaRPr>
           </a:p>
@@ -16623,42 +16443,42 @@
               </a:lnSpc>
             </a:pPr>
             <a:r>
-              <a:rPr lang="ko-KR" altLang="en-US" dirty="0" err="1" smtClean="0">
+              <a:rPr lang="ko-KR" altLang="en-US" dirty="0" err="1">
                 <a:sym typeface="Wingdings" panose="05000000000000000000" pitchFamily="2" charset="2"/>
               </a:rPr>
               <a:t>첨두</a:t>
             </a:r>
             <a:r>
-              <a:rPr lang="ko-KR" altLang="en-US" dirty="0" smtClean="0">
+              <a:rPr lang="ko-KR" altLang="en-US" dirty="0">
                 <a:sym typeface="Wingdings" panose="05000000000000000000" pitchFamily="2" charset="2"/>
               </a:rPr>
               <a:t> 시간대</a:t>
             </a:r>
             <a:r>
-              <a:rPr lang="en-US" altLang="ko-KR" dirty="0" smtClean="0">
+              <a:rPr lang="en-US" altLang="ko-KR" dirty="0">
                 <a:sym typeface="Wingdings" panose="05000000000000000000" pitchFamily="2" charset="2"/>
               </a:rPr>
               <a:t>: </a:t>
             </a:r>
             <a:r>
-              <a:rPr lang="ko-KR" altLang="en-US" dirty="0" smtClean="0">
+              <a:rPr lang="ko-KR" altLang="en-US" dirty="0">
                 <a:sym typeface="Wingdings" panose="05000000000000000000" pitchFamily="2" charset="2"/>
               </a:rPr>
               <a:t>연동 시스템의 구축보다 </a:t>
             </a:r>
             <a:r>
-              <a:rPr lang="ko-KR" altLang="en-US" dirty="0" err="1" smtClean="0">
+              <a:rPr lang="ko-KR" altLang="en-US" dirty="0" err="1">
                 <a:sym typeface="Wingdings" panose="05000000000000000000" pitchFamily="2" charset="2"/>
               </a:rPr>
               <a:t>통과용량</a:t>
             </a:r>
             <a:r>
-              <a:rPr lang="ko-KR" altLang="en-US" dirty="0" smtClean="0">
+              <a:rPr lang="ko-KR" altLang="en-US" dirty="0">
                 <a:sym typeface="Wingdings" panose="05000000000000000000" pitchFamily="2" charset="2"/>
               </a:rPr>
               <a:t> 극대화</a:t>
             </a:r>
-            <a:endParaRPr lang="en-US" altLang="ko-KR" dirty="0" smtClean="0">
+            <a:endParaRPr lang="en-US" altLang="ko-KR" dirty="0">
               <a:sym typeface="Wingdings" panose="05000000000000000000" pitchFamily="2" charset="2"/>
             </a:endParaRPr>
           </a:p>
@@ -16669,31 +16489,31 @@
               </a:lnSpc>
             </a:pPr>
             <a:r>
-              <a:rPr lang="ko-KR" altLang="en-US" dirty="0" smtClean="0">
+              <a:rPr lang="ko-KR" altLang="en-US" dirty="0">
                 <a:sym typeface="Wingdings" panose="05000000000000000000" pitchFamily="2" charset="2"/>
               </a:rPr>
               <a:t>비 </a:t>
             </a:r>
             <a:r>
-              <a:rPr lang="ko-KR" altLang="en-US" dirty="0" err="1" smtClean="0">
+              <a:rPr lang="ko-KR" altLang="en-US" dirty="0" err="1">
                 <a:sym typeface="Wingdings" panose="05000000000000000000" pitchFamily="2" charset="2"/>
               </a:rPr>
               <a:t>첨두</a:t>
             </a:r>
             <a:r>
-              <a:rPr lang="ko-KR" altLang="en-US" dirty="0" smtClean="0">
+              <a:rPr lang="ko-KR" altLang="en-US" dirty="0">
                 <a:sym typeface="Wingdings" panose="05000000000000000000" pitchFamily="2" charset="2"/>
               </a:rPr>
               <a:t> 시간대</a:t>
             </a:r>
             <a:r>
-              <a:rPr lang="en-US" altLang="ko-KR" dirty="0" smtClean="0">
+              <a:rPr lang="en-US" altLang="ko-KR" dirty="0">
                 <a:sym typeface="Wingdings" panose="05000000000000000000" pitchFamily="2" charset="2"/>
               </a:rPr>
               <a:t>: </a:t>
             </a:r>
             <a:r>
-              <a:rPr lang="ko-KR" altLang="en-US" dirty="0" smtClean="0">
+              <a:rPr lang="ko-KR" altLang="en-US" dirty="0">
                 <a:sym typeface="Wingdings" panose="05000000000000000000" pitchFamily="2" charset="2"/>
               </a:rPr>
               <a:t>두 교차로 사이에 유입되는 간선도로가 없을 때</a:t>
@@ -16748,7 +16568,7 @@
           <a:lstStyle/>
           <a:p>
             <a:r>
-              <a:rPr lang="en-US" altLang="ko-KR" dirty="0" smtClean="0"/>
+              <a:rPr lang="en-US" altLang="ko-KR" dirty="0"/>
               <a:t>Preliminary</a:t>
             </a:r>
             <a:endParaRPr lang="ko-KR" altLang="en-US" dirty="0"/>
@@ -16771,129 +16591,125 @@
           <a:lstStyle/>
           <a:p>
             <a:r>
-              <a:rPr lang="en-US" altLang="ko-KR" dirty="0" smtClean="0"/>
+              <a:rPr lang="en-US" altLang="ko-KR" dirty="0"/>
               <a:t> Spill back </a:t>
             </a:r>
           </a:p>
           <a:p>
             <a:pPr lvl="1"/>
             <a:r>
-              <a:rPr lang="ko-KR" altLang="en-US" dirty="0" smtClean="0"/>
+              <a:rPr lang="ko-KR" altLang="en-US" dirty="0"/>
               <a:t>신호교차로에서 </a:t>
             </a:r>
             <a:r>
-              <a:rPr lang="ko-KR" altLang="en-US" dirty="0" err="1" smtClean="0"/>
+              <a:rPr lang="ko-KR" altLang="en-US" dirty="0" err="1"/>
               <a:t>꼬리물기</a:t>
             </a:r>
             <a:r>
-              <a:rPr lang="en-US" altLang="ko-KR" dirty="0" smtClean="0"/>
+              <a:rPr lang="en-US" altLang="ko-KR" dirty="0"/>
               <a:t>, </a:t>
             </a:r>
             <a:r>
-              <a:rPr lang="ko-KR" altLang="en-US" dirty="0" smtClean="0"/>
+              <a:rPr lang="ko-KR" altLang="en-US" dirty="0"/>
               <a:t>교통량 과다 등이 원인이 되어 </a:t>
             </a:r>
             <a:r>
-              <a:rPr lang="en-US" altLang="ko-KR" dirty="0" smtClean="0"/>
+              <a:rPr lang="en-US" altLang="ko-KR" dirty="0"/>
               <a:t>inflow intersection</a:t>
             </a:r>
             <a:r>
-              <a:rPr lang="ko-KR" altLang="en-US" dirty="0" smtClean="0"/>
+              <a:rPr lang="ko-KR" altLang="en-US" dirty="0"/>
               <a:t>까지 차량이 넘쳐나서 원활한 통행을 방해하는 현상</a:t>
             </a:r>
-            <a:endParaRPr lang="en-US" altLang="ko-KR" dirty="0" smtClean="0"/>
-          </a:p>
-          <a:p>
-            <a:r>
-              <a:rPr lang="en-US" altLang="ko-KR" dirty="0" smtClean="0"/>
+            <a:endParaRPr lang="en-US" altLang="ko-KR" dirty="0"/>
+          </a:p>
+          <a:p>
+            <a:r>
+              <a:rPr lang="en-US" altLang="ko-KR" dirty="0"/>
               <a:t> Signal Phase</a:t>
             </a:r>
           </a:p>
           <a:p>
             <a:pPr lvl="1"/>
             <a:r>
-              <a:rPr lang="en-US" altLang="ko-KR" dirty="0" smtClean="0"/>
+              <a:rPr lang="en-US" altLang="ko-KR" dirty="0"/>
               <a:t>Signal set in intersection (n lane-&gt;n*4 signal set length)</a:t>
             </a:r>
           </a:p>
           <a:p>
             <a:pPr lvl="1"/>
             <a:r>
-              <a:rPr lang="ko-KR" altLang="en-US" dirty="0" smtClean="0"/>
+              <a:rPr lang="ko-KR" altLang="en-US" dirty="0"/>
               <a:t>보통 </a:t>
             </a:r>
             <a:r>
-              <a:rPr lang="en-US" altLang="ko-KR" dirty="0" smtClean="0"/>
+              <a:rPr lang="en-US" altLang="ko-KR" dirty="0"/>
               <a:t>8</a:t>
             </a:r>
             <a:r>
-              <a:rPr lang="ko-KR" altLang="en-US" dirty="0" smtClean="0"/>
+              <a:rPr lang="ko-KR" altLang="en-US" dirty="0"/>
               <a:t>개의 </a:t>
             </a:r>
             <a:r>
-              <a:rPr lang="en-US" altLang="ko-KR" dirty="0" smtClean="0"/>
+              <a:rPr lang="en-US" altLang="ko-KR" dirty="0"/>
               <a:t>Signal phase</a:t>
             </a:r>
             <a:r>
-              <a:rPr lang="ko-KR" altLang="en-US" dirty="0" smtClean="0"/>
+              <a:rPr lang="ko-KR" altLang="en-US" dirty="0"/>
               <a:t>를 가짐 </a:t>
             </a:r>
             <a:r>
-              <a:rPr lang="en-US" altLang="ko-KR" dirty="0" smtClean="0"/>
+              <a:rPr lang="en-US" altLang="ko-KR" dirty="0"/>
               <a:t>(Combined with movement signal)</a:t>
             </a:r>
           </a:p>
           <a:p>
             <a:pPr lvl="1"/>
             <a:r>
-              <a:rPr lang="en-US" altLang="ko-KR" dirty="0" smtClean="0"/>
+              <a:rPr lang="en-US" altLang="ko-KR" dirty="0"/>
               <a:t>Isolated intersection</a:t>
             </a:r>
             <a:r>
-              <a:rPr lang="ko-KR" altLang="en-US" dirty="0" smtClean="0"/>
+              <a:rPr lang="ko-KR" altLang="en-US" dirty="0"/>
               <a:t>에서는 </a:t>
             </a:r>
             <a:r>
-              <a:rPr lang="en-US" altLang="ko-KR" dirty="0" smtClean="0"/>
+              <a:rPr lang="en-US" altLang="ko-KR" dirty="0"/>
               <a:t>paired-signal phases</a:t>
             </a:r>
             <a:r>
-              <a:rPr lang="ko-KR" altLang="en-US" dirty="0" smtClean="0"/>
+              <a:rPr lang="ko-KR" altLang="en-US" dirty="0"/>
               <a:t>를 주로 사용</a:t>
             </a:r>
-            <a:endParaRPr lang="en-US" altLang="ko-KR" dirty="0" smtClean="0"/>
+            <a:endParaRPr lang="en-US" altLang="ko-KR" dirty="0"/>
           </a:p>
           <a:p>
             <a:pPr lvl="1"/>
             <a:r>
-              <a:rPr lang="en-US" altLang="ko-KR" dirty="0" smtClean="0"/>
+              <a:rPr lang="en-US" altLang="ko-KR" dirty="0"/>
               <a:t>Multi-grouped intersection</a:t>
             </a:r>
             <a:r>
-              <a:rPr lang="ko-KR" altLang="en-US" dirty="0" smtClean="0"/>
+              <a:rPr lang="ko-KR" altLang="en-US" dirty="0"/>
               <a:t>에서는 </a:t>
             </a:r>
             <a:r>
-              <a:rPr lang="en-US" altLang="ko-KR" dirty="0" smtClean="0"/>
+              <a:rPr lang="en-US" altLang="ko-KR" dirty="0"/>
               <a:t>single-signal phase </a:t>
             </a:r>
             <a:r>
-              <a:rPr lang="ko-KR" altLang="en-US" dirty="0" smtClean="0"/>
+              <a:rPr lang="ko-KR" altLang="en-US" dirty="0"/>
               <a:t>사용하여 </a:t>
             </a:r>
             <a:r>
-              <a:rPr lang="en-US" altLang="ko-KR" dirty="0" smtClean="0"/>
+              <a:rPr lang="en-US" altLang="ko-KR" dirty="0"/>
               <a:t>spill back</a:t>
             </a:r>
             <a:r>
               <a:rPr lang="ko-KR" altLang="en-US" dirty="0"/>
-              <a:t> </a:t>
-            </a:r>
-            <a:r>
-              <a:rPr lang="ko-KR" altLang="en-US" dirty="0" smtClean="0"/>
-              <a:t>예방</a:t>
-            </a:r>
-            <a:endParaRPr lang="en-US" altLang="ko-KR" dirty="0" smtClean="0"/>
+              <a:t> 예방</a:t>
+            </a:r>
+            <a:endParaRPr lang="en-US" altLang="ko-KR" dirty="0"/>
           </a:p>
         </p:txBody>
       </p:sp>
@@ -17027,7 +16843,7 @@
           <a:p>
             <a:pPr algn="ctr"/>
             <a:r>
-              <a:rPr lang="en-US" altLang="ko-KR" dirty="0" smtClean="0"/>
+              <a:rPr lang="en-US" altLang="ko-KR" dirty="0"/>
               <a:t>2x2 grid</a:t>
             </a:r>
             <a:endParaRPr lang="ko-KR" altLang="en-US" dirty="0"/>
@@ -17058,7 +16874,7 @@
           <a:p>
             <a:pPr algn="ctr"/>
             <a:r>
-              <a:rPr lang="en-US" altLang="ko-KR" dirty="0" smtClean="0"/>
+              <a:rPr lang="en-US" altLang="ko-KR" dirty="0"/>
               <a:t>3x3 grid</a:t>
             </a:r>
             <a:endParaRPr lang="ko-KR" altLang="en-US" dirty="0"/>
@@ -17149,10 +16965,6 @@
               <a:rPr lang="ko-KR" altLang="en-US" dirty="0"/>
               <a:t>를 조절</a:t>
             </a:r>
-            <a:r>
-              <a:rPr lang="en-US" altLang="ko-KR" dirty="0"/>
-              <a:t/>
-            </a:r>
             <a:br>
               <a:rPr lang="en-US" altLang="ko-KR" dirty="0"/>
             </a:br>
@@ -17300,10 +17112,6 @@
             <a:r>
               <a:rPr lang="ko-KR" altLang="en-US" dirty="0"/>
               <a:t>을 사용</a:t>
-            </a:r>
-            <a:r>
-              <a:rPr lang="en-US" altLang="ko-KR" dirty="0"/>
-              <a:t/>
             </a:r>
             <a:br>
               <a:rPr lang="en-US" altLang="ko-KR" dirty="0"/>
@@ -18110,10 +17918,6 @@
               <a:rPr lang="ko-KR" altLang="en-US" dirty="0"/>
               <a:t>부여 방식</a:t>
             </a:r>
-            <a:r>
-              <a:rPr lang="en-US" altLang="ko-KR" dirty="0"/>
-              <a:t/>
-            </a:r>
             <a:br>
               <a:rPr lang="en-US" altLang="ko-KR" dirty="0"/>
             </a:br>
@@ -18133,10 +17937,6 @@
               <a:rPr lang="ko-KR" altLang="en-US" dirty="0"/>
               <a:t>의 방향 별로 부여</a:t>
             </a:r>
-            <a:r>
-              <a:rPr lang="en-US" altLang="ko-KR" dirty="0"/>
-              <a:t/>
-            </a:r>
             <a:br>
               <a:rPr lang="en-US" altLang="ko-KR" dirty="0"/>
             </a:br>
@@ -18185,10 +17985,6 @@
             <a:r>
               <a:rPr lang="ko-KR" altLang="en-US" dirty="0"/>
               <a:t> 개수 조절 가능</a:t>
-            </a:r>
-            <a:r>
-              <a:rPr lang="en-US" altLang="ko-KR" dirty="0"/>
-              <a:t/>
             </a:r>
             <a:br>
               <a:rPr lang="en-US" altLang="ko-KR" dirty="0"/>

</xml_diff>

<commit_message>
add the configs and organize DQN
</commit_message>
<xml_diff>
--- a/1st_Seminar(강민수).pptx
+++ b/1st_Seminar(강민수).pptx
@@ -7159,9 +7159,10 @@
           <a:lstStyle/>
           <a:p>
             <a:r>
-              <a:rPr lang="ko-KR" altLang="en-US" dirty="0"/>
-              <a:t>사전 발표</a:t>
-            </a:r>
+              <a:rPr lang="en-US" altLang="ko-KR" dirty="0"/>
+              <a:t>Seminar</a:t>
+            </a:r>
+            <a:endParaRPr lang="ko-KR" altLang="en-US" dirty="0"/>
           </a:p>
         </p:txBody>
       </p:sp>
@@ -7262,10 +7263,6 @@
             <a:r>
               <a:rPr lang="ko-KR" altLang="en-US" dirty="0"/>
               <a:t>을 사용</a:t>
-            </a:r>
-            <a:r>
-              <a:rPr lang="en-US" altLang="ko-KR" dirty="0"/>
-              <a:t/>
             </a:r>
             <a:br>
               <a:rPr lang="en-US" altLang="ko-KR" dirty="0"/>
@@ -8032,10 +8029,6 @@
               <a:rPr lang="ko-KR" altLang="en-US" dirty="0"/>
               <a:t>부여 방식</a:t>
             </a:r>
-            <a:r>
-              <a:rPr lang="en-US" altLang="ko-KR" dirty="0"/>
-              <a:t/>
-            </a:r>
             <a:br>
               <a:rPr lang="en-US" altLang="ko-KR" dirty="0"/>
             </a:br>
@@ -8054,10 +8047,6 @@
             <a:r>
               <a:rPr lang="ko-KR" altLang="en-US" dirty="0"/>
               <a:t>의 방향 별로 부여</a:t>
-            </a:r>
-            <a:r>
-              <a:rPr lang="en-US" altLang="ko-KR" dirty="0"/>
-              <a:t/>
             </a:r>
             <a:br>
               <a:rPr lang="en-US" altLang="ko-KR" dirty="0"/>
@@ -8107,10 +8096,6 @@
             <a:r>
               <a:rPr lang="ko-KR" altLang="en-US" dirty="0"/>
               <a:t> 개수 조절 가능</a:t>
-            </a:r>
-            <a:r>
-              <a:rPr lang="en-US" altLang="ko-KR" dirty="0"/>
-              <a:t/>
             </a:r>
             <a:br>
               <a:rPr lang="en-US" altLang="ko-KR" dirty="0"/>
@@ -8415,10 +8400,6 @@
               <a:rPr lang="en-US" altLang="ko-KR" dirty="0" err="1"/>
               <a:t>getIDList</a:t>
             </a:r>
-            <a:r>
-              <a:rPr lang="en-US" altLang="ko-KR" dirty="0"/>
-              <a:t/>
-            </a:r>
             <a:br>
               <a:rPr lang="en-US" altLang="ko-KR" dirty="0"/>
             </a:br>
@@ -8427,24 +8408,20 @@
               <a:t>- State: </a:t>
             </a:r>
             <a:r>
-              <a:rPr lang="en-US" altLang="ko-KR" dirty="0" err="1" smtClean="0"/>
+              <a:rPr lang="en-US" altLang="ko-KR" dirty="0" err="1"/>
               <a:t>getRedYellowGreenState</a:t>
             </a:r>
             <a:r>
-              <a:rPr lang="en-US" altLang="ko-KR" dirty="0" smtClean="0"/>
+              <a:rPr lang="en-US" altLang="ko-KR" dirty="0"/>
               <a:t> , phase state</a:t>
             </a:r>
             <a:r>
-              <a:rPr lang="ko-KR" altLang="en-US" dirty="0" smtClean="0"/>
+              <a:rPr lang="ko-KR" altLang="en-US" dirty="0"/>
               <a:t>를 </a:t>
             </a:r>
             <a:r>
-              <a:rPr lang="ko-KR" altLang="en-US" dirty="0" err="1" smtClean="0"/>
+              <a:rPr lang="ko-KR" altLang="en-US" dirty="0" err="1"/>
               <a:t>받아옴</a:t>
-            </a:r>
-            <a:r>
-              <a:rPr lang="en-US" altLang="ko-KR" dirty="0"/>
-              <a:t/>
             </a:r>
             <a:br>
               <a:rPr lang="en-US" altLang="ko-KR" dirty="0"/>
@@ -8470,11 +8447,7 @@
             </a:r>
             <a:r>
               <a:rPr lang="en-US" altLang="ko-KR"/>
-              <a:t>Current </a:t>
-            </a:r>
-            <a:r>
-              <a:rPr lang="en-US" altLang="ko-KR" smtClean="0"/>
-              <a:t>phase number: </a:t>
+              <a:t>Current phase number: </a:t>
             </a:r>
             <a:r>
               <a:rPr lang="en-US" altLang="ko-KR" dirty="0" err="1"/>
@@ -8505,24 +8478,16 @@
               <a:t>의 </a:t>
             </a:r>
             <a:r>
-              <a:rPr lang="en-US" altLang="ko-KR" dirty="0" smtClean="0"/>
-              <a:t>index (</a:t>
-            </a:r>
-            <a:r>
-              <a:rPr lang="en-US" altLang="ko-KR" dirty="0" smtClean="0"/>
-              <a:t>id</a:t>
-            </a:r>
-            <a:r>
-              <a:rPr lang="ko-KR" altLang="en-US" dirty="0" smtClean="0"/>
+              <a:rPr lang="en-US" altLang="ko-KR" dirty="0"/>
+              <a:t>index (id</a:t>
+            </a:r>
+            <a:r>
+              <a:rPr lang="ko-KR" altLang="en-US" dirty="0"/>
               <a:t>에 등록된 것만</a:t>
             </a:r>
             <a:r>
-              <a:rPr lang="en-US" altLang="ko-KR" dirty="0" smtClean="0"/>
+              <a:rPr lang="en-US" altLang="ko-KR" dirty="0"/>
               <a:t>)</a:t>
-            </a:r>
-            <a:r>
-              <a:rPr lang="en-US" altLang="ko-KR" dirty="0"/>
-              <a:t/>
             </a:r>
             <a:br>
               <a:rPr lang="en-US" altLang="ko-KR" dirty="0"/>
@@ -8561,10 +8526,6 @@
               <a:rPr lang="en-US" altLang="ko-KR" dirty="0" err="1"/>
               <a:t>setRedYellowGreenState</a:t>
             </a:r>
-            <a:r>
-              <a:rPr lang="en-US" altLang="ko-KR" dirty="0"/>
-              <a:t/>
-            </a:r>
             <a:br>
               <a:rPr lang="en-US" altLang="ko-KR" dirty="0"/>
             </a:br>
@@ -8576,10 +8537,6 @@
               <a:rPr lang="en-US" altLang="ko-KR" dirty="0" err="1"/>
               <a:t>setPhaseDuration</a:t>
             </a:r>
-            <a:r>
-              <a:rPr lang="en-US" altLang="ko-KR" dirty="0"/>
-              <a:t/>
-            </a:r>
             <a:br>
               <a:rPr lang="en-US" altLang="ko-KR" dirty="0"/>
             </a:br>
@@ -8606,10 +8563,6 @@
             <a:r>
               <a:rPr lang="ko-KR" altLang="en-US" dirty="0"/>
               <a:t> 프로그램 삽입</a:t>
-            </a:r>
-            <a:r>
-              <a:rPr lang="en-US" altLang="ko-KR" dirty="0"/>
-              <a:t/>
             </a:r>
             <a:br>
               <a:rPr lang="en-US" altLang="ko-KR" dirty="0"/>
@@ -8920,10 +8873,6 @@
               <a:rPr lang="en-US" altLang="ko-KR" sz="2400" b="1" dirty="0"/>
               <a:t>Toward A Thousand Lights:</a:t>
             </a:r>
-            <a:r>
-              <a:rPr lang="en-US" altLang="ko-KR" sz="2400" dirty="0"/>
-              <a:t/>
-            </a:r>
             <a:br>
               <a:rPr lang="en-US" altLang="ko-KR" sz="2400" dirty="0"/>
             </a:br>
@@ -9098,15 +9047,7 @@
             </a:br>
             <a:r>
               <a:rPr lang="en-US" altLang="ko-KR" sz="1800" dirty="0"/>
-              <a:t>- </a:t>
-            </a:r>
-            <a:r>
-              <a:rPr lang="en-US" altLang="ko-KR" sz="1800" dirty="0" smtClean="0"/>
-              <a:t>Decentralized </a:t>
-            </a:r>
-            <a:r>
-              <a:rPr lang="en-US" altLang="ko-KR" sz="1800" dirty="0"/>
-              <a:t>agent based multi-intersection method with FRAP model</a:t>
+              <a:t>- Decentralized agent based multi-intersection method with FRAP model</a:t>
             </a:r>
           </a:p>
           <a:p>
@@ -9223,12 +9164,6 @@
               <a:rPr lang="en-US" altLang="ko-KR" dirty="0"/>
               <a:t>Increase emission gas (contributes 23% of total CO2 emission) </a:t>
             </a:r>
-            <a:r>
-              <a:rPr lang="en-US" altLang="ko-KR" dirty="0">
-                <a:sym typeface="Wingdings" panose="05000000000000000000" pitchFamily="2" charset="2"/>
-              </a:rPr>
-              <a:t/>
-            </a:r>
             <a:br>
               <a:rPr lang="en-US" altLang="ko-KR" dirty="0">
                 <a:sym typeface="Wingdings" panose="05000000000000000000" pitchFamily="2" charset="2"/>
@@ -9250,10 +9185,6 @@
                 <a:sym typeface="Wingdings" panose="05000000000000000000" pitchFamily="2" charset="2"/>
               </a:rPr>
               <a:t> Trend: applying RL method for traffic signal control</a:t>
-            </a:r>
-            <a:r>
-              <a:rPr lang="en-US" altLang="ko-KR" dirty="0"/>
-              <a:t/>
             </a:r>
             <a:br>
               <a:rPr lang="en-US" altLang="ko-KR" dirty="0"/>
@@ -9636,10 +9567,6 @@
             <a:br>
               <a:rPr lang="en-US" altLang="ko-KR" dirty="0"/>
             </a:br>
-            <a:r>
-              <a:rPr lang="en-US" altLang="ko-KR" dirty="0"/>
-              <a:t/>
-            </a:r>
             <a:br>
               <a:rPr lang="en-US" altLang="ko-KR" dirty="0"/>
             </a:br>
@@ -10033,10 +9960,6 @@
             <a:br>
               <a:rPr lang="en-US" altLang="ko-KR" dirty="0"/>
             </a:br>
-            <a:r>
-              <a:rPr lang="en-US" altLang="ko-KR" dirty="0"/>
-              <a:t/>
-            </a:r>
             <a:br>
               <a:rPr lang="en-US" altLang="ko-KR" dirty="0"/>
             </a:br>
@@ -10431,10 +10354,6 @@
             <a:r>
               <a:rPr lang="ko-KR" altLang="en-US" dirty="0"/>
               <a:t>제작</a:t>
-            </a:r>
-            <a:r>
-              <a:rPr lang="en-US" altLang="ko-KR" dirty="0"/>
-              <a:t/>
             </a:r>
             <a:br>
               <a:rPr lang="en-US" altLang="ko-KR" dirty="0"/>
@@ -11251,7 +11170,7 @@
             <a:pPr lvl="1"/>
             <a:r>
               <a:rPr lang="en-US" altLang="ko-KR" dirty="0"/>
-              <a:t>Few reward design for direct coordination</a:t>
+              <a:t>Few reward designs for direct coordination</a:t>
             </a:r>
           </a:p>
           <a:p>
@@ -11283,6 +11202,27 @@
             <a:r>
               <a:rPr lang="en-US" altLang="ko-KR" dirty="0"/>
               <a:t>Decentralized agent network</a:t>
+            </a:r>
+          </a:p>
+          <a:p>
+            <a:pPr lvl="2"/>
+            <a:r>
+              <a:rPr lang="en-US" altLang="ko-KR" dirty="0"/>
+              <a:t>Old-school reward function that uses common transport measurement(ex. Avg waiting time, delay)</a:t>
+            </a:r>
+          </a:p>
+          <a:p>
+            <a:pPr lvl="2"/>
+            <a:r>
+              <a:rPr lang="en-US" altLang="ko-KR" dirty="0"/>
+              <a:t>No guarantee to maximize each agent’s own expected reward</a:t>
+            </a:r>
+          </a:p>
+          <a:p>
+            <a:pPr lvl="2"/>
+            <a:r>
+              <a:rPr lang="en-US" altLang="ko-KR" dirty="0"/>
+              <a:t>Too complicated features to represent the traffic condition</a:t>
             </a:r>
           </a:p>
           <a:p>
@@ -11490,10 +11430,6 @@
             <a:br>
               <a:rPr lang="en-US" altLang="ko-KR" dirty="0"/>
             </a:br>
-            <a:r>
-              <a:rPr lang="en-US" altLang="ko-KR" dirty="0"/>
-              <a:t/>
-            </a:r>
             <a:br>
               <a:rPr lang="en-US" altLang="ko-KR" dirty="0"/>
             </a:br>
@@ -12955,7 +12891,7 @@
               <a:lstStyle/>
               <a:p>
                 <a:r>
-                  <a:rPr lang="en-US" altLang="ko-KR" dirty="0" smtClean="0"/>
+                  <a:rPr lang="en-US" altLang="ko-KR" dirty="0"/>
                   <a:t> Deep Q-Network</a:t>
                 </a:r>
               </a:p>
@@ -12970,15 +12906,7 @@
                 <a:pPr lvl="1"/>
                 <a:r>
                   <a:rPr lang="en-US" altLang="ko-KR" dirty="0"/>
-                  <a:t>Loss function that compare fixed target Q and approximated local Q </a:t>
-                </a:r>
-                <a:r>
-                  <a:rPr lang="en-US" altLang="ko-KR" dirty="0" smtClean="0"/>
-                  <a:t>(by bellman equation)</a:t>
-                </a:r>
-                <a:r>
-                  <a:rPr lang="en-US" altLang="ko-KR" dirty="0"/>
-                  <a:t/>
+                  <a:t>Loss function that compare fixed target Q and approximated local Q (by bellman equation)</a:t>
                 </a:r>
                 <a:br>
                   <a:rPr lang="en-US" altLang="ko-KR" dirty="0"/>
@@ -15746,22 +15674,16 @@
               <a:t> </a:t>
             </a:r>
             <a:r>
-              <a:rPr lang="en-US" altLang="ko-KR" dirty="0" err="1" smtClean="0">
+              <a:rPr lang="en-US" altLang="ko-KR" dirty="0" err="1">
                 <a:sym typeface="Wingdings" panose="05000000000000000000" pitchFamily="2" charset="2"/>
               </a:rPr>
               <a:t>MetaLight</a:t>
-            </a:r>
-            <a:r>
-              <a:rPr lang="en-US" altLang="ko-KR" dirty="0" smtClean="0">
-                <a:sym typeface="Wingdings" panose="05000000000000000000" pitchFamily="2" charset="2"/>
-              </a:rPr>
-              <a:t>(Faster Learning)</a:t>
             </a:r>
             <a:r>
               <a:rPr lang="en-US" altLang="ko-KR" dirty="0">
                 <a:sym typeface="Wingdings" panose="05000000000000000000" pitchFamily="2" charset="2"/>
               </a:rPr>
-              <a:t/>
+              <a:t>(Faster Learning)</a:t>
             </a:r>
             <a:br>
               <a:rPr lang="en-US" altLang="ko-KR" dirty="0">
@@ -15772,13 +15694,7 @@
               <a:rPr lang="en-US" altLang="ko-KR" dirty="0">
                 <a:sym typeface="Wingdings" panose="05000000000000000000" pitchFamily="2" charset="2"/>
               </a:rPr>
-              <a:t> Multi-agent learning(scalable</a:t>
-            </a:r>
-            <a:r>
-              <a:rPr lang="en-US" altLang="ko-KR" dirty="0" smtClean="0">
-                <a:sym typeface="Wingdings" panose="05000000000000000000" pitchFamily="2" charset="2"/>
-              </a:rPr>
-              <a:t>)</a:t>
+              <a:t> Multi-agent learning(scalable)</a:t>
             </a:r>
           </a:p>
         </p:txBody>
@@ -15896,80 +15812,72 @@
           <a:p>
             <a:r>
               <a:rPr lang="en-US" altLang="ko-KR" dirty="0"/>
-              <a:t> </a:t>
-            </a:r>
-            <a:r>
-              <a:rPr lang="en-US" altLang="ko-KR" dirty="0" smtClean="0"/>
-              <a:t>Opinion</a:t>
+              <a:t> Opinion</a:t>
             </a:r>
           </a:p>
           <a:p>
             <a:pPr lvl="1"/>
             <a:r>
-              <a:rPr lang="ko-KR" altLang="en-US" dirty="0" smtClean="0"/>
+              <a:rPr lang="ko-KR" altLang="en-US" dirty="0"/>
               <a:t>다른 </a:t>
             </a:r>
             <a:r>
-              <a:rPr lang="en-US" altLang="ko-KR" dirty="0" smtClean="0"/>
+              <a:rPr lang="en-US" altLang="ko-KR" dirty="0"/>
               <a:t>traffic light</a:t>
             </a:r>
             <a:r>
-              <a:rPr lang="ko-KR" altLang="en-US" dirty="0" smtClean="0"/>
+              <a:rPr lang="ko-KR" altLang="en-US" dirty="0"/>
               <a:t>가 추가 되었을 때</a:t>
             </a:r>
             <a:r>
-              <a:rPr lang="en-US" altLang="ko-KR" dirty="0" smtClean="0"/>
+              <a:rPr lang="en-US" altLang="ko-KR" dirty="0"/>
               <a:t>, </a:t>
             </a:r>
             <a:r>
-              <a:rPr lang="ko-KR" altLang="en-US" dirty="0" smtClean="0"/>
+              <a:rPr lang="ko-KR" altLang="en-US" dirty="0"/>
               <a:t>학습 시키려면 </a:t>
             </a:r>
             <a:r>
-              <a:rPr lang="ko-KR" altLang="en-US" dirty="0" err="1" smtClean="0"/>
+              <a:rPr lang="ko-KR" altLang="en-US" dirty="0" err="1"/>
               <a:t>오래걸릴</a:t>
             </a:r>
             <a:r>
-              <a:rPr lang="ko-KR" altLang="en-US" dirty="0" smtClean="0"/>
+              <a:rPr lang="ko-KR" altLang="en-US" dirty="0"/>
               <a:t> 것 </a:t>
             </a:r>
             <a:r>
-              <a:rPr lang="en-US" altLang="ko-KR" dirty="0" smtClean="0"/>
+              <a:rPr lang="en-US" altLang="ko-KR" dirty="0"/>
               <a:t>(State</a:t>
             </a:r>
             <a:r>
-              <a:rPr lang="ko-KR" altLang="en-US" dirty="0" smtClean="0"/>
+              <a:rPr lang="ko-KR" altLang="en-US" dirty="0"/>
               <a:t>가 너무 많음</a:t>
             </a:r>
             <a:r>
-              <a:rPr lang="en-US" altLang="ko-KR" dirty="0" smtClean="0"/>
+              <a:rPr lang="en-US" altLang="ko-KR" dirty="0"/>
               <a:t>) </a:t>
             </a:r>
           </a:p>
           <a:p>
             <a:pPr lvl="1"/>
             <a:r>
-              <a:rPr lang="ko-KR" altLang="en-US" dirty="0" smtClean="0"/>
+              <a:rPr lang="ko-KR" altLang="en-US" dirty="0"/>
               <a:t>결국 </a:t>
             </a:r>
             <a:r>
-              <a:rPr lang="en-US" altLang="ko-KR" dirty="0" smtClean="0"/>
+              <a:rPr lang="en-US" altLang="ko-KR" dirty="0"/>
               <a:t>Coordinate</a:t>
             </a:r>
             <a:r>
-              <a:rPr lang="ko-KR" altLang="en-US" dirty="0" smtClean="0"/>
+              <a:rPr lang="ko-KR" altLang="en-US" dirty="0"/>
               <a:t>라기 보단 모든 상황을 보고 자신에게 최적인 것만 학습할 뿐</a:t>
             </a:r>
-            <a:endParaRPr lang="en-US" altLang="ko-KR" dirty="0" smtClean="0"/>
-          </a:p>
-          <a:p>
-            <a:r>
-              <a:rPr lang="en-US" altLang="ko-KR" dirty="0" smtClean="0"/>
-              <a:t>Improvement </a:t>
-            </a:r>
-            <a:r>
-              <a:rPr lang="en-US" altLang="ko-KR" dirty="0"/>
-              <a:t>Proposal</a:t>
+            <a:endParaRPr lang="en-US" altLang="ko-KR" dirty="0"/>
+          </a:p>
+          <a:p>
+            <a:r>
+              <a:rPr lang="en-US" altLang="ko-KR" dirty="0"/>
+              <a:t>Improvement Proposal</a:t>
             </a:r>
           </a:p>
           <a:p>
@@ -15984,13 +15892,9 @@
             <a:pPr lvl="1"/>
             <a:r>
               <a:rPr lang="ko-KR" altLang="en-US" dirty="0"/>
-              <a:t>논문과의 비교와 </a:t>
-            </a:r>
-            <a:r>
-              <a:rPr lang="ko-KR" altLang="en-US" dirty="0" smtClean="0"/>
-              <a:t>개선</a:t>
-            </a:r>
-            <a:endParaRPr lang="en-US" altLang="ko-KR" dirty="0" smtClean="0"/>
+              <a:t>논문과의 비교와 개선</a:t>
+            </a:r>
+            <a:endParaRPr lang="en-US" altLang="ko-KR" dirty="0"/>
           </a:p>
           <a:p>
             <a:pPr lvl="1"/>
@@ -15998,98 +15902,98 @@
           </a:p>
           <a:p>
             <a:r>
-              <a:rPr lang="en-US" altLang="ko-KR" dirty="0" smtClean="0"/>
+              <a:rPr lang="en-US" altLang="ko-KR" dirty="0"/>
               <a:t> </a:t>
             </a:r>
             <a:r>
-              <a:rPr lang="ko-KR" altLang="en-US" dirty="0" smtClean="0"/>
+              <a:rPr lang="ko-KR" altLang="en-US" dirty="0"/>
               <a:t>우선 해야할 것</a:t>
             </a:r>
-            <a:endParaRPr lang="en-US" altLang="ko-KR" dirty="0" smtClean="0"/>
+            <a:endParaRPr lang="en-US" altLang="ko-KR" dirty="0"/>
           </a:p>
           <a:p>
             <a:pPr lvl="1"/>
             <a:r>
-              <a:rPr lang="en-US" altLang="ko-KR" dirty="0" smtClean="0"/>
+              <a:rPr lang="en-US" altLang="ko-KR" dirty="0"/>
               <a:t>Traci </a:t>
             </a:r>
             <a:r>
-              <a:rPr lang="ko-KR" altLang="en-US" dirty="0" smtClean="0"/>
+              <a:rPr lang="ko-KR" altLang="en-US" dirty="0"/>
               <a:t>기반 </a:t>
             </a:r>
             <a:r>
-              <a:rPr lang="en-US" altLang="ko-KR" dirty="0" smtClean="0"/>
+              <a:rPr lang="en-US" altLang="ko-KR" dirty="0"/>
               <a:t>state </a:t>
             </a:r>
             <a:r>
-              <a:rPr lang="ko-KR" altLang="en-US" dirty="0" smtClean="0"/>
+              <a:rPr lang="ko-KR" altLang="en-US" dirty="0"/>
               <a:t>받아오기</a:t>
             </a:r>
-            <a:endParaRPr lang="en-US" altLang="ko-KR" dirty="0" smtClean="0"/>
+            <a:endParaRPr lang="en-US" altLang="ko-KR" dirty="0"/>
           </a:p>
           <a:p>
             <a:pPr lvl="1"/>
             <a:r>
-              <a:rPr lang="en-US" altLang="ko-KR" dirty="0" err="1" smtClean="0"/>
+              <a:rPr lang="en-US" altLang="ko-KR" dirty="0" err="1"/>
               <a:t>Tensorboard</a:t>
             </a:r>
             <a:r>
-              <a:rPr lang="ko-KR" altLang="en-US" dirty="0" smtClean="0"/>
+              <a:rPr lang="ko-KR" altLang="en-US" dirty="0"/>
               <a:t>로 넘어가는 </a:t>
             </a:r>
             <a:r>
-              <a:rPr lang="en-US" altLang="ko-KR" dirty="0" smtClean="0"/>
+              <a:rPr lang="en-US" altLang="ko-KR" dirty="0"/>
               <a:t>xml </a:t>
             </a:r>
             <a:r>
-              <a:rPr lang="ko-KR" altLang="en-US" dirty="0" smtClean="0"/>
+              <a:rPr lang="ko-KR" altLang="en-US" dirty="0"/>
               <a:t>파일 생성 위치 </a:t>
             </a:r>
             <a:r>
-              <a:rPr lang="en-US" altLang="ko-KR" dirty="0" smtClean="0"/>
+              <a:rPr lang="en-US" altLang="ko-KR" dirty="0"/>
               <a:t>data</a:t>
             </a:r>
             <a:r>
-              <a:rPr lang="ko-KR" altLang="en-US" dirty="0" smtClean="0"/>
+              <a:rPr lang="ko-KR" altLang="en-US" dirty="0"/>
               <a:t>로 획일화 및 구분 필요</a:t>
             </a:r>
-            <a:endParaRPr lang="en-US" altLang="ko-KR" dirty="0" smtClean="0"/>
+            <a:endParaRPr lang="en-US" altLang="ko-KR" dirty="0"/>
           </a:p>
           <a:p>
             <a:pPr lvl="1"/>
             <a:r>
-              <a:rPr lang="en-US" altLang="ko-KR" dirty="0" smtClean="0"/>
+              <a:rPr lang="en-US" altLang="ko-KR" dirty="0"/>
               <a:t>FRAP </a:t>
             </a:r>
             <a:r>
-              <a:rPr lang="ko-KR" altLang="en-US" dirty="0" smtClean="0"/>
+              <a:rPr lang="ko-KR" altLang="en-US" dirty="0"/>
               <a:t>모델 생성</a:t>
             </a:r>
-            <a:endParaRPr lang="en-US" altLang="ko-KR" dirty="0" smtClean="0"/>
+            <a:endParaRPr lang="en-US" altLang="ko-KR" dirty="0"/>
           </a:p>
           <a:p>
             <a:pPr lvl="1"/>
             <a:r>
-              <a:rPr lang="en-US" altLang="ko-KR" dirty="0" smtClean="0"/>
+              <a:rPr lang="en-US" altLang="ko-KR" dirty="0"/>
               <a:t>Traffic Light Phase </a:t>
             </a:r>
             <a:r>
-              <a:rPr lang="ko-KR" altLang="en-US" dirty="0" smtClean="0"/>
+              <a:rPr lang="ko-KR" altLang="en-US" dirty="0"/>
               <a:t>정립</a:t>
             </a:r>
-            <a:endParaRPr lang="en-US" altLang="ko-KR" dirty="0" smtClean="0"/>
+            <a:endParaRPr lang="en-US" altLang="ko-KR" dirty="0"/>
           </a:p>
           <a:p>
             <a:pPr lvl="1"/>
             <a:r>
-              <a:rPr lang="en-US" altLang="ko-KR" dirty="0" smtClean="0"/>
+              <a:rPr lang="en-US" altLang="ko-KR" dirty="0"/>
               <a:t>U-turn connection </a:t>
             </a:r>
             <a:r>
-              <a:rPr lang="ko-KR" altLang="en-US" dirty="0" smtClean="0"/>
+              <a:rPr lang="ko-KR" altLang="en-US" dirty="0"/>
               <a:t>정리</a:t>
             </a:r>
-            <a:endParaRPr lang="en-US" altLang="ko-KR" dirty="0" smtClean="0"/>
+            <a:endParaRPr lang="en-US" altLang="ko-KR" dirty="0"/>
           </a:p>
           <a:p>
             <a:pPr lvl="1"/>
@@ -16872,10 +16776,6 @@
               <a:rPr lang="ko-KR" altLang="en-US" dirty="0"/>
               <a:t>에 가점 부여</a:t>
             </a:r>
-            <a:r>
-              <a:rPr lang="en-US" altLang="ko-KR" dirty="0"/>
-              <a:t/>
-            </a:r>
             <a:br>
               <a:rPr lang="en-US" altLang="ko-KR" dirty="0"/>
             </a:br>
@@ -16930,10 +16830,6 @@
             <a:r>
               <a:rPr lang="ko-KR" altLang="en-US" dirty="0"/>
               <a:t>차량 수 </a:t>
-            </a:r>
-            <a:r>
-              <a:rPr lang="en-US" altLang="ko-KR" dirty="0"/>
-              <a:t/>
             </a:r>
             <a:br>
               <a:rPr lang="en-US" altLang="ko-KR" dirty="0"/>
@@ -17499,10 +17395,6 @@
               <a:rPr lang="ko-KR" altLang="en-US" dirty="0"/>
               <a:t>을 뒤로 이동</a:t>
             </a:r>
-            <a:r>
-              <a:rPr lang="en-US" altLang="ko-KR" dirty="0"/>
-              <a:t/>
-            </a:r>
             <a:br>
               <a:rPr lang="en-US" altLang="ko-KR" dirty="0"/>
             </a:br>
@@ -18047,10 +17939,6 @@
               <a:rPr lang="ko-KR" altLang="en-US" dirty="0"/>
               <a:t>에서 중요 흐름에 가점 부여</a:t>
             </a:r>
-            <a:r>
-              <a:rPr lang="en-US" altLang="ko-KR" dirty="0"/>
-              <a:t/>
-            </a:r>
             <a:br>
               <a:rPr lang="en-US" altLang="ko-KR" dirty="0"/>
             </a:br>
@@ -18245,12 +18133,6 @@
                 <a:sym typeface="Wingdings" panose="05000000000000000000" pitchFamily="2" charset="2"/>
               </a:rPr>
               <a:t>모든 내용을 공유하는 것이 아닌 부분만 공유</a:t>
-            </a:r>
-            <a:r>
-              <a:rPr lang="en-US" altLang="ko-KR" dirty="0">
-                <a:sym typeface="Wingdings" panose="05000000000000000000" pitchFamily="2" charset="2"/>
-              </a:rPr>
-              <a:t/>
             </a:r>
             <a:br>
               <a:rPr lang="en-US" altLang="ko-KR" dirty="0">
@@ -19000,15 +18882,7 @@
             </a:pPr>
             <a:r>
               <a:rPr lang="ko-KR" altLang="en-US" dirty="0"/>
-              <a:t>신호 </a:t>
-            </a:r>
-            <a:r>
-              <a:rPr lang="ko-KR" altLang="en-US" dirty="0" smtClean="0"/>
-              <a:t>교차로 간 </a:t>
-            </a:r>
-            <a:r>
-              <a:rPr lang="ko-KR" altLang="en-US" dirty="0"/>
-              <a:t>거리</a:t>
+              <a:t>신호 교차로 간 거리</a:t>
             </a:r>
             <a:endParaRPr lang="en-US" altLang="ko-KR" dirty="0"/>
           </a:p>
@@ -19042,10 +18916,6 @@
               <a:rPr lang="ko-KR" altLang="en-US" dirty="0"/>
               <a:t>멀면 분산효과가 커서 필요성이 낮음</a:t>
             </a:r>
-            <a:r>
-              <a:rPr lang="en-US" altLang="ko-KR" dirty="0"/>
-              <a:t/>
-            </a:r>
             <a:br>
               <a:rPr lang="en-US" altLang="ko-KR" dirty="0"/>
             </a:br>
@@ -19173,16 +19043,10 @@
               <a:t>: </a:t>
             </a:r>
             <a:r>
-              <a:rPr lang="ko-KR" altLang="en-US" dirty="0" smtClean="0">
-                <a:sym typeface="Wingdings" panose="05000000000000000000" pitchFamily="2" charset="2"/>
-              </a:rPr>
-              <a:t>교차로 간 </a:t>
-            </a:r>
-            <a:r>
               <a:rPr lang="ko-KR" altLang="en-US" dirty="0">
                 <a:sym typeface="Wingdings" panose="05000000000000000000" pitchFamily="2" charset="2"/>
               </a:rPr>
-              <a:t>거리와 주행속도만으로 </a:t>
+              <a:t>교차로 간 거리와 주행속도만으로 </a:t>
             </a:r>
             <a:r>
               <a:rPr lang="en-US" altLang="ko-KR" dirty="0">
@@ -19254,12 +19118,6 @@
               </a:rPr>
               <a:t>차량 모두 고려해야 함</a:t>
             </a:r>
-            <a:r>
-              <a:rPr lang="en-US" altLang="ko-KR" dirty="0">
-                <a:sym typeface="Wingdings" panose="05000000000000000000" pitchFamily="2" charset="2"/>
-              </a:rPr>
-              <a:t/>
-            </a:r>
             <a:br>
               <a:rPr lang="en-US" altLang="ko-KR" dirty="0">
                 <a:sym typeface="Wingdings" panose="05000000000000000000" pitchFamily="2" charset="2"/>
@@ -19314,12 +19172,6 @@
                 <a:sym typeface="Wingdings" panose="05000000000000000000" pitchFamily="2" charset="2"/>
               </a:rPr>
               <a:t>연동 필요가 없음</a:t>
-            </a:r>
-            <a:r>
-              <a:rPr lang="en-US" altLang="ko-KR" dirty="0">
-                <a:sym typeface="Wingdings" panose="05000000000000000000" pitchFamily="2" charset="2"/>
-              </a:rPr>
-              <a:t/>
             </a:r>
             <a:br>
               <a:rPr lang="en-US" altLang="ko-KR" dirty="0">
@@ -19532,16 +19384,12 @@
               <a:t>까지 차량이 </a:t>
             </a:r>
             <a:r>
-              <a:rPr lang="ko-KR" altLang="en-US" dirty="0" err="1" smtClean="0"/>
+              <a:rPr lang="ko-KR" altLang="en-US" dirty="0" err="1"/>
               <a:t>넘쳐나원활한</a:t>
             </a:r>
             <a:r>
-              <a:rPr lang="ko-KR" altLang="en-US" dirty="0" smtClean="0"/>
-              <a:t> </a:t>
-            </a:r>
-            <a:r>
-              <a:rPr lang="ko-KR" altLang="en-US" dirty="0"/>
-              <a:t>통행을 방해하는 현상</a:t>
+              <a:rPr lang="ko-KR" altLang="en-US" dirty="0"/>
+              <a:t> 통행을 방해하는 현상</a:t>
             </a:r>
             <a:endParaRPr lang="en-US" altLang="ko-KR" dirty="0"/>
           </a:p>
@@ -19629,13 +19477,9 @@
             </a:r>
             <a:r>
               <a:rPr lang="ko-KR" altLang="en-US" dirty="0"/>
-              <a:t> </a:t>
-            </a:r>
-            <a:r>
-              <a:rPr lang="ko-KR" altLang="en-US" dirty="0" smtClean="0"/>
-              <a:t>예방</a:t>
-            </a:r>
-            <a:endParaRPr lang="en-US" altLang="ko-KR" dirty="0" smtClean="0"/>
+              <a:t> 예방</a:t>
+            </a:r>
+            <a:endParaRPr lang="en-US" altLang="ko-KR" dirty="0"/>
           </a:p>
           <a:p>
             <a:pPr lvl="1"/>
@@ -19643,49 +19487,48 @@
           </a:p>
           <a:p>
             <a:r>
-              <a:rPr lang="en-US" altLang="ko-KR" dirty="0" smtClean="0"/>
+              <a:rPr lang="en-US" altLang="ko-KR" dirty="0"/>
               <a:t> Signal Movement</a:t>
             </a:r>
           </a:p>
           <a:p>
             <a:pPr lvl="1"/>
             <a:r>
-              <a:rPr lang="en-US" altLang="ko-KR" dirty="0" smtClean="0"/>
+              <a:rPr lang="en-US" altLang="ko-KR" dirty="0"/>
               <a:t>1</a:t>
             </a:r>
             <a:r>
-              <a:rPr lang="ko-KR" altLang="en-US" dirty="0" smtClean="0"/>
+              <a:rPr lang="ko-KR" altLang="en-US" dirty="0"/>
               <a:t>개 </a:t>
             </a:r>
             <a:r>
-              <a:rPr lang="en-US" altLang="ko-KR" dirty="0" smtClean="0"/>
+              <a:rPr lang="en-US" altLang="ko-KR" dirty="0"/>
               <a:t>inflow</a:t>
             </a:r>
             <a:r>
-              <a:rPr lang="ko-KR" altLang="en-US" dirty="0" err="1" smtClean="0"/>
+              <a:rPr lang="ko-KR" altLang="en-US" dirty="0" err="1"/>
               <a:t>차로에서</a:t>
             </a:r>
             <a:r>
-              <a:rPr lang="ko-KR" altLang="en-US" dirty="0" smtClean="0"/>
+              <a:rPr lang="ko-KR" altLang="en-US" dirty="0"/>
               <a:t> 다른 </a:t>
             </a:r>
             <a:r>
-              <a:rPr lang="en-US" altLang="ko-KR" dirty="0" smtClean="0"/>
+              <a:rPr lang="en-US" altLang="ko-KR" dirty="0"/>
               <a:t>outflow</a:t>
             </a:r>
             <a:r>
-              <a:rPr lang="ko-KR" altLang="en-US" dirty="0" err="1" smtClean="0"/>
+              <a:rPr lang="ko-KR" altLang="en-US" dirty="0" err="1"/>
               <a:t>차로로</a:t>
             </a:r>
             <a:r>
-              <a:rPr lang="ko-KR" altLang="en-US" dirty="0" smtClean="0"/>
+              <a:rPr lang="ko-KR" altLang="en-US" dirty="0"/>
               <a:t> 이동하는 방향에서의 </a:t>
             </a:r>
             <a:r>
-              <a:rPr lang="en-US" altLang="ko-KR" dirty="0" smtClean="0"/>
+              <a:rPr lang="en-US" altLang="ko-KR" dirty="0"/>
               <a:t>signal(Green or Red)</a:t>
             </a:r>
-            <a:endParaRPr lang="en-US" altLang="ko-KR" dirty="0"/>
           </a:p>
         </p:txBody>
       </p:sp>
@@ -20348,105 +20191,96 @@
               <a:rPr lang="ko-KR" altLang="en-US" dirty="0">
                 <a:sym typeface="Wingdings" panose="05000000000000000000" pitchFamily="2" charset="2"/>
               </a:rPr>
-              <a:t>이후 실험에서 좌회전 비율에  따라 </a:t>
-            </a:r>
-            <a:r>
-              <a:rPr lang="ko-KR" altLang="en-US" dirty="0" smtClean="0">
-                <a:sym typeface="Wingdings" panose="05000000000000000000" pitchFamily="2" charset="2"/>
-              </a:rPr>
-              <a:t>설정</a:t>
-            </a:r>
-            <a:endParaRPr lang="en-US" altLang="ko-KR" dirty="0" smtClean="0">
-              <a:sym typeface="Wingdings" panose="05000000000000000000" pitchFamily="2" charset="2"/>
-            </a:endParaRPr>
-          </a:p>
-          <a:p>
+              <a:t>이후 실험에서 좌회전 비율에  따라 설정</a:t>
+            </a:r>
             <a:endParaRPr lang="en-US" altLang="ko-KR" dirty="0">
               <a:sym typeface="Wingdings" panose="05000000000000000000" pitchFamily="2" charset="2"/>
             </a:endParaRPr>
           </a:p>
           <a:p>
-            <a:r>
-              <a:rPr lang="en-US" altLang="ko-KR" dirty="0">
-                <a:sym typeface="Wingdings" panose="05000000000000000000" pitchFamily="2" charset="2"/>
-              </a:rPr>
-              <a:t> </a:t>
-            </a:r>
-            <a:r>
-              <a:rPr lang="ko-KR" altLang="en-US" dirty="0" smtClean="0">
-                <a:sym typeface="Wingdings" panose="05000000000000000000" pitchFamily="2" charset="2"/>
-              </a:rPr>
-              <a:t>해야할 부분</a:t>
-            </a:r>
-            <a:endParaRPr lang="en-US" altLang="ko-KR" dirty="0" smtClean="0">
-              <a:sym typeface="Wingdings" panose="05000000000000000000" pitchFamily="2" charset="2"/>
-            </a:endParaRPr>
-          </a:p>
-          <a:p>
-            <a:pPr lvl="1"/>
-            <a:r>
-              <a:rPr lang="en-US" altLang="ko-KR" dirty="0" smtClean="0">
-                <a:sym typeface="Wingdings" panose="05000000000000000000" pitchFamily="2" charset="2"/>
-              </a:rPr>
-              <a:t>U-turn </a:t>
-            </a:r>
-            <a:r>
-              <a:rPr lang="ko-KR" altLang="en-US" dirty="0" smtClean="0">
-                <a:sym typeface="Wingdings" panose="05000000000000000000" pitchFamily="2" charset="2"/>
-              </a:rPr>
-              <a:t>신호 </a:t>
-            </a:r>
-            <a:r>
-              <a:rPr lang="en-US" altLang="ko-KR" dirty="0" smtClean="0">
-                <a:sym typeface="Wingdings" panose="05000000000000000000" pitchFamily="2" charset="2"/>
-              </a:rPr>
-              <a:t>connection </a:t>
-            </a:r>
-            <a:r>
-              <a:rPr lang="ko-KR" altLang="en-US" dirty="0" smtClean="0">
-                <a:sym typeface="Wingdings" panose="05000000000000000000" pitchFamily="2" charset="2"/>
-              </a:rPr>
-              <a:t>제거</a:t>
-            </a:r>
-            <a:endParaRPr lang="en-US" altLang="ko-KR" dirty="0" smtClean="0">
-              <a:sym typeface="Wingdings" panose="05000000000000000000" pitchFamily="2" charset="2"/>
-            </a:endParaRPr>
-          </a:p>
-          <a:p>
-            <a:pPr lvl="1"/>
-            <a:r>
-              <a:rPr lang="en-US" altLang="ko-KR" dirty="0" smtClean="0">
-                <a:sym typeface="Wingdings" panose="05000000000000000000" pitchFamily="2" charset="2"/>
-              </a:rPr>
-              <a:t>Traffic light </a:t>
-            </a:r>
-            <a:r>
-              <a:rPr lang="ko-KR" altLang="en-US" dirty="0" smtClean="0">
-                <a:sym typeface="Wingdings" panose="05000000000000000000" pitchFamily="2" charset="2"/>
-              </a:rPr>
-              <a:t>설정 </a:t>
-            </a:r>
-            <a:r>
-              <a:rPr lang="en-US" altLang="ko-KR" dirty="0" smtClean="0">
-                <a:sym typeface="Wingdings" panose="05000000000000000000" pitchFamily="2" charset="2"/>
-              </a:rPr>
-              <a:t>(</a:t>
-            </a:r>
-            <a:r>
-              <a:rPr lang="ko-KR" altLang="en-US" dirty="0" smtClean="0">
-                <a:sym typeface="Wingdings" panose="05000000000000000000" pitchFamily="2" charset="2"/>
-              </a:rPr>
-              <a:t>논의 필요</a:t>
-            </a:r>
-            <a:r>
-              <a:rPr lang="en-US" altLang="ko-KR" dirty="0" smtClean="0">
-                <a:sym typeface="Wingdings" panose="05000000000000000000" pitchFamily="2" charset="2"/>
-              </a:rPr>
-              <a:t>)</a:t>
-            </a:r>
             <a:endParaRPr lang="en-US" altLang="ko-KR" dirty="0">
               <a:sym typeface="Wingdings" panose="05000000000000000000" pitchFamily="2" charset="2"/>
             </a:endParaRPr>
+          </a:p>
+          <a:p>
+            <a:r>
+              <a:rPr lang="en-US" altLang="ko-KR" dirty="0">
+                <a:sym typeface="Wingdings" panose="05000000000000000000" pitchFamily="2" charset="2"/>
+              </a:rPr>
+              <a:t> </a:t>
+            </a:r>
+            <a:r>
+              <a:rPr lang="ko-KR" altLang="en-US" dirty="0">
+                <a:sym typeface="Wingdings" panose="05000000000000000000" pitchFamily="2" charset="2"/>
+              </a:rPr>
+              <a:t>해야할 부분</a:t>
+            </a:r>
+            <a:endParaRPr lang="en-US" altLang="ko-KR" dirty="0">
+              <a:sym typeface="Wingdings" panose="05000000000000000000" pitchFamily="2" charset="2"/>
+            </a:endParaRPr>
+          </a:p>
+          <a:p>
+            <a:pPr lvl="1"/>
+            <a:r>
+              <a:rPr lang="en-US" altLang="ko-KR" dirty="0">
+                <a:sym typeface="Wingdings" panose="05000000000000000000" pitchFamily="2" charset="2"/>
+              </a:rPr>
+              <a:t>U-turn </a:t>
+            </a:r>
+            <a:r>
+              <a:rPr lang="ko-KR" altLang="en-US" dirty="0">
+                <a:sym typeface="Wingdings" panose="05000000000000000000" pitchFamily="2" charset="2"/>
+              </a:rPr>
+              <a:t>신호 </a:t>
+            </a:r>
+            <a:r>
+              <a:rPr lang="en-US" altLang="ko-KR" dirty="0">
+                <a:sym typeface="Wingdings" panose="05000000000000000000" pitchFamily="2" charset="2"/>
+              </a:rPr>
+              <a:t>connection </a:t>
+            </a:r>
+            <a:r>
+              <a:rPr lang="ko-KR" altLang="en-US" dirty="0">
+                <a:sym typeface="Wingdings" panose="05000000000000000000" pitchFamily="2" charset="2"/>
+              </a:rPr>
+              <a:t>제거</a:t>
+            </a:r>
+            <a:endParaRPr lang="en-US" altLang="ko-KR" dirty="0">
+              <a:sym typeface="Wingdings" panose="05000000000000000000" pitchFamily="2" charset="2"/>
+            </a:endParaRPr>
+          </a:p>
+          <a:p>
+            <a:pPr lvl="1"/>
+            <a:r>
+              <a:rPr lang="en-US" altLang="ko-KR" dirty="0">
+                <a:sym typeface="Wingdings" panose="05000000000000000000" pitchFamily="2" charset="2"/>
+              </a:rPr>
+              <a:t>Traffic light </a:t>
+            </a:r>
+            <a:r>
+              <a:rPr lang="ko-KR" altLang="en-US" dirty="0">
+                <a:sym typeface="Wingdings" panose="05000000000000000000" pitchFamily="2" charset="2"/>
+              </a:rPr>
+              <a:t>설정 </a:t>
+            </a:r>
+            <a:r>
+              <a:rPr lang="en-US" altLang="ko-KR" dirty="0">
+                <a:sym typeface="Wingdings" panose="05000000000000000000" pitchFamily="2" charset="2"/>
+              </a:rPr>
+              <a:t>(</a:t>
+            </a:r>
+            <a:r>
+              <a:rPr lang="ko-KR" altLang="en-US" dirty="0">
+                <a:sym typeface="Wingdings" panose="05000000000000000000" pitchFamily="2" charset="2"/>
+              </a:rPr>
+              <a:t>논의 필요</a:t>
+            </a:r>
+            <a:r>
+              <a:rPr lang="en-US" altLang="ko-KR" dirty="0">
+                <a:sym typeface="Wingdings" panose="05000000000000000000" pitchFamily="2" charset="2"/>
+              </a:rPr>
+              <a:t>)</a:t>
+            </a:r>
           </a:p>
         </p:txBody>
       </p:sp>
@@ -20601,10 +20435,6 @@
             <a:r>
               <a:rPr lang="ko-KR" altLang="en-US" dirty="0"/>
               <a:t>로 다양한 정보 비교</a:t>
-            </a:r>
-            <a:r>
-              <a:rPr lang="en-US" altLang="ko-KR" dirty="0"/>
-              <a:t/>
             </a:r>
             <a:br>
               <a:rPr lang="en-US" altLang="ko-KR" dirty="0"/>
@@ -20825,27 +20655,27 @@
               <a:t> </a:t>
             </a:r>
             <a:r>
-              <a:rPr lang="ko-KR" altLang="en-US" dirty="0" smtClean="0"/>
+              <a:rPr lang="ko-KR" altLang="en-US" dirty="0"/>
               <a:t>제작한 </a:t>
             </a:r>
             <a:r>
-              <a:rPr lang="en-US" altLang="ko-KR" dirty="0" smtClean="0"/>
+              <a:rPr lang="en-US" altLang="ko-KR" dirty="0"/>
               <a:t>Code</a:t>
             </a:r>
             <a:r>
-              <a:rPr lang="ko-KR" altLang="en-US" dirty="0" smtClean="0"/>
+              <a:rPr lang="ko-KR" altLang="en-US" dirty="0"/>
               <a:t>의 구성</a:t>
             </a:r>
             <a:r>
-              <a:rPr lang="en-US" altLang="ko-KR" dirty="0" smtClean="0"/>
+              <a:rPr lang="en-US" altLang="ko-KR" dirty="0"/>
               <a:t>(</a:t>
             </a:r>
             <a:r>
-              <a:rPr lang="en-US" altLang="ko-KR" dirty="0" err="1" smtClean="0"/>
+              <a:rPr lang="en-US" altLang="ko-KR" dirty="0" err="1"/>
               <a:t>Pytorch</a:t>
             </a:r>
             <a:r>
-              <a:rPr lang="en-US" altLang="ko-KR" dirty="0" smtClean="0"/>
+              <a:rPr lang="en-US" altLang="ko-KR" dirty="0"/>
               <a:t> based)</a:t>
             </a:r>
             <a:endParaRPr lang="ko-KR" altLang="en-US" dirty="0"/>
@@ -20945,22 +20775,22 @@
           <a:p>
             <a:pPr algn="ctr"/>
             <a:r>
-              <a:rPr lang="en-US" altLang="ko-KR" dirty="0" smtClean="0"/>
+              <a:rPr lang="en-US" altLang="ko-KR" dirty="0"/>
               <a:t>Env.py</a:t>
             </a:r>
           </a:p>
           <a:p>
             <a:pPr algn="ctr"/>
             <a:r>
-              <a:rPr lang="en-US" altLang="ko-KR" sz="1400" dirty="0" smtClean="0"/>
+              <a:rPr lang="en-US" altLang="ko-KR" sz="1400" dirty="0"/>
               <a:t>(</a:t>
             </a:r>
             <a:r>
-              <a:rPr lang="ko-KR" altLang="en-US" sz="1400" dirty="0" smtClean="0"/>
+              <a:rPr lang="ko-KR" altLang="en-US" sz="1400" dirty="0"/>
               <a:t>세팅 필요</a:t>
             </a:r>
             <a:r>
-              <a:rPr lang="en-US" altLang="ko-KR" sz="1400" dirty="0" smtClean="0"/>
+              <a:rPr lang="en-US" altLang="ko-KR" sz="1400" dirty="0"/>
               <a:t>)</a:t>
             </a:r>
             <a:endParaRPr lang="en-US" altLang="ko-KR" sz="2000" dirty="0"/>
@@ -21010,22 +20840,22 @@
           <a:p>
             <a:pPr algn="ctr"/>
             <a:r>
-              <a:rPr lang="en-US" altLang="ko-KR" dirty="0" smtClean="0"/>
+              <a:rPr lang="en-US" altLang="ko-KR" dirty="0"/>
               <a:t>Dqn.py</a:t>
             </a:r>
           </a:p>
           <a:p>
             <a:pPr algn="ctr"/>
             <a:r>
-              <a:rPr lang="en-US" altLang="ko-KR" sz="1400" dirty="0" smtClean="0"/>
+              <a:rPr lang="en-US" altLang="ko-KR" sz="1400" dirty="0"/>
               <a:t>(</a:t>
             </a:r>
             <a:r>
-              <a:rPr lang="ko-KR" altLang="en-US" sz="1400" dirty="0" err="1" smtClean="0"/>
+              <a:rPr lang="ko-KR" altLang="en-US" sz="1400" dirty="0" err="1"/>
               <a:t>검토필요</a:t>
             </a:r>
             <a:r>
-              <a:rPr lang="en-US" altLang="ko-KR" sz="1400" dirty="0" smtClean="0"/>
+              <a:rPr lang="en-US" altLang="ko-KR" sz="1400" dirty="0"/>
               <a:t>)</a:t>
             </a:r>
             <a:endParaRPr lang="en-US" altLang="ko-KR" dirty="0"/>
@@ -21075,25 +20905,24 @@
           <a:p>
             <a:pPr algn="ctr"/>
             <a:r>
-              <a:rPr lang="en-US" altLang="ko-KR" sz="1600" dirty="0" smtClean="0"/>
+              <a:rPr lang="en-US" altLang="ko-KR" sz="1600" dirty="0"/>
               <a:t>FRAP.py</a:t>
             </a:r>
           </a:p>
           <a:p>
             <a:pPr algn="ctr"/>
             <a:r>
-              <a:rPr lang="en-US" altLang="ko-KR" sz="1400" dirty="0" smtClean="0"/>
+              <a:rPr lang="en-US" altLang="ko-KR" sz="1400" dirty="0"/>
               <a:t>(</a:t>
             </a:r>
             <a:r>
-              <a:rPr lang="ko-KR" altLang="en-US" sz="1400" dirty="0" err="1" smtClean="0"/>
+              <a:rPr lang="ko-KR" altLang="en-US" sz="1400" dirty="0" err="1"/>
               <a:t>제작중</a:t>
             </a:r>
             <a:r>
-              <a:rPr lang="en-US" altLang="ko-KR" sz="1400" dirty="0" smtClean="0"/>
+              <a:rPr lang="en-US" altLang="ko-KR" sz="1400" dirty="0"/>
               <a:t>)</a:t>
             </a:r>
-            <a:endParaRPr lang="en-US" altLang="ko-KR" sz="1400" dirty="0"/>
           </a:p>
         </p:txBody>
       </p:sp>
@@ -21176,7 +21005,7 @@
           <a:p>
             <a:pPr algn="ctr"/>
             <a:r>
-              <a:rPr lang="en-US" altLang="ko-KR" dirty="0" smtClean="0"/>
+              <a:rPr lang="en-US" altLang="ko-KR" dirty="0"/>
               <a:t>Grid.py</a:t>
             </a:r>
             <a:endParaRPr lang="ko-KR" altLang="en-US" dirty="0"/>
@@ -21226,7 +21055,7 @@
           <a:p>
             <a:pPr algn="ctr"/>
             <a:r>
-              <a:rPr lang="en-US" altLang="ko-KR" sz="1600" dirty="0" smtClean="0"/>
+              <a:rPr lang="en-US" altLang="ko-KR" sz="1600" dirty="0"/>
               <a:t>Gen_net.py</a:t>
             </a:r>
             <a:endParaRPr lang="ko-KR" altLang="en-US" sz="1600" dirty="0"/>
@@ -21328,14 +21157,13 @@
           <a:lstStyle/>
           <a:p>
             <a:r>
-              <a:rPr lang="en-US" altLang="ko-KR" sz="1400" dirty="0" smtClean="0"/>
+              <a:rPr lang="en-US" altLang="ko-KR" sz="1400" dirty="0"/>
               <a:t>Network </a:t>
             </a:r>
             <a:r>
-              <a:rPr lang="ko-KR" altLang="en-US" sz="1400" dirty="0" smtClean="0"/>
+              <a:rPr lang="ko-KR" altLang="en-US" sz="1400" dirty="0"/>
               <a:t>생성</a:t>
             </a:r>
-            <a:endParaRPr lang="ko-KR" altLang="en-US" sz="1400" dirty="0"/>
           </a:p>
         </p:txBody>
       </p:sp>
@@ -21362,7 +21190,7 @@
           <a:lstStyle/>
           <a:p>
             <a:r>
-              <a:rPr lang="en-US" altLang="ko-KR" sz="1400" dirty="0" smtClean="0"/>
+              <a:rPr lang="en-US" altLang="ko-KR" sz="1400" dirty="0"/>
               <a:t>Environment Initialization</a:t>
             </a:r>
             <a:endParaRPr lang="ko-KR" altLang="en-US" sz="1400" dirty="0"/>
@@ -21428,7 +21256,7 @@
           <a:lstStyle/>
           <a:p>
             <a:r>
-              <a:rPr lang="en-US" altLang="ko-KR" sz="1400" dirty="0" smtClean="0"/>
+              <a:rPr lang="en-US" altLang="ko-KR" sz="1400" dirty="0"/>
               <a:t>Agent Initialization</a:t>
             </a:r>
             <a:endParaRPr lang="ko-KR" altLang="en-US" sz="1400" dirty="0"/>
@@ -21492,7 +21320,7 @@
           <a:p>
             <a:pPr algn="r"/>
             <a:r>
-              <a:rPr lang="en-US" altLang="ko-KR" sz="1200" dirty="0" smtClean="0"/>
+              <a:rPr lang="en-US" altLang="ko-KR" sz="1200" dirty="0"/>
               <a:t>Reward, Observation</a:t>
             </a:r>
             <a:endParaRPr lang="ko-KR" altLang="en-US" sz="1200" dirty="0"/>
@@ -21555,7 +21383,7 @@
           <a:lstStyle/>
           <a:p>
             <a:r>
-              <a:rPr lang="en-US" altLang="ko-KR" sz="1200" dirty="0" smtClean="0"/>
+              <a:rPr lang="en-US" altLang="ko-KR" sz="1200" dirty="0"/>
               <a:t>Action</a:t>
             </a:r>
             <a:endParaRPr lang="ko-KR" altLang="en-US" sz="1200" dirty="0"/>
@@ -21622,7 +21450,7 @@
           <a:p>
             <a:pPr algn="ctr"/>
             <a:r>
-              <a:rPr lang="en-US" altLang="ko-KR" sz="1200" dirty="0" smtClean="0"/>
+              <a:rPr lang="en-US" altLang="ko-KR" sz="1200" dirty="0"/>
               <a:t>Observation</a:t>
             </a:r>
             <a:endParaRPr lang="ko-KR" altLang="en-US" sz="1200" dirty="0"/>
@@ -21686,7 +21514,7 @@
           <a:p>
             <a:pPr algn="ctr"/>
             <a:r>
-              <a:rPr lang="en-US" altLang="ko-KR" sz="1200" dirty="0" smtClean="0"/>
+              <a:rPr lang="en-US" altLang="ko-KR" sz="1200" dirty="0"/>
               <a:t>Flip, Rotate</a:t>
             </a:r>
             <a:endParaRPr lang="ko-KR" altLang="en-US" sz="1200" dirty="0"/>
@@ -21717,26 +21545,25 @@
           <a:p>
             <a:pPr algn="r"/>
             <a:r>
-              <a:rPr lang="en-US" altLang="ko-KR" sz="1400" dirty="0" smtClean="0"/>
+              <a:rPr lang="en-US" altLang="ko-KR" sz="1400" dirty="0"/>
               <a:t>xml </a:t>
             </a:r>
             <a:r>
-              <a:rPr lang="ko-KR" altLang="en-US" sz="1400" dirty="0" smtClean="0"/>
+              <a:rPr lang="ko-KR" altLang="en-US" sz="1400" dirty="0"/>
               <a:t>및 </a:t>
             </a:r>
             <a:r>
-              <a:rPr lang="en-US" altLang="ko-KR" sz="1400" dirty="0" err="1" smtClean="0"/>
+              <a:rPr lang="en-US" altLang="ko-KR" sz="1400" dirty="0" err="1"/>
               <a:t>cfg</a:t>
             </a:r>
             <a:r>
-              <a:rPr lang="en-US" altLang="ko-KR" sz="1400" dirty="0" smtClean="0"/>
+              <a:rPr lang="en-US" altLang="ko-KR" sz="1400" dirty="0"/>
               <a:t> </a:t>
             </a:r>
             <a:r>
-              <a:rPr lang="ko-KR" altLang="en-US" sz="1400" dirty="0" smtClean="0"/>
+              <a:rPr lang="ko-KR" altLang="en-US" sz="1400" dirty="0"/>
               <a:t>생성</a:t>
             </a:r>
-            <a:endParaRPr lang="ko-KR" altLang="en-US" sz="1400" dirty="0"/>
           </a:p>
         </p:txBody>
       </p:sp>
@@ -21824,10 +21651,6 @@
               <a:rPr lang="ko-KR" altLang="en-US" dirty="0"/>
               <a:t>를 조절</a:t>
             </a:r>
-            <a:r>
-              <a:rPr lang="en-US" altLang="ko-KR" dirty="0"/>
-              <a:t/>
-            </a:r>
             <a:br>
               <a:rPr lang="en-US" altLang="ko-KR" dirty="0"/>
             </a:br>
@@ -21879,25 +21702,20 @@
             </a:r>
             <a:r>
               <a:rPr lang="ko-KR" altLang="en-US" dirty="0"/>
-              <a:t>로 </a:t>
-            </a:r>
-            <a:r>
-              <a:rPr lang="ko-KR" altLang="en-US" dirty="0" smtClean="0"/>
-              <a:t>바꿈 </a:t>
-            </a:r>
-            <a:r>
-              <a:rPr lang="en-US" altLang="ko-KR" dirty="0" smtClean="0"/>
+              <a:t>로 바꿈 </a:t>
+            </a:r>
+            <a:r>
+              <a:rPr lang="en-US" altLang="ko-KR" dirty="0"/>
               <a:t>(program</a:t>
             </a:r>
             <a:r>
-              <a:rPr lang="ko-KR" altLang="en-US" dirty="0" smtClean="0"/>
+              <a:rPr lang="ko-KR" altLang="en-US" dirty="0"/>
               <a:t>에 있는 내용만 가능</a:t>
             </a:r>
             <a:r>
-              <a:rPr lang="en-US" altLang="ko-KR" dirty="0" smtClean="0"/>
+              <a:rPr lang="en-US" altLang="ko-KR" dirty="0"/>
               <a:t>)</a:t>
             </a:r>
-            <a:endParaRPr lang="en-US" altLang="ko-KR" dirty="0"/>
           </a:p>
           <a:p>
             <a:r>

</xml_diff>

<commit_message>
change the files and setting
</commit_message>
<xml_diff>
--- a/1st_Seminar(강민수).pptx
+++ b/1st_Seminar(강민수).pptx
@@ -6,7 +6,7 @@
     <p:sldMasterId id="2147483744" r:id="rId2"/>
   </p:sldMasterIdLst>
   <p:notesMasterIdLst>
-    <p:notesMasterId r:id="rId41"/>
+    <p:notesMasterId r:id="rId44"/>
   </p:notesMasterIdLst>
   <p:sldIdLst>
     <p:sldId id="256" r:id="rId3"/>
@@ -46,7 +46,10 @@
     <p:sldId id="266" r:id="rId37"/>
     <p:sldId id="293" r:id="rId38"/>
     <p:sldId id="294" r:id="rId39"/>
-    <p:sldId id="295" r:id="rId40"/>
+    <p:sldId id="298" r:id="rId40"/>
+    <p:sldId id="300" r:id="rId41"/>
+    <p:sldId id="299" r:id="rId42"/>
+    <p:sldId id="295" r:id="rId43"/>
   </p:sldIdLst>
   <p:sldSz cx="12192000" cy="6858000"/>
   <p:notesSz cx="6858000" cy="9144000"/>
@@ -238,7 +241,7 @@
           <a:p>
             <a:fld id="{B401493B-0A52-4E9A-A475-D6276A64515A}" type="datetimeFigureOut">
               <a:rPr lang="ko-KR" altLang="en-US" smtClean="0"/>
-              <a:t>2021-01-19</a:t>
+              <a:t>2021-01-27</a:t>
             </a:fld>
             <a:endParaRPr lang="ko-KR" altLang="en-US"/>
           </a:p>
@@ -648,7 +651,7 @@
             <a:fld id="{B61BEF0D-F0BB-DE4B-95CE-6DB70DBA9567}" type="datetimeFigureOut">
               <a:rPr lang="en-US" smtClean="0"/>
               <a:pPr/>
-              <a:t>1/19/2021</a:t>
+              <a:t>1/27/2021</a:t>
             </a:fld>
             <a:endParaRPr lang="en-US" dirty="0"/>
           </a:p>
@@ -820,7 +823,7 @@
             <a:fld id="{B61BEF0D-F0BB-DE4B-95CE-6DB70DBA9567}" type="datetimeFigureOut">
               <a:rPr lang="en-US" smtClean="0"/>
               <a:pPr/>
-              <a:t>1/19/2021</a:t>
+              <a:t>1/27/2021</a:t>
             </a:fld>
             <a:endParaRPr lang="en-US" dirty="0"/>
           </a:p>
@@ -1002,7 +1005,7 @@
             <a:fld id="{B61BEF0D-F0BB-DE4B-95CE-6DB70DBA9567}" type="datetimeFigureOut">
               <a:rPr lang="en-US" smtClean="0"/>
               <a:pPr/>
-              <a:t>1/19/2021</a:t>
+              <a:t>1/27/2021</a:t>
             </a:fld>
             <a:endParaRPr lang="en-US" dirty="0"/>
           </a:p>
@@ -1291,7 +1294,7 @@
             <a:fld id="{B61BEF0D-F0BB-DE4B-95CE-6DB70DBA9567}" type="datetimeFigureOut">
               <a:rPr lang="en-US" smtClean="0"/>
               <a:pPr/>
-              <a:t>1/19/2021</a:t>
+              <a:t>1/27/2021</a:t>
             </a:fld>
             <a:endParaRPr lang="en-US" dirty="0"/>
           </a:p>
@@ -1531,7 +1534,7 @@
             <a:fld id="{B61BEF0D-F0BB-DE4B-95CE-6DB70DBA9567}" type="datetimeFigureOut">
               <a:rPr lang="en-US" smtClean="0"/>
               <a:pPr/>
-              <a:t>1/19/2021</a:t>
+              <a:t>1/27/2021</a:t>
             </a:fld>
             <a:endParaRPr lang="en-US" dirty="0"/>
           </a:p>
@@ -1876,7 +1879,7 @@
             <a:fld id="{B61BEF0D-F0BB-DE4B-95CE-6DB70DBA9567}" type="datetimeFigureOut">
               <a:rPr lang="en-US" smtClean="0"/>
               <a:pPr/>
-              <a:t>1/19/2021</a:t>
+              <a:t>1/27/2021</a:t>
             </a:fld>
             <a:endParaRPr lang="en-US" dirty="0"/>
           </a:p>
@@ -2153,7 +2156,7 @@
             <a:fld id="{B61BEF0D-F0BB-DE4B-95CE-6DB70DBA9567}" type="datetimeFigureOut">
               <a:rPr lang="en-US" smtClean="0"/>
               <a:pPr/>
-              <a:t>1/19/2021</a:t>
+              <a:t>1/27/2021</a:t>
             </a:fld>
             <a:endParaRPr lang="en-US" dirty="0"/>
           </a:p>
@@ -2534,7 +2537,7 @@
             <a:fld id="{B61BEF0D-F0BB-DE4B-95CE-6DB70DBA9567}" type="datetimeFigureOut">
               <a:rPr lang="en-US" smtClean="0"/>
               <a:pPr/>
-              <a:t>1/19/2021</a:t>
+              <a:t>1/27/2021</a:t>
             </a:fld>
             <a:endParaRPr lang="en-US" dirty="0"/>
           </a:p>
@@ -2654,7 +2657,7 @@
             <a:fld id="{B61BEF0D-F0BB-DE4B-95CE-6DB70DBA9567}" type="datetimeFigureOut">
               <a:rPr lang="en-US" smtClean="0"/>
               <a:pPr/>
-              <a:t>1/19/2021</a:t>
+              <a:t>1/27/2021</a:t>
             </a:fld>
             <a:endParaRPr lang="en-US" dirty="0"/>
           </a:p>
@@ -2827,7 +2830,7 @@
             <a:fld id="{B61BEF0D-F0BB-DE4B-95CE-6DB70DBA9567}" type="datetimeFigureOut">
               <a:rPr lang="en-US" smtClean="0"/>
               <a:pPr/>
-              <a:t>1/19/2021</a:t>
+              <a:t>1/27/2021</a:t>
             </a:fld>
             <a:endParaRPr lang="en-US" dirty="0"/>
           </a:p>
@@ -3183,7 +3186,7 @@
             <a:fld id="{B61BEF0D-F0BB-DE4B-95CE-6DB70DBA9567}" type="datetimeFigureOut">
               <a:rPr lang="en-US" smtClean="0"/>
               <a:pPr/>
-              <a:t>1/19/2021</a:t>
+              <a:t>1/27/2021</a:t>
             </a:fld>
             <a:endParaRPr lang="en-US" dirty="0"/>
           </a:p>
@@ -3376,7 +3379,7 @@
             <a:fld id="{B61BEF0D-F0BB-DE4B-95CE-6DB70DBA9567}" type="datetimeFigureOut">
               <a:rPr lang="en-US" smtClean="0"/>
               <a:pPr/>
-              <a:t>1/19/2021</a:t>
+              <a:t>1/27/2021</a:t>
             </a:fld>
             <a:endParaRPr lang="en-US" dirty="0"/>
           </a:p>
@@ -3739,7 +3742,7 @@
             <a:fld id="{B61BEF0D-F0BB-DE4B-95CE-6DB70DBA9567}" type="datetimeFigureOut">
               <a:rPr lang="en-US" smtClean="0"/>
               <a:pPr/>
-              <a:t>1/19/2021</a:t>
+              <a:t>1/27/2021</a:t>
             </a:fld>
             <a:endParaRPr lang="en-US" dirty="0"/>
           </a:p>
@@ -3911,7 +3914,7 @@
             <a:fld id="{B61BEF0D-F0BB-DE4B-95CE-6DB70DBA9567}" type="datetimeFigureOut">
               <a:rPr lang="en-US" smtClean="0"/>
               <a:pPr/>
-              <a:t>1/19/2021</a:t>
+              <a:t>1/27/2021</a:t>
             </a:fld>
             <a:endParaRPr lang="en-US" dirty="0"/>
           </a:p>
@@ -4169,7 +4172,7 @@
             <a:fld id="{B61BEF0D-F0BB-DE4B-95CE-6DB70DBA9567}" type="datetimeFigureOut">
               <a:rPr lang="en-US" smtClean="0"/>
               <a:pPr/>
-              <a:t>1/19/2021</a:t>
+              <a:t>1/27/2021</a:t>
             </a:fld>
             <a:endParaRPr lang="en-US" dirty="0"/>
           </a:p>
@@ -4422,7 +4425,7 @@
             <a:fld id="{B61BEF0D-F0BB-DE4B-95CE-6DB70DBA9567}" type="datetimeFigureOut">
               <a:rPr lang="en-US" smtClean="0"/>
               <a:pPr/>
-              <a:t>1/19/2021</a:t>
+              <a:t>1/27/2021</a:t>
             </a:fld>
             <a:endParaRPr lang="en-US" dirty="0"/>
           </a:p>
@@ -4656,7 +4659,7 @@
             <a:fld id="{B61BEF0D-F0BB-DE4B-95CE-6DB70DBA9567}" type="datetimeFigureOut">
               <a:rPr lang="en-US" smtClean="0"/>
               <a:pPr/>
-              <a:t>1/19/2021</a:t>
+              <a:t>1/27/2021</a:t>
             </a:fld>
             <a:endParaRPr lang="en-US" dirty="0"/>
           </a:p>
@@ -5005,7 +5008,7 @@
             <a:fld id="{B61BEF0D-F0BB-DE4B-95CE-6DB70DBA9567}" type="datetimeFigureOut">
               <a:rPr lang="en-US" smtClean="0"/>
               <a:pPr/>
-              <a:t>1/19/2021</a:t>
+              <a:t>1/27/2021</a:t>
             </a:fld>
             <a:endParaRPr lang="en-US" dirty="0"/>
           </a:p>
@@ -5125,7 +5128,7 @@
             <a:fld id="{B61BEF0D-F0BB-DE4B-95CE-6DB70DBA9567}" type="datetimeFigureOut">
               <a:rPr lang="en-US" smtClean="0"/>
               <a:pPr/>
-              <a:t>1/19/2021</a:t>
+              <a:t>1/27/2021</a:t>
             </a:fld>
             <a:endParaRPr lang="en-US" dirty="0"/>
           </a:p>
@@ -5245,7 +5248,7 @@
             <a:fld id="{B61BEF0D-F0BB-DE4B-95CE-6DB70DBA9567}" type="datetimeFigureOut">
               <a:rPr lang="en-US" smtClean="0"/>
               <a:pPr/>
-              <a:t>1/19/2021</a:t>
+              <a:t>1/27/2021</a:t>
             </a:fld>
             <a:endParaRPr lang="en-US" dirty="0"/>
           </a:p>
@@ -5531,7 +5534,7 @@
             <a:fld id="{B61BEF0D-F0BB-DE4B-95CE-6DB70DBA9567}" type="datetimeFigureOut">
               <a:rPr lang="en-US" smtClean="0"/>
               <a:pPr/>
-              <a:t>1/19/2021</a:t>
+              <a:t>1/27/2021</a:t>
             </a:fld>
             <a:endParaRPr lang="en-US" dirty="0"/>
           </a:p>
@@ -5797,7 +5800,7 @@
             <a:fld id="{B61BEF0D-F0BB-DE4B-95CE-6DB70DBA9567}" type="datetimeFigureOut">
               <a:rPr lang="en-US" smtClean="0"/>
               <a:pPr/>
-              <a:t>1/19/2021</a:t>
+              <a:t>1/27/2021</a:t>
             </a:fld>
             <a:endParaRPr lang="en-US" dirty="0"/>
           </a:p>
@@ -6013,7 +6016,7 @@
             <a:fld id="{B61BEF0D-F0BB-DE4B-95CE-6DB70DBA9567}" type="datetimeFigureOut">
               <a:rPr lang="en-US" smtClean="0"/>
               <a:pPr/>
-              <a:t>1/19/2021</a:t>
+              <a:t>1/27/2021</a:t>
             </a:fld>
             <a:endParaRPr lang="en-US" dirty="0"/>
           </a:p>
@@ -6618,7 +6621,7 @@
             <a:fld id="{B61BEF0D-F0BB-DE4B-95CE-6DB70DBA9567}" type="datetimeFigureOut">
               <a:rPr lang="en-US" smtClean="0"/>
               <a:pPr/>
-              <a:t>1/19/2021</a:t>
+              <a:t>1/27/2021</a:t>
             </a:fld>
             <a:endParaRPr lang="en-US" dirty="0"/>
           </a:p>
@@ -7272,6 +7275,10 @@
               <a:rPr lang="ko-KR" altLang="en-US" dirty="0"/>
               <a:t>를 조절</a:t>
             </a:r>
+            <a:r>
+              <a:rPr lang="en-US" altLang="ko-KR" dirty="0"/>
+              <a:t/>
+            </a:r>
             <a:br>
               <a:rPr lang="en-US" altLang="ko-KR" dirty="0"/>
             </a:br>
@@ -7458,6 +7465,10 @@
               <a:rPr lang="en-US" altLang="ko-KR" sz="2400" b="1" dirty="0"/>
               <a:t>Toward A Thousand Lights:</a:t>
             </a:r>
+            <a:r>
+              <a:rPr lang="en-US" altLang="ko-KR" sz="2400" dirty="0"/>
+              <a:t/>
+            </a:r>
             <a:br>
               <a:rPr lang="en-US" altLang="ko-KR" sz="2400" dirty="0"/>
             </a:br>
@@ -7749,6 +7760,12 @@
               <a:rPr lang="en-US" altLang="ko-KR" dirty="0"/>
               <a:t>Increase emission gas (contributes 23% of total CO2 emission) </a:t>
             </a:r>
+            <a:r>
+              <a:rPr lang="en-US" altLang="ko-KR" dirty="0">
+                <a:sym typeface="Wingdings" panose="05000000000000000000" pitchFamily="2" charset="2"/>
+              </a:rPr>
+              <a:t/>
+            </a:r>
             <a:br>
               <a:rPr lang="en-US" altLang="ko-KR" dirty="0">
                 <a:sym typeface="Wingdings" panose="05000000000000000000" pitchFamily="2" charset="2"/>
@@ -7770,6 +7787,10 @@
                 <a:sym typeface="Wingdings" panose="05000000000000000000" pitchFamily="2" charset="2"/>
               </a:rPr>
               <a:t> Trend: applying RL method for traffic signal control</a:t>
+            </a:r>
+            <a:r>
+              <a:rPr lang="en-US" altLang="ko-KR" dirty="0"/>
+              <a:t/>
             </a:r>
             <a:br>
               <a:rPr lang="en-US" altLang="ko-KR" dirty="0"/>
@@ -8152,6 +8173,10 @@
             <a:br>
               <a:rPr lang="en-US" altLang="ko-KR" dirty="0"/>
             </a:br>
+            <a:r>
+              <a:rPr lang="en-US" altLang="ko-KR" dirty="0"/>
+              <a:t/>
+            </a:r>
             <a:br>
               <a:rPr lang="en-US" altLang="ko-KR" dirty="0"/>
             </a:br>
@@ -8545,6 +8570,10 @@
             <a:br>
               <a:rPr lang="en-US" altLang="ko-KR" dirty="0"/>
             </a:br>
+            <a:r>
+              <a:rPr lang="en-US" altLang="ko-KR" dirty="0"/>
+              <a:t/>
+            </a:r>
             <a:br>
               <a:rPr lang="en-US" altLang="ko-KR" dirty="0"/>
             </a:br>
@@ -9853,6 +9882,10 @@
             <a:br>
               <a:rPr lang="en-US" altLang="ko-KR" dirty="0"/>
             </a:br>
+            <a:r>
+              <a:rPr lang="en-US" altLang="ko-KR" dirty="0"/>
+              <a:t/>
+            </a:r>
             <a:br>
               <a:rPr lang="en-US" altLang="ko-KR" dirty="0"/>
             </a:br>
@@ -9990,6 +10023,10 @@
             <a:r>
               <a:rPr lang="ko-KR" altLang="en-US" dirty="0"/>
               <a:t>제작</a:t>
+            </a:r>
+            <a:r>
+              <a:rPr lang="en-US" altLang="ko-KR" dirty="0"/>
+              <a:t/>
             </a:r>
             <a:br>
               <a:rPr lang="en-US" altLang="ko-KR" dirty="0"/>
@@ -10448,8 +10485,8 @@
           </a:p>
         </p:txBody>
       </p:sp>
-      <mc:AlternateContent xmlns:mc="http://schemas.openxmlformats.org/markup-compatibility/2006">
-        <mc:Choice xmlns:a14="http://schemas.microsoft.com/office/drawing/2010/main" Requires="a14">
+      <mc:AlternateContent xmlns:mc="http://schemas.openxmlformats.org/markup-compatibility/2006" xmlns:a14="http://schemas.microsoft.com/office/drawing/2010/main">
+        <mc:Choice Requires="a14">
           <p:sp>
             <p:nvSpPr>
               <p:cNvPr id="3" name="내용 개체 틀 2"/>
@@ -10599,7 +10636,7 @@
             </p:txBody>
           </p:sp>
         </mc:Choice>
-        <mc:Fallback>
+        <mc:Fallback xmlns="">
           <p:sp>
             <p:nvSpPr>
               <p:cNvPr id="3" name="내용 개체 틀 2"/>
@@ -11464,8 +11501,8 @@
           </a:p>
         </p:txBody>
       </p:sp>
-      <mc:AlternateContent xmlns:mc="http://schemas.openxmlformats.org/markup-compatibility/2006">
-        <mc:Choice xmlns:a14="http://schemas.microsoft.com/office/drawing/2010/main" Requires="a14">
+      <mc:AlternateContent xmlns:mc="http://schemas.openxmlformats.org/markup-compatibility/2006" xmlns:a14="http://schemas.microsoft.com/office/drawing/2010/main">
+        <mc:Choice Requires="a14">
           <p:sp>
             <p:nvSpPr>
               <p:cNvPr id="3" name="내용 개체 틀 2"/>
@@ -11947,7 +11984,7 @@
             </p:txBody>
           </p:sp>
         </mc:Choice>
-        <mc:Fallback>
+        <mc:Fallback xmlns="">
           <p:sp>
             <p:nvSpPr>
               <p:cNvPr id="3" name="내용 개체 틀 2"/>
@@ -16500,6 +16537,10 @@
               <a:rPr lang="ko-KR" altLang="en-US" dirty="0"/>
               <a:t>로 다양한 정보 비교</a:t>
             </a:r>
+            <a:r>
+              <a:rPr lang="en-US" altLang="ko-KR" dirty="0"/>
+              <a:t/>
+            </a:r>
             <a:br>
               <a:rPr lang="en-US" altLang="ko-KR" dirty="0"/>
             </a:br>
@@ -17473,6 +17514,10 @@
               <a:rPr lang="ko-KR" altLang="en-US" dirty="0"/>
               <a:t>에 가점 부여</a:t>
             </a:r>
+            <a:r>
+              <a:rPr lang="en-US" altLang="ko-KR" dirty="0"/>
+              <a:t/>
+            </a:r>
             <a:br>
               <a:rPr lang="en-US" altLang="ko-KR" dirty="0"/>
             </a:br>
@@ -17527,6 +17572,10 @@
             <a:r>
               <a:rPr lang="ko-KR" altLang="en-US" dirty="0"/>
               <a:t>차량 수 </a:t>
+            </a:r>
+            <a:r>
+              <a:rPr lang="en-US" altLang="ko-KR" dirty="0"/>
+              <a:t/>
             </a:r>
             <a:br>
               <a:rPr lang="en-US" altLang="ko-KR" dirty="0"/>
@@ -18092,6 +18141,10 @@
               <a:rPr lang="ko-KR" altLang="en-US" dirty="0"/>
               <a:t>을 뒤로 이동</a:t>
             </a:r>
+            <a:r>
+              <a:rPr lang="en-US" altLang="ko-KR" dirty="0"/>
+              <a:t/>
+            </a:r>
             <a:br>
               <a:rPr lang="en-US" altLang="ko-KR" dirty="0"/>
             </a:br>
@@ -18636,6 +18689,10 @@
               <a:rPr lang="ko-KR" altLang="en-US" dirty="0"/>
               <a:t>에서 중요 흐름에 가점 부여</a:t>
             </a:r>
+            <a:r>
+              <a:rPr lang="en-US" altLang="ko-KR" dirty="0"/>
+              <a:t/>
+            </a:r>
             <a:br>
               <a:rPr lang="en-US" altLang="ko-KR" dirty="0"/>
             </a:br>
@@ -18830,6 +18887,12 @@
                 <a:sym typeface="Wingdings" panose="05000000000000000000" pitchFamily="2" charset="2"/>
               </a:rPr>
               <a:t>모든 내용을 공유하는 것이 아닌 부분만 공유</a:t>
+            </a:r>
+            <a:r>
+              <a:rPr lang="en-US" altLang="ko-KR" dirty="0">
+                <a:sym typeface="Wingdings" panose="05000000000000000000" pitchFamily="2" charset="2"/>
+              </a:rPr>
+              <a:t/>
             </a:r>
             <a:br>
               <a:rPr lang="en-US" altLang="ko-KR" dirty="0">
@@ -19426,13 +19489,7 @@
       </p:grpSpPr>
       <p:sp>
         <p:nvSpPr>
-          <p:cNvPr id="4" name="제목 3">
-            <a:extLst>
-              <a:ext uri="{FF2B5EF4-FFF2-40B4-BE49-F238E27FC236}">
-                <a16:creationId xmlns:a16="http://schemas.microsoft.com/office/drawing/2014/main" id="{F2EF6404-AC06-4DB1-BD54-8DAD08F9FFB8}"/>
-              </a:ext>
-            </a:extLst>
-          </p:cNvPr>
+          <p:cNvPr id="2" name="제목 1"/>
           <p:cNvSpPr>
             <a:spLocks noGrp="1"/>
           </p:cNvSpPr>
@@ -19446,8 +19503,8 @@
           <a:lstStyle/>
           <a:p>
             <a:r>
-              <a:rPr lang="en-US" altLang="ko-KR" dirty="0"/>
-              <a:t>Thank you</a:t>
+              <a:rPr lang="ko-KR" altLang="en-US" dirty="0" smtClean="0"/>
+              <a:t>기준 데이터와의 비교</a:t>
             </a:r>
             <a:endParaRPr lang="ko-KR" altLang="en-US" dirty="0"/>
           </a:p>
@@ -19455,13 +19512,7 @@
       </p:sp>
       <p:sp>
         <p:nvSpPr>
-          <p:cNvPr id="5" name="내용 개체 틀 4">
-            <a:extLst>
-              <a:ext uri="{FF2B5EF4-FFF2-40B4-BE49-F238E27FC236}">
-                <a16:creationId xmlns:a16="http://schemas.microsoft.com/office/drawing/2014/main" id="{D72192F5-DDDC-412C-9637-EA3364A1C7C4}"/>
-              </a:ext>
-            </a:extLst>
-          </p:cNvPr>
+          <p:cNvPr id="3" name="내용 개체 틀 2"/>
           <p:cNvSpPr>
             <a:spLocks noGrp="1"/>
           </p:cNvSpPr>
@@ -19474,24 +19525,335 @@
           <a:bodyPr/>
           <a:lstStyle/>
           <a:p>
-            <a:endParaRPr lang="ko-KR" altLang="en-US"/>
-          </a:p>
-        </p:txBody>
-      </p:sp>
-      <p:sp>
-        <p:nvSpPr>
-          <p:cNvPr id="6" name="텍스트 개체 틀 5">
-            <a:extLst>
-              <a:ext uri="{FF2B5EF4-FFF2-40B4-BE49-F238E27FC236}">
-                <a16:creationId xmlns:a16="http://schemas.microsoft.com/office/drawing/2014/main" id="{615F8F27-81FE-45EB-BA01-9A134AE49B9E}"/>
-              </a:ext>
-            </a:extLst>
-          </p:cNvPr>
+            <a:r>
+              <a:rPr lang="en-US" altLang="ko-KR" dirty="0" smtClean="0"/>
+              <a:t> </a:t>
+            </a:r>
+            <a:r>
+              <a:rPr lang="ko-KR" altLang="en-US" dirty="0" smtClean="0"/>
+              <a:t>상하 </a:t>
+            </a:r>
+            <a:r>
+              <a:rPr lang="en-US" altLang="ko-KR" dirty="0" smtClean="0"/>
+              <a:t>0.5, </a:t>
+            </a:r>
+            <a:r>
+              <a:rPr lang="ko-KR" altLang="en-US" dirty="0" smtClean="0"/>
+              <a:t>좌우 </a:t>
+            </a:r>
+            <a:r>
+              <a:rPr lang="en-US" altLang="ko-KR" dirty="0" smtClean="0"/>
+              <a:t>0.2 vehicle generate probability (</a:t>
+            </a:r>
+            <a:r>
+              <a:rPr lang="ko-KR" altLang="en-US" dirty="0" smtClean="0"/>
+              <a:t>방향 제어 없이 직진만 하는 경우</a:t>
+            </a:r>
+            <a:r>
+              <a:rPr lang="en-US" altLang="ko-KR" dirty="0" smtClean="0"/>
+              <a:t>)</a:t>
+            </a:r>
+          </a:p>
+          <a:p>
+            <a:pPr lvl="1"/>
+            <a:r>
+              <a:rPr lang="en-US" altLang="ko-KR" dirty="0" smtClean="0"/>
+              <a:t>90</a:t>
+            </a:r>
+            <a:r>
+              <a:rPr lang="ko-KR" altLang="en-US" dirty="0" smtClean="0"/>
+              <a:t>초의 신호 간격일 경우</a:t>
+            </a:r>
+            <a:r>
+              <a:rPr lang="en-US" altLang="ko-KR" dirty="0" smtClean="0"/>
+              <a:t>: Throughput 10460 </a:t>
+            </a:r>
+            <a:r>
+              <a:rPr lang="en-US" altLang="ko-KR" dirty="0"/>
+              <a:t>[</a:t>
+            </a:r>
+            <a:r>
+              <a:rPr lang="en-US" altLang="ko-KR" dirty="0" smtClean="0"/>
+              <a:t>vehicles/epoch] (42</a:t>
+            </a:r>
+            <a:r>
+              <a:rPr lang="ko-KR" altLang="en-US" dirty="0" smtClean="0"/>
+              <a:t>초 </a:t>
+            </a:r>
+            <a:r>
+              <a:rPr lang="en-US" altLang="ko-KR" dirty="0" smtClean="0"/>
+              <a:t>green, 3</a:t>
+            </a:r>
+            <a:r>
+              <a:rPr lang="ko-KR" altLang="en-US" dirty="0" smtClean="0"/>
+              <a:t>초 </a:t>
+            </a:r>
+            <a:r>
+              <a:rPr lang="en-US" altLang="ko-KR" dirty="0" smtClean="0"/>
+              <a:t>yellow)</a:t>
+            </a:r>
+          </a:p>
+          <a:p>
+            <a:pPr lvl="1"/>
+            <a:r>
+              <a:rPr lang="en-US" altLang="ko-KR" dirty="0" smtClean="0"/>
+              <a:t>DQN </a:t>
+            </a:r>
+            <a:r>
+              <a:rPr lang="ko-KR" altLang="en-US" dirty="0" smtClean="0"/>
+              <a:t>적용 후</a:t>
+            </a:r>
+            <a:r>
+              <a:rPr lang="en-US" altLang="ko-KR" dirty="0" smtClean="0"/>
+              <a:t>, 20</a:t>
+            </a:r>
+            <a:r>
+              <a:rPr lang="ko-KR" altLang="en-US" dirty="0" smtClean="0"/>
+              <a:t>초 </a:t>
+            </a:r>
+            <a:r>
+              <a:rPr lang="en-US" altLang="ko-KR" dirty="0" smtClean="0"/>
+              <a:t>green+5</a:t>
+            </a:r>
+            <a:r>
+              <a:rPr lang="ko-KR" altLang="en-US" dirty="0" smtClean="0"/>
+              <a:t>초 </a:t>
+            </a:r>
+            <a:r>
+              <a:rPr lang="en-US" altLang="ko-KR" dirty="0" smtClean="0"/>
+              <a:t>yellow </a:t>
+            </a:r>
+            <a:r>
+              <a:rPr lang="ko-KR" altLang="en-US" dirty="0" err="1" smtClean="0"/>
+              <a:t>적용시</a:t>
+            </a:r>
+            <a:r>
+              <a:rPr lang="ko-KR" altLang="en-US" dirty="0" smtClean="0"/>
+              <a:t> </a:t>
+            </a:r>
+            <a:r>
+              <a:rPr lang="en-US" altLang="ko-KR" dirty="0" smtClean="0"/>
+              <a:t>Throughput</a:t>
+            </a:r>
+            <a:endParaRPr lang="en-US" altLang="ko-KR" dirty="0"/>
+          </a:p>
+          <a:p>
+            <a:pPr lvl="2"/>
+            <a:r>
+              <a:rPr lang="ko-KR" altLang="en-US" dirty="0" smtClean="0"/>
+              <a:t>최고</a:t>
+            </a:r>
+            <a:r>
+              <a:rPr lang="en-US" altLang="ko-KR" dirty="0" smtClean="0"/>
+              <a:t>: 11200, </a:t>
+            </a:r>
+            <a:r>
+              <a:rPr lang="ko-KR" altLang="en-US" dirty="0" smtClean="0"/>
+              <a:t>평균</a:t>
+            </a:r>
+            <a:r>
+              <a:rPr lang="en-US" altLang="ko-KR" dirty="0" smtClean="0"/>
+              <a:t>: 10800</a:t>
+            </a:r>
+            <a:r>
+              <a:rPr lang="ko-KR" altLang="en-US" dirty="0" smtClean="0"/>
+              <a:t>으로 수렴 </a:t>
+            </a:r>
+            <a:r>
+              <a:rPr lang="en-US" altLang="ko-KR" dirty="0" smtClean="0">
+                <a:sym typeface="Wingdings" panose="05000000000000000000" pitchFamily="2" charset="2"/>
+              </a:rPr>
+              <a:t> </a:t>
+            </a:r>
+            <a:r>
+              <a:rPr lang="ko-KR" altLang="en-US" dirty="0" smtClean="0">
+                <a:sym typeface="Wingdings" panose="05000000000000000000" pitchFamily="2" charset="2"/>
+              </a:rPr>
+              <a:t>약 </a:t>
+            </a:r>
+            <a:r>
+              <a:rPr lang="en-US" altLang="ko-KR" dirty="0" smtClean="0">
+                <a:sym typeface="Wingdings" panose="05000000000000000000" pitchFamily="2" charset="2"/>
+              </a:rPr>
+              <a:t>8~9% </a:t>
+            </a:r>
+            <a:r>
+              <a:rPr lang="ko-KR" altLang="en-US" dirty="0" smtClean="0">
+                <a:sym typeface="Wingdings" panose="05000000000000000000" pitchFamily="2" charset="2"/>
+              </a:rPr>
+              <a:t>성능 향상을 보임</a:t>
+            </a:r>
+            <a:endParaRPr lang="en-US" altLang="ko-KR" dirty="0" smtClean="0">
+              <a:sym typeface="Wingdings" panose="05000000000000000000" pitchFamily="2" charset="2"/>
+            </a:endParaRPr>
+          </a:p>
+          <a:p>
+            <a:pPr lvl="2"/>
+            <a:r>
+              <a:rPr lang="ko-KR" altLang="en-US" dirty="0" smtClean="0">
+                <a:sym typeface="Wingdings" panose="05000000000000000000" pitchFamily="2" charset="2"/>
+              </a:rPr>
+              <a:t>하지만</a:t>
+            </a:r>
+            <a:r>
+              <a:rPr lang="en-US" altLang="ko-KR" dirty="0" smtClean="0">
+                <a:sym typeface="Wingdings" panose="05000000000000000000" pitchFamily="2" charset="2"/>
+              </a:rPr>
+              <a:t>, Teleport(</a:t>
+            </a:r>
+            <a:r>
+              <a:rPr lang="ko-KR" altLang="en-US" dirty="0" smtClean="0">
+                <a:sym typeface="Wingdings" panose="05000000000000000000" pitchFamily="2" charset="2"/>
+              </a:rPr>
+              <a:t>지나친 병목</a:t>
+            </a:r>
+            <a:r>
+              <a:rPr lang="en-US" altLang="ko-KR" dirty="0" smtClean="0">
+                <a:sym typeface="Wingdings" panose="05000000000000000000" pitchFamily="2" charset="2"/>
+              </a:rPr>
+              <a:t>) </a:t>
+            </a:r>
+            <a:r>
+              <a:rPr lang="ko-KR" altLang="en-US" dirty="0" smtClean="0">
+                <a:sym typeface="Wingdings" panose="05000000000000000000" pitchFamily="2" charset="2"/>
+              </a:rPr>
+              <a:t>현상이 잦아서 실험의 개선이 필요했음 </a:t>
+            </a:r>
+            <a:r>
+              <a:rPr lang="en-US" altLang="ko-KR" dirty="0" smtClean="0">
+                <a:sym typeface="Wingdings" panose="05000000000000000000" pitchFamily="2" charset="2"/>
+              </a:rPr>
+              <a:t>(</a:t>
+            </a:r>
+            <a:r>
+              <a:rPr lang="en-US" altLang="ko-KR" dirty="0" err="1" smtClean="0">
+                <a:sym typeface="Wingdings" panose="05000000000000000000" pitchFamily="2" charset="2"/>
+              </a:rPr>
+              <a:t>Spillout</a:t>
+            </a:r>
+            <a:r>
+              <a:rPr lang="en-US" altLang="ko-KR" dirty="0" smtClean="0">
+                <a:sym typeface="Wingdings" panose="05000000000000000000" pitchFamily="2" charset="2"/>
+              </a:rPr>
+              <a:t> </a:t>
+            </a:r>
+            <a:r>
+              <a:rPr lang="ko-KR" altLang="en-US" dirty="0" smtClean="0">
+                <a:sym typeface="Wingdings" panose="05000000000000000000" pitchFamily="2" charset="2"/>
+              </a:rPr>
+              <a:t>현상 발생</a:t>
+            </a:r>
+            <a:r>
+              <a:rPr lang="en-US" altLang="ko-KR" dirty="0" smtClean="0">
+                <a:sym typeface="Wingdings" panose="05000000000000000000" pitchFamily="2" charset="2"/>
+              </a:rPr>
+              <a:t>)</a:t>
+            </a:r>
+          </a:p>
+          <a:p>
+            <a:pPr lvl="2"/>
+            <a:r>
+              <a:rPr lang="en-US" altLang="ko-KR" dirty="0" smtClean="0">
+                <a:sym typeface="Wingdings" panose="05000000000000000000" pitchFamily="2" charset="2"/>
+              </a:rPr>
+              <a:t>Epsilon Greedy</a:t>
+            </a:r>
+            <a:r>
+              <a:rPr lang="ko-KR" altLang="en-US" dirty="0" smtClean="0">
+                <a:sym typeface="Wingdings" panose="05000000000000000000" pitchFamily="2" charset="2"/>
+              </a:rPr>
+              <a:t>에서 </a:t>
+            </a:r>
+            <a:r>
+              <a:rPr lang="en-US" altLang="ko-KR" dirty="0" smtClean="0">
+                <a:sym typeface="Wingdings" panose="05000000000000000000" pitchFamily="2" charset="2"/>
+              </a:rPr>
+              <a:t>Epsilon</a:t>
+            </a:r>
+            <a:r>
+              <a:rPr lang="ko-KR" altLang="en-US" dirty="0" smtClean="0">
+                <a:sym typeface="Wingdings" panose="05000000000000000000" pitchFamily="2" charset="2"/>
+              </a:rPr>
+              <a:t>값이 </a:t>
+            </a:r>
+            <a:r>
+              <a:rPr lang="en-US" altLang="ko-KR" dirty="0" smtClean="0">
+                <a:sym typeface="Wingdings" panose="05000000000000000000" pitchFamily="2" charset="2"/>
+              </a:rPr>
+              <a:t>0.05</a:t>
+            </a:r>
+            <a:r>
+              <a:rPr lang="ko-KR" altLang="en-US" dirty="0" smtClean="0">
+                <a:sym typeface="Wingdings" panose="05000000000000000000" pitchFamily="2" charset="2"/>
+              </a:rPr>
+              <a:t>인 점을 감안하면 성능이 뛰어났음</a:t>
+            </a:r>
+            <a:endParaRPr lang="ko-KR" altLang="en-US" dirty="0"/>
+          </a:p>
+        </p:txBody>
+      </p:sp>
+      <p:pic>
+        <p:nvPicPr>
+          <p:cNvPr id="4" name="그림 3"/>
+          <p:cNvPicPr>
+            <a:picLocks noChangeAspect="1"/>
+          </p:cNvPicPr>
+          <p:nvPr/>
+        </p:nvPicPr>
+        <p:blipFill>
+          <a:blip r:embed="rId2"/>
+          <a:stretch>
+            <a:fillRect/>
+          </a:stretch>
+        </p:blipFill>
+        <p:spPr>
+          <a:xfrm>
+            <a:off x="1097280" y="3734685"/>
+            <a:ext cx="9102079" cy="2516973"/>
+          </a:xfrm>
+          <a:prstGeom prst="rect">
+            <a:avLst/>
+          </a:prstGeom>
+        </p:spPr>
+      </p:pic>
+    </p:spTree>
+    <p:extLst>
+      <p:ext uri="{BB962C8B-B14F-4D97-AF65-F5344CB8AC3E}">
+        <p14:creationId xmlns:p14="http://schemas.microsoft.com/office/powerpoint/2010/main" val="725406072"/>
+      </p:ext>
+    </p:extLst>
+  </p:cSld>
+  <p:clrMapOvr>
+    <a:masterClrMapping/>
+  </p:clrMapOvr>
+</p:sld>
+</file>
+
+<file path=ppt/slides/slide39.xml><?xml version="1.0" encoding="utf-8"?>
+<p:sld xmlns:a="http://schemas.openxmlformats.org/drawingml/2006/main" xmlns:r="http://schemas.openxmlformats.org/officeDocument/2006/relationships" xmlns:p="http://schemas.openxmlformats.org/presentationml/2006/main">
+  <p:cSld>
+    <p:spTree>
+      <p:nvGrpSpPr>
+        <p:cNvPr id="1" name=""/>
+        <p:cNvGrpSpPr/>
+        <p:nvPr/>
+      </p:nvGrpSpPr>
+      <p:grpSpPr>
+        <a:xfrm>
+          <a:off x="0" y="0"/>
+          <a:ext cx="0" cy="0"/>
+          <a:chOff x="0" y="0"/>
+          <a:chExt cx="0" cy="0"/>
+        </a:xfrm>
+      </p:grpSpPr>
+      <p:sp>
+        <p:nvSpPr>
+          <p:cNvPr id="2" name="제목 1"/>
           <p:cNvSpPr>
             <a:spLocks noGrp="1"/>
           </p:cNvSpPr>
           <p:nvPr>
-            <p:ph type="body" sz="half" idx="2"/>
+            <p:ph type="title"/>
           </p:nvPr>
         </p:nvSpPr>
         <p:spPr/>
@@ -19499,14 +19861,243 @@
           <a:bodyPr/>
           <a:lstStyle/>
           <a:p>
-            <a:endParaRPr lang="ko-KR" altLang="en-US"/>
-          </a:p>
-        </p:txBody>
-      </p:sp>
+            <a:r>
+              <a:rPr lang="ko-KR" altLang="en-US" dirty="0" smtClean="0"/>
+              <a:t>기준 데이터와의 비교</a:t>
+            </a:r>
+            <a:endParaRPr lang="ko-KR" altLang="en-US" dirty="0"/>
+          </a:p>
+        </p:txBody>
+      </p:sp>
+      <p:sp>
+        <p:nvSpPr>
+          <p:cNvPr id="3" name="내용 개체 틀 2"/>
+          <p:cNvSpPr>
+            <a:spLocks noGrp="1"/>
+          </p:cNvSpPr>
+          <p:nvPr>
+            <p:ph idx="1"/>
+          </p:nvPr>
+        </p:nvSpPr>
+        <p:spPr/>
+        <p:txBody>
+          <a:bodyPr/>
+          <a:lstStyle/>
+          <a:p>
+            <a:r>
+              <a:rPr lang="en-US" altLang="ko-KR" dirty="0" smtClean="0"/>
+              <a:t> </a:t>
+            </a:r>
+            <a:r>
+              <a:rPr lang="ko-KR" altLang="en-US" dirty="0" smtClean="0"/>
+              <a:t>상하 </a:t>
+            </a:r>
+            <a:r>
+              <a:rPr lang="en-US" altLang="ko-KR" dirty="0" smtClean="0"/>
+              <a:t>0.388, </a:t>
+            </a:r>
+            <a:r>
+              <a:rPr lang="ko-KR" altLang="en-US" dirty="0" smtClean="0"/>
+              <a:t>좌우 </a:t>
+            </a:r>
+            <a:r>
+              <a:rPr lang="en-US" altLang="ko-KR" dirty="0" smtClean="0"/>
+              <a:t>0.133 vehicle generate probability (</a:t>
+            </a:r>
+            <a:r>
+              <a:rPr lang="ko-KR" altLang="en-US" dirty="0" smtClean="0"/>
+              <a:t>방향 제어 없이 직진만 하는 경우</a:t>
+            </a:r>
+            <a:r>
+              <a:rPr lang="en-US" altLang="ko-KR" dirty="0" smtClean="0"/>
+              <a:t>)</a:t>
+            </a:r>
+          </a:p>
+          <a:p>
+            <a:pPr lvl="1"/>
+            <a:r>
+              <a:rPr lang="en-US" altLang="ko-KR" dirty="0" smtClean="0"/>
+              <a:t>20</a:t>
+            </a:r>
+            <a:r>
+              <a:rPr lang="ko-KR" altLang="en-US" dirty="0" smtClean="0"/>
+              <a:t>초의 신호 간격일 경우</a:t>
+            </a:r>
+            <a:r>
+              <a:rPr lang="en-US" altLang="ko-KR" dirty="0" smtClean="0"/>
+              <a:t>: Throughput 8170 [</a:t>
+            </a:r>
+            <a:r>
+              <a:rPr lang="en-US" altLang="ko-KR" dirty="0" err="1" smtClean="0"/>
+              <a:t>veh</a:t>
+            </a:r>
+            <a:r>
+              <a:rPr lang="en-US" altLang="ko-KR" dirty="0" smtClean="0"/>
+              <a:t>/epoch] (20</a:t>
+            </a:r>
+            <a:r>
+              <a:rPr lang="ko-KR" altLang="en-US" dirty="0" smtClean="0"/>
+              <a:t>초 </a:t>
+            </a:r>
+            <a:r>
+              <a:rPr lang="en-US" altLang="ko-KR" dirty="0" smtClean="0"/>
+              <a:t>green, 5</a:t>
+            </a:r>
+            <a:r>
+              <a:rPr lang="ko-KR" altLang="en-US" dirty="0" smtClean="0"/>
+              <a:t>초 </a:t>
+            </a:r>
+            <a:r>
+              <a:rPr lang="en-US" altLang="ko-KR" dirty="0" smtClean="0"/>
+              <a:t>yellow)</a:t>
+            </a:r>
+          </a:p>
+          <a:p>
+            <a:pPr lvl="1"/>
+            <a:r>
+              <a:rPr lang="en-US" altLang="ko-KR" dirty="0" smtClean="0"/>
+              <a:t>DQN </a:t>
+            </a:r>
+            <a:r>
+              <a:rPr lang="ko-KR" altLang="en-US" dirty="0" smtClean="0"/>
+              <a:t>적용 후</a:t>
+            </a:r>
+            <a:r>
+              <a:rPr lang="en-US" altLang="ko-KR" dirty="0" smtClean="0"/>
+              <a:t>, 20</a:t>
+            </a:r>
+            <a:r>
+              <a:rPr lang="ko-KR" altLang="en-US" dirty="0" smtClean="0"/>
+              <a:t>초 </a:t>
+            </a:r>
+            <a:r>
+              <a:rPr lang="en-US" altLang="ko-KR" dirty="0" smtClean="0"/>
+              <a:t>green+5</a:t>
+            </a:r>
+            <a:r>
+              <a:rPr lang="ko-KR" altLang="en-US" dirty="0" smtClean="0"/>
+              <a:t>초 </a:t>
+            </a:r>
+            <a:r>
+              <a:rPr lang="en-US" altLang="ko-KR" dirty="0" smtClean="0"/>
+              <a:t>yellow </a:t>
+            </a:r>
+            <a:r>
+              <a:rPr lang="ko-KR" altLang="en-US" dirty="0" err="1" smtClean="0"/>
+              <a:t>적용시</a:t>
+            </a:r>
+            <a:r>
+              <a:rPr lang="ko-KR" altLang="en-US" dirty="0" smtClean="0"/>
+              <a:t> </a:t>
+            </a:r>
+            <a:r>
+              <a:rPr lang="en-US" altLang="ko-KR" dirty="0" smtClean="0"/>
+              <a:t>Throughput</a:t>
+            </a:r>
+            <a:endParaRPr lang="en-US" altLang="ko-KR" dirty="0"/>
+          </a:p>
+          <a:p>
+            <a:pPr lvl="2"/>
+            <a:r>
+              <a:rPr lang="ko-KR" altLang="en-US" dirty="0" smtClean="0"/>
+              <a:t>최고</a:t>
+            </a:r>
+            <a:r>
+              <a:rPr lang="en-US" altLang="ko-KR" dirty="0" smtClean="0"/>
+              <a:t>: 8790, </a:t>
+            </a:r>
+            <a:r>
+              <a:rPr lang="ko-KR" altLang="en-US" dirty="0" smtClean="0"/>
+              <a:t>평균</a:t>
+            </a:r>
+            <a:r>
+              <a:rPr lang="en-US" altLang="ko-KR" dirty="0" smtClean="0"/>
+              <a:t>: 8600</a:t>
+            </a:r>
+            <a:r>
+              <a:rPr lang="ko-KR" altLang="en-US" dirty="0" smtClean="0"/>
+              <a:t>으로 수렴 </a:t>
+            </a:r>
+            <a:r>
+              <a:rPr lang="en-US" altLang="ko-KR" dirty="0" smtClean="0">
+                <a:sym typeface="Wingdings" panose="05000000000000000000" pitchFamily="2" charset="2"/>
+              </a:rPr>
+              <a:t> </a:t>
+            </a:r>
+            <a:r>
+              <a:rPr lang="ko-KR" altLang="en-US" dirty="0" smtClean="0">
+                <a:sym typeface="Wingdings" panose="05000000000000000000" pitchFamily="2" charset="2"/>
+              </a:rPr>
+              <a:t>약 </a:t>
+            </a:r>
+            <a:r>
+              <a:rPr lang="en-US" altLang="ko-KR" dirty="0" smtClean="0">
+                <a:sym typeface="Wingdings" panose="05000000000000000000" pitchFamily="2" charset="2"/>
+              </a:rPr>
+              <a:t>7~8% </a:t>
+            </a:r>
+            <a:r>
+              <a:rPr lang="ko-KR" altLang="en-US" dirty="0" smtClean="0">
+                <a:sym typeface="Wingdings" panose="05000000000000000000" pitchFamily="2" charset="2"/>
+              </a:rPr>
+              <a:t>성능 향상을 보임</a:t>
+            </a:r>
+            <a:endParaRPr lang="en-US" altLang="ko-KR" dirty="0" smtClean="0">
+              <a:sym typeface="Wingdings" panose="05000000000000000000" pitchFamily="2" charset="2"/>
+            </a:endParaRPr>
+          </a:p>
+          <a:p>
+            <a:pPr lvl="2"/>
+            <a:r>
+              <a:rPr lang="en-US" altLang="ko-KR" dirty="0" smtClean="0">
+                <a:sym typeface="Wingdings" panose="05000000000000000000" pitchFamily="2" charset="2"/>
+              </a:rPr>
+              <a:t>Epsilon Greedy</a:t>
+            </a:r>
+            <a:r>
+              <a:rPr lang="ko-KR" altLang="en-US" dirty="0" smtClean="0">
+                <a:sym typeface="Wingdings" panose="05000000000000000000" pitchFamily="2" charset="2"/>
+              </a:rPr>
+              <a:t>에서 </a:t>
+            </a:r>
+            <a:r>
+              <a:rPr lang="en-US" altLang="ko-KR" dirty="0" smtClean="0">
+                <a:sym typeface="Wingdings" panose="05000000000000000000" pitchFamily="2" charset="2"/>
+              </a:rPr>
+              <a:t>Epsilon: 0.005</a:t>
+            </a:r>
+            <a:endParaRPr lang="ko-KR" altLang="en-US" dirty="0"/>
+          </a:p>
+        </p:txBody>
+      </p:sp>
+      <p:pic>
+        <p:nvPicPr>
+          <p:cNvPr id="5" name="그림 4"/>
+          <p:cNvPicPr>
+            <a:picLocks noChangeAspect="1"/>
+          </p:cNvPicPr>
+          <p:nvPr/>
+        </p:nvPicPr>
+        <p:blipFill>
+          <a:blip r:embed="rId2"/>
+          <a:stretch>
+            <a:fillRect/>
+          </a:stretch>
+        </p:blipFill>
+        <p:spPr>
+          <a:xfrm>
+            <a:off x="1467807" y="3706152"/>
+            <a:ext cx="8646551" cy="2375980"/>
+          </a:xfrm>
+          <a:prstGeom prst="rect">
+            <a:avLst/>
+          </a:prstGeom>
+        </p:spPr>
+      </p:pic>
     </p:spTree>
     <p:extLst>
       <p:ext uri="{BB962C8B-B14F-4D97-AF65-F5344CB8AC3E}">
-        <p14:creationId xmlns:p14="http://schemas.microsoft.com/office/powerpoint/2010/main" val="2291802260"/>
+        <p14:creationId xmlns:p14="http://schemas.microsoft.com/office/powerpoint/2010/main" val="4267862882"/>
       </p:ext>
     </p:extLst>
   </p:cSld>
@@ -19630,6 +20221,10 @@
               <a:rPr lang="ko-KR" altLang="en-US" dirty="0"/>
               <a:t>멀면 분산효과가 커서 필요성이 낮음</a:t>
             </a:r>
+            <a:r>
+              <a:rPr lang="en-US" altLang="ko-KR" dirty="0"/>
+              <a:t/>
+            </a:r>
             <a:br>
               <a:rPr lang="en-US" altLang="ko-KR" dirty="0"/>
             </a:br>
@@ -19832,6 +20427,12 @@
               </a:rPr>
               <a:t>차량 모두 고려해야 함</a:t>
             </a:r>
+            <a:r>
+              <a:rPr lang="en-US" altLang="ko-KR" dirty="0">
+                <a:sym typeface="Wingdings" panose="05000000000000000000" pitchFamily="2" charset="2"/>
+              </a:rPr>
+              <a:t/>
+            </a:r>
             <a:br>
               <a:rPr lang="en-US" altLang="ko-KR" dirty="0">
                 <a:sym typeface="Wingdings" panose="05000000000000000000" pitchFamily="2" charset="2"/>
@@ -19887,6 +20488,12 @@
               </a:rPr>
               <a:t>연동 필요가 없음</a:t>
             </a:r>
+            <a:r>
+              <a:rPr lang="en-US" altLang="ko-KR" dirty="0">
+                <a:sym typeface="Wingdings" panose="05000000000000000000" pitchFamily="2" charset="2"/>
+              </a:rPr>
+              <a:t/>
+            </a:r>
             <a:br>
               <a:rPr lang="en-US" altLang="ko-KR" dirty="0">
                 <a:sym typeface="Wingdings" panose="05000000000000000000" pitchFamily="2" charset="2"/>
@@ -20002,6 +20609,183 @@
     <p:extLst>
       <p:ext uri="{BB962C8B-B14F-4D97-AF65-F5344CB8AC3E}">
         <p14:creationId xmlns:p14="http://schemas.microsoft.com/office/powerpoint/2010/main" val="1630567643"/>
+      </p:ext>
+    </p:extLst>
+  </p:cSld>
+  <p:clrMapOvr>
+    <a:masterClrMapping/>
+  </p:clrMapOvr>
+</p:sld>
+</file>
+
+<file path=ppt/slides/slide40.xml><?xml version="1.0" encoding="utf-8"?>
+<p:sld xmlns:a="http://schemas.openxmlformats.org/drawingml/2006/main" xmlns:r="http://schemas.openxmlformats.org/officeDocument/2006/relationships" xmlns:p="http://schemas.openxmlformats.org/presentationml/2006/main">
+  <p:cSld>
+    <p:spTree>
+      <p:nvGrpSpPr>
+        <p:cNvPr id="1" name=""/>
+        <p:cNvGrpSpPr/>
+        <p:nvPr/>
+      </p:nvGrpSpPr>
+      <p:grpSpPr>
+        <a:xfrm>
+          <a:off x="0" y="0"/>
+          <a:ext cx="0" cy="0"/>
+          <a:chOff x="0" y="0"/>
+          <a:chExt cx="0" cy="0"/>
+        </a:xfrm>
+      </p:grpSpPr>
+      <p:sp>
+        <p:nvSpPr>
+          <p:cNvPr id="2" name="제목 1"/>
+          <p:cNvSpPr>
+            <a:spLocks noGrp="1"/>
+          </p:cNvSpPr>
+          <p:nvPr>
+            <p:ph type="title"/>
+          </p:nvPr>
+        </p:nvSpPr>
+        <p:spPr/>
+        <p:txBody>
+          <a:bodyPr/>
+          <a:lstStyle/>
+          <a:p>
+            <a:endParaRPr lang="ko-KR" altLang="en-US"/>
+          </a:p>
+        </p:txBody>
+      </p:sp>
+      <p:sp>
+        <p:nvSpPr>
+          <p:cNvPr id="3" name="내용 개체 틀 2"/>
+          <p:cNvSpPr>
+            <a:spLocks noGrp="1"/>
+          </p:cNvSpPr>
+          <p:nvPr>
+            <p:ph idx="1"/>
+          </p:nvPr>
+        </p:nvSpPr>
+        <p:spPr/>
+        <p:txBody>
+          <a:bodyPr/>
+          <a:lstStyle/>
+          <a:p>
+            <a:endParaRPr lang="ko-KR" altLang="en-US"/>
+          </a:p>
+        </p:txBody>
+      </p:sp>
+    </p:spTree>
+    <p:extLst>
+      <p:ext uri="{BB962C8B-B14F-4D97-AF65-F5344CB8AC3E}">
+        <p14:creationId xmlns:p14="http://schemas.microsoft.com/office/powerpoint/2010/main" val="1418110980"/>
+      </p:ext>
+    </p:extLst>
+  </p:cSld>
+  <p:clrMapOvr>
+    <a:masterClrMapping/>
+  </p:clrMapOvr>
+</p:sld>
+</file>
+
+<file path=ppt/slides/slide41.xml><?xml version="1.0" encoding="utf-8"?>
+<p:sld xmlns:a="http://schemas.openxmlformats.org/drawingml/2006/main" xmlns:r="http://schemas.openxmlformats.org/officeDocument/2006/relationships" xmlns:p="http://schemas.openxmlformats.org/presentationml/2006/main">
+  <p:cSld>
+    <p:spTree>
+      <p:nvGrpSpPr>
+        <p:cNvPr id="1" name=""/>
+        <p:cNvGrpSpPr/>
+        <p:nvPr/>
+      </p:nvGrpSpPr>
+      <p:grpSpPr>
+        <a:xfrm>
+          <a:off x="0" y="0"/>
+          <a:ext cx="0" cy="0"/>
+          <a:chOff x="0" y="0"/>
+          <a:chExt cx="0" cy="0"/>
+        </a:xfrm>
+      </p:grpSpPr>
+      <p:sp>
+        <p:nvSpPr>
+          <p:cNvPr id="4" name="제목 3">
+            <a:extLst>
+              <a:ext uri="{FF2B5EF4-FFF2-40B4-BE49-F238E27FC236}">
+                <a16:creationId xmlns:a16="http://schemas.microsoft.com/office/drawing/2014/main" id="{F2EF6404-AC06-4DB1-BD54-8DAD08F9FFB8}"/>
+              </a:ext>
+            </a:extLst>
+          </p:cNvPr>
+          <p:cNvSpPr>
+            <a:spLocks noGrp="1"/>
+          </p:cNvSpPr>
+          <p:nvPr>
+            <p:ph type="title"/>
+          </p:nvPr>
+        </p:nvSpPr>
+        <p:spPr/>
+        <p:txBody>
+          <a:bodyPr/>
+          <a:lstStyle/>
+          <a:p>
+            <a:r>
+              <a:rPr lang="en-US" altLang="ko-KR" dirty="0"/>
+              <a:t>Thank you</a:t>
+            </a:r>
+            <a:endParaRPr lang="ko-KR" altLang="en-US" dirty="0"/>
+          </a:p>
+        </p:txBody>
+      </p:sp>
+      <p:sp>
+        <p:nvSpPr>
+          <p:cNvPr id="5" name="내용 개체 틀 4">
+            <a:extLst>
+              <a:ext uri="{FF2B5EF4-FFF2-40B4-BE49-F238E27FC236}">
+                <a16:creationId xmlns:a16="http://schemas.microsoft.com/office/drawing/2014/main" id="{D72192F5-DDDC-412C-9637-EA3364A1C7C4}"/>
+              </a:ext>
+            </a:extLst>
+          </p:cNvPr>
+          <p:cNvSpPr>
+            <a:spLocks noGrp="1"/>
+          </p:cNvSpPr>
+          <p:nvPr>
+            <p:ph idx="1"/>
+          </p:nvPr>
+        </p:nvSpPr>
+        <p:spPr/>
+        <p:txBody>
+          <a:bodyPr/>
+          <a:lstStyle/>
+          <a:p>
+            <a:endParaRPr lang="ko-KR" altLang="en-US"/>
+          </a:p>
+        </p:txBody>
+      </p:sp>
+      <p:sp>
+        <p:nvSpPr>
+          <p:cNvPr id="6" name="텍스트 개체 틀 5">
+            <a:extLst>
+              <a:ext uri="{FF2B5EF4-FFF2-40B4-BE49-F238E27FC236}">
+                <a16:creationId xmlns:a16="http://schemas.microsoft.com/office/drawing/2014/main" id="{615F8F27-81FE-45EB-BA01-9A134AE49B9E}"/>
+              </a:ext>
+            </a:extLst>
+          </p:cNvPr>
+          <p:cNvSpPr>
+            <a:spLocks noGrp="1"/>
+          </p:cNvSpPr>
+          <p:nvPr>
+            <p:ph type="body" sz="half" idx="2"/>
+          </p:nvPr>
+        </p:nvSpPr>
+        <p:spPr/>
+        <p:txBody>
+          <a:bodyPr/>
+          <a:lstStyle/>
+          <a:p>
+            <a:endParaRPr lang="ko-KR" altLang="en-US"/>
+          </a:p>
+        </p:txBody>
+      </p:sp>
+    </p:spTree>
+    <p:extLst>
+      <p:ext uri="{BB962C8B-B14F-4D97-AF65-F5344CB8AC3E}">
+        <p14:creationId xmlns:p14="http://schemas.microsoft.com/office/powerpoint/2010/main" val="2291802260"/>
       </p:ext>
     </p:extLst>
   </p:cSld>
@@ -20321,6 +21105,10 @@
             <a:r>
               <a:rPr lang="ko-KR" altLang="en-US" dirty="0"/>
               <a:t>을 사용</a:t>
+            </a:r>
+            <a:r>
+              <a:rPr lang="en-US" altLang="ko-KR" dirty="0"/>
+              <a:t/>
             </a:r>
             <a:br>
               <a:rPr lang="en-US" altLang="ko-KR" dirty="0"/>
@@ -21087,6 +21875,10 @@
               <a:rPr lang="ko-KR" altLang="en-US" dirty="0"/>
               <a:t>부여 방식</a:t>
             </a:r>
+            <a:r>
+              <a:rPr lang="en-US" altLang="ko-KR" dirty="0"/>
+              <a:t/>
+            </a:r>
             <a:br>
               <a:rPr lang="en-US" altLang="ko-KR" dirty="0"/>
             </a:br>
@@ -21106,6 +21898,10 @@
               <a:rPr lang="ko-KR" altLang="en-US" dirty="0"/>
               <a:t>의 방향 별로 부여</a:t>
             </a:r>
+            <a:r>
+              <a:rPr lang="en-US" altLang="ko-KR" dirty="0"/>
+              <a:t/>
+            </a:r>
             <a:br>
               <a:rPr lang="en-US" altLang="ko-KR" dirty="0"/>
             </a:br>
@@ -21154,6 +21950,10 @@
             <a:r>
               <a:rPr lang="ko-KR" altLang="en-US" dirty="0"/>
               <a:t> 개수 조절 가능</a:t>
+            </a:r>
+            <a:r>
+              <a:rPr lang="en-US" altLang="ko-KR" dirty="0"/>
+              <a:t/>
             </a:r>
             <a:br>
               <a:rPr lang="en-US" altLang="ko-KR" dirty="0"/>
@@ -21458,6 +22258,10 @@
               <a:rPr lang="en-US" altLang="ko-KR" dirty="0" err="1"/>
               <a:t>getIDList</a:t>
             </a:r>
+            <a:r>
+              <a:rPr lang="en-US" altLang="ko-KR" dirty="0"/>
+              <a:t/>
+            </a:r>
             <a:br>
               <a:rPr lang="en-US" altLang="ko-KR" dirty="0"/>
             </a:br>
@@ -21481,6 +22285,10 @@
               <a:rPr lang="ko-KR" altLang="en-US" dirty="0" err="1"/>
               <a:t>받아옴</a:t>
             </a:r>
+            <a:r>
+              <a:rPr lang="en-US" altLang="ko-KR" dirty="0"/>
+              <a:t/>
+            </a:r>
             <a:br>
               <a:rPr lang="en-US" altLang="ko-KR" dirty="0"/>
             </a:br>
@@ -21584,6 +22392,10 @@
               <a:rPr lang="en-US" altLang="ko-KR" dirty="0" err="1"/>
               <a:t>setRedYellowGreenState</a:t>
             </a:r>
+            <a:r>
+              <a:rPr lang="en-US" altLang="ko-KR" dirty="0"/>
+              <a:t/>
+            </a:r>
             <a:br>
               <a:rPr lang="en-US" altLang="ko-KR" dirty="0"/>
             </a:br>
@@ -21595,6 +22407,10 @@
               <a:rPr lang="en-US" altLang="ko-KR" dirty="0" err="1"/>
               <a:t>setPhaseDuration</a:t>
             </a:r>
+            <a:r>
+              <a:rPr lang="en-US" altLang="ko-KR" dirty="0"/>
+              <a:t/>
+            </a:r>
             <a:br>
               <a:rPr lang="en-US" altLang="ko-KR" dirty="0"/>
             </a:br>
@@ -21621,6 +22437,10 @@
             <a:r>
               <a:rPr lang="ko-KR" altLang="en-US" dirty="0"/>
               <a:t> 프로그램 삽입</a:t>
+            </a:r>
+            <a:r>
+              <a:rPr lang="en-US" altLang="ko-KR" dirty="0"/>
+              <a:t/>
             </a:r>
             <a:br>
               <a:rPr lang="en-US" altLang="ko-KR" dirty="0"/>

</xml_diff>